<commit_message>
Expressions link → ulearn.me
</commit_message>
<xml_diff>
--- a/mocks.pptx
+++ b/mocks.pptx
@@ -2487,6 +2487,13 @@
         </dgm:presLayoutVars>
       </dgm:prSet>
       <dgm:spPr/>
+      <dgm:t>
+        <a:bodyPr/>
+        <a:lstStyle/>
+        <a:p>
+          <a:endParaRPr lang="ru-RU"/>
+        </a:p>
+      </dgm:t>
     </dgm:pt>
     <dgm:pt modelId="{CF6D50B3-578A-4EA0-A5A0-492FA729F6ED}" type="pres">
       <dgm:prSet presAssocID="{B75F6A3A-9A51-4DF3-8A57-9AEB0739425C}" presName="composite" presStyleCnt="0"/>
@@ -2499,6 +2506,13 @@
         </dgm:presLayoutVars>
       </dgm:prSet>
       <dgm:spPr/>
+      <dgm:t>
+        <a:bodyPr/>
+        <a:lstStyle/>
+        <a:p>
+          <a:endParaRPr lang="ru-RU"/>
+        </a:p>
+      </dgm:t>
     </dgm:pt>
     <dgm:pt modelId="{61EB78D8-69FF-471D-8FEB-71388C442F55}" type="pres">
       <dgm:prSet presAssocID="{B75F6A3A-9A51-4DF3-8A57-9AEB0739425C}" presName="rect1" presStyleLbl="alignImgPlace1" presStyleIdx="0" presStyleCnt="1" custScaleX="596594" custScaleY="114980" custLinFactX="-64576" custLinFactNeighborX="-100000" custLinFactNeighborY="-13065"/>
@@ -2520,9 +2534,9 @@
     </dgm:pt>
   </dgm:ptLst>
   <dgm:cxnLst>
+    <dgm:cxn modelId="{017518C9-1619-4B19-AA03-86BA999BA287}" srcId="{EAB81984-5B84-4970-8447-2B456B8C58DF}" destId="{B75F6A3A-9A51-4DF3-8A57-9AEB0739425C}" srcOrd="0" destOrd="0" parTransId="{203596AF-4F49-40BA-B1E1-11BDD34B512E}" sibTransId="{A056157B-3867-49A4-9195-F3A4F3FBBA8E}"/>
     <dgm:cxn modelId="{1CEAA455-5BF4-4666-95B8-390900AB8124}" type="presOf" srcId="{EAB81984-5B84-4970-8447-2B456B8C58DF}" destId="{3A252E36-3D7E-49E5-B812-EE4CACF0D5CF}" srcOrd="0" destOrd="0" presId="urn:microsoft.com/office/officeart/2008/layout/PictureGrid"/>
     <dgm:cxn modelId="{147A14B3-96E8-4139-969B-9DB1BCB4D95E}" type="presOf" srcId="{B75F6A3A-9A51-4DF3-8A57-9AEB0739425C}" destId="{B29ABF60-EC0F-45AD-A90E-9C76D15C2F14}" srcOrd="0" destOrd="0" presId="urn:microsoft.com/office/officeart/2008/layout/PictureGrid"/>
-    <dgm:cxn modelId="{017518C9-1619-4B19-AA03-86BA999BA287}" srcId="{EAB81984-5B84-4970-8447-2B456B8C58DF}" destId="{B75F6A3A-9A51-4DF3-8A57-9AEB0739425C}" srcOrd="0" destOrd="0" parTransId="{203596AF-4F49-40BA-B1E1-11BDD34B512E}" sibTransId="{A056157B-3867-49A4-9195-F3A4F3FBBA8E}"/>
     <dgm:cxn modelId="{D3458AFA-605E-43EE-8C8A-0E0C1E3CD931}" type="presParOf" srcId="{3A252E36-3D7E-49E5-B812-EE4CACF0D5CF}" destId="{CF6D50B3-578A-4EA0-A5A0-492FA729F6ED}" srcOrd="0" destOrd="0" presId="urn:microsoft.com/office/officeart/2008/layout/PictureGrid"/>
     <dgm:cxn modelId="{9835F3F3-3E30-4AC4-AD89-BC095FA9A878}" type="presParOf" srcId="{CF6D50B3-578A-4EA0-A5A0-492FA729F6ED}" destId="{B29ABF60-EC0F-45AD-A90E-9C76D15C2F14}" srcOrd="0" destOrd="0" presId="urn:microsoft.com/office/officeart/2008/layout/PictureGrid"/>
     <dgm:cxn modelId="{70FA379F-7827-49B9-806E-1FD72CAE8F89}" type="presParOf" srcId="{CF6D50B3-578A-4EA0-A5A0-492FA729F6ED}" destId="{61EB78D8-69FF-471D-8FEB-71388C442F55}" srcOrd="1" destOrd="0" presId="urn:microsoft.com/office/officeart/2008/layout/PictureGrid"/>
@@ -2594,6 +2608,13 @@
         </dgm:presLayoutVars>
       </dgm:prSet>
       <dgm:spPr/>
+      <dgm:t>
+        <a:bodyPr/>
+        <a:lstStyle/>
+        <a:p>
+          <a:endParaRPr lang="ru-RU"/>
+        </a:p>
+      </dgm:t>
     </dgm:pt>
     <dgm:pt modelId="{CF6D50B3-578A-4EA0-A5A0-492FA729F6ED}" type="pres">
       <dgm:prSet presAssocID="{B75F6A3A-9A51-4DF3-8A57-9AEB0739425C}" presName="composite" presStyleCnt="0"/>
@@ -2606,6 +2627,13 @@
         </dgm:presLayoutVars>
       </dgm:prSet>
       <dgm:spPr/>
+      <dgm:t>
+        <a:bodyPr/>
+        <a:lstStyle/>
+        <a:p>
+          <a:endParaRPr lang="ru-RU"/>
+        </a:p>
+      </dgm:t>
     </dgm:pt>
     <dgm:pt modelId="{61EB78D8-69FF-471D-8FEB-71388C442F55}" type="pres">
       <dgm:prSet presAssocID="{B75F6A3A-9A51-4DF3-8A57-9AEB0739425C}" presName="rect1" presStyleLbl="alignImgPlace1" presStyleIdx="0" presStyleCnt="1" custScaleX="596594" custScaleY="114980" custLinFactX="-64576" custLinFactNeighborX="-100000" custLinFactNeighborY="-13065"/>
@@ -2627,9 +2655,9 @@
     </dgm:pt>
   </dgm:ptLst>
   <dgm:cxnLst>
+    <dgm:cxn modelId="{017518C9-1619-4B19-AA03-86BA999BA287}" srcId="{EAB81984-5B84-4970-8447-2B456B8C58DF}" destId="{B75F6A3A-9A51-4DF3-8A57-9AEB0739425C}" srcOrd="0" destOrd="0" parTransId="{203596AF-4F49-40BA-B1E1-11BDD34B512E}" sibTransId="{A056157B-3867-49A4-9195-F3A4F3FBBA8E}"/>
     <dgm:cxn modelId="{1CEAA455-5BF4-4666-95B8-390900AB8124}" type="presOf" srcId="{EAB81984-5B84-4970-8447-2B456B8C58DF}" destId="{3A252E36-3D7E-49E5-B812-EE4CACF0D5CF}" srcOrd="0" destOrd="0" presId="urn:microsoft.com/office/officeart/2008/layout/PictureGrid"/>
     <dgm:cxn modelId="{147A14B3-96E8-4139-969B-9DB1BCB4D95E}" type="presOf" srcId="{B75F6A3A-9A51-4DF3-8A57-9AEB0739425C}" destId="{B29ABF60-EC0F-45AD-A90E-9C76D15C2F14}" srcOrd="0" destOrd="0" presId="urn:microsoft.com/office/officeart/2008/layout/PictureGrid"/>
-    <dgm:cxn modelId="{017518C9-1619-4B19-AA03-86BA999BA287}" srcId="{EAB81984-5B84-4970-8447-2B456B8C58DF}" destId="{B75F6A3A-9A51-4DF3-8A57-9AEB0739425C}" srcOrd="0" destOrd="0" parTransId="{203596AF-4F49-40BA-B1E1-11BDD34B512E}" sibTransId="{A056157B-3867-49A4-9195-F3A4F3FBBA8E}"/>
     <dgm:cxn modelId="{D3458AFA-605E-43EE-8C8A-0E0C1E3CD931}" type="presParOf" srcId="{3A252E36-3D7E-49E5-B812-EE4CACF0D5CF}" destId="{CF6D50B3-578A-4EA0-A5A0-492FA729F6ED}" srcOrd="0" destOrd="0" presId="urn:microsoft.com/office/officeart/2008/layout/PictureGrid"/>
     <dgm:cxn modelId="{9835F3F3-3E30-4AC4-AD89-BC095FA9A878}" type="presParOf" srcId="{CF6D50B3-578A-4EA0-A5A0-492FA729F6ED}" destId="{B29ABF60-EC0F-45AD-A90E-9C76D15C2F14}" srcOrd="0" destOrd="0" presId="urn:microsoft.com/office/officeart/2008/layout/PictureGrid"/>
     <dgm:cxn modelId="{70FA379F-7827-49B9-806E-1FD72CAE8F89}" type="presParOf" srcId="{CF6D50B3-578A-4EA0-A5A0-492FA729F6ED}" destId="{61EB78D8-69FF-471D-8FEB-71388C442F55}" srcOrd="1" destOrd="0" presId="urn:microsoft.com/office/officeart/2008/layout/PictureGrid"/>
@@ -2719,6 +2747,13 @@
         </dgm:presLayoutVars>
       </dgm:prSet>
       <dgm:spPr/>
+      <dgm:t>
+        <a:bodyPr/>
+        <a:lstStyle/>
+        <a:p>
+          <a:endParaRPr lang="ru-RU"/>
+        </a:p>
+      </dgm:t>
     </dgm:pt>
     <dgm:pt modelId="{65D73C51-61AB-436D-8191-975603FC9C68}" type="pres">
       <dgm:prSet presAssocID="{9C9C0585-42CE-4F34-A2BB-F1377DA03788}" presName="composite" presStyleCnt="0"/>
@@ -2731,6 +2766,13 @@
         </dgm:presLayoutVars>
       </dgm:prSet>
       <dgm:spPr/>
+      <dgm:t>
+        <a:bodyPr/>
+        <a:lstStyle/>
+        <a:p>
+          <a:endParaRPr lang="ru-RU"/>
+        </a:p>
+      </dgm:t>
     </dgm:pt>
     <dgm:pt modelId="{DFDA3CA3-5C68-4A2F-A4A8-285063A35D87}" type="pres">
       <dgm:prSet presAssocID="{9C9C0585-42CE-4F34-A2BB-F1377DA03788}" presName="rect1" presStyleLbl="alignImgPlace1" presStyleIdx="0" presStyleCnt="1" custScaleX="62421" custScaleY="62421" custLinFactNeighborX="1076" custLinFactNeighborY="-52209"/>
@@ -2755,8 +2797,8 @@
     </dgm:pt>
   </dgm:ptLst>
   <dgm:cxnLst>
+    <dgm:cxn modelId="{A177C822-7566-4410-A889-706A6CE15148}" srcId="{8F66C165-B39F-46D3-B19F-623799541DD3}" destId="{9C9C0585-42CE-4F34-A2BB-F1377DA03788}" srcOrd="0" destOrd="0" parTransId="{4E5DCF2B-AAE7-41E2-837F-518128C03597}" sibTransId="{56F70C7F-1925-4DBA-9BD6-AF5E91799A59}"/>
     <dgm:cxn modelId="{A9E27516-E8E4-42A7-A155-024D48E79559}" type="presOf" srcId="{8F66C165-B39F-46D3-B19F-623799541DD3}" destId="{B6F028CB-F170-4FEF-BC3A-25F0E90D434A}" srcOrd="0" destOrd="0" presId="urn:microsoft.com/office/officeart/2008/layout/PictureGrid"/>
-    <dgm:cxn modelId="{A177C822-7566-4410-A889-706A6CE15148}" srcId="{8F66C165-B39F-46D3-B19F-623799541DD3}" destId="{9C9C0585-42CE-4F34-A2BB-F1377DA03788}" srcOrd="0" destOrd="0" parTransId="{4E5DCF2B-AAE7-41E2-837F-518128C03597}" sibTransId="{56F70C7F-1925-4DBA-9BD6-AF5E91799A59}"/>
     <dgm:cxn modelId="{ACD53F50-5BA1-48C9-B5DF-09BF6DA4DE65}" type="presOf" srcId="{9C9C0585-42CE-4F34-A2BB-F1377DA03788}" destId="{A30F2283-C0A4-4A69-BCBE-833D967155A2}" srcOrd="0" destOrd="0" presId="urn:microsoft.com/office/officeart/2008/layout/PictureGrid"/>
     <dgm:cxn modelId="{CC189C1C-06A1-4F03-B886-67BF46A53703}" type="presParOf" srcId="{B6F028CB-F170-4FEF-BC3A-25F0E90D434A}" destId="{65D73C51-61AB-436D-8191-975603FC9C68}" srcOrd="0" destOrd="0" presId="urn:microsoft.com/office/officeart/2008/layout/PictureGrid"/>
     <dgm:cxn modelId="{CD7DB92E-B84F-43A0-AC2D-FBBFB40722EE}" type="presParOf" srcId="{65D73C51-61AB-436D-8191-975603FC9C68}" destId="{A30F2283-C0A4-4A69-BCBE-833D967155A2}" srcOrd="0" destOrd="0" presId="urn:microsoft.com/office/officeart/2008/layout/PictureGrid"/>
@@ -2817,7 +2859,7 @@
         </a:bodyPr>
         <a:lstStyle/>
         <a:p>
-          <a:pPr marL="0" lvl="0" indent="0" algn="l" defTabSz="222250">
+          <a:pPr lvl="0" algn="l" defTabSz="222250">
             <a:lnSpc>
               <a:spcPct val="90000"/>
             </a:lnSpc>
@@ -2827,7 +2869,6 @@
             <a:spcAft>
               <a:spcPct val="35000"/>
             </a:spcAft>
-            <a:buNone/>
           </a:pPr>
           <a:r>
             <a:rPr lang="ru-RU" sz="500" kern="1200" dirty="0"/>
@@ -2904,118 +2945,6 @@
       <dsp:cNvGrpSpPr/>
     </dsp:nvGrpSpPr>
     <dsp:grpSpPr/>
-    <dsp:sp modelId="{B29ABF60-EC0F-45AD-A90E-9C76D15C2F14}">
-      <dsp:nvSpPr>
-        <dsp:cNvPr id="0" name=""/>
-        <dsp:cNvSpPr/>
-      </dsp:nvSpPr>
-      <dsp:spPr>
-        <a:xfrm>
-          <a:off x="1748174" y="210303"/>
-          <a:ext cx="175586" cy="38914"/>
-        </a:xfrm>
-        <a:prstGeom prst="rect">
-          <a:avLst/>
-        </a:prstGeom>
-        <a:noFill/>
-        <a:ln>
-          <a:noFill/>
-        </a:ln>
-        <a:effectLst/>
-      </dsp:spPr>
-      <dsp:style>
-        <a:lnRef idx="0">
-          <a:scrgbClr r="0" g="0" b="0"/>
-        </a:lnRef>
-        <a:fillRef idx="0">
-          <a:scrgbClr r="0" g="0" b="0"/>
-        </a:fillRef>
-        <a:effectRef idx="0">
-          <a:scrgbClr r="0" g="0" b="0"/>
-        </a:effectRef>
-        <a:fontRef idx="minor"/>
-      </dsp:style>
-      <dsp:txBody>
-        <a:bodyPr spcFirstLastPara="0" vert="horz" wrap="square" lIns="0" tIns="19050" rIns="19050" bIns="0" numCol="1" spcCol="1270" anchor="t" anchorCtr="0">
-          <a:noAutofit/>
-        </a:bodyPr>
-        <a:lstStyle/>
-        <a:p>
-          <a:pPr marL="0" lvl="0" indent="0" algn="l" defTabSz="222250">
-            <a:lnSpc>
-              <a:spcPct val="90000"/>
-            </a:lnSpc>
-            <a:spcBef>
-              <a:spcPct val="0"/>
-            </a:spcBef>
-            <a:spcAft>
-              <a:spcPct val="35000"/>
-            </a:spcAft>
-            <a:buNone/>
-          </a:pPr>
-          <a:r>
-            <a:rPr lang="ru-RU" sz="500" kern="1200" dirty="0"/>
-            <a:t> </a:t>
-          </a:r>
-        </a:p>
-      </dsp:txBody>
-      <dsp:txXfrm>
-        <a:off x="1748174" y="210303"/>
-        <a:ext cx="175586" cy="38914"/>
-      </dsp:txXfrm>
-    </dsp:sp>
-    <dsp:sp modelId="{61EB78D8-69FF-471D-8FEB-71388C442F55}">
-      <dsp:nvSpPr>
-        <dsp:cNvPr id="0" name=""/>
-        <dsp:cNvSpPr/>
-      </dsp:nvSpPr>
-      <dsp:spPr>
-        <a:xfrm>
-          <a:off x="0" y="0"/>
-          <a:ext cx="1980001" cy="381600"/>
-        </a:xfrm>
-        <a:prstGeom prst="rect">
-          <a:avLst/>
-        </a:prstGeom>
-        <a:blipFill>
-          <a:blip xmlns:r="http://schemas.openxmlformats.org/officeDocument/2006/relationships" r:embed="rId1">
-            <a:extLst>
-              <a:ext uri="{28A0092B-C50C-407E-A947-70E740481C1C}">
-                <a14:useLocalDpi xmlns:a14="http://schemas.microsoft.com/office/drawing/2010/main" val="0"/>
-              </a:ext>
-            </a:extLst>
-          </a:blip>
-          <a:srcRect/>
-          <a:stretch>
-            <a:fillRect l="-1000" r="-1000"/>
-          </a:stretch>
-        </a:blipFill>
-        <a:ln w="25400" cap="flat" cmpd="sng" algn="ctr">
-          <a:solidFill>
-            <a:schemeClr val="lt1">
-              <a:hueOff val="0"/>
-              <a:satOff val="0"/>
-              <a:lumOff val="0"/>
-              <a:alphaOff val="0"/>
-            </a:schemeClr>
-          </a:solidFill>
-          <a:prstDash val="solid"/>
-        </a:ln>
-        <a:effectLst/>
-      </dsp:spPr>
-      <dsp:style>
-        <a:lnRef idx="2">
-          <a:scrgbClr r="0" g="0" b="0"/>
-        </a:lnRef>
-        <a:fillRef idx="1">
-          <a:scrgbClr r="0" g="0" b="0"/>
-        </a:fillRef>
-        <a:effectRef idx="0">
-          <a:scrgbClr r="0" g="0" b="0"/>
-        </a:effectRef>
-        <a:fontRef idx="minor"/>
-      </dsp:style>
-    </dsp:sp>
   </dsp:spTree>
 </dsp:drawing>
 </file>
@@ -3028,128 +2957,6 @@
       <dsp:cNvGrpSpPr/>
     </dsp:nvGrpSpPr>
     <dsp:grpSpPr/>
-    <dsp:sp modelId="{A30F2283-C0A4-4A69-BCBE-833D967155A2}">
-      <dsp:nvSpPr>
-        <dsp:cNvPr id="0" name=""/>
-        <dsp:cNvSpPr/>
-      </dsp:nvSpPr>
-      <dsp:spPr>
-        <a:xfrm>
-          <a:off x="469735" y="1146225"/>
-          <a:ext cx="2927097" cy="509149"/>
-        </a:xfrm>
-        <a:prstGeom prst="rect">
-          <a:avLst/>
-        </a:prstGeom>
-        <a:noFill/>
-        <a:ln>
-          <a:noFill/>
-        </a:ln>
-        <a:effectLst/>
-      </dsp:spPr>
-      <dsp:style>
-        <a:lnRef idx="0">
-          <a:scrgbClr r="0" g="0" b="0"/>
-        </a:lnRef>
-        <a:fillRef idx="0">
-          <a:scrgbClr r="0" g="0" b="0"/>
-        </a:fillRef>
-        <a:effectRef idx="0">
-          <a:scrgbClr r="0" g="0" b="0"/>
-        </a:effectRef>
-        <a:fontRef idx="minor"/>
-      </dsp:style>
-      <dsp:txBody>
-        <a:bodyPr spcFirstLastPara="0" vert="horz" wrap="square" lIns="0" tIns="152400" rIns="152400" bIns="0" numCol="1" spcCol="1270" anchor="b" anchorCtr="0">
-          <a:noAutofit/>
-        </a:bodyPr>
-        <a:lstStyle/>
-        <a:p>
-          <a:pPr marL="0" lvl="0" indent="0" algn="ctr" defTabSz="1778000">
-            <a:lnSpc>
-              <a:spcPct val="90000"/>
-            </a:lnSpc>
-            <a:spcBef>
-              <a:spcPct val="0"/>
-            </a:spcBef>
-            <a:spcAft>
-              <a:spcPct val="35000"/>
-            </a:spcAft>
-            <a:buNone/>
-          </a:pPr>
-          <a:r>
-            <a:rPr lang="ru-RU" sz="4000" kern="1200" dirty="0">
-              <a:solidFill>
-                <a:schemeClr val="accent1"/>
-              </a:solidFill>
-            </a:rPr>
-            <a:t>ВОПРОСЫ</a:t>
-          </a:r>
-          <a:r>
-            <a:rPr lang="en-US" sz="4000" kern="1200" dirty="0">
-              <a:solidFill>
-                <a:schemeClr val="accent1"/>
-              </a:solidFill>
-            </a:rPr>
-            <a:t>?</a:t>
-          </a:r>
-          <a:endParaRPr lang="ru-RU" sz="4000" kern="1200" dirty="0">
-            <a:solidFill>
-              <a:schemeClr val="accent1"/>
-            </a:solidFill>
-          </a:endParaRPr>
-        </a:p>
-      </dsp:txBody>
-      <dsp:txXfrm>
-        <a:off x="469735" y="1146225"/>
-        <a:ext cx="2927097" cy="509149"/>
-      </dsp:txXfrm>
-    </dsp:sp>
-    <dsp:sp modelId="{DFDA3CA3-5C68-4A2F-A4A8-285063A35D87}">
-      <dsp:nvSpPr>
-        <dsp:cNvPr id="0" name=""/>
-        <dsp:cNvSpPr/>
-      </dsp:nvSpPr>
-      <dsp:spPr>
-        <a:xfrm>
-          <a:off x="1521700" y="91137"/>
-          <a:ext cx="849599" cy="849599"/>
-        </a:xfrm>
-        <a:prstGeom prst="rect">
-          <a:avLst/>
-        </a:prstGeom>
-        <a:blipFill>
-          <a:blip xmlns:r="http://schemas.openxmlformats.org/officeDocument/2006/relationships" r:embed="rId1">
-            <a:extLst>
-              <a:ext uri="{28A0092B-C50C-407E-A947-70E740481C1C}">
-                <a14:useLocalDpi xmlns:a14="http://schemas.microsoft.com/office/drawing/2010/main" val="0"/>
-              </a:ext>
-            </a:extLst>
-          </a:blip>
-          <a:srcRect/>
-          <a:stretch>
-            <a:fillRect/>
-          </a:stretch>
-        </a:blipFill>
-        <a:ln w="0" cap="flat" cmpd="sng" algn="ctr">
-          <a:noFill/>
-          <a:prstDash val="solid"/>
-        </a:ln>
-        <a:effectLst/>
-      </dsp:spPr>
-      <dsp:style>
-        <a:lnRef idx="2">
-          <a:scrgbClr r="0" g="0" b="0"/>
-        </a:lnRef>
-        <a:fillRef idx="1">
-          <a:scrgbClr r="0" g="0" b="0"/>
-        </a:fillRef>
-        <a:effectRef idx="0">
-          <a:scrgbClr r="0" g="0" b="0"/>
-        </a:effectRef>
-        <a:fontRef idx="minor"/>
-      </dsp:style>
-    </dsp:sp>
   </dsp:spTree>
 </dsp:drawing>
 </file>
@@ -7136,7 +6943,7 @@
           <a:p>
             <a:fld id="{1D12B38D-150E-44F0-AD67-CE4A0E7D73CD}" type="datetimeFigureOut">
               <a:rPr lang="ru-RU" smtClean="0"/>
-              <a:t>07.08.2017</a:t>
+              <a:t>16.08.2017</a:t>
             </a:fld>
             <a:endParaRPr lang="ru-RU"/>
           </a:p>
@@ -11980,6 +11787,13 @@
   <p:clrMapOvr>
     <a:masterClrMapping/>
   </p:clrMapOvr>
+  <p:timing>
+    <p:tnLst>
+      <p:par>
+        <p:cTn id="1" dur="indefinite" restart="never" nodeType="tmRoot"/>
+      </p:par>
+    </p:tnLst>
+  </p:timing>
 </p:sld>
 </file>
 
@@ -13709,6 +13523,14 @@
   <p:clrMapOvr>
     <a:masterClrMapping/>
   </p:clrMapOvr>
+  <mc:AlternateContent xmlns:mc="http://schemas.openxmlformats.org/markup-compatibility/2006">
+    <mc:Choice xmlns:p14="http://schemas.microsoft.com/office/powerpoint/2010/main" Requires="p14">
+      <p:transition spd="slow" p14:dur="2000"/>
+    </mc:Choice>
+    <mc:Fallback>
+      <p:transition spd="slow"/>
+    </mc:Fallback>
+  </mc:AlternateContent>
 </p:sld>
 </file>
 
@@ -13953,6 +13775,14 @@
   <p:clrMapOvr>
     <a:masterClrMapping/>
   </p:clrMapOvr>
+  <mc:AlternateContent xmlns:mc="http://schemas.openxmlformats.org/markup-compatibility/2006">
+    <mc:Choice xmlns:p14="http://schemas.microsoft.com/office/powerpoint/2010/main" Requires="p14">
+      <p:transition spd="slow" p14:dur="2000"/>
+    </mc:Choice>
+    <mc:Fallback>
+      <p:transition spd="slow"/>
+    </mc:Fallback>
+  </mc:AlternateContent>
 </p:sld>
 </file>
 
@@ -14067,6 +13897,10 @@
             <a:r>
               <a:rPr lang="en-US" dirty="0"/>
               <a:t>ct</a:t>
+            </a:r>
+            <a:r>
+              <a:rPr lang="ru-RU" dirty="0"/>
+              <a:t/>
             </a:r>
             <a:br>
               <a:rPr lang="ru-RU" dirty="0"/>
@@ -14654,6 +14488,16 @@
               </a:rPr>
               <a:t>&gt;(); </a:t>
             </a:r>
+            <a:r>
+              <a:rPr lang="en-US" altLang="ru-RU" sz="2000" dirty="0">
+                <a:solidFill>
+                  <a:srgbClr val="969896"/>
+                </a:solidFill>
+                <a:latin typeface="Consolas" panose="020B0609020204030204" pitchFamily="49" charset="0"/>
+                <a:cs typeface="Consolas" panose="020B0609020204030204" pitchFamily="49" charset="0"/>
+              </a:rPr>
+              <a:t/>
+            </a:r>
             <a:br>
               <a:rPr lang="en-US" altLang="ru-RU" sz="2000" dirty="0">
                 <a:solidFill>
@@ -15154,6 +14998,13 @@
   <p:clrMapOvr>
     <a:masterClrMapping/>
   </p:clrMapOvr>
+  <p:timing>
+    <p:tnLst>
+      <p:par>
+        <p:cTn id="1" dur="indefinite" restart="never" nodeType="tmRoot"/>
+      </p:par>
+    </p:tnLst>
+  </p:timing>
 </p:sld>
 </file>
 
@@ -15317,6 +15168,13 @@
   <p:clrMapOvr>
     <a:masterClrMapping/>
   </p:clrMapOvr>
+  <p:timing>
+    <p:tnLst>
+      <p:par>
+        <p:cTn id="1" dur="indefinite" restart="never" nodeType="tmRoot"/>
+      </p:par>
+    </p:tnLst>
+  </p:timing>
 </p:sld>
 </file>
 
@@ -15361,6 +15219,10 @@
               <a:rPr lang="en-US" dirty="0" err="1"/>
               <a:t>Castle.DynamicProxy</a:t>
             </a:r>
+            <a:r>
+              <a:rPr lang="en-US" sz="2200" dirty="0"/>
+              <a:t/>
+            </a:r>
             <a:br>
               <a:rPr lang="en-US" sz="2200" dirty="0"/>
             </a:br>
@@ -15389,6 +15251,10 @@
             <a:endParaRPr lang="ru-RU" dirty="0"/>
           </a:p>
           <a:p>
+            <a:r>
+              <a:rPr lang="en-US" sz="2200" dirty="0"/>
+              <a:t/>
+            </a:r>
             <a:br>
               <a:rPr lang="en-US" sz="2200" dirty="0"/>
             </a:br>
@@ -15606,29 +15472,55 @@
             </a:endParaRPr>
           </a:p>
           <a:p>
-            <a:endParaRPr lang="en-US" sz="2200" dirty="0">
-              <a:latin typeface="Consolas" panose="020B0609020204030204" pitchFamily="49" charset="0"/>
+            <a:endParaRPr lang="en-US" sz="1400" dirty="0" smtClean="0">
+              <a:hlinkClick r:id="rId3"/>
             </a:endParaRPr>
           </a:p>
           <a:p>
             <a:r>
-              <a:rPr lang="en-US" sz="2200" dirty="0">
+              <a:rPr lang="ru-RU" sz="1800" dirty="0" smtClean="0">
                 <a:hlinkClick r:id="rId3"/>
               </a:rPr>
-              <a:t>http://habrahabr.ru/post/83169/</a:t>
-            </a:r>
-            <a:r>
-              <a:rPr lang="en-US" sz="2200" dirty="0"/>
+              <a:t>Про </a:t>
+            </a:r>
+            <a:r>
+              <a:rPr lang="en-US" sz="1800" dirty="0" smtClean="0">
+                <a:hlinkClick r:id="rId3"/>
+              </a:rPr>
+              <a:t>Expressions </a:t>
+            </a:r>
+            <a:r>
+              <a:rPr lang="ru-RU" sz="1800" dirty="0" smtClean="0">
+                <a:hlinkClick r:id="rId3"/>
+              </a:rPr>
+              <a:t>на </a:t>
+            </a:r>
+            <a:r>
+              <a:rPr lang="en-US" sz="1800" dirty="0" smtClean="0">
+                <a:hlinkClick r:id="rId3"/>
+              </a:rPr>
+              <a:t>ulearn.me</a:t>
+            </a:r>
+            <a:r>
+              <a:rPr lang="en-US" sz="1100" dirty="0"/>
               <a:t> </a:t>
             </a:r>
-            <a:r>
-              <a:rPr lang="ru-RU" sz="2200" dirty="0"/>
-              <a:t> — про </a:t>
-            </a:r>
-            <a:r>
-              <a:rPr lang="en-US" sz="2200" dirty="0"/>
-              <a:t>Expression&lt;T&gt;</a:t>
-            </a:r>
+            <a:endParaRPr lang="en-US" sz="1100" dirty="0" smtClean="0"/>
+          </a:p>
+          <a:p>
+            <a:r>
+              <a:rPr lang="en-US" sz="1100" smtClean="0"/>
+              <a:t>https</a:t>
+            </a:r>
+            <a:r>
+              <a:rPr lang="en-US" sz="1100"/>
+              <a:t>://</a:t>
+            </a:r>
+            <a:r>
+              <a:rPr lang="en-US" sz="1100" smtClean="0"/>
+              <a:t>ulearn.me/Course/BasicProgramming2/2a224f58-f29d-4047-9ed1-5662f860f344</a:t>
+            </a:r>
+            <a:endParaRPr lang="en-US" sz="1800" dirty="0"/>
           </a:p>
         </p:txBody>
       </p:sp>
@@ -16128,19 +16020,68 @@
                             </p:stCondLst>
                             <p:childTnLst>
                               <p:par>
-                                <p:cTn id="25" presetID="1" presetClass="entr" presetSubtype="0" fill="hold" grpId="0" nodeType="clickEffect" nodePh="1">
+                                <p:cTn id="25" presetID="1" presetClass="entr" presetSubtype="0" fill="hold" nodeType="clickEffect">
+                                  <p:stCondLst>
+                                    <p:cond delay="0"/>
+                                  </p:stCondLst>
+                                  <p:childTnLst>
+                                    <p:set>
+                                      <p:cBhvr>
+                                        <p:cTn id="26" dur="1" fill="hold">
+                                          <p:stCondLst>
+                                            <p:cond delay="0"/>
+                                          </p:stCondLst>
+                                        </p:cTn>
+                                        <p:tgtEl>
+                                          <p:spTgt spid="3">
+                                            <p:txEl>
+                                              <p:pRg st="8" end="8"/>
+                                            </p:txEl>
+                                          </p:spTgt>
+                                        </p:tgtEl>
+                                        <p:attrNameLst>
+                                          <p:attrName>style.visibility</p:attrName>
+                                        </p:attrNameLst>
+                                      </p:cBhvr>
+                                      <p:to>
+                                        <p:strVal val="visible"/>
+                                      </p:to>
+                                    </p:set>
+                                  </p:childTnLst>
+                                </p:cTn>
+                              </p:par>
+                            </p:childTnLst>
+                          </p:cTn>
+                        </p:par>
+                      </p:childTnLst>
+                    </p:cTn>
+                  </p:par>
+                  <p:par>
+                    <p:cTn id="27" fill="hold">
+                      <p:stCondLst>
+                        <p:cond delay="indefinite"/>
+                      </p:stCondLst>
+                      <p:childTnLst>
+                        <p:par>
+                          <p:cTn id="28" fill="hold">
+                            <p:stCondLst>
+                              <p:cond delay="0"/>
+                            </p:stCondLst>
+                            <p:childTnLst>
+                              <p:par>
+                                <p:cTn id="29" presetID="1" presetClass="entr" presetSubtype="0" fill="hold" grpId="0" nodeType="clickEffect" nodePh="1">
                                   <p:stCondLst>
                                     <p:cond delay="0"/>
                                   </p:stCondLst>
                                   <p:endCondLst>
                                     <p:cond evt="begin" delay="0">
-                                      <p:tn val="25"/>
+                                      <p:tn val="29"/>
                                     </p:cond>
                                   </p:endCondLst>
                                   <p:childTnLst>
                                     <p:set>
                                       <p:cBhvr>
-                                        <p:cTn id="26" dur="1" fill="hold">
+                                        <p:cTn id="30" dur="1" fill="hold">
                                           <p:stCondLst>
                                             <p:cond delay="0"/>
                                           </p:stCondLst>
@@ -16369,6 +16310,13 @@
   <p:clrMapOvr>
     <a:masterClrMapping/>
   </p:clrMapOvr>
+  <p:timing>
+    <p:tnLst>
+      <p:par>
+        <p:cTn id="1" dur="indefinite" restart="never" nodeType="tmRoot"/>
+      </p:par>
+    </p:tnLst>
+  </p:timing>
 </p:sld>
 </file>
 

</xml_diff>

<commit_message>
Added lecturer notes to presentation. Added a slide about AssignsOutAndRefParameters
</commit_message>
<xml_diff>
--- a/mocks.pptx
+++ b/mocks.pptx
@@ -6,7 +6,7 @@
     <p:sldMasterId id="2147483704" r:id="rId2"/>
   </p:sldMasterIdLst>
   <p:notesMasterIdLst>
-    <p:notesMasterId r:id="rId20"/>
+    <p:notesMasterId r:id="rId21"/>
   </p:notesMasterIdLst>
   <p:sldIdLst>
     <p:sldId id="329" r:id="rId3"/>
@@ -16,16 +16,17 @@
     <p:sldId id="318" r:id="rId7"/>
     <p:sldId id="322" r:id="rId8"/>
     <p:sldId id="336" r:id="rId9"/>
-    <p:sldId id="330" r:id="rId10"/>
-    <p:sldId id="327" r:id="rId11"/>
-    <p:sldId id="337" r:id="rId12"/>
-    <p:sldId id="328" r:id="rId13"/>
-    <p:sldId id="333" r:id="rId14"/>
-    <p:sldId id="332" r:id="rId15"/>
-    <p:sldId id="335" r:id="rId16"/>
-    <p:sldId id="331" r:id="rId17"/>
-    <p:sldId id="324" r:id="rId18"/>
-    <p:sldId id="334" r:id="rId19"/>
+    <p:sldId id="338" r:id="rId10"/>
+    <p:sldId id="330" r:id="rId11"/>
+    <p:sldId id="327" r:id="rId12"/>
+    <p:sldId id="337" r:id="rId13"/>
+    <p:sldId id="328" r:id="rId14"/>
+    <p:sldId id="333" r:id="rId15"/>
+    <p:sldId id="332" r:id="rId16"/>
+    <p:sldId id="335" r:id="rId17"/>
+    <p:sldId id="331" r:id="rId18"/>
+    <p:sldId id="324" r:id="rId19"/>
+    <p:sldId id="334" r:id="rId20"/>
   </p:sldIdLst>
   <p:sldSz cx="12192000" cy="6858000"/>
   <p:notesSz cx="6858000" cy="9144000"/>
@@ -144,6 +145,7 @@
           <p14:sldIdLst>
             <p14:sldId id="322"/>
             <p14:sldId id="336"/>
+            <p14:sldId id="338"/>
             <p14:sldId id="330"/>
           </p14:sldIdLst>
         </p14:section>
@@ -6943,7 +6945,7 @@
           <a:p>
             <a:fld id="{1D12B38D-150E-44F0-AD67-CE4A0E7D73CD}" type="datetimeFigureOut">
               <a:rPr lang="ru-RU" smtClean="0"/>
-              <a:t>16.08.2017</a:t>
+              <a:t>07.09.2017</a:t>
             </a:fld>
             <a:endParaRPr lang="ru-RU"/>
           </a:p>
@@ -7255,40 +7257,51 @@
           <a:lstStyle/>
           <a:p>
             <a:r>
-              <a:rPr lang="ru-RU" dirty="0"/>
-              <a:t>Количество вызовов существенно в работе кэша.</a:t>
-            </a:r>
-          </a:p>
-          <a:p>
-            <a:r>
-              <a:rPr lang="ru-RU" dirty="0"/>
-              <a:t>Недостаток написания тестов в</a:t>
-            </a:r>
-            <a:r>
-              <a:rPr lang="ru-RU" baseline="0" dirty="0"/>
-              <a:t> том же файле: это значит, что </a:t>
-            </a:r>
-            <a:r>
-              <a:rPr lang="ru-RU" baseline="0" dirty="0" err="1"/>
-              <a:t>релизная</a:t>
-            </a:r>
-            <a:r>
-              <a:rPr lang="ru-RU" baseline="0" dirty="0"/>
-              <a:t> сборка будет зависеть от </a:t>
-            </a:r>
-            <a:r>
-              <a:rPr lang="en-US" baseline="0" dirty="0" err="1"/>
-              <a:t>NUnit</a:t>
-            </a:r>
-            <a:r>
-              <a:rPr lang="en-US" baseline="0" dirty="0"/>
-              <a:t> </a:t>
-            </a:r>
-            <a:r>
-              <a:rPr lang="ru-RU" baseline="0" dirty="0"/>
-              <a:t>и других библиотек для тестов.</a:t>
-            </a:r>
-            <a:endParaRPr lang="en-US" dirty="0"/>
+              <a:rPr lang="ru-RU" dirty="0" smtClean="0"/>
+              <a:t>Вопросы</a:t>
+            </a:r>
+            <a:r>
+              <a:rPr lang="ru-RU" baseline="0" dirty="0" smtClean="0"/>
+              <a:t> к аудитории:</a:t>
+            </a:r>
+          </a:p>
+          <a:p>
+            <a:endParaRPr lang="ru-RU" baseline="0" dirty="0" smtClean="0"/>
+          </a:p>
+          <a:p>
+            <a:pPr marL="228600" indent="-228600">
+              <a:buAutoNum type="arabicPeriod"/>
+            </a:pPr>
+            <a:r>
+              <a:rPr lang="ru-RU" baseline="0" dirty="0" smtClean="0"/>
+              <a:t>Кто использовал </a:t>
+            </a:r>
+            <a:r>
+              <a:rPr lang="ru-RU" baseline="0" dirty="0" err="1" smtClean="0"/>
+              <a:t>моки</a:t>
+            </a:r>
+            <a:r>
+              <a:rPr lang="ru-RU" baseline="0" dirty="0" smtClean="0"/>
+              <a:t>? Какие?</a:t>
+            </a:r>
+          </a:p>
+          <a:p>
+            <a:pPr marL="228600" indent="-228600">
+              <a:buAutoNum type="arabicPeriod"/>
+            </a:pPr>
+            <a:r>
+              <a:rPr lang="ru-RU" baseline="0" dirty="0" smtClean="0"/>
+              <a:t>Зачем нужны </a:t>
+            </a:r>
+            <a:r>
+              <a:rPr lang="ru-RU" baseline="0" dirty="0" err="1" smtClean="0"/>
+              <a:t>моки</a:t>
+            </a:r>
+            <a:r>
+              <a:rPr lang="ru-RU" baseline="0" dirty="0" smtClean="0"/>
+              <a:t>?</a:t>
+            </a:r>
+            <a:endParaRPr lang="ru-RU" dirty="0"/>
           </a:p>
         </p:txBody>
       </p:sp>
@@ -7309,7 +7322,7 @@
           <a:p>
             <a:fld id="{DC348DFF-10E5-4AE9-8016-9910A89BCDEE}" type="slidenum">
               <a:rPr lang="ru-RU" smtClean="0"/>
-              <a:t>8</a:t>
+              <a:t>1</a:t>
             </a:fld>
             <a:endParaRPr lang="ru-RU"/>
           </a:p>
@@ -7318,7 +7331,873 @@
     </p:spTree>
     <p:extLst>
       <p:ext uri="{BB962C8B-B14F-4D97-AF65-F5344CB8AC3E}">
-        <p14:creationId xmlns:p14="http://schemas.microsoft.com/office/powerpoint/2010/main" val="3022555790"/>
+        <p14:creationId xmlns:p14="http://schemas.microsoft.com/office/powerpoint/2010/main" val="3115534550"/>
+      </p:ext>
+    </p:extLst>
+  </p:cSld>
+  <p:clrMapOvr>
+    <a:masterClrMapping/>
+  </p:clrMapOvr>
+</p:notes>
+</file>
+
+<file path=ppt/notesSlides/notesSlide10.xml><?xml version="1.0" encoding="utf-8"?>
+<p:notes xmlns:a="http://schemas.openxmlformats.org/drawingml/2006/main" xmlns:r="http://schemas.openxmlformats.org/officeDocument/2006/relationships" xmlns:p="http://schemas.openxmlformats.org/presentationml/2006/main">
+  <p:cSld>
+    <p:spTree>
+      <p:nvGrpSpPr>
+        <p:cNvPr id="1" name=""/>
+        <p:cNvGrpSpPr/>
+        <p:nvPr/>
+      </p:nvGrpSpPr>
+      <p:grpSpPr>
+        <a:xfrm>
+          <a:off x="0" y="0"/>
+          <a:ext cx="0" cy="0"/>
+          <a:chOff x="0" y="0"/>
+          <a:chExt cx="0" cy="0"/>
+        </a:xfrm>
+      </p:grpSpPr>
+      <p:sp>
+        <p:nvSpPr>
+          <p:cNvPr id="2" name="Образ слайда 1"/>
+          <p:cNvSpPr>
+            <a:spLocks noGrp="1" noRot="1" noChangeAspect="1"/>
+          </p:cNvSpPr>
+          <p:nvPr>
+            <p:ph type="sldImg"/>
+          </p:nvPr>
+        </p:nvSpPr>
+        <p:spPr/>
+      </p:sp>
+      <p:sp>
+        <p:nvSpPr>
+          <p:cNvPr id="3" name="Заметки 2"/>
+          <p:cNvSpPr>
+            <a:spLocks noGrp="1"/>
+          </p:cNvSpPr>
+          <p:nvPr>
+            <p:ph type="body" idx="1"/>
+          </p:nvPr>
+        </p:nvSpPr>
+        <p:spPr/>
+        <p:txBody>
+          <a:bodyPr/>
+          <a:lstStyle/>
+          <a:p>
+            <a:r>
+              <a:rPr lang="ru-RU" dirty="0" smtClean="0"/>
+              <a:t>Возможно,</a:t>
+            </a:r>
+            <a:r>
+              <a:rPr lang="ru-RU" baseline="0" dirty="0" smtClean="0"/>
+              <a:t> этот слайд надо двинуть вперед.</a:t>
+            </a:r>
+          </a:p>
+          <a:p>
+            <a:endParaRPr lang="en-US" dirty="0" smtClean="0"/>
+          </a:p>
+          <a:p>
+            <a:r>
+              <a:rPr lang="ru-RU" dirty="0" smtClean="0"/>
+              <a:t>Рассказать</a:t>
+            </a:r>
+            <a:r>
+              <a:rPr lang="ru-RU" baseline="0" dirty="0" smtClean="0"/>
+              <a:t> </a:t>
+            </a:r>
+            <a:r>
+              <a:rPr lang="ru-RU" baseline="0" dirty="0" smtClean="0"/>
+              <a:t>про возможности </a:t>
+            </a:r>
+            <a:r>
+              <a:rPr lang="ru-RU" baseline="0" dirty="0" err="1" smtClean="0"/>
+              <a:t>фреймворка</a:t>
+            </a:r>
+            <a:r>
+              <a:rPr lang="ru-RU" baseline="0" dirty="0" smtClean="0"/>
+              <a:t> (они могут пригодиться в следующей задаче):</a:t>
+            </a:r>
+            <a:endParaRPr lang="ru-RU" baseline="0" dirty="0" smtClean="0"/>
+          </a:p>
+          <a:p>
+            <a:pPr marL="228600" indent="-228600">
+              <a:buAutoNum type="arabicPeriod"/>
+            </a:pPr>
+            <a:r>
+              <a:rPr lang="ru-RU" baseline="0" dirty="0" smtClean="0"/>
+              <a:t>Замокать вызов метода с любыми параметрами</a:t>
+            </a:r>
+          </a:p>
+          <a:p>
+            <a:pPr marL="228600" indent="-228600">
+              <a:buAutoNum type="arabicPeriod"/>
+            </a:pPr>
+            <a:r>
+              <a:rPr lang="ru-RU" baseline="0" dirty="0" smtClean="0"/>
+              <a:t>Настроить возвращаемые значения для первого или первых нескольких вызовов метода</a:t>
+            </a:r>
+            <a:endParaRPr lang="en-US" dirty="0" smtClean="0"/>
+          </a:p>
+          <a:p>
+            <a:endParaRPr lang="ru-RU" dirty="0" smtClean="0"/>
+          </a:p>
+          <a:p>
+            <a:r>
+              <a:rPr lang="ru-RU" dirty="0" smtClean="0"/>
+              <a:t>Рассказ про стек:</a:t>
+            </a:r>
+            <a:endParaRPr lang="en-US" dirty="0" smtClean="0"/>
+          </a:p>
+          <a:p>
+            <a:r>
+              <a:rPr lang="ru-RU" dirty="0" smtClean="0"/>
+              <a:t>Настройки</a:t>
+            </a:r>
+            <a:r>
+              <a:rPr lang="ru-RU" baseline="0" dirty="0" smtClean="0"/>
+              <a:t> результатов вызовов </a:t>
+            </a:r>
+            <a:r>
+              <a:rPr lang="ru-RU" baseline="0" dirty="0" err="1" smtClean="0"/>
+              <a:t>замоканного</a:t>
+            </a:r>
+            <a:r>
+              <a:rPr lang="ru-RU" baseline="0" dirty="0" smtClean="0"/>
+              <a:t> метода складываются в стек.</a:t>
+            </a:r>
+          </a:p>
+          <a:p>
+            <a:r>
+              <a:rPr lang="ru-RU" baseline="0" dirty="0" smtClean="0"/>
+              <a:t>Почему? Чтобы можно было переопределять поведение, заданное в </a:t>
+            </a:r>
+            <a:r>
+              <a:rPr lang="ru-RU" baseline="0" dirty="0" err="1" smtClean="0"/>
+              <a:t>сетапе</a:t>
+            </a:r>
+            <a:r>
+              <a:rPr lang="ru-RU" baseline="0" dirty="0" smtClean="0"/>
+              <a:t>.</a:t>
+            </a:r>
+          </a:p>
+          <a:p>
+            <a:endParaRPr lang="ru-RU" baseline="0" dirty="0" smtClean="0"/>
+          </a:p>
+          <a:p>
+            <a:r>
+              <a:rPr lang="en-US" baseline="0" dirty="0" smtClean="0"/>
+              <a:t>TODO. </a:t>
+            </a:r>
+            <a:r>
+              <a:rPr lang="ru-RU" baseline="0" dirty="0" smtClean="0"/>
+              <a:t>Возможно, надо добавить слайд про это.</a:t>
+            </a:r>
+            <a:endParaRPr lang="ru-RU" baseline="0" dirty="0" smtClean="0"/>
+          </a:p>
+        </p:txBody>
+      </p:sp>
+      <p:sp>
+        <p:nvSpPr>
+          <p:cNvPr id="4" name="Номер слайда 3"/>
+          <p:cNvSpPr>
+            <a:spLocks noGrp="1"/>
+          </p:cNvSpPr>
+          <p:nvPr>
+            <p:ph type="sldNum" sz="quarter" idx="10"/>
+          </p:nvPr>
+        </p:nvSpPr>
+        <p:spPr/>
+        <p:txBody>
+          <a:bodyPr/>
+          <a:lstStyle/>
+          <a:p>
+            <a:fld id="{DC348DFF-10E5-4AE9-8016-9910A89BCDEE}" type="slidenum">
+              <a:rPr lang="ru-RU" smtClean="0"/>
+              <a:t>10</a:t>
+            </a:fld>
+            <a:endParaRPr lang="ru-RU"/>
+          </a:p>
+        </p:txBody>
+      </p:sp>
+    </p:spTree>
+    <p:extLst>
+      <p:ext uri="{BB962C8B-B14F-4D97-AF65-F5344CB8AC3E}">
+        <p14:creationId xmlns:p14="http://schemas.microsoft.com/office/powerpoint/2010/main" val="93746307"/>
+      </p:ext>
+    </p:extLst>
+  </p:cSld>
+  <p:clrMapOvr>
+    <a:masterClrMapping/>
+  </p:clrMapOvr>
+</p:notes>
+</file>
+
+<file path=ppt/notesSlides/notesSlide11.xml><?xml version="1.0" encoding="utf-8"?>
+<p:notes xmlns:a="http://schemas.openxmlformats.org/drawingml/2006/main" xmlns:r="http://schemas.openxmlformats.org/officeDocument/2006/relationships" xmlns:p="http://schemas.openxmlformats.org/presentationml/2006/main">
+  <p:cSld>
+    <p:spTree>
+      <p:nvGrpSpPr>
+        <p:cNvPr id="1" name=""/>
+        <p:cNvGrpSpPr/>
+        <p:nvPr/>
+      </p:nvGrpSpPr>
+      <p:grpSpPr>
+        <a:xfrm>
+          <a:off x="0" y="0"/>
+          <a:ext cx="0" cy="0"/>
+          <a:chOff x="0" y="0"/>
+          <a:chExt cx="0" cy="0"/>
+        </a:xfrm>
+      </p:grpSpPr>
+      <p:sp>
+        <p:nvSpPr>
+          <p:cNvPr id="2" name="Образ слайда 1"/>
+          <p:cNvSpPr>
+            <a:spLocks noGrp="1" noRot="1" noChangeAspect="1"/>
+          </p:cNvSpPr>
+          <p:nvPr>
+            <p:ph type="sldImg"/>
+          </p:nvPr>
+        </p:nvSpPr>
+        <p:spPr/>
+      </p:sp>
+      <p:sp>
+        <p:nvSpPr>
+          <p:cNvPr id="3" name="Заметки 2"/>
+          <p:cNvSpPr>
+            <a:spLocks noGrp="1"/>
+          </p:cNvSpPr>
+          <p:nvPr>
+            <p:ph type="body" idx="1"/>
+          </p:nvPr>
+        </p:nvSpPr>
+        <p:spPr/>
+        <p:txBody>
+          <a:bodyPr/>
+          <a:lstStyle/>
+          <a:p>
+            <a:r>
+              <a:rPr lang="ru-RU" dirty="0" smtClean="0"/>
+              <a:t>Дополнительные</a:t>
+            </a:r>
+            <a:r>
+              <a:rPr lang="ru-RU" baseline="0" dirty="0" smtClean="0"/>
+              <a:t> требования:</a:t>
+            </a:r>
+            <a:endParaRPr lang="ru-RU" dirty="0" smtClean="0"/>
+          </a:p>
+          <a:p>
+            <a:pPr marL="228600" indent="-228600">
+              <a:buAutoNum type="arabicPeriod"/>
+            </a:pPr>
+            <a:r>
+              <a:rPr lang="ru-RU" dirty="0" smtClean="0"/>
+              <a:t>Обойтись </a:t>
+            </a:r>
+            <a:r>
+              <a:rPr lang="ru-RU" dirty="0" smtClean="0"/>
+              <a:t>без дублирования:</a:t>
+            </a:r>
+            <a:r>
+              <a:rPr lang="ru-RU" baseline="0" dirty="0" smtClean="0"/>
+              <a:t> вынести общий код в </a:t>
+            </a:r>
+            <a:r>
+              <a:rPr lang="en-US" baseline="0" dirty="0" err="1" smtClean="0"/>
+              <a:t>SetUp</a:t>
+            </a:r>
+            <a:endParaRPr lang="ru-RU" baseline="0" dirty="0" smtClean="0"/>
+          </a:p>
+          <a:p>
+            <a:pPr marL="228600" marR="0" lvl="0" indent="-228600" algn="l" defTabSz="914400" rtl="0" eaLnBrk="1" fontAlgn="auto" latinLnBrk="0" hangingPunct="1">
+              <a:lnSpc>
+                <a:spcPct val="100000"/>
+              </a:lnSpc>
+              <a:spcBef>
+                <a:spcPts val="0"/>
+              </a:spcBef>
+              <a:spcAft>
+                <a:spcPts val="0"/>
+              </a:spcAft>
+              <a:buClrTx/>
+              <a:buSzTx/>
+              <a:buFontTx/>
+              <a:buAutoNum type="arabicPeriod"/>
+              <a:tabLst/>
+              <a:defRPr/>
+            </a:pPr>
+            <a:r>
+              <a:rPr lang="ru-RU" baseline="0" dirty="0" smtClean="0"/>
+              <a:t>Код теста должен быть очевидным для понимания (никакой магии!)</a:t>
+            </a:r>
+            <a:endParaRPr lang="ru-RU" dirty="0" smtClean="0"/>
+          </a:p>
+        </p:txBody>
+      </p:sp>
+      <p:sp>
+        <p:nvSpPr>
+          <p:cNvPr id="4" name="Номер слайда 3"/>
+          <p:cNvSpPr>
+            <a:spLocks noGrp="1"/>
+          </p:cNvSpPr>
+          <p:nvPr>
+            <p:ph type="sldNum" sz="quarter" idx="10"/>
+          </p:nvPr>
+        </p:nvSpPr>
+        <p:spPr/>
+        <p:txBody>
+          <a:bodyPr/>
+          <a:lstStyle/>
+          <a:p>
+            <a:fld id="{DC348DFF-10E5-4AE9-8016-9910A89BCDEE}" type="slidenum">
+              <a:rPr lang="ru-RU" smtClean="0"/>
+              <a:t>11</a:t>
+            </a:fld>
+            <a:endParaRPr lang="ru-RU"/>
+          </a:p>
+        </p:txBody>
+      </p:sp>
+    </p:spTree>
+    <p:extLst>
+      <p:ext uri="{BB962C8B-B14F-4D97-AF65-F5344CB8AC3E}">
+        <p14:creationId xmlns:p14="http://schemas.microsoft.com/office/powerpoint/2010/main" val="3586348289"/>
+      </p:ext>
+    </p:extLst>
+  </p:cSld>
+  <p:clrMapOvr>
+    <a:masterClrMapping/>
+  </p:clrMapOvr>
+</p:notes>
+</file>
+
+<file path=ppt/notesSlides/notesSlide12.xml><?xml version="1.0" encoding="utf-8"?>
+<p:notes xmlns:a="http://schemas.openxmlformats.org/drawingml/2006/main" xmlns:r="http://schemas.openxmlformats.org/officeDocument/2006/relationships" xmlns:p="http://schemas.openxmlformats.org/presentationml/2006/main">
+  <p:cSld>
+    <p:spTree>
+      <p:nvGrpSpPr>
+        <p:cNvPr id="1" name=""/>
+        <p:cNvGrpSpPr/>
+        <p:nvPr/>
+      </p:nvGrpSpPr>
+      <p:grpSpPr>
+        <a:xfrm>
+          <a:off x="0" y="0"/>
+          <a:ext cx="0" cy="0"/>
+          <a:chOff x="0" y="0"/>
+          <a:chExt cx="0" cy="0"/>
+        </a:xfrm>
+      </p:grpSpPr>
+      <p:sp>
+        <p:nvSpPr>
+          <p:cNvPr id="2" name="Образ слайда 1"/>
+          <p:cNvSpPr>
+            <a:spLocks noGrp="1" noRot="1" noChangeAspect="1"/>
+          </p:cNvSpPr>
+          <p:nvPr>
+            <p:ph type="sldImg"/>
+          </p:nvPr>
+        </p:nvSpPr>
+        <p:spPr/>
+      </p:sp>
+      <p:sp>
+        <p:nvSpPr>
+          <p:cNvPr id="3" name="Заметки 2"/>
+          <p:cNvSpPr>
+            <a:spLocks noGrp="1"/>
+          </p:cNvSpPr>
+          <p:nvPr>
+            <p:ph type="body" idx="1"/>
+          </p:nvPr>
+        </p:nvSpPr>
+        <p:spPr/>
+        <p:txBody>
+          <a:bodyPr/>
+          <a:lstStyle/>
+          <a:p>
+            <a:r>
+              <a:rPr lang="ru-RU" dirty="0" smtClean="0"/>
+              <a:t>К п.1</a:t>
+            </a:r>
+            <a:r>
+              <a:rPr lang="ru-RU" baseline="0" dirty="0" smtClean="0"/>
+              <a:t>: но надо убирать дублирование в </a:t>
+            </a:r>
+            <a:r>
+              <a:rPr lang="en-US" baseline="0" dirty="0" err="1" smtClean="0"/>
+              <a:t>SetUp</a:t>
+            </a:r>
+            <a:r>
+              <a:rPr lang="en-US" baseline="0" dirty="0" smtClean="0"/>
+              <a:t>, </a:t>
+            </a:r>
+            <a:r>
+              <a:rPr lang="ru-RU" baseline="0" dirty="0" smtClean="0"/>
+              <a:t>иначе возникают все проблемы, связанные с копи-</a:t>
+            </a:r>
+            <a:r>
+              <a:rPr lang="ru-RU" baseline="0" dirty="0" err="1" smtClean="0"/>
+              <a:t>пастом</a:t>
+            </a:r>
+            <a:r>
+              <a:rPr lang="ru-RU" baseline="0" dirty="0" smtClean="0"/>
+              <a:t> кода</a:t>
+            </a:r>
+          </a:p>
+          <a:p>
+            <a:r>
+              <a:rPr lang="ru-RU" baseline="0" dirty="0" smtClean="0"/>
+              <a:t>К п.3</a:t>
+            </a:r>
+            <a:r>
+              <a:rPr lang="en-US" baseline="0" dirty="0" smtClean="0"/>
+              <a:t>:</a:t>
+            </a:r>
+            <a:r>
+              <a:rPr lang="ru-RU" baseline="0" dirty="0" smtClean="0"/>
+              <a:t> в этой задаче: когда </a:t>
+            </a:r>
+            <a:r>
+              <a:rPr lang="ru-RU" baseline="0" dirty="0" err="1" smtClean="0"/>
+              <a:t>тестим</a:t>
+            </a:r>
+            <a:r>
+              <a:rPr lang="ru-RU" baseline="0" dirty="0" smtClean="0"/>
+              <a:t> актуальность документа</a:t>
+            </a:r>
+          </a:p>
+          <a:p>
+            <a:r>
+              <a:rPr lang="ru-RU" baseline="0" dirty="0" smtClean="0"/>
+              <a:t>К п.4: Возможные решения: в реализации доставать время из </a:t>
+            </a:r>
+            <a:r>
+              <a:rPr lang="en-US" sz="1200" kern="1200" dirty="0" err="1" smtClean="0">
+                <a:solidFill>
+                  <a:schemeClr val="tx1"/>
+                </a:solidFill>
+                <a:latin typeface="+mn-lt"/>
+                <a:ea typeface="+mn-ea"/>
+                <a:cs typeface="+mn-cs"/>
+              </a:rPr>
+              <a:t>IDateTimeService</a:t>
+            </a:r>
+            <a:r>
+              <a:rPr lang="en-US" sz="1200" kern="1200" dirty="0" smtClean="0">
+                <a:solidFill>
+                  <a:schemeClr val="tx1"/>
+                </a:solidFill>
+                <a:latin typeface="+mn-lt"/>
+                <a:ea typeface="+mn-ea"/>
+                <a:cs typeface="+mn-cs"/>
+              </a:rPr>
+              <a:t>,</a:t>
+            </a:r>
+            <a:r>
+              <a:rPr lang="en-US" sz="1200" kern="1200" baseline="0" dirty="0" smtClean="0">
+                <a:solidFill>
+                  <a:schemeClr val="tx1"/>
+                </a:solidFill>
+                <a:latin typeface="+mn-lt"/>
+                <a:ea typeface="+mn-ea"/>
+                <a:cs typeface="+mn-cs"/>
+              </a:rPr>
+              <a:t> </a:t>
+            </a:r>
+            <a:r>
+              <a:rPr lang="ru-RU" baseline="0" dirty="0" smtClean="0"/>
+              <a:t>а в тесте его </a:t>
+            </a:r>
+            <a:r>
+              <a:rPr lang="ru-RU" baseline="0" dirty="0" err="1" smtClean="0"/>
+              <a:t>мокать</a:t>
+            </a:r>
+            <a:r>
+              <a:rPr lang="ru-RU" baseline="0" dirty="0" smtClean="0"/>
+              <a:t>. Еще можно текущее время передавать параметром в тестируемый метод.</a:t>
+            </a:r>
+            <a:endParaRPr lang="en-US" dirty="0"/>
+          </a:p>
+        </p:txBody>
+      </p:sp>
+      <p:sp>
+        <p:nvSpPr>
+          <p:cNvPr id="4" name="Номер слайда 3"/>
+          <p:cNvSpPr>
+            <a:spLocks noGrp="1"/>
+          </p:cNvSpPr>
+          <p:nvPr>
+            <p:ph type="sldNum" sz="quarter" idx="10"/>
+          </p:nvPr>
+        </p:nvSpPr>
+        <p:spPr/>
+        <p:txBody>
+          <a:bodyPr/>
+          <a:lstStyle/>
+          <a:p>
+            <a:fld id="{DC348DFF-10E5-4AE9-8016-9910A89BCDEE}" type="slidenum">
+              <a:rPr lang="ru-RU" smtClean="0"/>
+              <a:t>12</a:t>
+            </a:fld>
+            <a:endParaRPr lang="ru-RU"/>
+          </a:p>
+        </p:txBody>
+      </p:sp>
+    </p:spTree>
+    <p:extLst>
+      <p:ext uri="{BB962C8B-B14F-4D97-AF65-F5344CB8AC3E}">
+        <p14:creationId xmlns:p14="http://schemas.microsoft.com/office/powerpoint/2010/main" val="3543837237"/>
+      </p:ext>
+    </p:extLst>
+  </p:cSld>
+  <p:clrMapOvr>
+    <a:masterClrMapping/>
+  </p:clrMapOvr>
+</p:notes>
+</file>
+
+<file path=ppt/notesSlides/notesSlide13.xml><?xml version="1.0" encoding="utf-8"?>
+<p:notes xmlns:a="http://schemas.openxmlformats.org/drawingml/2006/main" xmlns:r="http://schemas.openxmlformats.org/officeDocument/2006/relationships" xmlns:p="http://schemas.openxmlformats.org/presentationml/2006/main">
+  <p:cSld>
+    <p:spTree>
+      <p:nvGrpSpPr>
+        <p:cNvPr id="1" name=""/>
+        <p:cNvGrpSpPr/>
+        <p:nvPr/>
+      </p:nvGrpSpPr>
+      <p:grpSpPr>
+        <a:xfrm>
+          <a:off x="0" y="0"/>
+          <a:ext cx="0" cy="0"/>
+          <a:chOff x="0" y="0"/>
+          <a:chExt cx="0" cy="0"/>
+        </a:xfrm>
+      </p:grpSpPr>
+      <p:sp>
+        <p:nvSpPr>
+          <p:cNvPr id="2" name="Образ слайда 1"/>
+          <p:cNvSpPr>
+            <a:spLocks noGrp="1" noRot="1" noChangeAspect="1"/>
+          </p:cNvSpPr>
+          <p:nvPr>
+            <p:ph type="sldImg"/>
+          </p:nvPr>
+        </p:nvSpPr>
+        <p:spPr/>
+      </p:sp>
+      <p:sp>
+        <p:nvSpPr>
+          <p:cNvPr id="3" name="Заметки 2"/>
+          <p:cNvSpPr>
+            <a:spLocks noGrp="1"/>
+          </p:cNvSpPr>
+          <p:nvPr>
+            <p:ph type="body" idx="1"/>
+          </p:nvPr>
+        </p:nvSpPr>
+        <p:spPr/>
+        <p:txBody>
+          <a:bodyPr/>
+          <a:lstStyle/>
+          <a:p>
+            <a:r>
+              <a:rPr lang="ru-RU" dirty="0" smtClean="0"/>
+              <a:t>Показываем вариант </a:t>
+            </a:r>
+            <a:r>
+              <a:rPr lang="ru-RU" dirty="0" err="1" smtClean="0"/>
+              <a:t>рефакторинга</a:t>
+            </a:r>
+            <a:r>
+              <a:rPr lang="ru-RU" baseline="0" dirty="0" smtClean="0"/>
+              <a:t> </a:t>
+            </a:r>
+            <a:r>
+              <a:rPr lang="en-US" baseline="0" dirty="0" err="1" smtClean="0"/>
+              <a:t>FileSender</a:t>
+            </a:r>
+            <a:r>
+              <a:rPr lang="en-US" baseline="0" dirty="0" smtClean="0"/>
+              <a:t> </a:t>
+            </a:r>
+            <a:r>
+              <a:rPr lang="ru-RU" baseline="0" dirty="0" smtClean="0"/>
+              <a:t>в </a:t>
+            </a:r>
+            <a:r>
+              <a:rPr lang="en-US" baseline="0" dirty="0" err="1" smtClean="0"/>
+              <a:t>MultiFileSender</a:t>
+            </a:r>
+            <a:r>
+              <a:rPr lang="en-US" baseline="0" dirty="0" smtClean="0"/>
+              <a:t>, </a:t>
+            </a:r>
+            <a:r>
+              <a:rPr lang="en-US" baseline="0" dirty="0" err="1" smtClean="0"/>
+              <a:t>SingleFileSender</a:t>
+            </a:r>
+            <a:r>
+              <a:rPr lang="en-US" baseline="0" dirty="0" smtClean="0"/>
+              <a:t> </a:t>
+            </a:r>
+            <a:r>
+              <a:rPr lang="ru-RU" baseline="0" dirty="0" smtClean="0"/>
+              <a:t>и </a:t>
+            </a:r>
+            <a:r>
+              <a:rPr lang="en-US" baseline="0" dirty="0" err="1" smtClean="0"/>
+              <a:t>DocumentChecker</a:t>
+            </a:r>
+            <a:r>
+              <a:rPr lang="en-US" baseline="0" dirty="0" smtClean="0"/>
+              <a:t>.</a:t>
+            </a:r>
+          </a:p>
+          <a:p>
+            <a:r>
+              <a:rPr lang="ru-RU" baseline="0" dirty="0" smtClean="0"/>
+              <a:t>Смотрим, какие получились тесты.</a:t>
+            </a:r>
+            <a:endParaRPr lang="ru-RU" dirty="0"/>
+          </a:p>
+        </p:txBody>
+      </p:sp>
+      <p:sp>
+        <p:nvSpPr>
+          <p:cNvPr id="4" name="Номер слайда 3"/>
+          <p:cNvSpPr>
+            <a:spLocks noGrp="1"/>
+          </p:cNvSpPr>
+          <p:nvPr>
+            <p:ph type="sldNum" sz="quarter" idx="10"/>
+          </p:nvPr>
+        </p:nvSpPr>
+        <p:spPr/>
+        <p:txBody>
+          <a:bodyPr/>
+          <a:lstStyle/>
+          <a:p>
+            <a:fld id="{DC348DFF-10E5-4AE9-8016-9910A89BCDEE}" type="slidenum">
+              <a:rPr lang="ru-RU" smtClean="0"/>
+              <a:t>13</a:t>
+            </a:fld>
+            <a:endParaRPr lang="ru-RU"/>
+          </a:p>
+        </p:txBody>
+      </p:sp>
+    </p:spTree>
+    <p:extLst>
+      <p:ext uri="{BB962C8B-B14F-4D97-AF65-F5344CB8AC3E}">
+        <p14:creationId xmlns:p14="http://schemas.microsoft.com/office/powerpoint/2010/main" val="3958762426"/>
+      </p:ext>
+    </p:extLst>
+  </p:cSld>
+  <p:clrMapOvr>
+    <a:masterClrMapping/>
+  </p:clrMapOvr>
+</p:notes>
+</file>
+
+<file path=ppt/notesSlides/notesSlide14.xml><?xml version="1.0" encoding="utf-8"?>
+<p:notes xmlns:a="http://schemas.openxmlformats.org/drawingml/2006/main" xmlns:r="http://schemas.openxmlformats.org/officeDocument/2006/relationships" xmlns:p="http://schemas.openxmlformats.org/presentationml/2006/main">
+  <p:cSld>
+    <p:spTree>
+      <p:nvGrpSpPr>
+        <p:cNvPr id="1" name=""/>
+        <p:cNvGrpSpPr/>
+        <p:nvPr/>
+      </p:nvGrpSpPr>
+      <p:grpSpPr>
+        <a:xfrm>
+          <a:off x="0" y="0"/>
+          <a:ext cx="0" cy="0"/>
+          <a:chOff x="0" y="0"/>
+          <a:chExt cx="0" cy="0"/>
+        </a:xfrm>
+      </p:grpSpPr>
+      <p:sp>
+        <p:nvSpPr>
+          <p:cNvPr id="2" name="Образ слайда 1"/>
+          <p:cNvSpPr>
+            <a:spLocks noGrp="1" noRot="1" noChangeAspect="1"/>
+          </p:cNvSpPr>
+          <p:nvPr>
+            <p:ph type="sldImg"/>
+          </p:nvPr>
+        </p:nvSpPr>
+        <p:spPr/>
+      </p:sp>
+      <p:sp>
+        <p:nvSpPr>
+          <p:cNvPr id="3" name="Заметки 2"/>
+          <p:cNvSpPr>
+            <a:spLocks noGrp="1"/>
+          </p:cNvSpPr>
+          <p:nvPr>
+            <p:ph type="body" idx="1"/>
+          </p:nvPr>
+        </p:nvSpPr>
+        <p:spPr/>
+        <p:txBody>
+          <a:bodyPr/>
+          <a:lstStyle/>
+          <a:p>
+            <a:r>
+              <a:rPr lang="ru-RU" dirty="0"/>
+              <a:t>Тестов</a:t>
+            </a:r>
+            <a:r>
+              <a:rPr lang="ru-RU" baseline="0" dirty="0"/>
+              <a:t> после </a:t>
+            </a:r>
+            <a:r>
+              <a:rPr lang="ru-RU" baseline="0" dirty="0" err="1"/>
+              <a:t>рефакторинга</a:t>
+            </a:r>
+            <a:r>
+              <a:rPr lang="ru-RU" baseline="0" dirty="0"/>
+              <a:t> больше, но они проще.</a:t>
+            </a:r>
+          </a:p>
+          <a:p>
+            <a:r>
+              <a:rPr lang="ru-RU" baseline="0" dirty="0"/>
+              <a:t>Их больше, т.к. положительный исход порождает по одному тесту на сущность (зеленые, жирные), а также отдельно нужен тест на ошибки предыдущего уровня (красные).</a:t>
+            </a:r>
+          </a:p>
+        </p:txBody>
+      </p:sp>
+      <p:sp>
+        <p:nvSpPr>
+          <p:cNvPr id="4" name="Номер слайда 3"/>
+          <p:cNvSpPr>
+            <a:spLocks noGrp="1"/>
+          </p:cNvSpPr>
+          <p:nvPr>
+            <p:ph type="sldNum" sz="quarter" idx="10"/>
+          </p:nvPr>
+        </p:nvSpPr>
+        <p:spPr/>
+        <p:txBody>
+          <a:bodyPr/>
+          <a:lstStyle/>
+          <a:p>
+            <a:fld id="{DC348DFF-10E5-4AE9-8016-9910A89BCDEE}" type="slidenum">
+              <a:rPr lang="ru-RU" smtClean="0"/>
+              <a:t>14</a:t>
+            </a:fld>
+            <a:endParaRPr lang="ru-RU"/>
+          </a:p>
+        </p:txBody>
+      </p:sp>
+    </p:spTree>
+    <p:extLst>
+      <p:ext uri="{BB962C8B-B14F-4D97-AF65-F5344CB8AC3E}">
+        <p14:creationId xmlns:p14="http://schemas.microsoft.com/office/powerpoint/2010/main" val="2463996460"/>
+      </p:ext>
+    </p:extLst>
+  </p:cSld>
+  <p:clrMapOvr>
+    <a:masterClrMapping/>
+  </p:clrMapOvr>
+</p:notes>
+</file>
+
+<file path=ppt/notesSlides/notesSlide15.xml><?xml version="1.0" encoding="utf-8"?>
+<p:notes xmlns:a="http://schemas.openxmlformats.org/drawingml/2006/main" xmlns:r="http://schemas.openxmlformats.org/officeDocument/2006/relationships" xmlns:p="http://schemas.openxmlformats.org/presentationml/2006/main">
+  <p:cSld>
+    <p:spTree>
+      <p:nvGrpSpPr>
+        <p:cNvPr id="1" name=""/>
+        <p:cNvGrpSpPr/>
+        <p:nvPr/>
+      </p:nvGrpSpPr>
+      <p:grpSpPr>
+        <a:xfrm>
+          <a:off x="0" y="0"/>
+          <a:ext cx="0" cy="0"/>
+          <a:chOff x="0" y="0"/>
+          <a:chExt cx="0" cy="0"/>
+        </a:xfrm>
+      </p:grpSpPr>
+      <p:sp>
+        <p:nvSpPr>
+          <p:cNvPr id="2" name="Образ слайда 1"/>
+          <p:cNvSpPr>
+            <a:spLocks noGrp="1" noRot="1" noChangeAspect="1"/>
+          </p:cNvSpPr>
+          <p:nvPr>
+            <p:ph type="sldImg"/>
+          </p:nvPr>
+        </p:nvSpPr>
+        <p:spPr/>
+      </p:sp>
+      <p:sp>
+        <p:nvSpPr>
+          <p:cNvPr id="3" name="Заметки 2"/>
+          <p:cNvSpPr>
+            <a:spLocks noGrp="1"/>
+          </p:cNvSpPr>
+          <p:nvPr>
+            <p:ph type="body" idx="1"/>
+          </p:nvPr>
+        </p:nvSpPr>
+        <p:spPr/>
+        <p:txBody>
+          <a:bodyPr/>
+          <a:lstStyle/>
+          <a:p>
+            <a:r>
+              <a:rPr lang="ru-RU" dirty="0"/>
+              <a:t>Пример </a:t>
+            </a:r>
+            <a:r>
+              <a:rPr lang="en-US" dirty="0"/>
+              <a:t>Fake – </a:t>
+            </a:r>
+            <a:r>
+              <a:rPr lang="en-US" dirty="0" err="1"/>
+              <a:t>InMemory</a:t>
+            </a:r>
+            <a:r>
+              <a:rPr lang="en-US" dirty="0"/>
+              <a:t> Storage</a:t>
+            </a:r>
+            <a:r>
+              <a:rPr lang="ru-RU" baseline="0" dirty="0"/>
+              <a:t> без использования сетевых вызовов.</a:t>
+            </a:r>
+            <a:endParaRPr lang="en-US" dirty="0"/>
+          </a:p>
+        </p:txBody>
+      </p:sp>
+      <p:sp>
+        <p:nvSpPr>
+          <p:cNvPr id="4" name="Номер слайда 3"/>
+          <p:cNvSpPr>
+            <a:spLocks noGrp="1"/>
+          </p:cNvSpPr>
+          <p:nvPr>
+            <p:ph type="sldNum" sz="quarter" idx="10"/>
+          </p:nvPr>
+        </p:nvSpPr>
+        <p:spPr/>
+        <p:txBody>
+          <a:bodyPr/>
+          <a:lstStyle/>
+          <a:p>
+            <a:fld id="{DC348DFF-10E5-4AE9-8016-9910A89BCDEE}" type="slidenum">
+              <a:rPr lang="ru-RU" smtClean="0"/>
+              <a:t>16</a:t>
+            </a:fld>
+            <a:endParaRPr lang="ru-RU"/>
+          </a:p>
+        </p:txBody>
+      </p:sp>
+    </p:spTree>
+    <p:extLst>
+      <p:ext uri="{BB962C8B-B14F-4D97-AF65-F5344CB8AC3E}">
+        <p14:creationId xmlns:p14="http://schemas.microsoft.com/office/powerpoint/2010/main" val="490445322"/>
       </p:ext>
     </p:extLst>
   </p:cSld>
@@ -7372,7 +8251,40 @@
           <a:bodyPr/>
           <a:lstStyle/>
           <a:p>
-            <a:endParaRPr lang="en-US" dirty="0"/>
+            <a:r>
+              <a:rPr lang="ru-RU" dirty="0" smtClean="0"/>
+              <a:t>Пишем код по </a:t>
+            </a:r>
+            <a:r>
+              <a:rPr lang="en-US" dirty="0" smtClean="0"/>
+              <a:t>SOLID</a:t>
+            </a:r>
+            <a:r>
+              <a:rPr lang="en-US" baseline="0" dirty="0" smtClean="0"/>
+              <a:t> – </a:t>
+            </a:r>
+            <a:r>
+              <a:rPr lang="ru-RU" baseline="0" dirty="0" smtClean="0"/>
+              <a:t>получаем небольшие модули, которые можно протестировать изолированно, заменив зависимости заглушками.</a:t>
+            </a:r>
+          </a:p>
+          <a:p>
+            <a:r>
+              <a:rPr lang="ru-RU" baseline="0" dirty="0" smtClean="0"/>
+              <a:t>Лень писать сотни заглушек — поможет </a:t>
+            </a:r>
+            <a:r>
+              <a:rPr lang="en-US" baseline="0" dirty="0" smtClean="0"/>
+              <a:t>mock-</a:t>
+            </a:r>
+            <a:r>
+              <a:rPr lang="ru-RU" baseline="0" dirty="0" err="1" smtClean="0"/>
+              <a:t>фреймворк</a:t>
+            </a:r>
+            <a:r>
+              <a:rPr lang="ru-RU" baseline="0" dirty="0" smtClean="0"/>
+              <a:t>.</a:t>
+            </a:r>
           </a:p>
         </p:txBody>
       </p:sp>
@@ -7393,7 +8305,7 @@
           <a:p>
             <a:fld id="{DC348DFF-10E5-4AE9-8016-9910A89BCDEE}" type="slidenum">
               <a:rPr lang="ru-RU" smtClean="0"/>
-              <a:t>11</a:t>
+              <a:t>2</a:t>
             </a:fld>
             <a:endParaRPr lang="ru-RU"/>
           </a:p>
@@ -7402,7 +8314,7 @@
     </p:spTree>
     <p:extLst>
       <p:ext uri="{BB962C8B-B14F-4D97-AF65-F5344CB8AC3E}">
-        <p14:creationId xmlns:p14="http://schemas.microsoft.com/office/powerpoint/2010/main" val="3543837237"/>
+        <p14:creationId xmlns:p14="http://schemas.microsoft.com/office/powerpoint/2010/main" val="404857234"/>
       </p:ext>
     </p:extLst>
   </p:cSld>
@@ -7457,26 +8369,176 @@
           <a:lstStyle/>
           <a:p>
             <a:r>
-              <a:rPr lang="ru-RU" dirty="0"/>
-              <a:t>Тестов</a:t>
-            </a:r>
-            <a:r>
-              <a:rPr lang="ru-RU" baseline="0" dirty="0"/>
-              <a:t> после </a:t>
-            </a:r>
-            <a:r>
-              <a:rPr lang="ru-RU" baseline="0" dirty="0" err="1"/>
-              <a:t>рефакторинга</a:t>
-            </a:r>
-            <a:r>
-              <a:rPr lang="ru-RU" baseline="0" dirty="0"/>
-              <a:t> больше, но они проще.</a:t>
-            </a:r>
-          </a:p>
-          <a:p>
-            <a:r>
-              <a:rPr lang="ru-RU" baseline="0" dirty="0"/>
-              <a:t>Их больше, т.к. положительный исход порождает по одному тесту на сущность (зеленые, жирные), а также отдельно нужен тест на ошибки предыдущего уровня (красные).</a:t>
+              <a:rPr lang="ru-RU" dirty="0" smtClean="0"/>
+              <a:t>Будем</a:t>
+            </a:r>
+            <a:r>
+              <a:rPr lang="en-US" baseline="0" dirty="0" smtClean="0"/>
+              <a:t> </a:t>
+            </a:r>
+            <a:r>
+              <a:rPr lang="ru-RU" baseline="0" dirty="0" smtClean="0"/>
+              <a:t>смотреть на примере </a:t>
+            </a:r>
+            <a:r>
+              <a:rPr lang="en-US" baseline="0" dirty="0" err="1" smtClean="0"/>
+              <a:t>FakeItEasy</a:t>
+            </a:r>
+            <a:r>
+              <a:rPr lang="en-US" baseline="0" dirty="0" smtClean="0"/>
+              <a:t>:</a:t>
+            </a:r>
+          </a:p>
+          <a:p>
+            <a:pPr marL="228600" indent="-228600">
+              <a:buAutoNum type="arabicPeriod"/>
+            </a:pPr>
+            <a:r>
+              <a:rPr lang="ru-RU" baseline="0" dirty="0" smtClean="0"/>
+              <a:t>Редко используется в командах — будете знать несколько </a:t>
+            </a:r>
+            <a:r>
+              <a:rPr lang="ru-RU" baseline="0" dirty="0" err="1" smtClean="0"/>
+              <a:t>фреймворков</a:t>
+            </a:r>
+            <a:endParaRPr lang="ru-RU" baseline="0" dirty="0" smtClean="0"/>
+          </a:p>
+          <a:p>
+            <a:pPr marL="228600" indent="-228600">
+              <a:buAutoNum type="arabicPeriod"/>
+            </a:pPr>
+            <a:r>
+              <a:rPr lang="ru-RU" baseline="0" dirty="0" smtClean="0"/>
+              <a:t>Простая терминология — все есть </a:t>
+            </a:r>
+            <a:r>
+              <a:rPr lang="en-US" baseline="0" dirty="0" smtClean="0"/>
+              <a:t>Fake</a:t>
+            </a:r>
+          </a:p>
+          <a:p>
+            <a:pPr marL="228600" indent="-228600">
+              <a:buAutoNum type="arabicPeriod"/>
+            </a:pPr>
+            <a:r>
+              <a:rPr lang="ru-RU" baseline="0" dirty="0" smtClean="0"/>
+              <a:t>Код похож на </a:t>
+            </a:r>
+            <a:r>
+              <a:rPr lang="ru-RU" baseline="0" dirty="0" smtClean="0"/>
+              <a:t>английский</a:t>
+            </a:r>
+            <a:endParaRPr lang="en-US" baseline="0" dirty="0" smtClean="0"/>
+          </a:p>
+          <a:p>
+            <a:pPr marL="228600" indent="-228600">
+              <a:buAutoNum type="arabicPeriod"/>
+            </a:pPr>
+            <a:endParaRPr lang="en-US" baseline="0" dirty="0" smtClean="0"/>
+          </a:p>
+          <a:p>
+            <a:pPr marL="0" indent="0">
+              <a:buNone/>
+            </a:pPr>
+            <a:r>
+              <a:rPr lang="en-US" baseline="0" dirty="0" smtClean="0"/>
+              <a:t>--</a:t>
+            </a:r>
+            <a:r>
+              <a:rPr lang="ru-RU" baseline="0" dirty="0" smtClean="0"/>
+              <a:t> листаем на следующий слайд --</a:t>
+            </a:r>
+            <a:endParaRPr lang="ru-RU" baseline="0" dirty="0" smtClean="0"/>
+          </a:p>
+          <a:p>
+            <a:pPr marL="0" indent="0">
+              <a:buNone/>
+            </a:pPr>
+            <a:endParaRPr lang="en-US" baseline="0" dirty="0" smtClean="0"/>
+          </a:p>
+          <a:p>
+            <a:pPr marL="0" indent="0">
+              <a:buNone/>
+            </a:pPr>
+            <a:r>
+              <a:rPr lang="ru-RU" baseline="0" dirty="0" smtClean="0"/>
+              <a:t>Как эта магия работает:</a:t>
+            </a:r>
+          </a:p>
+          <a:p>
+            <a:pPr marL="228600" indent="-228600">
+              <a:buAutoNum type="arabicPeriod"/>
+            </a:pPr>
+            <a:r>
+              <a:rPr lang="ru-RU" baseline="0" dirty="0" smtClean="0"/>
+              <a:t>Что возвращает </a:t>
+            </a:r>
+            <a:r>
+              <a:rPr lang="en-US" baseline="0" dirty="0" err="1" smtClean="0"/>
+              <a:t>A.Fake</a:t>
+            </a:r>
+            <a:r>
+              <a:rPr lang="en-US" baseline="0" dirty="0" smtClean="0"/>
+              <a:t>&lt;T&gt;()?</a:t>
+            </a:r>
+          </a:p>
+          <a:p>
+            <a:pPr marL="228600" indent="-228600">
+              <a:buAutoNum type="arabicPeriod"/>
+            </a:pPr>
+            <a:r>
+              <a:rPr lang="ru-RU" baseline="0" dirty="0" smtClean="0"/>
+              <a:t>Как создать класс в </a:t>
+            </a:r>
+            <a:r>
+              <a:rPr lang="ru-RU" baseline="0" dirty="0" err="1" smtClean="0"/>
+              <a:t>рантайме</a:t>
+            </a:r>
+            <a:r>
+              <a:rPr lang="ru-RU" baseline="0" dirty="0" smtClean="0"/>
+              <a:t>?</a:t>
+            </a:r>
+            <a:r>
+              <a:rPr lang="en-US" baseline="0" dirty="0" smtClean="0"/>
+              <a:t> (</a:t>
+            </a:r>
+            <a:r>
+              <a:rPr lang="en-US" baseline="0" dirty="0" err="1" smtClean="0"/>
+              <a:t>Castle.DynamicProxy</a:t>
+            </a:r>
+            <a:r>
+              <a:rPr lang="en-US" baseline="0" dirty="0" smtClean="0"/>
+              <a:t>)</a:t>
+            </a:r>
+            <a:endParaRPr lang="ru-RU" baseline="0" dirty="0" smtClean="0"/>
+          </a:p>
+          <a:p>
+            <a:pPr marL="228600" indent="-228600">
+              <a:buAutoNum type="arabicPeriod"/>
+            </a:pPr>
+            <a:r>
+              <a:rPr lang="ru-RU" baseline="0" dirty="0" smtClean="0"/>
+              <a:t>Как работает </a:t>
+            </a:r>
+            <a:r>
+              <a:rPr lang="en-US" baseline="0" dirty="0" err="1" smtClean="0"/>
+              <a:t>A.CallTo</a:t>
+            </a:r>
+            <a:r>
+              <a:rPr lang="en-US" baseline="0" dirty="0" smtClean="0"/>
+              <a:t>()? </a:t>
+            </a:r>
+            <a:r>
+              <a:rPr lang="ru-RU" baseline="0" dirty="0" smtClean="0"/>
+              <a:t>Что он принимает? (</a:t>
+            </a:r>
+            <a:r>
+              <a:rPr lang="en-US" baseline="0" dirty="0" smtClean="0"/>
+              <a:t>Expression</a:t>
+            </a:r>
+            <a:r>
+              <a:rPr lang="ru-RU" baseline="0" dirty="0" smtClean="0"/>
+              <a:t>)</a:t>
             </a:r>
           </a:p>
         </p:txBody>
@@ -7498,7 +8560,7 @@
           <a:p>
             <a:fld id="{DC348DFF-10E5-4AE9-8016-9910A89BCDEE}" type="slidenum">
               <a:rPr lang="ru-RU" smtClean="0"/>
-              <a:t>13</a:t>
+              <a:t>3</a:t>
             </a:fld>
             <a:endParaRPr lang="ru-RU"/>
           </a:p>
@@ -7507,7 +8569,7 @@
     </p:spTree>
     <p:extLst>
       <p:ext uri="{BB962C8B-B14F-4D97-AF65-F5344CB8AC3E}">
-        <p14:creationId xmlns:p14="http://schemas.microsoft.com/office/powerpoint/2010/main" val="2463996460"/>
+        <p14:creationId xmlns:p14="http://schemas.microsoft.com/office/powerpoint/2010/main" val="3538192990"/>
       </p:ext>
     </p:extLst>
   </p:cSld>
@@ -7562,26 +8624,14 @@
           <a:lstStyle/>
           <a:p>
             <a:r>
-              <a:rPr lang="ru-RU" dirty="0"/>
-              <a:t>Пример </a:t>
-            </a:r>
-            <a:r>
-              <a:rPr lang="en-US" dirty="0"/>
-              <a:t>Fake – </a:t>
-            </a:r>
-            <a:r>
-              <a:rPr lang="en-US" dirty="0" err="1"/>
-              <a:t>InMemory</a:t>
-            </a:r>
-            <a:r>
-              <a:rPr lang="en-US" dirty="0"/>
-              <a:t> Storage</a:t>
-            </a:r>
-            <a:r>
-              <a:rPr lang="ru-RU" baseline="0" dirty="0"/>
-              <a:t> без использования сетевых вызовов.</a:t>
-            </a:r>
-            <a:endParaRPr lang="en-US" dirty="0"/>
+              <a:rPr lang="ru-RU" dirty="0" smtClean="0"/>
+              <a:t>Можно вернуться к предыдущему</a:t>
+            </a:r>
+            <a:r>
+              <a:rPr lang="ru-RU" baseline="0" dirty="0" smtClean="0"/>
+              <a:t> слайду и разобрать на конкретном примере</a:t>
+            </a:r>
+            <a:endParaRPr lang="ru-RU" dirty="0"/>
           </a:p>
         </p:txBody>
       </p:sp>
@@ -7602,7 +8652,7 @@
           <a:p>
             <a:fld id="{DC348DFF-10E5-4AE9-8016-9910A89BCDEE}" type="slidenum">
               <a:rPr lang="ru-RU" smtClean="0"/>
-              <a:t>15</a:t>
+              <a:t>4</a:t>
             </a:fld>
             <a:endParaRPr lang="ru-RU"/>
           </a:p>
@@ -7611,7 +8661,685 @@
     </p:spTree>
     <p:extLst>
       <p:ext uri="{BB962C8B-B14F-4D97-AF65-F5344CB8AC3E}">
-        <p14:creationId xmlns:p14="http://schemas.microsoft.com/office/powerpoint/2010/main" val="490445322"/>
+        <p14:creationId xmlns:p14="http://schemas.microsoft.com/office/powerpoint/2010/main" val="820243834"/>
+      </p:ext>
+    </p:extLst>
+  </p:cSld>
+  <p:clrMapOvr>
+    <a:masterClrMapping/>
+  </p:clrMapOvr>
+</p:notes>
+</file>
+
+<file path=ppt/notesSlides/notesSlide5.xml><?xml version="1.0" encoding="utf-8"?>
+<p:notes xmlns:a="http://schemas.openxmlformats.org/drawingml/2006/main" xmlns:r="http://schemas.openxmlformats.org/officeDocument/2006/relationships" xmlns:p="http://schemas.openxmlformats.org/presentationml/2006/main">
+  <p:cSld>
+    <p:spTree>
+      <p:nvGrpSpPr>
+        <p:cNvPr id="1" name=""/>
+        <p:cNvGrpSpPr/>
+        <p:nvPr/>
+      </p:nvGrpSpPr>
+      <p:grpSpPr>
+        <a:xfrm>
+          <a:off x="0" y="0"/>
+          <a:ext cx="0" cy="0"/>
+          <a:chOff x="0" y="0"/>
+          <a:chExt cx="0" cy="0"/>
+        </a:xfrm>
+      </p:grpSpPr>
+      <p:sp>
+        <p:nvSpPr>
+          <p:cNvPr id="2" name="Образ слайда 1"/>
+          <p:cNvSpPr>
+            <a:spLocks noGrp="1" noRot="1" noChangeAspect="1"/>
+          </p:cNvSpPr>
+          <p:nvPr>
+            <p:ph type="sldImg"/>
+          </p:nvPr>
+        </p:nvSpPr>
+        <p:spPr/>
+      </p:sp>
+      <p:sp>
+        <p:nvSpPr>
+          <p:cNvPr id="3" name="Заметки 2"/>
+          <p:cNvSpPr>
+            <a:spLocks noGrp="1"/>
+          </p:cNvSpPr>
+          <p:nvPr>
+            <p:ph type="body" idx="1"/>
+          </p:nvPr>
+        </p:nvSpPr>
+        <p:spPr/>
+        <p:txBody>
+          <a:bodyPr/>
+          <a:lstStyle/>
+          <a:p>
+            <a:r>
+              <a:rPr lang="ru-RU" dirty="0" smtClean="0"/>
+              <a:t>Задаем вопрос, возвращаемся</a:t>
+            </a:r>
+            <a:r>
+              <a:rPr lang="ru-RU" baseline="0" dirty="0" smtClean="0"/>
+              <a:t> к слайду с кодом </a:t>
+            </a:r>
+            <a:r>
+              <a:rPr lang="en-US" baseline="0" dirty="0" err="1" smtClean="0"/>
+              <a:t>FakeItEasy</a:t>
+            </a:r>
+            <a:r>
+              <a:rPr lang="en-US" baseline="0" dirty="0" smtClean="0"/>
+              <a:t>.</a:t>
+            </a:r>
+          </a:p>
+          <a:p>
+            <a:r>
+              <a:rPr lang="ru-RU" baseline="0" dirty="0" smtClean="0"/>
+              <a:t>Потом показываем пункты.</a:t>
+            </a:r>
+            <a:endParaRPr lang="ru-RU" dirty="0" smtClean="0"/>
+          </a:p>
+          <a:p>
+            <a:endParaRPr lang="ru-RU" dirty="0" smtClean="0"/>
+          </a:p>
+          <a:p>
+            <a:r>
+              <a:rPr lang="ru-RU" dirty="0" smtClean="0"/>
+              <a:t>К</a:t>
+            </a:r>
+            <a:r>
+              <a:rPr lang="ru-RU" baseline="0" dirty="0" smtClean="0"/>
+              <a:t> п.2</a:t>
+            </a:r>
+            <a:r>
+              <a:rPr lang="ru-RU" dirty="0" smtClean="0"/>
+              <a:t>:</a:t>
+            </a:r>
+            <a:r>
+              <a:rPr lang="ru-RU" baseline="0" dirty="0" smtClean="0"/>
+              <a:t> м</a:t>
+            </a:r>
+            <a:r>
+              <a:rPr lang="ru-RU" dirty="0" smtClean="0"/>
+              <a:t>ожно </a:t>
+            </a:r>
+            <a:r>
+              <a:rPr lang="ru-RU" dirty="0" smtClean="0"/>
+              <a:t>обойтись и без</a:t>
+            </a:r>
+            <a:r>
+              <a:rPr lang="ru-RU" baseline="0" dirty="0" smtClean="0"/>
+              <a:t> </a:t>
+            </a:r>
+            <a:r>
+              <a:rPr lang="en-US" baseline="0" dirty="0" smtClean="0"/>
+              <a:t>expressions, </a:t>
+            </a:r>
+            <a:r>
+              <a:rPr lang="ru-RU" baseline="0" dirty="0" smtClean="0"/>
+              <a:t>как в </a:t>
+            </a:r>
+            <a:r>
+              <a:rPr lang="en-US" baseline="0" dirty="0" smtClean="0"/>
+              <a:t>Rhino</a:t>
+            </a:r>
+            <a:r>
+              <a:rPr lang="ru-RU" baseline="0" dirty="0" smtClean="0"/>
+              <a:t>, там на </a:t>
+            </a:r>
+            <a:r>
+              <a:rPr lang="en-US" baseline="0" dirty="0" err="1" smtClean="0"/>
+              <a:t>Func</a:t>
+            </a:r>
+            <a:r>
+              <a:rPr lang="en-US" baseline="0" dirty="0" smtClean="0"/>
+              <a:t>&lt;&gt;</a:t>
+            </a:r>
+            <a:r>
+              <a:rPr lang="ru-RU" baseline="0" dirty="0" smtClean="0"/>
+              <a:t> все</a:t>
+            </a:r>
+            <a:r>
+              <a:rPr lang="ru-RU" dirty="0" smtClean="0"/>
+              <a:t>.</a:t>
+            </a:r>
+            <a:endParaRPr lang="ru-RU" dirty="0"/>
+          </a:p>
+        </p:txBody>
+      </p:sp>
+      <p:sp>
+        <p:nvSpPr>
+          <p:cNvPr id="4" name="Номер слайда 3"/>
+          <p:cNvSpPr>
+            <a:spLocks noGrp="1"/>
+          </p:cNvSpPr>
+          <p:nvPr>
+            <p:ph type="sldNum" sz="quarter" idx="10"/>
+          </p:nvPr>
+        </p:nvSpPr>
+        <p:spPr/>
+        <p:txBody>
+          <a:bodyPr/>
+          <a:lstStyle/>
+          <a:p>
+            <a:fld id="{DC348DFF-10E5-4AE9-8016-9910A89BCDEE}" type="slidenum">
+              <a:rPr lang="ru-RU" smtClean="0"/>
+              <a:t>5</a:t>
+            </a:fld>
+            <a:endParaRPr lang="ru-RU"/>
+          </a:p>
+        </p:txBody>
+      </p:sp>
+    </p:spTree>
+    <p:extLst>
+      <p:ext uri="{BB962C8B-B14F-4D97-AF65-F5344CB8AC3E}">
+        <p14:creationId xmlns:p14="http://schemas.microsoft.com/office/powerpoint/2010/main" val="62390182"/>
+      </p:ext>
+    </p:extLst>
+  </p:cSld>
+  <p:clrMapOvr>
+    <a:masterClrMapping/>
+  </p:clrMapOvr>
+</p:notes>
+</file>
+
+<file path=ppt/notesSlides/notesSlide6.xml><?xml version="1.0" encoding="utf-8"?>
+<p:notes xmlns:a="http://schemas.openxmlformats.org/drawingml/2006/main" xmlns:r="http://schemas.openxmlformats.org/officeDocument/2006/relationships" xmlns:p="http://schemas.openxmlformats.org/presentationml/2006/main">
+  <p:cSld>
+    <p:spTree>
+      <p:nvGrpSpPr>
+        <p:cNvPr id="1" name=""/>
+        <p:cNvGrpSpPr/>
+        <p:nvPr/>
+      </p:nvGrpSpPr>
+      <p:grpSpPr>
+        <a:xfrm>
+          <a:off x="0" y="0"/>
+          <a:ext cx="0" cy="0"/>
+          <a:chOff x="0" y="0"/>
+          <a:chExt cx="0" cy="0"/>
+        </a:xfrm>
+      </p:grpSpPr>
+      <p:sp>
+        <p:nvSpPr>
+          <p:cNvPr id="2" name="Образ слайда 1"/>
+          <p:cNvSpPr>
+            <a:spLocks noGrp="1" noRot="1" noChangeAspect="1"/>
+          </p:cNvSpPr>
+          <p:nvPr>
+            <p:ph type="sldImg"/>
+          </p:nvPr>
+        </p:nvSpPr>
+        <p:spPr/>
+      </p:sp>
+      <p:sp>
+        <p:nvSpPr>
+          <p:cNvPr id="3" name="Заметки 2"/>
+          <p:cNvSpPr>
+            <a:spLocks noGrp="1"/>
+          </p:cNvSpPr>
+          <p:nvPr>
+            <p:ph type="body" idx="1"/>
+          </p:nvPr>
+        </p:nvSpPr>
+        <p:spPr/>
+        <p:txBody>
+          <a:bodyPr/>
+          <a:lstStyle/>
+          <a:p>
+            <a:r>
+              <a:rPr lang="ru-RU" dirty="0" smtClean="0"/>
+              <a:t>Открываем</a:t>
+            </a:r>
+            <a:r>
+              <a:rPr lang="ru-RU" baseline="0" dirty="0" smtClean="0"/>
+              <a:t> в </a:t>
+            </a:r>
+            <a:r>
+              <a:rPr lang="ru-RU" baseline="0" dirty="0" err="1" smtClean="0"/>
+              <a:t>солюшене</a:t>
+            </a:r>
+            <a:r>
+              <a:rPr lang="ru-RU" baseline="0" dirty="0" smtClean="0"/>
+              <a:t> проект </a:t>
+            </a:r>
+            <a:r>
+              <a:rPr lang="en-US" baseline="0" dirty="0" err="1" smtClean="0"/>
+              <a:t>ThingCache</a:t>
+            </a:r>
+            <a:r>
+              <a:rPr lang="en-US" baseline="0" dirty="0" smtClean="0"/>
+              <a:t>.</a:t>
+            </a:r>
+          </a:p>
+        </p:txBody>
+      </p:sp>
+      <p:sp>
+        <p:nvSpPr>
+          <p:cNvPr id="4" name="Номер слайда 3"/>
+          <p:cNvSpPr>
+            <a:spLocks noGrp="1"/>
+          </p:cNvSpPr>
+          <p:nvPr>
+            <p:ph type="sldNum" sz="quarter" idx="10"/>
+          </p:nvPr>
+        </p:nvSpPr>
+        <p:spPr/>
+        <p:txBody>
+          <a:bodyPr/>
+          <a:lstStyle/>
+          <a:p>
+            <a:fld id="{DC348DFF-10E5-4AE9-8016-9910A89BCDEE}" type="slidenum">
+              <a:rPr lang="ru-RU" smtClean="0"/>
+              <a:t>6</a:t>
+            </a:fld>
+            <a:endParaRPr lang="ru-RU"/>
+          </a:p>
+        </p:txBody>
+      </p:sp>
+    </p:spTree>
+    <p:extLst>
+      <p:ext uri="{BB962C8B-B14F-4D97-AF65-F5344CB8AC3E}">
+        <p14:creationId xmlns:p14="http://schemas.microsoft.com/office/powerpoint/2010/main" val="1185310749"/>
+      </p:ext>
+    </p:extLst>
+  </p:cSld>
+  <p:clrMapOvr>
+    <a:masterClrMapping/>
+  </p:clrMapOvr>
+</p:notes>
+</file>
+
+<file path=ppt/notesSlides/notesSlide7.xml><?xml version="1.0" encoding="utf-8"?>
+<p:notes xmlns:a="http://schemas.openxmlformats.org/drawingml/2006/main" xmlns:r="http://schemas.openxmlformats.org/officeDocument/2006/relationships" xmlns:p="http://schemas.openxmlformats.org/presentationml/2006/main">
+  <p:cSld>
+    <p:spTree>
+      <p:nvGrpSpPr>
+        <p:cNvPr id="1" name=""/>
+        <p:cNvGrpSpPr/>
+        <p:nvPr/>
+      </p:nvGrpSpPr>
+      <p:grpSpPr>
+        <a:xfrm>
+          <a:off x="0" y="0"/>
+          <a:ext cx="0" cy="0"/>
+          <a:chOff x="0" y="0"/>
+          <a:chExt cx="0" cy="0"/>
+        </a:xfrm>
+      </p:grpSpPr>
+      <p:sp>
+        <p:nvSpPr>
+          <p:cNvPr id="2" name="Образ слайда 1"/>
+          <p:cNvSpPr>
+            <a:spLocks noGrp="1" noRot="1" noChangeAspect="1"/>
+          </p:cNvSpPr>
+          <p:nvPr>
+            <p:ph type="sldImg"/>
+          </p:nvPr>
+        </p:nvSpPr>
+        <p:spPr/>
+      </p:sp>
+      <p:sp>
+        <p:nvSpPr>
+          <p:cNvPr id="3" name="Заметки 2"/>
+          <p:cNvSpPr>
+            <a:spLocks noGrp="1"/>
+          </p:cNvSpPr>
+          <p:nvPr>
+            <p:ph type="body" idx="1"/>
+          </p:nvPr>
+        </p:nvSpPr>
+        <p:spPr/>
+        <p:txBody>
+          <a:bodyPr/>
+          <a:lstStyle/>
+          <a:p>
+            <a:r>
+              <a:rPr lang="ru-RU" baseline="0" dirty="0" smtClean="0"/>
+              <a:t>Рассказать, как замокать вызов метода и как проверить, вызвался ли он.</a:t>
+            </a:r>
+          </a:p>
+          <a:p>
+            <a:endParaRPr lang="ru-RU" baseline="0" dirty="0" smtClean="0"/>
+          </a:p>
+          <a:p>
+            <a:r>
+              <a:rPr lang="ru-RU" baseline="0" dirty="0" smtClean="0"/>
+              <a:t>В </a:t>
+            </a:r>
+            <a:r>
+              <a:rPr lang="en-US" baseline="0" dirty="0" err="1" smtClean="0"/>
+              <a:t>MustHaveHappened</a:t>
+            </a:r>
+            <a:r>
+              <a:rPr lang="en-US" baseline="0" dirty="0" smtClean="0"/>
+              <a:t> </a:t>
+            </a:r>
+            <a:r>
+              <a:rPr lang="ru-RU" baseline="0" dirty="0" smtClean="0"/>
+              <a:t>можно передать, сколько раз мы ожидали вызов.</a:t>
+            </a:r>
+            <a:endParaRPr lang="ru-RU" baseline="0" dirty="0" smtClean="0"/>
+          </a:p>
+        </p:txBody>
+      </p:sp>
+      <p:sp>
+        <p:nvSpPr>
+          <p:cNvPr id="4" name="Номер слайда 3"/>
+          <p:cNvSpPr>
+            <a:spLocks noGrp="1"/>
+          </p:cNvSpPr>
+          <p:nvPr>
+            <p:ph type="sldNum" sz="quarter" idx="10"/>
+          </p:nvPr>
+        </p:nvSpPr>
+        <p:spPr/>
+        <p:txBody>
+          <a:bodyPr/>
+          <a:lstStyle/>
+          <a:p>
+            <a:fld id="{DC348DFF-10E5-4AE9-8016-9910A89BCDEE}" type="slidenum">
+              <a:rPr lang="ru-RU" smtClean="0"/>
+              <a:t>7</a:t>
+            </a:fld>
+            <a:endParaRPr lang="ru-RU"/>
+          </a:p>
+        </p:txBody>
+      </p:sp>
+    </p:spTree>
+    <p:extLst>
+      <p:ext uri="{BB962C8B-B14F-4D97-AF65-F5344CB8AC3E}">
+        <p14:creationId xmlns:p14="http://schemas.microsoft.com/office/powerpoint/2010/main" val="1203865521"/>
+      </p:ext>
+    </p:extLst>
+  </p:cSld>
+  <p:clrMapOvr>
+    <a:masterClrMapping/>
+  </p:clrMapOvr>
+</p:notes>
+</file>
+
+<file path=ppt/notesSlides/notesSlide8.xml><?xml version="1.0" encoding="utf-8"?>
+<p:notes xmlns:a="http://schemas.openxmlformats.org/drawingml/2006/main" xmlns:r="http://schemas.openxmlformats.org/officeDocument/2006/relationships" xmlns:p="http://schemas.openxmlformats.org/presentationml/2006/main">
+  <p:cSld>
+    <p:spTree>
+      <p:nvGrpSpPr>
+        <p:cNvPr id="1" name=""/>
+        <p:cNvGrpSpPr/>
+        <p:nvPr/>
+      </p:nvGrpSpPr>
+      <p:grpSpPr>
+        <a:xfrm>
+          <a:off x="0" y="0"/>
+          <a:ext cx="0" cy="0"/>
+          <a:chOff x="0" y="0"/>
+          <a:chExt cx="0" cy="0"/>
+        </a:xfrm>
+      </p:grpSpPr>
+      <p:sp>
+        <p:nvSpPr>
+          <p:cNvPr id="2" name="Образ слайда 1"/>
+          <p:cNvSpPr>
+            <a:spLocks noGrp="1" noRot="1" noChangeAspect="1"/>
+          </p:cNvSpPr>
+          <p:nvPr>
+            <p:ph type="sldImg"/>
+          </p:nvPr>
+        </p:nvSpPr>
+        <p:spPr/>
+      </p:sp>
+      <p:sp>
+        <p:nvSpPr>
+          <p:cNvPr id="3" name="Заметки 2"/>
+          <p:cNvSpPr>
+            <a:spLocks noGrp="1"/>
+          </p:cNvSpPr>
+          <p:nvPr>
+            <p:ph type="body" idx="1"/>
+          </p:nvPr>
+        </p:nvSpPr>
+        <p:spPr/>
+        <p:txBody>
+          <a:bodyPr/>
+          <a:lstStyle/>
+          <a:p>
+            <a:r>
+              <a:rPr lang="ru-RU" dirty="0" smtClean="0"/>
+              <a:t>Рассказать,</a:t>
+            </a:r>
+            <a:r>
+              <a:rPr lang="ru-RU" baseline="0" dirty="0" smtClean="0"/>
+              <a:t> как проставлять </a:t>
+            </a:r>
+            <a:r>
+              <a:rPr lang="en-US" baseline="0" dirty="0" smtClean="0"/>
+              <a:t>out</a:t>
+            </a:r>
+            <a:r>
+              <a:rPr lang="ru-RU" baseline="0" dirty="0" smtClean="0"/>
+              <a:t>-параметры </a:t>
+            </a:r>
+            <a:r>
+              <a:rPr lang="ru-RU" baseline="0" dirty="0" err="1" smtClean="0"/>
+              <a:t>замоканным</a:t>
+            </a:r>
+            <a:r>
+              <a:rPr lang="ru-RU" baseline="0" dirty="0" smtClean="0"/>
+              <a:t> методом.</a:t>
+            </a:r>
+          </a:p>
+          <a:p>
+            <a:endParaRPr lang="ru-RU" baseline="0" dirty="0" smtClean="0"/>
+          </a:p>
+          <a:p>
+            <a:r>
+              <a:rPr lang="ru-RU" baseline="0" dirty="0" smtClean="0"/>
+              <a:t>После этого можно писать код.</a:t>
+            </a:r>
+            <a:endParaRPr lang="ru-RU" baseline="0" dirty="0" smtClean="0"/>
+          </a:p>
+        </p:txBody>
+      </p:sp>
+      <p:sp>
+        <p:nvSpPr>
+          <p:cNvPr id="4" name="Номер слайда 3"/>
+          <p:cNvSpPr>
+            <a:spLocks noGrp="1"/>
+          </p:cNvSpPr>
+          <p:nvPr>
+            <p:ph type="sldNum" sz="quarter" idx="10"/>
+          </p:nvPr>
+        </p:nvSpPr>
+        <p:spPr/>
+        <p:txBody>
+          <a:bodyPr/>
+          <a:lstStyle/>
+          <a:p>
+            <a:fld id="{DC348DFF-10E5-4AE9-8016-9910A89BCDEE}" type="slidenum">
+              <a:rPr lang="ru-RU" smtClean="0"/>
+              <a:t>8</a:t>
+            </a:fld>
+            <a:endParaRPr lang="ru-RU"/>
+          </a:p>
+        </p:txBody>
+      </p:sp>
+    </p:spTree>
+    <p:extLst>
+      <p:ext uri="{BB962C8B-B14F-4D97-AF65-F5344CB8AC3E}">
+        <p14:creationId xmlns:p14="http://schemas.microsoft.com/office/powerpoint/2010/main" val="2810692097"/>
+      </p:ext>
+    </p:extLst>
+  </p:cSld>
+  <p:clrMapOvr>
+    <a:masterClrMapping/>
+  </p:clrMapOvr>
+</p:notes>
+</file>
+
+<file path=ppt/notesSlides/notesSlide9.xml><?xml version="1.0" encoding="utf-8"?>
+<p:notes xmlns:a="http://schemas.openxmlformats.org/drawingml/2006/main" xmlns:r="http://schemas.openxmlformats.org/officeDocument/2006/relationships" xmlns:p="http://schemas.openxmlformats.org/presentationml/2006/main">
+  <p:cSld>
+    <p:spTree>
+      <p:nvGrpSpPr>
+        <p:cNvPr id="1" name=""/>
+        <p:cNvGrpSpPr/>
+        <p:nvPr/>
+      </p:nvGrpSpPr>
+      <p:grpSpPr>
+        <a:xfrm>
+          <a:off x="0" y="0"/>
+          <a:ext cx="0" cy="0"/>
+          <a:chOff x="0" y="0"/>
+          <a:chExt cx="0" cy="0"/>
+        </a:xfrm>
+      </p:grpSpPr>
+      <p:sp>
+        <p:nvSpPr>
+          <p:cNvPr id="2" name="Образ слайда 1"/>
+          <p:cNvSpPr>
+            <a:spLocks noGrp="1" noRot="1" noChangeAspect="1"/>
+          </p:cNvSpPr>
+          <p:nvPr>
+            <p:ph type="sldImg"/>
+          </p:nvPr>
+        </p:nvSpPr>
+        <p:spPr/>
+      </p:sp>
+      <p:sp>
+        <p:nvSpPr>
+          <p:cNvPr id="3" name="Заметки 2"/>
+          <p:cNvSpPr>
+            <a:spLocks noGrp="1"/>
+          </p:cNvSpPr>
+          <p:nvPr>
+            <p:ph type="body" idx="1"/>
+          </p:nvPr>
+        </p:nvSpPr>
+        <p:spPr/>
+        <p:txBody>
+          <a:bodyPr/>
+          <a:lstStyle/>
+          <a:p>
+            <a:r>
+              <a:rPr lang="en-US" dirty="0" smtClean="0"/>
+              <a:t>TODO. </a:t>
+            </a:r>
+            <a:r>
+              <a:rPr lang="ru-RU" dirty="0" smtClean="0"/>
+              <a:t>Непонятно,</a:t>
+            </a:r>
+            <a:r>
+              <a:rPr lang="ru-RU" baseline="0" dirty="0" smtClean="0"/>
+              <a:t> как к этим пунктам подводить в контексте задачи.</a:t>
+            </a:r>
+            <a:endParaRPr lang="ru-RU" dirty="0" smtClean="0"/>
+          </a:p>
+          <a:p>
+            <a:endParaRPr lang="ru-RU" dirty="0" smtClean="0"/>
+          </a:p>
+          <a:p>
+            <a:r>
+              <a:rPr lang="ru-RU" dirty="0" smtClean="0"/>
+              <a:t>К п.1:</a:t>
+            </a:r>
+            <a:r>
+              <a:rPr lang="ru-RU" baseline="0" dirty="0" smtClean="0"/>
+              <a:t> это классическая </a:t>
+            </a:r>
+            <a:r>
+              <a:rPr lang="en-US" baseline="0" dirty="0" smtClean="0"/>
+              <a:t>TDD.</a:t>
+            </a:r>
+            <a:r>
+              <a:rPr lang="ru-RU" baseline="0" dirty="0" smtClean="0"/>
+              <a:t> Почитать можно книгу Кента Бека.</a:t>
+            </a:r>
+          </a:p>
+          <a:p>
+            <a:r>
+              <a:rPr lang="ru-RU" dirty="0" smtClean="0"/>
+              <a:t>К п.3:</a:t>
+            </a:r>
+            <a:r>
+              <a:rPr lang="ru-RU" baseline="0" dirty="0" smtClean="0"/>
+              <a:t> </a:t>
+            </a:r>
+            <a:r>
+              <a:rPr lang="ru-RU" dirty="0" smtClean="0"/>
+              <a:t>Количество </a:t>
+            </a:r>
+            <a:r>
+              <a:rPr lang="ru-RU" dirty="0"/>
+              <a:t>вызовов существенно в работе кэша.</a:t>
+            </a:r>
+          </a:p>
+          <a:p>
+            <a:endParaRPr lang="ru-RU" dirty="0" smtClean="0"/>
+          </a:p>
+          <a:p>
+            <a:r>
+              <a:rPr lang="ru-RU" dirty="0" smtClean="0"/>
+              <a:t>Недостаток </a:t>
+            </a:r>
+            <a:r>
+              <a:rPr lang="ru-RU" dirty="0"/>
+              <a:t>написания тестов в</a:t>
+            </a:r>
+            <a:r>
+              <a:rPr lang="ru-RU" baseline="0" dirty="0"/>
+              <a:t> том же файле: это значит, что </a:t>
+            </a:r>
+            <a:r>
+              <a:rPr lang="ru-RU" baseline="0" dirty="0" err="1"/>
+              <a:t>релизная</a:t>
+            </a:r>
+            <a:r>
+              <a:rPr lang="ru-RU" baseline="0" dirty="0"/>
+              <a:t> сборка будет зависеть от </a:t>
+            </a:r>
+            <a:r>
+              <a:rPr lang="en-US" baseline="0" dirty="0" err="1"/>
+              <a:t>NUnit</a:t>
+            </a:r>
+            <a:r>
+              <a:rPr lang="en-US" baseline="0" dirty="0"/>
+              <a:t> </a:t>
+            </a:r>
+            <a:r>
+              <a:rPr lang="ru-RU" baseline="0" dirty="0"/>
+              <a:t>и других библиотек для тестов.</a:t>
+            </a:r>
+            <a:endParaRPr lang="en-US" dirty="0"/>
+          </a:p>
+        </p:txBody>
+      </p:sp>
+      <p:sp>
+        <p:nvSpPr>
+          <p:cNvPr id="4" name="Номер слайда 3"/>
+          <p:cNvSpPr>
+            <a:spLocks noGrp="1"/>
+          </p:cNvSpPr>
+          <p:nvPr>
+            <p:ph type="sldNum" sz="quarter" idx="10"/>
+          </p:nvPr>
+        </p:nvSpPr>
+        <p:spPr/>
+        <p:txBody>
+          <a:bodyPr/>
+          <a:lstStyle/>
+          <a:p>
+            <a:fld id="{DC348DFF-10E5-4AE9-8016-9910A89BCDEE}" type="slidenum">
+              <a:rPr lang="ru-RU" smtClean="0"/>
+              <a:t>9</a:t>
+            </a:fld>
+            <a:endParaRPr lang="ru-RU"/>
+          </a:p>
+        </p:txBody>
+      </p:sp>
+    </p:spTree>
+    <p:extLst>
+      <p:ext uri="{BB962C8B-B14F-4D97-AF65-F5344CB8AC3E}">
+        <p14:creationId xmlns:p14="http://schemas.microsoft.com/office/powerpoint/2010/main" val="3022555790"/>
       </p:ext>
     </p:extLst>
   </p:cSld>
@@ -11703,13 +13431,13 @@
           <a:p>
             <a:r>
               <a:rPr lang="en-US" dirty="0">
-                <a:hlinkClick r:id="rId2"/>
+                <a:hlinkClick r:id="rId3"/>
               </a:rPr>
               <a:t>https://github.com/kontur-csharper/</a:t>
             </a:r>
             <a:r>
               <a:rPr lang="en-US" b="1" dirty="0">
-                <a:hlinkClick r:id="rId2"/>
+                <a:hlinkClick r:id="rId3"/>
               </a:rPr>
               <a:t>mocks</a:t>
             </a:r>
@@ -11753,7 +13481,7 @@
           <p:nvPr/>
         </p:nvPicPr>
         <p:blipFill>
-          <a:blip r:embed="rId3" cstate="print">
+          <a:blip r:embed="rId4" cstate="print">
             <a:extLst>
               <a:ext uri="{28A0092B-C50C-407E-A947-70E740481C1C}">
                 <a14:useLocalDpi xmlns:a14="http://schemas.microsoft.com/office/drawing/2010/main" val="0"/>
@@ -11831,24 +13559,125 @@
           </a:bodyPr>
           <a:lstStyle/>
           <a:p>
-            <a:pPr marL="0" indent="0">
-              <a:buNone/>
-            </a:pPr>
-            <a:r>
-              <a:rPr lang="ru-RU" dirty="0"/>
-              <a:t>На метод </a:t>
-            </a:r>
-            <a:r>
-              <a:rPr lang="en-US" dirty="0" err="1"/>
-              <a:t>SendFiles</a:t>
-            </a:r>
-            <a:r>
-              <a:rPr lang="en-US" dirty="0"/>
-              <a:t> </a:t>
-            </a:r>
-            <a:r>
-              <a:rPr lang="ru-RU" dirty="0"/>
-              <a:t>написан только один тест, проверяющий успешную отправку файлов.</a:t>
+            <a:r>
+              <a:rPr lang="en-US" b="1" dirty="0"/>
+              <a:t>Arrange:</a:t>
+            </a:r>
+          </a:p>
+          <a:p>
+            <a:r>
+              <a:rPr lang="en-US" sz="2800" dirty="0" err="1">
+                <a:latin typeface="Consolas" panose="020B0609020204030204" pitchFamily="49" charset="0"/>
+              </a:rPr>
+              <a:t>A.CallTo</a:t>
+            </a:r>
+            <a:r>
+              <a:rPr lang="en-US" sz="2800" dirty="0">
+                <a:latin typeface="Consolas" panose="020B0609020204030204" pitchFamily="49" charset="0"/>
+              </a:rPr>
+              <a:t>(() =&gt; </a:t>
+            </a:r>
+            <a:r>
+              <a:rPr lang="en-US" sz="2800" dirty="0" err="1">
+                <a:latin typeface="Consolas" panose="020B0609020204030204" pitchFamily="49" charset="0"/>
+              </a:rPr>
+              <a:t>fake.SomeMethod</a:t>
+            </a:r>
+            <a:r>
+              <a:rPr lang="en-US" sz="2800" dirty="0">
+                <a:latin typeface="Consolas" panose="020B0609020204030204" pitchFamily="49" charset="0"/>
+              </a:rPr>
+              <a:t>(null))</a:t>
+            </a:r>
+          </a:p>
+          <a:p>
+            <a:r>
+              <a:rPr lang="en-US" sz="2800" dirty="0">
+                <a:latin typeface="Consolas" panose="020B0609020204030204" pitchFamily="49" charset="0"/>
+              </a:rPr>
+              <a:t>	.</a:t>
+            </a:r>
+            <a:r>
+              <a:rPr lang="en-US" sz="2800" b="1" dirty="0" err="1">
+                <a:latin typeface="Consolas" panose="020B0609020204030204" pitchFamily="49" charset="0"/>
+              </a:rPr>
+              <a:t>WithAnyArguments</a:t>
+            </a:r>
+            <a:r>
+              <a:rPr lang="en-US" sz="2800" b="1" dirty="0">
+                <a:latin typeface="Consolas" panose="020B0609020204030204" pitchFamily="49" charset="0"/>
+              </a:rPr>
+              <a:t>()</a:t>
+            </a:r>
+            <a:r>
+              <a:rPr lang="en-US" sz="2800" dirty="0">
+                <a:latin typeface="Consolas" panose="020B0609020204030204" pitchFamily="49" charset="0"/>
+              </a:rPr>
+              <a:t>.Returns(true)</a:t>
+            </a:r>
+            <a:r>
+              <a:rPr lang="en-US" sz="2800" b="1" dirty="0">
+                <a:latin typeface="Consolas" panose="020B0609020204030204" pitchFamily="49" charset="0"/>
+              </a:rPr>
+              <a:t>.Once()</a:t>
+            </a:r>
+            <a:r>
+              <a:rPr lang="en-US" sz="2800" dirty="0">
+                <a:latin typeface="Consolas" panose="020B0609020204030204" pitchFamily="49" charset="0"/>
+              </a:rPr>
+              <a:t>;</a:t>
+            </a:r>
+          </a:p>
+          <a:p>
+            <a:endParaRPr lang="en-US" dirty="0"/>
+          </a:p>
+          <a:p>
+            <a:r>
+              <a:rPr lang="en-US" sz="2800" dirty="0" err="1">
+                <a:latin typeface="Consolas" panose="020B0609020204030204" pitchFamily="49" charset="0"/>
+              </a:rPr>
+              <a:t>A.CallTo</a:t>
+            </a:r>
+            <a:r>
+              <a:rPr lang="en-US" sz="2800" dirty="0">
+                <a:latin typeface="Consolas" panose="020B0609020204030204" pitchFamily="49" charset="0"/>
+              </a:rPr>
+              <a:t>(() =&gt; </a:t>
+            </a:r>
+            <a:r>
+              <a:rPr lang="en-US" sz="2800" dirty="0" err="1">
+                <a:latin typeface="Consolas" panose="020B0609020204030204" pitchFamily="49" charset="0"/>
+              </a:rPr>
+              <a:t>fake.SomeMethod</a:t>
+            </a:r>
+            <a:r>
+              <a:rPr lang="en-US" sz="2800" dirty="0">
+                <a:latin typeface="Consolas" panose="020B0609020204030204" pitchFamily="49" charset="0"/>
+              </a:rPr>
+              <a:t>())</a:t>
+            </a:r>
+            <a:br>
+              <a:rPr lang="en-US" sz="2800" dirty="0">
+                <a:latin typeface="Consolas" panose="020B0609020204030204" pitchFamily="49" charset="0"/>
+              </a:rPr>
+            </a:br>
+            <a:r>
+              <a:rPr lang="en-US" sz="2800" dirty="0">
+                <a:latin typeface="Consolas" panose="020B0609020204030204" pitchFamily="49" charset="0"/>
+              </a:rPr>
+              <a:t>	.</a:t>
+            </a:r>
+            <a:r>
+              <a:rPr lang="en-US" sz="2800" b="1" dirty="0" err="1">
+                <a:latin typeface="Consolas" panose="020B0609020204030204" pitchFamily="49" charset="0"/>
+              </a:rPr>
+              <a:t>ReturnsNextFromSequence</a:t>
+            </a:r>
+            <a:r>
+              <a:rPr lang="en-US" sz="2800" dirty="0">
+                <a:latin typeface="Consolas" panose="020B0609020204030204" pitchFamily="49" charset="0"/>
+              </a:rPr>
+              <a:t>(false, true);</a:t>
             </a:r>
           </a:p>
           <a:p>
@@ -11856,67 +13685,6 @@
               <a:buNone/>
             </a:pPr>
             <a:endParaRPr lang="ru-RU" dirty="0"/>
-          </a:p>
-          <a:p>
-            <a:pPr marL="0" indent="0">
-              <a:buNone/>
-            </a:pPr>
-            <a:r>
-              <a:rPr lang="ru-RU" dirty="0"/>
-              <a:t>Надо реализовать оставшиеся тесты на метод </a:t>
-            </a:r>
-            <a:r>
-              <a:rPr lang="en-US" dirty="0" err="1">
-                <a:solidFill>
-                  <a:schemeClr val="accent1"/>
-                </a:solidFill>
-              </a:rPr>
-              <a:t>SendFiles</a:t>
-            </a:r>
-            <a:r>
-              <a:rPr lang="en-US" dirty="0"/>
-              <a:t> </a:t>
-            </a:r>
-            <a:r>
-              <a:rPr lang="ru-RU" dirty="0"/>
-              <a:t>класса </a:t>
-            </a:r>
-            <a:r>
-              <a:rPr lang="en-US" dirty="0" err="1">
-                <a:solidFill>
-                  <a:schemeClr val="accent1"/>
-                </a:solidFill>
-              </a:rPr>
-              <a:t>FileSender</a:t>
-            </a:r>
-            <a:endParaRPr lang="ru-RU" dirty="0">
-              <a:solidFill>
-                <a:schemeClr val="accent1"/>
-              </a:solidFill>
-            </a:endParaRPr>
-          </a:p>
-          <a:p>
-            <a:pPr marL="0" indent="0">
-              <a:buNone/>
-            </a:pPr>
-            <a:endParaRPr lang="ru-RU" dirty="0"/>
-          </a:p>
-          <a:p>
-            <a:pPr marL="0" indent="0">
-              <a:buNone/>
-            </a:pPr>
-            <a:r>
-              <a:rPr lang="ru-RU" dirty="0"/>
-              <a:t>Нельзя менять файлы из папки </a:t>
-            </a:r>
-            <a:r>
-              <a:rPr lang="en-US" dirty="0"/>
-              <a:t>Dependencies</a:t>
-            </a:r>
-            <a:r>
-              <a:rPr lang="ru-RU" dirty="0"/>
-              <a:t>!</a:t>
-            </a:r>
           </a:p>
         </p:txBody>
       </p:sp>
@@ -11960,6 +13728,186 @@
     </p:spTree>
     <p:extLst>
       <p:ext uri="{BB962C8B-B14F-4D97-AF65-F5344CB8AC3E}">
+        <p14:creationId xmlns:p14="http://schemas.microsoft.com/office/powerpoint/2010/main" val="1149368405"/>
+      </p:ext>
+    </p:extLst>
+  </p:cSld>
+  <p:clrMapOvr>
+    <a:masterClrMapping/>
+  </p:clrMapOvr>
+  <p:timing>
+    <p:tnLst>
+      <p:par>
+        <p:cTn id="1" dur="indefinite" restart="never" nodeType="tmRoot"/>
+      </p:par>
+    </p:tnLst>
+  </p:timing>
+</p:sld>
+</file>
+
+<file path=ppt/slides/slide11.xml><?xml version="1.0" encoding="utf-8"?>
+<p:sld xmlns:a="http://schemas.openxmlformats.org/drawingml/2006/main" xmlns:r="http://schemas.openxmlformats.org/officeDocument/2006/relationships" xmlns:p="http://schemas.openxmlformats.org/presentationml/2006/main">
+  <p:cSld>
+    <p:spTree>
+      <p:nvGrpSpPr>
+        <p:cNvPr id="1" name=""/>
+        <p:cNvGrpSpPr/>
+        <p:nvPr/>
+      </p:nvGrpSpPr>
+      <p:grpSpPr>
+        <a:xfrm>
+          <a:off x="0" y="0"/>
+          <a:ext cx="0" cy="0"/>
+          <a:chOff x="0" y="0"/>
+          <a:chExt cx="0" cy="0"/>
+        </a:xfrm>
+      </p:grpSpPr>
+      <p:sp>
+        <p:nvSpPr>
+          <p:cNvPr id="3" name="Объект 2"/>
+          <p:cNvSpPr>
+            <a:spLocks noGrp="1"/>
+          </p:cNvSpPr>
+          <p:nvPr>
+            <p:ph sz="quarter" idx="13"/>
+          </p:nvPr>
+        </p:nvSpPr>
+        <p:spPr/>
+        <p:txBody>
+          <a:bodyPr>
+            <a:normAutofit/>
+          </a:bodyPr>
+          <a:lstStyle/>
+          <a:p>
+            <a:pPr marL="0" indent="0">
+              <a:buNone/>
+            </a:pPr>
+            <a:r>
+              <a:rPr lang="ru-RU" dirty="0"/>
+              <a:t>На метод </a:t>
+            </a:r>
+            <a:r>
+              <a:rPr lang="en-US" dirty="0" err="1"/>
+              <a:t>SendFiles</a:t>
+            </a:r>
+            <a:r>
+              <a:rPr lang="en-US" dirty="0"/>
+              <a:t> </a:t>
+            </a:r>
+            <a:r>
+              <a:rPr lang="ru-RU" dirty="0"/>
+              <a:t>написан только один тест, проверяющий успешную отправку файлов.</a:t>
+            </a:r>
+          </a:p>
+          <a:p>
+            <a:pPr marL="0" indent="0">
+              <a:buNone/>
+            </a:pPr>
+            <a:endParaRPr lang="ru-RU" dirty="0"/>
+          </a:p>
+          <a:p>
+            <a:pPr marL="0" indent="0">
+              <a:buNone/>
+            </a:pPr>
+            <a:r>
+              <a:rPr lang="ru-RU" dirty="0"/>
+              <a:t>Надо реализовать оставшиеся тесты на метод </a:t>
+            </a:r>
+            <a:r>
+              <a:rPr lang="en-US" dirty="0" err="1">
+                <a:solidFill>
+                  <a:schemeClr val="accent1"/>
+                </a:solidFill>
+              </a:rPr>
+              <a:t>SendFiles</a:t>
+            </a:r>
+            <a:r>
+              <a:rPr lang="en-US" dirty="0"/>
+              <a:t> </a:t>
+            </a:r>
+            <a:r>
+              <a:rPr lang="ru-RU" dirty="0"/>
+              <a:t>класса </a:t>
+            </a:r>
+            <a:r>
+              <a:rPr lang="en-US" dirty="0" err="1">
+                <a:solidFill>
+                  <a:schemeClr val="accent1"/>
+                </a:solidFill>
+              </a:rPr>
+              <a:t>FileSender</a:t>
+            </a:r>
+            <a:endParaRPr lang="ru-RU" dirty="0">
+              <a:solidFill>
+                <a:schemeClr val="accent1"/>
+              </a:solidFill>
+            </a:endParaRPr>
+          </a:p>
+          <a:p>
+            <a:pPr marL="0" indent="0">
+              <a:buNone/>
+            </a:pPr>
+            <a:endParaRPr lang="ru-RU" dirty="0"/>
+          </a:p>
+          <a:p>
+            <a:pPr marL="0" indent="0">
+              <a:buNone/>
+            </a:pPr>
+            <a:r>
+              <a:rPr lang="ru-RU" dirty="0"/>
+              <a:t>Нельзя менять файлы из папки </a:t>
+            </a:r>
+            <a:r>
+              <a:rPr lang="en-US" dirty="0"/>
+              <a:t>Dependencies</a:t>
+            </a:r>
+            <a:r>
+              <a:rPr lang="ru-RU" dirty="0"/>
+              <a:t>!</a:t>
+            </a:r>
+          </a:p>
+        </p:txBody>
+      </p:sp>
+      <p:sp>
+        <p:nvSpPr>
+          <p:cNvPr id="2" name="Заголовок 1"/>
+          <p:cNvSpPr>
+            <a:spLocks noGrp="1"/>
+          </p:cNvSpPr>
+          <p:nvPr>
+            <p:ph type="title"/>
+          </p:nvPr>
+        </p:nvSpPr>
+        <p:spPr/>
+        <p:txBody>
+          <a:bodyPr>
+            <a:noAutofit/>
+          </a:bodyPr>
+          <a:lstStyle/>
+          <a:p>
+            <a:r>
+              <a:rPr lang="ru-RU" dirty="0">
+                <a:solidFill>
+                  <a:schemeClr val="tx1"/>
+                </a:solidFill>
+              </a:rPr>
+              <a:t>Задача</a:t>
+            </a:r>
+            <a:r>
+              <a:rPr lang="ru-RU" dirty="0"/>
+              <a:t> </a:t>
+            </a:r>
+            <a:r>
+              <a:rPr lang="en-US" dirty="0" err="1"/>
+              <a:t>FileSender</a:t>
+            </a:r>
+            <a:endParaRPr lang="ru-RU" dirty="0"/>
+          </a:p>
+        </p:txBody>
+      </p:sp>
+    </p:spTree>
+    <p:extLst>
+      <p:ext uri="{BB962C8B-B14F-4D97-AF65-F5344CB8AC3E}">
         <p14:creationId xmlns:p14="http://schemas.microsoft.com/office/powerpoint/2010/main" val="106446690"/>
       </p:ext>
     </p:extLst>
@@ -11967,10 +13915,17 @@
   <p:clrMapOvr>
     <a:masterClrMapping/>
   </p:clrMapOvr>
+  <p:timing>
+    <p:tnLst>
+      <p:par>
+        <p:cTn id="1" dur="indefinite" restart="never" nodeType="tmRoot"/>
+      </p:par>
+    </p:tnLst>
+  </p:timing>
 </p:sld>
 </file>
 
-<file path=ppt/slides/slide11.xml><?xml version="1.0" encoding="utf-8"?>
+<file path=ppt/slides/slide12.xml><?xml version="1.0" encoding="utf-8"?>
 <p:sld xmlns:a="http://schemas.openxmlformats.org/drawingml/2006/main" xmlns:r="http://schemas.openxmlformats.org/officeDocument/2006/relationships" xmlns:p="http://schemas.openxmlformats.org/presentationml/2006/main">
   <p:cSld>
     <p:spTree>
@@ -12333,7 +14288,7 @@
 </p:sld>
 </file>
 
-<file path=ppt/slides/slide12.xml><?xml version="1.0" encoding="utf-8"?>
+<file path=ppt/slides/slide13.xml><?xml version="1.0" encoding="utf-8"?>
 <p:sld xmlns:a="http://schemas.openxmlformats.org/drawingml/2006/main" xmlns:r="http://schemas.openxmlformats.org/officeDocument/2006/relationships" xmlns:p="http://schemas.openxmlformats.org/presentationml/2006/main">
   <p:cSld>
     <p:spTree>
@@ -12386,7 +14341,7 @@
           <p:nvPr/>
         </p:nvPicPr>
         <p:blipFill>
-          <a:blip r:embed="rId2" cstate="print">
+          <a:blip r:embed="rId3" cstate="print">
             <a:duotone>
               <a:schemeClr val="accent1">
                 <a:shade val="45000"/>
@@ -12438,7 +14393,7 @@
 </p:sld>
 </file>
 
-<file path=ppt/slides/slide13.xml><?xml version="1.0" encoding="utf-8"?>
+<file path=ppt/slides/slide14.xml><?xml version="1.0" encoding="utf-8"?>
 <p:sld xmlns:a="http://schemas.openxmlformats.org/drawingml/2006/main" xmlns:r="http://schemas.openxmlformats.org/officeDocument/2006/relationships" xmlns:p="http://schemas.openxmlformats.org/presentationml/2006/main">
   <p:cSld>
     <p:spTree>
@@ -13053,7 +15008,7 @@
 </p:sld>
 </file>
 
-<file path=ppt/slides/slide14.xml><?xml version="1.0" encoding="utf-8"?>
+<file path=ppt/slides/slide15.xml><?xml version="1.0" encoding="utf-8"?>
 <p:sld xmlns:a="http://schemas.openxmlformats.org/drawingml/2006/main" xmlns:r="http://schemas.openxmlformats.org/officeDocument/2006/relationships" xmlns:p="http://schemas.openxmlformats.org/presentationml/2006/main">
   <p:cSld>
     <p:spTree>
@@ -13106,7 +15061,7 @@
 </p:sld>
 </file>
 
-<file path=ppt/slides/slide15.xml><?xml version="1.0" encoding="utf-8"?>
+<file path=ppt/slides/slide16.xml><?xml version="1.0" encoding="utf-8"?>
 <p:sld xmlns:a="http://schemas.openxmlformats.org/drawingml/2006/main" xmlns:r="http://schemas.openxmlformats.org/officeDocument/2006/relationships" xmlns:p="http://schemas.openxmlformats.org/presentationml/2006/main">
   <p:cSld>
     <p:spTree>
@@ -13381,7 +15336,7 @@
 </p:sld>
 </file>
 
-<file path=ppt/slides/slide16.xml><?xml version="1.0" encoding="utf-8"?>
+<file path=ppt/slides/slide17.xml><?xml version="1.0" encoding="utf-8"?>
 <p:sld xmlns:a="http://schemas.openxmlformats.org/drawingml/2006/main" xmlns:r="http://schemas.openxmlformats.org/officeDocument/2006/relationships" xmlns:p="http://schemas.openxmlformats.org/presentationml/2006/main" show="0">
   <p:cSld>
     <p:spTree>
@@ -13523,18 +15478,18 @@
   <p:clrMapOvr>
     <a:masterClrMapping/>
   </p:clrMapOvr>
-  <mc:AlternateContent xmlns:mc="http://schemas.openxmlformats.org/markup-compatibility/2006">
-    <mc:Choice xmlns:p14="http://schemas.microsoft.com/office/powerpoint/2010/main" Requires="p14">
+  <mc:AlternateContent xmlns:mc="http://schemas.openxmlformats.org/markup-compatibility/2006" xmlns:p14="http://schemas.microsoft.com/office/powerpoint/2010/main">
+    <mc:Choice Requires="p14">
       <p:transition spd="slow" p14:dur="2000"/>
     </mc:Choice>
-    <mc:Fallback>
+    <mc:Fallback xmlns="">
       <p:transition spd="slow"/>
     </mc:Fallback>
   </mc:AlternateContent>
 </p:sld>
 </file>
 
-<file path=ppt/slides/slide17.xml><?xml version="1.0" encoding="utf-8"?>
+<file path=ppt/slides/slide18.xml><?xml version="1.0" encoding="utf-8"?>
 <p:sld xmlns:a="http://schemas.openxmlformats.org/drawingml/2006/main" xmlns:r="http://schemas.openxmlformats.org/officeDocument/2006/relationships" xmlns:p="http://schemas.openxmlformats.org/presentationml/2006/main" show="0">
   <p:cSld>
     <p:spTree>
@@ -13775,11 +15730,11 @@
   <p:clrMapOvr>
     <a:masterClrMapping/>
   </p:clrMapOvr>
-  <mc:AlternateContent xmlns:mc="http://schemas.openxmlformats.org/markup-compatibility/2006">
-    <mc:Choice xmlns:p14="http://schemas.microsoft.com/office/powerpoint/2010/main" Requires="p14">
+  <mc:AlternateContent xmlns:mc="http://schemas.openxmlformats.org/markup-compatibility/2006" xmlns:p14="http://schemas.microsoft.com/office/powerpoint/2010/main">
+    <mc:Choice Requires="p14">
       <p:transition spd="slow" p14:dur="2000"/>
     </mc:Choice>
-    <mc:Fallback>
+    <mc:Fallback xmlns="">
       <p:transition spd="slow"/>
     </mc:Fallback>
   </mc:AlternateContent>
@@ -14198,19 +16153,19 @@
           <a:p>
             <a:r>
               <a:rPr lang="en-US" sz="2800" cap="none" dirty="0">
-                <a:hlinkClick r:id="rId2"/>
+                <a:hlinkClick r:id="rId3"/>
               </a:rPr>
               <a:t>https://github.com/</a:t>
             </a:r>
             <a:r>
               <a:rPr lang="en-US" sz="5400" b="1" cap="none" dirty="0">
-                <a:hlinkClick r:id="rId2"/>
+                <a:hlinkClick r:id="rId3"/>
               </a:rPr>
               <a:t>FakeItEasy</a:t>
             </a:r>
             <a:r>
               <a:rPr lang="en-US" sz="2800" cap="none" dirty="0">
-                <a:hlinkClick r:id="rId2"/>
+                <a:hlinkClick r:id="rId3"/>
               </a:rPr>
               <a:t>/fakeiteasy</a:t>
             </a:r>
@@ -14956,7 +16911,7 @@
           <p:nvPr/>
         </p:nvPicPr>
         <p:blipFill>
-          <a:blip r:embed="rId3">
+          <a:blip r:embed="rId4">
             <a:extLst>
               <a:ext uri="{28A0092B-C50C-407E-A947-70E740481C1C}">
                 <a14:useLocalDpi xmlns:a14="http://schemas.microsoft.com/office/drawing/2010/main" val="0"/>
@@ -15228,7 +17183,7 @@
             </a:br>
             <a:r>
               <a:rPr lang="en-US" sz="2200" dirty="0">
-                <a:hlinkClick r:id="rId2"/>
+                <a:hlinkClick r:id="rId3"/>
               </a:rPr>
               <a:t>http://www.castleproject.org/projects/dynamicproxy/</a:t>
             </a:r>
@@ -15473,31 +17428,31 @@
           </a:p>
           <a:p>
             <a:endParaRPr lang="en-US" sz="1400" dirty="0" smtClean="0">
-              <a:hlinkClick r:id="rId3"/>
+              <a:hlinkClick r:id="rId4"/>
             </a:endParaRPr>
           </a:p>
           <a:p>
             <a:r>
               <a:rPr lang="ru-RU" sz="1800" dirty="0" smtClean="0">
-                <a:hlinkClick r:id="rId3"/>
+                <a:hlinkClick r:id="rId4"/>
               </a:rPr>
               <a:t>Про </a:t>
             </a:r>
             <a:r>
               <a:rPr lang="en-US" sz="1800" dirty="0" smtClean="0">
-                <a:hlinkClick r:id="rId3"/>
+                <a:hlinkClick r:id="rId4"/>
               </a:rPr>
               <a:t>Expressions </a:t>
             </a:r>
             <a:r>
               <a:rPr lang="ru-RU" sz="1800" dirty="0" smtClean="0">
-                <a:hlinkClick r:id="rId3"/>
+                <a:hlinkClick r:id="rId4"/>
               </a:rPr>
               <a:t>на </a:t>
             </a:r>
             <a:r>
               <a:rPr lang="en-US" sz="1800" dirty="0" smtClean="0">
-                <a:hlinkClick r:id="rId3"/>
+                <a:hlinkClick r:id="rId4"/>
               </a:rPr>
               <a:t>ulearn.me</a:t>
             </a:r>
@@ -16448,30 +18403,36 @@
               <a:rPr lang="en-US" sz="2400" dirty="0">
                 <a:latin typeface="Consolas" panose="020B0609020204030204" pitchFamily="49" charset="0"/>
               </a:rPr>
-              <a:t> value = “42”;</a:t>
-            </a:r>
-          </a:p>
-          <a:p>
-            <a:r>
-              <a:rPr lang="en-US" sz="2400" dirty="0" err="1">
+              <a:t> </a:t>
+            </a:r>
+            <a:r>
+              <a:rPr lang="en-US" sz="2400" dirty="0" smtClean="0">
                 <a:latin typeface="Consolas" panose="020B0609020204030204" pitchFamily="49" charset="0"/>
               </a:rPr>
+              <a:t>value = “42”;</a:t>
+            </a:r>
+          </a:p>
+          <a:p>
+            <a:r>
+              <a:rPr lang="en-US" sz="2400" dirty="0" err="1" smtClean="0">
+                <a:latin typeface="Consolas" panose="020B0609020204030204" pitchFamily="49" charset="0"/>
+              </a:rPr>
               <a:t>A.CallTo</a:t>
             </a:r>
             <a:r>
-              <a:rPr lang="en-US" sz="2400" dirty="0">
+              <a:rPr lang="en-US" sz="2400" dirty="0" smtClean="0">
                 <a:latin typeface="Consolas" panose="020B0609020204030204" pitchFamily="49" charset="0"/>
               </a:rPr>
               <a:t>(() =&gt; </a:t>
             </a:r>
             <a:r>
-              <a:rPr lang="en-US" sz="2400" dirty="0" err="1">
+              <a:rPr lang="en-US" sz="2400" dirty="0" err="1" smtClean="0">
                 <a:latin typeface="Consolas" panose="020B0609020204030204" pitchFamily="49" charset="0"/>
               </a:rPr>
               <a:t>fake.TryRead</a:t>
             </a:r>
             <a:r>
-              <a:rPr lang="en-US" sz="2400" dirty="0">
+              <a:rPr lang="en-US" sz="2400" dirty="0" smtClean="0">
                 <a:latin typeface="Consolas" panose="020B0609020204030204" pitchFamily="49" charset="0"/>
               </a:rPr>
               <a:t>(id, out value))</a:t>
@@ -16479,30 +18440,30 @@
           </a:p>
           <a:p>
             <a:r>
-              <a:rPr lang="en-US" sz="2400" dirty="0">
+              <a:rPr lang="en-US" sz="2400" dirty="0" smtClean="0">
                 <a:latin typeface="Consolas" panose="020B0609020204030204" pitchFamily="49" charset="0"/>
               </a:rPr>
               <a:t>	.</a:t>
             </a:r>
             <a:r>
-              <a:rPr lang="en-US" sz="2400" dirty="0" err="1">
+              <a:rPr lang="en-US" sz="2400" dirty="0" err="1" smtClean="0">
                 <a:latin typeface="Consolas" panose="020B0609020204030204" pitchFamily="49" charset="0"/>
               </a:rPr>
               <a:t>MustHaveHappened</a:t>
             </a:r>
             <a:r>
-              <a:rPr lang="en-US" sz="2400" dirty="0">
+              <a:rPr lang="en-US" sz="2400" dirty="0" smtClean="0">
                 <a:latin typeface="Consolas" panose="020B0609020204030204" pitchFamily="49" charset="0"/>
               </a:rPr>
               <a:t>(); //</a:t>
             </a:r>
             <a:r>
-              <a:rPr lang="ru-RU" sz="2400" dirty="0">
+              <a:rPr lang="ru-RU" sz="2400" dirty="0" smtClean="0">
                 <a:latin typeface="Consolas" panose="020B0609020204030204" pitchFamily="49" charset="0"/>
               </a:rPr>
               <a:t>должен быть в конце теста</a:t>
             </a:r>
-            <a:endParaRPr lang="en-US" sz="2400" dirty="0">
+            <a:endParaRPr lang="en-US" sz="2400" dirty="0" smtClean="0">
               <a:latin typeface="Consolas" panose="020B0609020204030204" pitchFamily="49" charset="0"/>
             </a:endParaRPr>
           </a:p>
@@ -16558,10 +18519,294 @@
   <p:clrMapOvr>
     <a:masterClrMapping/>
   </p:clrMapOvr>
+  <p:timing>
+    <p:tnLst>
+      <p:par>
+        <p:cTn id="1" dur="indefinite" restart="never" nodeType="tmRoot"/>
+      </p:par>
+    </p:tnLst>
+  </p:timing>
 </p:sld>
 </file>
 
 <file path=ppt/slides/slide8.xml><?xml version="1.0" encoding="utf-8"?>
+<p:sld xmlns:a="http://schemas.openxmlformats.org/drawingml/2006/main" xmlns:r="http://schemas.openxmlformats.org/officeDocument/2006/relationships" xmlns:p="http://schemas.openxmlformats.org/presentationml/2006/main">
+  <p:cSld>
+    <p:spTree>
+      <p:nvGrpSpPr>
+        <p:cNvPr id="1" name=""/>
+        <p:cNvGrpSpPr/>
+        <p:nvPr/>
+      </p:nvGrpSpPr>
+      <p:grpSpPr>
+        <a:xfrm>
+          <a:off x="0" y="0"/>
+          <a:ext cx="0" cy="0"/>
+          <a:chOff x="0" y="0"/>
+          <a:chExt cx="0" cy="0"/>
+        </a:xfrm>
+      </p:grpSpPr>
+      <p:sp>
+        <p:nvSpPr>
+          <p:cNvPr id="4" name="Объект 3"/>
+          <p:cNvSpPr>
+            <a:spLocks noGrp="1"/>
+          </p:cNvSpPr>
+          <p:nvPr>
+            <p:ph sz="quarter" idx="13"/>
+          </p:nvPr>
+        </p:nvSpPr>
+        <p:spPr/>
+        <p:txBody>
+          <a:bodyPr>
+            <a:normAutofit lnSpcReduction="10000"/>
+          </a:bodyPr>
+          <a:lstStyle/>
+          <a:p>
+            <a:r>
+              <a:rPr lang="en-US" sz="2400" dirty="0" err="1">
+                <a:latin typeface="Consolas" panose="020B0609020204030204" pitchFamily="49" charset="0"/>
+              </a:rPr>
+              <a:t>var</a:t>
+            </a:r>
+            <a:r>
+              <a:rPr lang="en-US" sz="2400" dirty="0">
+                <a:latin typeface="Consolas" panose="020B0609020204030204" pitchFamily="49" charset="0"/>
+              </a:rPr>
+              <a:t> value = “42</a:t>
+            </a:r>
+            <a:r>
+              <a:rPr lang="en-US" sz="2400" dirty="0" smtClean="0">
+                <a:latin typeface="Consolas" panose="020B0609020204030204" pitchFamily="49" charset="0"/>
+              </a:rPr>
+              <a:t>”;</a:t>
+            </a:r>
+          </a:p>
+          <a:p>
+            <a:endParaRPr lang="en-US" sz="2400" dirty="0" smtClean="0">
+              <a:latin typeface="Consolas" panose="020B0609020204030204" pitchFamily="49" charset="0"/>
+            </a:endParaRPr>
+          </a:p>
+          <a:p>
+            <a:r>
+              <a:rPr lang="en-US" sz="2400" dirty="0" smtClean="0">
+                <a:latin typeface="Consolas" panose="020B0609020204030204" pitchFamily="49" charset="0"/>
+              </a:rPr>
+              <a:t>string _;</a:t>
+            </a:r>
+            <a:endParaRPr lang="en-US" sz="2400" dirty="0">
+              <a:latin typeface="Consolas" panose="020B0609020204030204" pitchFamily="49" charset="0"/>
+            </a:endParaRPr>
+          </a:p>
+          <a:p>
+            <a:r>
+              <a:rPr lang="en-US" sz="2400" dirty="0" err="1">
+                <a:latin typeface="Consolas" panose="020B0609020204030204" pitchFamily="49" charset="0"/>
+              </a:rPr>
+              <a:t>A.CallTo</a:t>
+            </a:r>
+            <a:r>
+              <a:rPr lang="en-US" sz="2400" dirty="0">
+                <a:latin typeface="Consolas" panose="020B0609020204030204" pitchFamily="49" charset="0"/>
+              </a:rPr>
+              <a:t>(() =&gt; </a:t>
+            </a:r>
+            <a:r>
+              <a:rPr lang="en-US" sz="2400" dirty="0" err="1">
+                <a:latin typeface="Consolas" panose="020B0609020204030204" pitchFamily="49" charset="0"/>
+              </a:rPr>
+              <a:t>fake.TryRead</a:t>
+            </a:r>
+            <a:r>
+              <a:rPr lang="en-US" sz="2400" dirty="0">
+                <a:latin typeface="Consolas" panose="020B0609020204030204" pitchFamily="49" charset="0"/>
+              </a:rPr>
+              <a:t>(id, </a:t>
+            </a:r>
+            <a:r>
+              <a:rPr lang="en-US" sz="2400" dirty="0" smtClean="0">
+                <a:latin typeface="Consolas" panose="020B0609020204030204" pitchFamily="49" charset="0"/>
+              </a:rPr>
+              <a:t>out _))</a:t>
+            </a:r>
+          </a:p>
+          <a:p>
+            <a:r>
+              <a:rPr lang="en-US" sz="2400" dirty="0">
+                <a:latin typeface="Consolas" panose="020B0609020204030204" pitchFamily="49" charset="0"/>
+              </a:rPr>
+              <a:t>	</a:t>
+            </a:r>
+            <a:r>
+              <a:rPr lang="en-US" sz="2400" dirty="0" smtClean="0">
+                <a:latin typeface="Consolas" panose="020B0609020204030204" pitchFamily="49" charset="0"/>
+              </a:rPr>
+              <a:t>.</a:t>
+            </a:r>
+            <a:r>
+              <a:rPr lang="en-US" sz="2400" b="1" dirty="0" err="1" smtClean="0">
+                <a:latin typeface="Consolas" panose="020B0609020204030204" pitchFamily="49" charset="0"/>
+              </a:rPr>
+              <a:t>AssignsOutAndRefParameters</a:t>
+            </a:r>
+            <a:r>
+              <a:rPr lang="en-US" sz="2400" dirty="0" smtClean="0">
+                <a:latin typeface="Consolas" panose="020B0609020204030204" pitchFamily="49" charset="0"/>
+              </a:rPr>
+              <a:t>(value)</a:t>
+            </a:r>
+            <a:endParaRPr lang="en-US" sz="2400" dirty="0">
+              <a:latin typeface="Consolas" panose="020B0609020204030204" pitchFamily="49" charset="0"/>
+            </a:endParaRPr>
+          </a:p>
+          <a:p>
+            <a:r>
+              <a:rPr lang="en-US" sz="2400" dirty="0">
+                <a:latin typeface="Consolas" panose="020B0609020204030204" pitchFamily="49" charset="0"/>
+              </a:rPr>
+              <a:t>	.Returns(true);</a:t>
+            </a:r>
+          </a:p>
+          <a:p>
+            <a:endParaRPr lang="en-US" sz="2400" dirty="0" smtClean="0">
+              <a:latin typeface="Consolas" panose="020B0609020204030204" pitchFamily="49" charset="0"/>
+            </a:endParaRPr>
+          </a:p>
+          <a:p>
+            <a:r>
+              <a:rPr lang="en-US" sz="2400" dirty="0" smtClean="0">
+                <a:solidFill>
+                  <a:schemeClr val="bg2">
+                    <a:lumMod val="75000"/>
+                  </a:schemeClr>
+                </a:solidFill>
+                <a:latin typeface="Consolas" panose="020B0609020204030204" pitchFamily="49" charset="0"/>
+              </a:rPr>
+              <a:t>&lt;=&gt;</a:t>
+            </a:r>
+            <a:endParaRPr lang="en-US" sz="2400" dirty="0">
+              <a:solidFill>
+                <a:schemeClr val="bg2">
+                  <a:lumMod val="75000"/>
+                </a:schemeClr>
+              </a:solidFill>
+              <a:latin typeface="Consolas" panose="020B0609020204030204" pitchFamily="49" charset="0"/>
+            </a:endParaRPr>
+          </a:p>
+          <a:p>
+            <a:endParaRPr lang="en-US" sz="2400" dirty="0">
+              <a:latin typeface="Consolas" panose="020B0609020204030204" pitchFamily="49" charset="0"/>
+            </a:endParaRPr>
+          </a:p>
+          <a:p>
+            <a:r>
+              <a:rPr lang="en-US" sz="2400" dirty="0" err="1" smtClean="0">
+                <a:latin typeface="Consolas" panose="020B0609020204030204" pitchFamily="49" charset="0"/>
+              </a:rPr>
+              <a:t>A.CallTo</a:t>
+            </a:r>
+            <a:r>
+              <a:rPr lang="en-US" sz="2400" dirty="0" smtClean="0">
+                <a:latin typeface="Consolas" panose="020B0609020204030204" pitchFamily="49" charset="0"/>
+              </a:rPr>
+              <a:t>(() =&gt; </a:t>
+            </a:r>
+            <a:r>
+              <a:rPr lang="en-US" sz="2400" dirty="0" err="1" smtClean="0">
+                <a:latin typeface="Consolas" panose="020B0609020204030204" pitchFamily="49" charset="0"/>
+              </a:rPr>
+              <a:t>fake.TryRead</a:t>
+            </a:r>
+            <a:r>
+              <a:rPr lang="en-US" sz="2400" dirty="0" smtClean="0">
+                <a:latin typeface="Consolas" panose="020B0609020204030204" pitchFamily="49" charset="0"/>
+              </a:rPr>
+              <a:t>(id, </a:t>
+            </a:r>
+            <a:r>
+              <a:rPr lang="en-US" sz="2400" b="1" dirty="0" smtClean="0">
+                <a:latin typeface="Consolas" panose="020B0609020204030204" pitchFamily="49" charset="0"/>
+              </a:rPr>
+              <a:t>out value</a:t>
+            </a:r>
+            <a:r>
+              <a:rPr lang="en-US" sz="2400" dirty="0" smtClean="0">
+                <a:latin typeface="Consolas" panose="020B0609020204030204" pitchFamily="49" charset="0"/>
+              </a:rPr>
+              <a:t>))</a:t>
+            </a:r>
+          </a:p>
+          <a:p>
+            <a:r>
+              <a:rPr lang="en-US" sz="2400" dirty="0" smtClean="0">
+                <a:latin typeface="Consolas" panose="020B0609020204030204" pitchFamily="49" charset="0"/>
+              </a:rPr>
+              <a:t>	.Returns(true);</a:t>
+            </a:r>
+          </a:p>
+          <a:p>
+            <a:endParaRPr lang="en-US" sz="2800" dirty="0"/>
+          </a:p>
+        </p:txBody>
+      </p:sp>
+      <p:sp>
+        <p:nvSpPr>
+          <p:cNvPr id="2" name="Заголовок 1"/>
+          <p:cNvSpPr>
+            <a:spLocks noGrp="1"/>
+          </p:cNvSpPr>
+          <p:nvPr>
+            <p:ph type="title"/>
+          </p:nvPr>
+        </p:nvSpPr>
+        <p:spPr/>
+        <p:txBody>
+          <a:bodyPr>
+            <a:noAutofit/>
+          </a:bodyPr>
+          <a:lstStyle/>
+          <a:p>
+            <a:r>
+              <a:rPr lang="ru-RU" dirty="0">
+                <a:solidFill>
+                  <a:schemeClr val="tx1"/>
+                </a:solidFill>
+              </a:rPr>
+              <a:t>Задача</a:t>
+            </a:r>
+            <a:r>
+              <a:rPr lang="ru-RU" dirty="0"/>
+              <a:t> </a:t>
+            </a:r>
+            <a:r>
+              <a:rPr lang="en-US" dirty="0" err="1"/>
+              <a:t>ThingCache</a:t>
+            </a:r>
+            <a:endParaRPr lang="ru-RU" dirty="0"/>
+          </a:p>
+        </p:txBody>
+      </p:sp>
+    </p:spTree>
+    <p:extLst>
+      <p:ext uri="{BB962C8B-B14F-4D97-AF65-F5344CB8AC3E}">
+        <p14:creationId xmlns:p14="http://schemas.microsoft.com/office/powerpoint/2010/main" val="3121748027"/>
+      </p:ext>
+    </p:extLst>
+  </p:cSld>
+  <p:clrMapOvr>
+    <a:masterClrMapping/>
+  </p:clrMapOvr>
+  <p:timing>
+    <p:tnLst>
+      <p:par>
+        <p:cTn id="1" dur="indefinite" restart="never" nodeType="tmRoot"/>
+      </p:par>
+    </p:tnLst>
+  </p:timing>
+</p:sld>
+</file>
+
+<file path=ppt/slides/slide9.xml><?xml version="1.0" encoding="utf-8"?>
 <p:sld xmlns:a="http://schemas.openxmlformats.org/drawingml/2006/main" xmlns:r="http://schemas.openxmlformats.org/officeDocument/2006/relationships" xmlns:p="http://schemas.openxmlformats.org/presentationml/2006/main">
   <p:cSld>
     <p:spTree>
@@ -16857,219 +19102,6 @@
       <p:bldP spid="3" grpId="0" build="p"/>
     </p:bldLst>
   </p:timing>
-</p:sld>
-</file>
-
-<file path=ppt/slides/slide9.xml><?xml version="1.0" encoding="utf-8"?>
-<p:sld xmlns:a="http://schemas.openxmlformats.org/drawingml/2006/main" xmlns:r="http://schemas.openxmlformats.org/officeDocument/2006/relationships" xmlns:p="http://schemas.openxmlformats.org/presentationml/2006/main">
-  <p:cSld>
-    <p:spTree>
-      <p:nvGrpSpPr>
-        <p:cNvPr id="1" name=""/>
-        <p:cNvGrpSpPr/>
-        <p:nvPr/>
-      </p:nvGrpSpPr>
-      <p:grpSpPr>
-        <a:xfrm>
-          <a:off x="0" y="0"/>
-          <a:ext cx="0" cy="0"/>
-          <a:chOff x="0" y="0"/>
-          <a:chExt cx="0" cy="0"/>
-        </a:xfrm>
-      </p:grpSpPr>
-      <p:sp>
-        <p:nvSpPr>
-          <p:cNvPr id="3" name="Объект 2"/>
-          <p:cNvSpPr>
-            <a:spLocks noGrp="1"/>
-          </p:cNvSpPr>
-          <p:nvPr>
-            <p:ph sz="quarter" idx="13"/>
-          </p:nvPr>
-        </p:nvSpPr>
-        <p:spPr/>
-        <p:txBody>
-          <a:bodyPr>
-            <a:normAutofit/>
-          </a:bodyPr>
-          <a:lstStyle/>
-          <a:p>
-            <a:r>
-              <a:rPr lang="en-US" b="1" dirty="0"/>
-              <a:t>Arrange:</a:t>
-            </a:r>
-          </a:p>
-          <a:p>
-            <a:r>
-              <a:rPr lang="en-US" sz="2800" dirty="0" err="1">
-                <a:latin typeface="Consolas" panose="020B0609020204030204" pitchFamily="49" charset="0"/>
-              </a:rPr>
-              <a:t>A.CallTo</a:t>
-            </a:r>
-            <a:r>
-              <a:rPr lang="en-US" sz="2800" dirty="0">
-                <a:latin typeface="Consolas" panose="020B0609020204030204" pitchFamily="49" charset="0"/>
-              </a:rPr>
-              <a:t>(() =&gt; </a:t>
-            </a:r>
-            <a:r>
-              <a:rPr lang="en-US" sz="2800" dirty="0" err="1">
-                <a:latin typeface="Consolas" panose="020B0609020204030204" pitchFamily="49" charset="0"/>
-              </a:rPr>
-              <a:t>fake.SomeMethod</a:t>
-            </a:r>
-            <a:r>
-              <a:rPr lang="en-US" sz="2800" dirty="0">
-                <a:latin typeface="Consolas" panose="020B0609020204030204" pitchFamily="49" charset="0"/>
-              </a:rPr>
-              <a:t>(null))</a:t>
-            </a:r>
-          </a:p>
-          <a:p>
-            <a:r>
-              <a:rPr lang="en-US" sz="2800" dirty="0">
-                <a:latin typeface="Consolas" panose="020B0609020204030204" pitchFamily="49" charset="0"/>
-              </a:rPr>
-              <a:t>	.</a:t>
-            </a:r>
-            <a:r>
-              <a:rPr lang="en-US" sz="2800" b="1" dirty="0" err="1">
-                <a:latin typeface="Consolas" panose="020B0609020204030204" pitchFamily="49" charset="0"/>
-              </a:rPr>
-              <a:t>WithAnyArguments</a:t>
-            </a:r>
-            <a:r>
-              <a:rPr lang="en-US" sz="2800" b="1" dirty="0">
-                <a:latin typeface="Consolas" panose="020B0609020204030204" pitchFamily="49" charset="0"/>
-              </a:rPr>
-              <a:t>()</a:t>
-            </a:r>
-            <a:r>
-              <a:rPr lang="en-US" sz="2800" dirty="0">
-                <a:latin typeface="Consolas" panose="020B0609020204030204" pitchFamily="49" charset="0"/>
-              </a:rPr>
-              <a:t>.Returns(true)</a:t>
-            </a:r>
-            <a:r>
-              <a:rPr lang="en-US" sz="2800" b="1" dirty="0">
-                <a:latin typeface="Consolas" panose="020B0609020204030204" pitchFamily="49" charset="0"/>
-              </a:rPr>
-              <a:t>.Once()</a:t>
-            </a:r>
-            <a:r>
-              <a:rPr lang="en-US" sz="2800" dirty="0">
-                <a:latin typeface="Consolas" panose="020B0609020204030204" pitchFamily="49" charset="0"/>
-              </a:rPr>
-              <a:t>;</a:t>
-            </a:r>
-          </a:p>
-          <a:p>
-            <a:endParaRPr lang="en-US" dirty="0"/>
-          </a:p>
-          <a:p>
-            <a:r>
-              <a:rPr lang="en-US" sz="2800" dirty="0" err="1">
-                <a:latin typeface="Consolas" panose="020B0609020204030204" pitchFamily="49" charset="0"/>
-              </a:rPr>
-              <a:t>A.CallTo</a:t>
-            </a:r>
-            <a:r>
-              <a:rPr lang="en-US" sz="2800" dirty="0">
-                <a:latin typeface="Consolas" panose="020B0609020204030204" pitchFamily="49" charset="0"/>
-              </a:rPr>
-              <a:t>(() =&gt; </a:t>
-            </a:r>
-            <a:r>
-              <a:rPr lang="en-US" sz="2800" dirty="0" err="1">
-                <a:latin typeface="Consolas" panose="020B0609020204030204" pitchFamily="49" charset="0"/>
-              </a:rPr>
-              <a:t>fake.SomeMethod</a:t>
-            </a:r>
-            <a:r>
-              <a:rPr lang="en-US" sz="2800" dirty="0">
-                <a:latin typeface="Consolas" panose="020B0609020204030204" pitchFamily="49" charset="0"/>
-              </a:rPr>
-              <a:t>())</a:t>
-            </a:r>
-            <a:br>
-              <a:rPr lang="en-US" sz="2800" dirty="0">
-                <a:latin typeface="Consolas" panose="020B0609020204030204" pitchFamily="49" charset="0"/>
-              </a:rPr>
-            </a:br>
-            <a:r>
-              <a:rPr lang="en-US" sz="2800" dirty="0">
-                <a:latin typeface="Consolas" panose="020B0609020204030204" pitchFamily="49" charset="0"/>
-              </a:rPr>
-              <a:t>	.</a:t>
-            </a:r>
-            <a:r>
-              <a:rPr lang="en-US" sz="2800" b="1" dirty="0" err="1">
-                <a:latin typeface="Consolas" panose="020B0609020204030204" pitchFamily="49" charset="0"/>
-              </a:rPr>
-              <a:t>ReturnsNextFromSequence</a:t>
-            </a:r>
-            <a:r>
-              <a:rPr lang="en-US" sz="2800" dirty="0">
-                <a:latin typeface="Consolas" panose="020B0609020204030204" pitchFamily="49" charset="0"/>
-              </a:rPr>
-              <a:t>(false, true);</a:t>
-            </a:r>
-          </a:p>
-          <a:p>
-            <a:pPr marL="0" indent="0">
-              <a:buNone/>
-            </a:pPr>
-            <a:endParaRPr lang="ru-RU" dirty="0"/>
-          </a:p>
-        </p:txBody>
-      </p:sp>
-      <p:sp>
-        <p:nvSpPr>
-          <p:cNvPr id="2" name="Заголовок 1"/>
-          <p:cNvSpPr>
-            <a:spLocks noGrp="1"/>
-          </p:cNvSpPr>
-          <p:nvPr>
-            <p:ph type="title"/>
-          </p:nvPr>
-        </p:nvSpPr>
-        <p:spPr/>
-        <p:txBody>
-          <a:bodyPr>
-            <a:noAutofit/>
-          </a:bodyPr>
-          <a:lstStyle/>
-          <a:p>
-            <a:r>
-              <a:rPr lang="ru-RU" dirty="0">
-                <a:solidFill>
-                  <a:schemeClr val="tx1"/>
-                </a:solidFill>
-              </a:rPr>
-              <a:t>Задача</a:t>
-            </a:r>
-            <a:r>
-              <a:rPr lang="ru-RU" dirty="0"/>
-              <a:t> </a:t>
-            </a:r>
-            <a:r>
-              <a:rPr lang="en-US" dirty="0" err="1"/>
-              <a:t>FileSender</a:t>
-            </a:r>
-            <a:endParaRPr lang="ru-RU" dirty="0"/>
-          </a:p>
-        </p:txBody>
-      </p:sp>
-    </p:spTree>
-    <p:extLst>
-      <p:ext uri="{BB962C8B-B14F-4D97-AF65-F5344CB8AC3E}">
-        <p14:creationId xmlns:p14="http://schemas.microsoft.com/office/powerpoint/2010/main" val="1149368405"/>
-      </p:ext>
-    </p:extLst>
-  </p:cSld>
-  <p:clrMapOvr>
-    <a:masterClrMapping/>
-  </p:clrMapOvr>
 </p:sld>
 </file>
 

</xml_diff>

<commit_message>
add slide to presentation about default behaviour of fakes
</commit_message>
<xml_diff>
--- a/mocks.pptx
+++ b/mocks.pptx
@@ -6,7 +6,7 @@
     <p:sldMasterId id="2147483704" r:id="rId2"/>
   </p:sldMasterIdLst>
   <p:notesMasterIdLst>
-    <p:notesMasterId r:id="rId23"/>
+    <p:notesMasterId r:id="rId24"/>
   </p:notesMasterIdLst>
   <p:sldIdLst>
     <p:sldId id="329" r:id="rId3"/>
@@ -20,15 +20,16 @@
     <p:sldId id="330" r:id="rId11"/>
     <p:sldId id="327" r:id="rId12"/>
     <p:sldId id="341" r:id="rId13"/>
-    <p:sldId id="337" r:id="rId14"/>
-    <p:sldId id="328" r:id="rId15"/>
-    <p:sldId id="333" r:id="rId16"/>
-    <p:sldId id="332" r:id="rId17"/>
-    <p:sldId id="335" r:id="rId18"/>
-    <p:sldId id="331" r:id="rId19"/>
-    <p:sldId id="324" r:id="rId20"/>
-    <p:sldId id="334" r:id="rId21"/>
-    <p:sldId id="344" r:id="rId22"/>
+    <p:sldId id="345" r:id="rId14"/>
+    <p:sldId id="337" r:id="rId15"/>
+    <p:sldId id="328" r:id="rId16"/>
+    <p:sldId id="333" r:id="rId17"/>
+    <p:sldId id="332" r:id="rId18"/>
+    <p:sldId id="335" r:id="rId19"/>
+    <p:sldId id="331" r:id="rId20"/>
+    <p:sldId id="324" r:id="rId21"/>
+    <p:sldId id="334" r:id="rId22"/>
+    <p:sldId id="344" r:id="rId23"/>
   </p:sldIdLst>
   <p:sldSz cx="12192000" cy="6858000"/>
   <p:notesSz cx="6858000" cy="9144000"/>
@@ -155,6 +156,7 @@
           <p14:sldIdLst>
             <p14:sldId id="327"/>
             <p14:sldId id="341"/>
+            <p14:sldId id="345"/>
             <p14:sldId id="337"/>
             <p14:sldId id="328"/>
             <p14:sldId id="333"/>
@@ -7138,7 +7140,7 @@
           <a:p>
             <a:fld id="{1D12B38D-150E-44F0-AD67-CE4A0E7D73CD}" type="datetimeFigureOut">
               <a:rPr lang="ru-RU" smtClean="0"/>
-              <a:t>16.04.2018</a:t>
+              <a:t>15.05.2018</a:t>
             </a:fld>
             <a:endParaRPr lang="ru-RU"/>
           </a:p>
@@ -7992,7 +7994,7 @@
           <a:p>
             <a:fld id="{DC348DFF-10E5-4AE9-8016-9910A89BCDEE}" type="slidenum">
               <a:rPr lang="ru-RU" smtClean="0"/>
-              <a:t>12</a:t>
+              <a:t>13</a:t>
             </a:fld>
             <a:endParaRPr lang="ru-RU"/>
           </a:p>
@@ -8147,7 +8149,7 @@
           <a:p>
             <a:fld id="{DC348DFF-10E5-4AE9-8016-9910A89BCDEE}" type="slidenum">
               <a:rPr lang="ru-RU" smtClean="0"/>
-              <a:t>13</a:t>
+              <a:t>14</a:t>
             </a:fld>
             <a:endParaRPr lang="ru-RU"/>
           </a:p>
@@ -8289,7 +8291,7 @@
           <a:p>
             <a:fld id="{DC348DFF-10E5-4AE9-8016-9910A89BCDEE}" type="slidenum">
               <a:rPr lang="ru-RU" smtClean="0"/>
-              <a:t>14</a:t>
+              <a:t>15</a:t>
             </a:fld>
             <a:endParaRPr lang="ru-RU"/>
           </a:p>
@@ -8412,7 +8414,7 @@
           <a:p>
             <a:fld id="{DC348DFF-10E5-4AE9-8016-9910A89BCDEE}" type="slidenum">
               <a:rPr lang="ru-RU" smtClean="0"/>
-              <a:t>15</a:t>
+              <a:t>16</a:t>
             </a:fld>
             <a:endParaRPr lang="ru-RU"/>
           </a:p>
@@ -8516,7 +8518,7 @@
           <a:p>
             <a:fld id="{DC348DFF-10E5-4AE9-8016-9910A89BCDEE}" type="slidenum">
               <a:rPr lang="ru-RU" smtClean="0"/>
-              <a:t>17</a:t>
+              <a:t>18</a:t>
             </a:fld>
             <a:endParaRPr lang="ru-RU"/>
           </a:p>
@@ -16166,6 +16168,241 @@
       </p:grpSpPr>
       <p:sp>
         <p:nvSpPr>
+          <p:cNvPr id="3" name="Заголовок 2">
+            <a:extLst>
+              <a:ext uri="{FF2B5EF4-FFF2-40B4-BE49-F238E27FC236}">
+                <a16:creationId xmlns:a16="http://schemas.microsoft.com/office/drawing/2014/main" id="{BBDAAB41-1B82-4B23-9FDE-91CB0F19C549}"/>
+              </a:ext>
+            </a:extLst>
+          </p:cNvPr>
+          <p:cNvSpPr>
+            <a:spLocks noGrp="1"/>
+          </p:cNvSpPr>
+          <p:nvPr>
+            <p:ph type="title"/>
+          </p:nvPr>
+        </p:nvSpPr>
+        <p:spPr/>
+        <p:txBody>
+          <a:bodyPr/>
+          <a:lstStyle/>
+          <a:p>
+            <a:r>
+              <a:rPr lang="ru-RU" sz="3600" dirty="0"/>
+              <a:t>Зачем нужны значения </a:t>
+            </a:r>
+            <a:r>
+              <a:rPr lang="ru-RU" sz="3600" dirty="0" err="1"/>
+              <a:t>по-умолчанию</a:t>
+            </a:r>
+            <a:r>
+              <a:rPr lang="ru-RU" sz="3600" dirty="0"/>
+              <a:t>?</a:t>
+            </a:r>
+          </a:p>
+        </p:txBody>
+      </p:sp>
+      <p:sp>
+        <p:nvSpPr>
+          <p:cNvPr id="2" name="Объект 1">
+            <a:extLst>
+              <a:ext uri="{FF2B5EF4-FFF2-40B4-BE49-F238E27FC236}">
+                <a16:creationId xmlns:a16="http://schemas.microsoft.com/office/drawing/2014/main" id="{678D050B-70B8-411D-801E-83F35A20D625}"/>
+              </a:ext>
+            </a:extLst>
+          </p:cNvPr>
+          <p:cNvSpPr>
+            <a:spLocks noGrp="1"/>
+          </p:cNvSpPr>
+          <p:nvPr>
+            <p:ph sz="quarter" idx="13"/>
+          </p:nvPr>
+        </p:nvSpPr>
+        <p:spPr/>
+        <p:txBody>
+          <a:bodyPr/>
+          <a:lstStyle/>
+          <a:p>
+            <a:r>
+              <a:rPr lang="ru-RU" dirty="0"/>
+              <a:t>Уменьшает хрупкость!</a:t>
+            </a:r>
+          </a:p>
+          <a:p>
+            <a:endParaRPr lang="ru-RU" dirty="0"/>
+          </a:p>
+          <a:p>
+            <a:r>
+              <a:rPr lang="ru-RU" dirty="0"/>
+              <a:t>Например,</a:t>
+            </a:r>
+            <a:br>
+              <a:rPr lang="ru-RU" dirty="0"/>
+            </a:br>
+            <a:r>
+              <a:rPr lang="ru-RU" dirty="0"/>
+              <a:t>если добавление логирования в </a:t>
+            </a:r>
+            <a:r>
+              <a:rPr lang="en-US" dirty="0" err="1"/>
+              <a:t>ThingCache</a:t>
+            </a:r>
+            <a:r>
+              <a:rPr lang="en-US" dirty="0"/>
+              <a:t> </a:t>
+            </a:r>
+            <a:r>
+              <a:rPr lang="ru-RU" dirty="0"/>
+              <a:t>в качестве зависимости, то существующие тесты не упадут!</a:t>
+            </a:r>
+          </a:p>
+          <a:p>
+            <a:endParaRPr lang="ru-RU" dirty="0"/>
+          </a:p>
+        </p:txBody>
+      </p:sp>
+    </p:spTree>
+    <p:extLst>
+      <p:ext uri="{BB962C8B-B14F-4D97-AF65-F5344CB8AC3E}">
+        <p14:creationId xmlns:p14="http://schemas.microsoft.com/office/powerpoint/2010/main" val="3147644062"/>
+      </p:ext>
+    </p:extLst>
+  </p:cSld>
+  <p:clrMapOvr>
+    <a:masterClrMapping/>
+  </p:clrMapOvr>
+  <p:timing>
+    <p:tnLst>
+      <p:par>
+        <p:cTn id="1" dur="indefinite" restart="never" nodeType="tmRoot">
+          <p:childTnLst>
+            <p:seq concurrent="1" nextAc="seek">
+              <p:cTn id="2" dur="indefinite" nodeType="mainSeq">
+                <p:childTnLst>
+                  <p:par>
+                    <p:cTn id="3" fill="hold">
+                      <p:stCondLst>
+                        <p:cond delay="indefinite"/>
+                      </p:stCondLst>
+                      <p:childTnLst>
+                        <p:par>
+                          <p:cTn id="4" fill="hold">
+                            <p:stCondLst>
+                              <p:cond delay="0"/>
+                            </p:stCondLst>
+                            <p:childTnLst>
+                              <p:par>
+                                <p:cTn id="5" presetID="1" presetClass="entr" presetSubtype="0" fill="hold" nodeType="clickEffect">
+                                  <p:stCondLst>
+                                    <p:cond delay="0"/>
+                                  </p:stCondLst>
+                                  <p:childTnLst>
+                                    <p:set>
+                                      <p:cBhvr>
+                                        <p:cTn id="6" dur="1" fill="hold">
+                                          <p:stCondLst>
+                                            <p:cond delay="0"/>
+                                          </p:stCondLst>
+                                        </p:cTn>
+                                        <p:tgtEl>
+                                          <p:spTgt spid="2">
+                                            <p:txEl>
+                                              <p:pRg st="0" end="0"/>
+                                            </p:txEl>
+                                          </p:spTgt>
+                                        </p:tgtEl>
+                                        <p:attrNameLst>
+                                          <p:attrName>style.visibility</p:attrName>
+                                        </p:attrNameLst>
+                                      </p:cBhvr>
+                                      <p:to>
+                                        <p:strVal val="visible"/>
+                                      </p:to>
+                                    </p:set>
+                                  </p:childTnLst>
+                                </p:cTn>
+                              </p:par>
+                              <p:par>
+                                <p:cTn id="7" presetID="1" presetClass="entr" presetSubtype="0" fill="hold" nodeType="withEffect">
+                                  <p:stCondLst>
+                                    <p:cond delay="0"/>
+                                  </p:stCondLst>
+                                  <p:childTnLst>
+                                    <p:set>
+                                      <p:cBhvr>
+                                        <p:cTn id="8" dur="1" fill="hold">
+                                          <p:stCondLst>
+                                            <p:cond delay="0"/>
+                                          </p:stCondLst>
+                                        </p:cTn>
+                                        <p:tgtEl>
+                                          <p:spTgt spid="2">
+                                            <p:txEl>
+                                              <p:pRg st="2" end="2"/>
+                                            </p:txEl>
+                                          </p:spTgt>
+                                        </p:tgtEl>
+                                        <p:attrNameLst>
+                                          <p:attrName>style.visibility</p:attrName>
+                                        </p:attrNameLst>
+                                      </p:cBhvr>
+                                      <p:to>
+                                        <p:strVal val="visible"/>
+                                      </p:to>
+                                    </p:set>
+                                  </p:childTnLst>
+                                </p:cTn>
+                              </p:par>
+                            </p:childTnLst>
+                          </p:cTn>
+                        </p:par>
+                      </p:childTnLst>
+                    </p:cTn>
+                  </p:par>
+                </p:childTnLst>
+              </p:cTn>
+              <p:prevCondLst>
+                <p:cond evt="onPrev" delay="0">
+                  <p:tgtEl>
+                    <p:sldTgt/>
+                  </p:tgtEl>
+                </p:cond>
+              </p:prevCondLst>
+              <p:nextCondLst>
+                <p:cond evt="onNext" delay="0">
+                  <p:tgtEl>
+                    <p:sldTgt/>
+                  </p:tgtEl>
+                </p:cond>
+              </p:nextCondLst>
+            </p:seq>
+          </p:childTnLst>
+        </p:cTn>
+      </p:par>
+    </p:tnLst>
+  </p:timing>
+</p:sld>
+</file>
+
+<file path=ppt/slides/slide13.xml><?xml version="1.0" encoding="utf-8"?>
+<p:sld xmlns:a="http://schemas.openxmlformats.org/drawingml/2006/main" xmlns:r="http://schemas.openxmlformats.org/officeDocument/2006/relationships" xmlns:p="http://schemas.openxmlformats.org/presentationml/2006/main">
+  <p:cSld>
+    <p:spTree>
+      <p:nvGrpSpPr>
+        <p:cNvPr id="1" name=""/>
+        <p:cNvGrpSpPr/>
+        <p:nvPr/>
+      </p:nvGrpSpPr>
+      <p:grpSpPr>
+        <a:xfrm>
+          <a:off x="0" y="0"/>
+          <a:ext cx="0" cy="0"/>
+          <a:chOff x="0" y="0"/>
+          <a:chExt cx="0" cy="0"/>
+        </a:xfrm>
+      </p:grpSpPr>
+      <p:sp>
+        <p:nvSpPr>
           <p:cNvPr id="3" name="Объект 2"/>
           <p:cNvSpPr>
             <a:spLocks noGrp="1"/>
@@ -16320,7 +16557,7 @@
 </p:sld>
 </file>
 
-<file path=ppt/slides/slide13.xml><?xml version="1.0" encoding="utf-8"?>
+<file path=ppt/slides/slide14.xml><?xml version="1.0" encoding="utf-8"?>
 <p:sld xmlns:a="http://schemas.openxmlformats.org/drawingml/2006/main" xmlns:r="http://schemas.openxmlformats.org/officeDocument/2006/relationships" xmlns:p="http://schemas.openxmlformats.org/presentationml/2006/main">
   <p:cSld>
     <p:spTree>
@@ -16683,7 +16920,7 @@
 </p:sld>
 </file>
 
-<file path=ppt/slides/slide14.xml><?xml version="1.0" encoding="utf-8"?>
+<file path=ppt/slides/slide15.xml><?xml version="1.0" encoding="utf-8"?>
 <p:sld xmlns:a="http://schemas.openxmlformats.org/drawingml/2006/main" xmlns:r="http://schemas.openxmlformats.org/officeDocument/2006/relationships" xmlns:p="http://schemas.openxmlformats.org/presentationml/2006/main">
   <p:cSld>
     <p:spTree>
@@ -16788,7 +17025,7 @@
 </p:sld>
 </file>
 
-<file path=ppt/slides/slide15.xml><?xml version="1.0" encoding="utf-8"?>
+<file path=ppt/slides/slide16.xml><?xml version="1.0" encoding="utf-8"?>
 <p:sld xmlns:a="http://schemas.openxmlformats.org/drawingml/2006/main" xmlns:r="http://schemas.openxmlformats.org/officeDocument/2006/relationships" xmlns:p="http://schemas.openxmlformats.org/presentationml/2006/main">
   <p:cSld>
     <p:spTree>
@@ -17403,7 +17640,7 @@
 </p:sld>
 </file>
 
-<file path=ppt/slides/slide16.xml><?xml version="1.0" encoding="utf-8"?>
+<file path=ppt/slides/slide17.xml><?xml version="1.0" encoding="utf-8"?>
 <p:sld xmlns:a="http://schemas.openxmlformats.org/drawingml/2006/main" xmlns:r="http://schemas.openxmlformats.org/officeDocument/2006/relationships" xmlns:p="http://schemas.openxmlformats.org/presentationml/2006/main">
   <p:cSld>
     <p:spTree>
@@ -17456,7 +17693,7 @@
 </p:sld>
 </file>
 
-<file path=ppt/slides/slide17.xml><?xml version="1.0" encoding="utf-8"?>
+<file path=ppt/slides/slide18.xml><?xml version="1.0" encoding="utf-8"?>
 <p:sld xmlns:a="http://schemas.openxmlformats.org/drawingml/2006/main" xmlns:r="http://schemas.openxmlformats.org/officeDocument/2006/relationships" xmlns:p="http://schemas.openxmlformats.org/presentationml/2006/main">
   <p:cSld>
     <p:spTree>
@@ -17731,7 +17968,7 @@
 </p:sld>
 </file>
 
-<file path=ppt/slides/slide18.xml><?xml version="1.0" encoding="utf-8"?>
+<file path=ppt/slides/slide19.xml><?xml version="1.0" encoding="utf-8"?>
 <p:sld xmlns:a="http://schemas.openxmlformats.org/drawingml/2006/main" xmlns:r="http://schemas.openxmlformats.org/officeDocument/2006/relationships" xmlns:p="http://schemas.openxmlformats.org/presentationml/2006/main" show="0">
   <p:cSld>
     <p:spTree>
@@ -17867,250 +18104,6 @@
     <p:extLst>
       <p:ext uri="{BB962C8B-B14F-4D97-AF65-F5344CB8AC3E}">
         <p14:creationId xmlns:p14="http://schemas.microsoft.com/office/powerpoint/2010/main" val="3707230800"/>
-      </p:ext>
-    </p:extLst>
-  </p:cSld>
-  <p:clrMapOvr>
-    <a:masterClrMapping/>
-  </p:clrMapOvr>
-</p:sld>
-</file>
-
-<file path=ppt/slides/slide19.xml><?xml version="1.0" encoding="utf-8"?>
-<p:sld xmlns:a="http://schemas.openxmlformats.org/drawingml/2006/main" xmlns:r="http://schemas.openxmlformats.org/officeDocument/2006/relationships" xmlns:p="http://schemas.openxmlformats.org/presentationml/2006/main" show="0">
-  <p:cSld>
-    <p:spTree>
-      <p:nvGrpSpPr>
-        <p:cNvPr id="1" name=""/>
-        <p:cNvGrpSpPr/>
-        <p:nvPr/>
-      </p:nvGrpSpPr>
-      <p:grpSpPr>
-        <a:xfrm>
-          <a:off x="0" y="0"/>
-          <a:ext cx="0" cy="0"/>
-          <a:chOff x="0" y="0"/>
-          <a:chExt cx="0" cy="0"/>
-        </a:xfrm>
-      </p:grpSpPr>
-      <p:sp>
-        <p:nvSpPr>
-          <p:cNvPr id="2" name="Заголовок 1"/>
-          <p:cNvSpPr>
-            <a:spLocks noGrp="1"/>
-          </p:cNvSpPr>
-          <p:nvPr>
-            <p:ph type="title"/>
-          </p:nvPr>
-        </p:nvSpPr>
-        <p:spPr/>
-        <p:txBody>
-          <a:bodyPr/>
-          <a:lstStyle/>
-          <a:p>
-            <a:r>
-              <a:rPr lang="en-US" dirty="0"/>
-              <a:t>Behavior tests </a:t>
-            </a:r>
-            <a:r>
-              <a:rPr lang="en-US" dirty="0">
-                <a:solidFill>
-                  <a:schemeClr val="tx1"/>
-                </a:solidFill>
-              </a:rPr>
-              <a:t>vs</a:t>
-            </a:r>
-            <a:r>
-              <a:rPr lang="en-US" dirty="0"/>
-              <a:t> State tests</a:t>
-            </a:r>
-          </a:p>
-        </p:txBody>
-      </p:sp>
-      <p:sp>
-        <p:nvSpPr>
-          <p:cNvPr id="3" name="Объект 2"/>
-          <p:cNvSpPr>
-            <a:spLocks noGrp="1"/>
-          </p:cNvSpPr>
-          <p:nvPr>
-            <p:ph sz="quarter" idx="11"/>
-          </p:nvPr>
-        </p:nvSpPr>
-        <p:spPr/>
-        <p:txBody>
-          <a:bodyPr>
-            <a:normAutofit/>
-          </a:bodyPr>
-          <a:lstStyle/>
-          <a:p>
-            <a:pPr marL="457200" indent="-457200" fontAlgn="ctr">
-              <a:buFont typeface="Arial" panose="020B0604020202020204" pitchFamily="34" charset="0"/>
-              <a:buChar char="•"/>
-            </a:pPr>
-            <a:r>
-              <a:rPr lang="x-none" sz="2000" dirty="0"/>
-              <a:t>Более независимые</a:t>
-            </a:r>
-            <a:r>
-              <a:rPr lang="ru-RU" sz="2000" dirty="0"/>
-              <a:t> друг от друга</a:t>
-            </a:r>
-            <a:r>
-              <a:rPr lang="x-none" sz="2000" dirty="0"/>
-              <a:t> тесты</a:t>
-            </a:r>
-            <a:endParaRPr lang="en-US" sz="2000" dirty="0"/>
-          </a:p>
-          <a:p>
-            <a:pPr marL="457200" indent="-457200" fontAlgn="ctr">
-              <a:buFont typeface="Arial" panose="020B0604020202020204" pitchFamily="34" charset="0"/>
-              <a:buChar char="•"/>
-            </a:pPr>
-            <a:r>
-              <a:rPr lang="ru-RU" sz="2000" dirty="0"/>
-              <a:t>Методика приводит</a:t>
-            </a:r>
-            <a:r>
-              <a:rPr lang="x-none" sz="2000" dirty="0"/>
-              <a:t> к более модульному дизайну</a:t>
-            </a:r>
-            <a:endParaRPr lang="en-US" sz="2000" dirty="0"/>
-          </a:p>
-          <a:p>
-            <a:pPr marL="457200" indent="-457200" fontAlgn="ctr">
-              <a:buFont typeface="Arial" panose="020B0604020202020204" pitchFamily="34" charset="0"/>
-              <a:buChar char="•"/>
-            </a:pPr>
-            <a:endParaRPr lang="ru-RU" sz="2000" dirty="0"/>
-          </a:p>
-          <a:p>
-            <a:pPr marL="457200" indent="-457200" fontAlgn="ctr">
-              <a:buFont typeface="Arial" panose="020B0604020202020204" pitchFamily="34" charset="0"/>
-              <a:buChar char="•"/>
-            </a:pPr>
-            <a:r>
-              <a:rPr lang="ru-RU" sz="2000" dirty="0"/>
-              <a:t>В большей степени связывают реализацию и тесты, поэтому сложно менять реализацию</a:t>
-            </a:r>
-          </a:p>
-          <a:p>
-            <a:pPr marL="457200" indent="-457200" fontAlgn="ctr">
-              <a:buFont typeface="Arial" panose="020B0604020202020204" pitchFamily="34" charset="0"/>
-              <a:buChar char="•"/>
-            </a:pPr>
-            <a:endParaRPr lang="x-none" sz="2000" dirty="0"/>
-          </a:p>
-          <a:p>
-            <a:pPr marL="457200" indent="-457200" fontAlgn="ctr">
-              <a:buFont typeface="Arial" panose="020B0604020202020204" pitchFamily="34" charset="0"/>
-              <a:buChar char="•"/>
-            </a:pPr>
-            <a:r>
-              <a:rPr lang="x-none" sz="2000" dirty="0"/>
-              <a:t>Более быстрый и легкий запуск тестов</a:t>
-            </a:r>
-          </a:p>
-          <a:p>
-            <a:endParaRPr lang="en-US" sz="2000" dirty="0"/>
-          </a:p>
-        </p:txBody>
-      </p:sp>
-      <p:sp>
-        <p:nvSpPr>
-          <p:cNvPr id="4" name="Объект 3"/>
-          <p:cNvSpPr>
-            <a:spLocks noGrp="1"/>
-          </p:cNvSpPr>
-          <p:nvPr>
-            <p:ph sz="quarter" idx="12"/>
-          </p:nvPr>
-        </p:nvSpPr>
-        <p:spPr/>
-        <p:txBody>
-          <a:bodyPr>
-            <a:noAutofit/>
-          </a:bodyPr>
-          <a:lstStyle/>
-          <a:p>
-            <a:pPr marL="457200" indent="-457200" fontAlgn="ctr">
-              <a:buFont typeface="Arial" panose="020B0604020202020204" pitchFamily="34" charset="0"/>
-              <a:buChar char="•"/>
-            </a:pPr>
-            <a:r>
-              <a:rPr lang="x-none" sz="2000" dirty="0"/>
-              <a:t>Каждый тест -</a:t>
-            </a:r>
-            <a:r>
-              <a:rPr lang="ru-RU" sz="2000" dirty="0"/>
-              <a:t> это</a:t>
-            </a:r>
-            <a:r>
-              <a:rPr lang="x-none" sz="2000" dirty="0"/>
-              <a:t> мини-интеграционный тест</a:t>
-            </a:r>
-            <a:endParaRPr lang="en-US" sz="2000" dirty="0"/>
-          </a:p>
-          <a:p>
-            <a:pPr marL="457200" indent="-457200" fontAlgn="ctr">
-              <a:buFont typeface="Arial" panose="020B0604020202020204" pitchFamily="34" charset="0"/>
-              <a:buChar char="•"/>
-            </a:pPr>
-            <a:r>
-              <a:rPr lang="ru-RU" sz="2000" dirty="0"/>
-              <a:t>Позволяет тестировать стыки между модулями</a:t>
-            </a:r>
-            <a:endParaRPr lang="en-US" sz="2000" dirty="0"/>
-          </a:p>
-          <a:p>
-            <a:pPr marL="457200" indent="-457200" fontAlgn="ctr">
-              <a:buFont typeface="Arial" panose="020B0604020202020204" pitchFamily="34" charset="0"/>
-              <a:buChar char="•"/>
-            </a:pPr>
-            <a:endParaRPr lang="x-none" sz="2000" dirty="0"/>
-          </a:p>
-          <a:p>
-            <a:pPr marL="457200" indent="-457200" fontAlgn="ctr">
-              <a:buFont typeface="Arial" panose="020B0604020202020204" pitchFamily="34" charset="0"/>
-              <a:buChar char="•"/>
-            </a:pPr>
-            <a:r>
-              <a:rPr lang="x-none" sz="2000" dirty="0"/>
-              <a:t>Создаются лишние методы для получения и тестирования внутреннего состояния</a:t>
-            </a:r>
-            <a:endParaRPr lang="en-US" sz="2000" dirty="0"/>
-          </a:p>
-          <a:p>
-            <a:pPr marL="457200" indent="-457200" fontAlgn="ctr">
-              <a:buFont typeface="Arial" panose="020B0604020202020204" pitchFamily="34" charset="0"/>
-              <a:buChar char="•"/>
-            </a:pPr>
-            <a:endParaRPr lang="x-none" sz="2000" dirty="0"/>
-          </a:p>
-          <a:p>
-            <a:pPr marL="457200" indent="-457200" fontAlgn="ctr">
-              <a:buFont typeface="Arial" panose="020B0604020202020204" pitchFamily="34" charset="0"/>
-              <a:buChar char="•"/>
-            </a:pPr>
-            <a:r>
-              <a:rPr lang="en-US" sz="2000" dirty="0"/>
-              <a:t>Test Fixture: </a:t>
-            </a:r>
-            <a:r>
-              <a:rPr lang="x-none" sz="2000" dirty="0"/>
-              <a:t>Необходимо создания тестового окружения, которое для скорости приходится переиспользовать, что создает побочные эффекты</a:t>
-            </a:r>
-            <a:endParaRPr lang="ru-RU" sz="2000" dirty="0"/>
-          </a:p>
-          <a:p>
-            <a:endParaRPr lang="en-US" sz="2000" dirty="0"/>
-          </a:p>
-        </p:txBody>
-      </p:sp>
-    </p:spTree>
-    <p:extLst>
-      <p:ext uri="{BB962C8B-B14F-4D97-AF65-F5344CB8AC3E}">
-        <p14:creationId xmlns:p14="http://schemas.microsoft.com/office/powerpoint/2010/main" val="1575640365"/>
       </p:ext>
     </p:extLst>
   </p:cSld>
@@ -18493,6 +18486,250 @@
 </file>
 
 <file path=ppt/slides/slide20.xml><?xml version="1.0" encoding="utf-8"?>
+<p:sld xmlns:a="http://schemas.openxmlformats.org/drawingml/2006/main" xmlns:r="http://schemas.openxmlformats.org/officeDocument/2006/relationships" xmlns:p="http://schemas.openxmlformats.org/presentationml/2006/main" show="0">
+  <p:cSld>
+    <p:spTree>
+      <p:nvGrpSpPr>
+        <p:cNvPr id="1" name=""/>
+        <p:cNvGrpSpPr/>
+        <p:nvPr/>
+      </p:nvGrpSpPr>
+      <p:grpSpPr>
+        <a:xfrm>
+          <a:off x="0" y="0"/>
+          <a:ext cx="0" cy="0"/>
+          <a:chOff x="0" y="0"/>
+          <a:chExt cx="0" cy="0"/>
+        </a:xfrm>
+      </p:grpSpPr>
+      <p:sp>
+        <p:nvSpPr>
+          <p:cNvPr id="2" name="Заголовок 1"/>
+          <p:cNvSpPr>
+            <a:spLocks noGrp="1"/>
+          </p:cNvSpPr>
+          <p:nvPr>
+            <p:ph type="title"/>
+          </p:nvPr>
+        </p:nvSpPr>
+        <p:spPr/>
+        <p:txBody>
+          <a:bodyPr/>
+          <a:lstStyle/>
+          <a:p>
+            <a:r>
+              <a:rPr lang="en-US" dirty="0"/>
+              <a:t>Behavior tests </a:t>
+            </a:r>
+            <a:r>
+              <a:rPr lang="en-US" dirty="0">
+                <a:solidFill>
+                  <a:schemeClr val="tx1"/>
+                </a:solidFill>
+              </a:rPr>
+              <a:t>vs</a:t>
+            </a:r>
+            <a:r>
+              <a:rPr lang="en-US" dirty="0"/>
+              <a:t> State tests</a:t>
+            </a:r>
+          </a:p>
+        </p:txBody>
+      </p:sp>
+      <p:sp>
+        <p:nvSpPr>
+          <p:cNvPr id="3" name="Объект 2"/>
+          <p:cNvSpPr>
+            <a:spLocks noGrp="1"/>
+          </p:cNvSpPr>
+          <p:nvPr>
+            <p:ph sz="quarter" idx="11"/>
+          </p:nvPr>
+        </p:nvSpPr>
+        <p:spPr/>
+        <p:txBody>
+          <a:bodyPr>
+            <a:normAutofit/>
+          </a:bodyPr>
+          <a:lstStyle/>
+          <a:p>
+            <a:pPr marL="457200" indent="-457200" fontAlgn="ctr">
+              <a:buFont typeface="Arial" panose="020B0604020202020204" pitchFamily="34" charset="0"/>
+              <a:buChar char="•"/>
+            </a:pPr>
+            <a:r>
+              <a:rPr lang="x-none" sz="2000" dirty="0"/>
+              <a:t>Более независимые</a:t>
+            </a:r>
+            <a:r>
+              <a:rPr lang="ru-RU" sz="2000" dirty="0"/>
+              <a:t> друг от друга</a:t>
+            </a:r>
+            <a:r>
+              <a:rPr lang="x-none" sz="2000" dirty="0"/>
+              <a:t> тесты</a:t>
+            </a:r>
+            <a:endParaRPr lang="en-US" sz="2000" dirty="0"/>
+          </a:p>
+          <a:p>
+            <a:pPr marL="457200" indent="-457200" fontAlgn="ctr">
+              <a:buFont typeface="Arial" panose="020B0604020202020204" pitchFamily="34" charset="0"/>
+              <a:buChar char="•"/>
+            </a:pPr>
+            <a:r>
+              <a:rPr lang="ru-RU" sz="2000" dirty="0"/>
+              <a:t>Методика приводит</a:t>
+            </a:r>
+            <a:r>
+              <a:rPr lang="x-none" sz="2000" dirty="0"/>
+              <a:t> к более модульному дизайну</a:t>
+            </a:r>
+            <a:endParaRPr lang="en-US" sz="2000" dirty="0"/>
+          </a:p>
+          <a:p>
+            <a:pPr marL="457200" indent="-457200" fontAlgn="ctr">
+              <a:buFont typeface="Arial" panose="020B0604020202020204" pitchFamily="34" charset="0"/>
+              <a:buChar char="•"/>
+            </a:pPr>
+            <a:endParaRPr lang="ru-RU" sz="2000" dirty="0"/>
+          </a:p>
+          <a:p>
+            <a:pPr marL="457200" indent="-457200" fontAlgn="ctr">
+              <a:buFont typeface="Arial" panose="020B0604020202020204" pitchFamily="34" charset="0"/>
+              <a:buChar char="•"/>
+            </a:pPr>
+            <a:r>
+              <a:rPr lang="ru-RU" sz="2000" dirty="0"/>
+              <a:t>В большей степени связывают реализацию и тесты, поэтому сложно менять реализацию</a:t>
+            </a:r>
+          </a:p>
+          <a:p>
+            <a:pPr marL="457200" indent="-457200" fontAlgn="ctr">
+              <a:buFont typeface="Arial" panose="020B0604020202020204" pitchFamily="34" charset="0"/>
+              <a:buChar char="•"/>
+            </a:pPr>
+            <a:endParaRPr lang="x-none" sz="2000" dirty="0"/>
+          </a:p>
+          <a:p>
+            <a:pPr marL="457200" indent="-457200" fontAlgn="ctr">
+              <a:buFont typeface="Arial" panose="020B0604020202020204" pitchFamily="34" charset="0"/>
+              <a:buChar char="•"/>
+            </a:pPr>
+            <a:r>
+              <a:rPr lang="x-none" sz="2000" dirty="0"/>
+              <a:t>Более быстрый и легкий запуск тестов</a:t>
+            </a:r>
+          </a:p>
+          <a:p>
+            <a:endParaRPr lang="en-US" sz="2000" dirty="0"/>
+          </a:p>
+        </p:txBody>
+      </p:sp>
+      <p:sp>
+        <p:nvSpPr>
+          <p:cNvPr id="4" name="Объект 3"/>
+          <p:cNvSpPr>
+            <a:spLocks noGrp="1"/>
+          </p:cNvSpPr>
+          <p:nvPr>
+            <p:ph sz="quarter" idx="12"/>
+          </p:nvPr>
+        </p:nvSpPr>
+        <p:spPr/>
+        <p:txBody>
+          <a:bodyPr>
+            <a:noAutofit/>
+          </a:bodyPr>
+          <a:lstStyle/>
+          <a:p>
+            <a:pPr marL="457200" indent="-457200" fontAlgn="ctr">
+              <a:buFont typeface="Arial" panose="020B0604020202020204" pitchFamily="34" charset="0"/>
+              <a:buChar char="•"/>
+            </a:pPr>
+            <a:r>
+              <a:rPr lang="x-none" sz="2000" dirty="0"/>
+              <a:t>Каждый тест -</a:t>
+            </a:r>
+            <a:r>
+              <a:rPr lang="ru-RU" sz="2000" dirty="0"/>
+              <a:t> это</a:t>
+            </a:r>
+            <a:r>
+              <a:rPr lang="x-none" sz="2000" dirty="0"/>
+              <a:t> мини-интеграционный тест</a:t>
+            </a:r>
+            <a:endParaRPr lang="en-US" sz="2000" dirty="0"/>
+          </a:p>
+          <a:p>
+            <a:pPr marL="457200" indent="-457200" fontAlgn="ctr">
+              <a:buFont typeface="Arial" panose="020B0604020202020204" pitchFamily="34" charset="0"/>
+              <a:buChar char="•"/>
+            </a:pPr>
+            <a:r>
+              <a:rPr lang="ru-RU" sz="2000" dirty="0"/>
+              <a:t>Позволяет тестировать стыки между модулями</a:t>
+            </a:r>
+            <a:endParaRPr lang="en-US" sz="2000" dirty="0"/>
+          </a:p>
+          <a:p>
+            <a:pPr marL="457200" indent="-457200" fontAlgn="ctr">
+              <a:buFont typeface="Arial" panose="020B0604020202020204" pitchFamily="34" charset="0"/>
+              <a:buChar char="•"/>
+            </a:pPr>
+            <a:endParaRPr lang="x-none" sz="2000" dirty="0"/>
+          </a:p>
+          <a:p>
+            <a:pPr marL="457200" indent="-457200" fontAlgn="ctr">
+              <a:buFont typeface="Arial" panose="020B0604020202020204" pitchFamily="34" charset="0"/>
+              <a:buChar char="•"/>
+            </a:pPr>
+            <a:r>
+              <a:rPr lang="x-none" sz="2000" dirty="0"/>
+              <a:t>Создаются лишние методы для получения и тестирования внутреннего состояния</a:t>
+            </a:r>
+            <a:endParaRPr lang="en-US" sz="2000" dirty="0"/>
+          </a:p>
+          <a:p>
+            <a:pPr marL="457200" indent="-457200" fontAlgn="ctr">
+              <a:buFont typeface="Arial" panose="020B0604020202020204" pitchFamily="34" charset="0"/>
+              <a:buChar char="•"/>
+            </a:pPr>
+            <a:endParaRPr lang="x-none" sz="2000" dirty="0"/>
+          </a:p>
+          <a:p>
+            <a:pPr marL="457200" indent="-457200" fontAlgn="ctr">
+              <a:buFont typeface="Arial" panose="020B0604020202020204" pitchFamily="34" charset="0"/>
+              <a:buChar char="•"/>
+            </a:pPr>
+            <a:r>
+              <a:rPr lang="en-US" sz="2000" dirty="0"/>
+              <a:t>Test Fixture: </a:t>
+            </a:r>
+            <a:r>
+              <a:rPr lang="x-none" sz="2000" dirty="0"/>
+              <a:t>Необходимо создания тестового окружения, которое для скорости приходится переиспользовать, что создает побочные эффекты</a:t>
+            </a:r>
+            <a:endParaRPr lang="ru-RU" sz="2000" dirty="0"/>
+          </a:p>
+          <a:p>
+            <a:endParaRPr lang="en-US" sz="2000" dirty="0"/>
+          </a:p>
+        </p:txBody>
+      </p:sp>
+    </p:spTree>
+    <p:extLst>
+      <p:ext uri="{BB962C8B-B14F-4D97-AF65-F5344CB8AC3E}">
+        <p14:creationId xmlns:p14="http://schemas.microsoft.com/office/powerpoint/2010/main" val="1575640365"/>
+      </p:ext>
+    </p:extLst>
+  </p:cSld>
+  <p:clrMapOvr>
+    <a:masterClrMapping/>
+  </p:clrMapOvr>
+</p:sld>
+</file>
+
+<file path=ppt/slides/slide21.xml><?xml version="1.0" encoding="utf-8"?>
 <p:sld xmlns:a="http://schemas.openxmlformats.org/drawingml/2006/main" xmlns:r="http://schemas.openxmlformats.org/officeDocument/2006/relationships" xmlns:p="http://schemas.openxmlformats.org/presentationml/2006/main">
   <p:cSld>
     <p:spTree>

</xml_diff>

<commit_message>
Add missed test + Add slide about MustHaveHappended
</commit_message>
<xml_diff>
--- a/mocks.pptx
+++ b/mocks.pptx
@@ -6,7 +6,7 @@
     <p:sldMasterId id="2147483704" r:id="rId2"/>
   </p:sldMasterIdLst>
   <p:notesMasterIdLst>
-    <p:notesMasterId r:id="rId24"/>
+    <p:notesMasterId r:id="rId25"/>
   </p:notesMasterIdLst>
   <p:sldIdLst>
     <p:sldId id="329" r:id="rId3"/>
@@ -17,19 +17,20 @@
     <p:sldId id="322" r:id="rId8"/>
     <p:sldId id="336" r:id="rId9"/>
     <p:sldId id="338" r:id="rId10"/>
-    <p:sldId id="330" r:id="rId11"/>
-    <p:sldId id="327" r:id="rId12"/>
-    <p:sldId id="341" r:id="rId13"/>
-    <p:sldId id="345" r:id="rId14"/>
-    <p:sldId id="337" r:id="rId15"/>
-    <p:sldId id="328" r:id="rId16"/>
-    <p:sldId id="333" r:id="rId17"/>
-    <p:sldId id="332" r:id="rId18"/>
-    <p:sldId id="335" r:id="rId19"/>
-    <p:sldId id="331" r:id="rId20"/>
-    <p:sldId id="324" r:id="rId21"/>
-    <p:sldId id="334" r:id="rId22"/>
-    <p:sldId id="344" r:id="rId23"/>
+    <p:sldId id="346" r:id="rId11"/>
+    <p:sldId id="330" r:id="rId12"/>
+    <p:sldId id="327" r:id="rId13"/>
+    <p:sldId id="341" r:id="rId14"/>
+    <p:sldId id="345" r:id="rId15"/>
+    <p:sldId id="337" r:id="rId16"/>
+    <p:sldId id="328" r:id="rId17"/>
+    <p:sldId id="333" r:id="rId18"/>
+    <p:sldId id="332" r:id="rId19"/>
+    <p:sldId id="335" r:id="rId20"/>
+    <p:sldId id="331" r:id="rId21"/>
+    <p:sldId id="324" r:id="rId22"/>
+    <p:sldId id="334" r:id="rId23"/>
+    <p:sldId id="344" r:id="rId24"/>
   </p:sldIdLst>
   <p:sldSz cx="12192000" cy="6858000"/>
   <p:notesSz cx="6858000" cy="9144000"/>
@@ -149,6 +150,7 @@
             <p14:sldId id="322"/>
             <p14:sldId id="336"/>
             <p14:sldId id="338"/>
+            <p14:sldId id="346"/>
             <p14:sldId id="330"/>
           </p14:sldIdLst>
         </p14:section>
@@ -2491,13 +2493,6 @@
         </dgm:presLayoutVars>
       </dgm:prSet>
       <dgm:spPr/>
-      <dgm:t>
-        <a:bodyPr/>
-        <a:lstStyle/>
-        <a:p>
-          <a:endParaRPr lang="ru-RU"/>
-        </a:p>
-      </dgm:t>
     </dgm:pt>
     <dgm:pt modelId="{CF6D50B3-578A-4EA0-A5A0-492FA729F6ED}" type="pres">
       <dgm:prSet presAssocID="{B75F6A3A-9A51-4DF3-8A57-9AEB0739425C}" presName="composite" presStyleCnt="0"/>
@@ -2510,13 +2505,6 @@
         </dgm:presLayoutVars>
       </dgm:prSet>
       <dgm:spPr/>
-      <dgm:t>
-        <a:bodyPr/>
-        <a:lstStyle/>
-        <a:p>
-          <a:endParaRPr lang="ru-RU"/>
-        </a:p>
-      </dgm:t>
     </dgm:pt>
     <dgm:pt modelId="{61EB78D8-69FF-471D-8FEB-71388C442F55}" type="pres">
       <dgm:prSet presAssocID="{B75F6A3A-9A51-4DF3-8A57-9AEB0739425C}" presName="rect1" presStyleLbl="alignImgPlace1" presStyleIdx="0" presStyleCnt="1" custScaleX="596594" custScaleY="114980" custLinFactX="-64576" custLinFactNeighborX="-100000" custLinFactNeighborY="-13065"/>
@@ -2538,9 +2526,9 @@
     </dgm:pt>
   </dgm:ptLst>
   <dgm:cxnLst>
-    <dgm:cxn modelId="{017518C9-1619-4B19-AA03-86BA999BA287}" srcId="{EAB81984-5B84-4970-8447-2B456B8C58DF}" destId="{B75F6A3A-9A51-4DF3-8A57-9AEB0739425C}" srcOrd="0" destOrd="0" parTransId="{203596AF-4F49-40BA-B1E1-11BDD34B512E}" sibTransId="{A056157B-3867-49A4-9195-F3A4F3FBBA8E}"/>
     <dgm:cxn modelId="{1CEAA455-5BF4-4666-95B8-390900AB8124}" type="presOf" srcId="{EAB81984-5B84-4970-8447-2B456B8C58DF}" destId="{3A252E36-3D7E-49E5-B812-EE4CACF0D5CF}" srcOrd="0" destOrd="0" presId="urn:microsoft.com/office/officeart/2008/layout/PictureGrid"/>
     <dgm:cxn modelId="{147A14B3-96E8-4139-969B-9DB1BCB4D95E}" type="presOf" srcId="{B75F6A3A-9A51-4DF3-8A57-9AEB0739425C}" destId="{B29ABF60-EC0F-45AD-A90E-9C76D15C2F14}" srcOrd="0" destOrd="0" presId="urn:microsoft.com/office/officeart/2008/layout/PictureGrid"/>
+    <dgm:cxn modelId="{017518C9-1619-4B19-AA03-86BA999BA287}" srcId="{EAB81984-5B84-4970-8447-2B456B8C58DF}" destId="{B75F6A3A-9A51-4DF3-8A57-9AEB0739425C}" srcOrd="0" destOrd="0" parTransId="{203596AF-4F49-40BA-B1E1-11BDD34B512E}" sibTransId="{A056157B-3867-49A4-9195-F3A4F3FBBA8E}"/>
     <dgm:cxn modelId="{D3458AFA-605E-43EE-8C8A-0E0C1E3CD931}" type="presParOf" srcId="{3A252E36-3D7E-49E5-B812-EE4CACF0D5CF}" destId="{CF6D50B3-578A-4EA0-A5A0-492FA729F6ED}" srcOrd="0" destOrd="0" presId="urn:microsoft.com/office/officeart/2008/layout/PictureGrid"/>
     <dgm:cxn modelId="{9835F3F3-3E30-4AC4-AD89-BC095FA9A878}" type="presParOf" srcId="{CF6D50B3-578A-4EA0-A5A0-492FA729F6ED}" destId="{B29ABF60-EC0F-45AD-A90E-9C76D15C2F14}" srcOrd="0" destOrd="0" presId="urn:microsoft.com/office/officeart/2008/layout/PictureGrid"/>
     <dgm:cxn modelId="{70FA379F-7827-49B9-806E-1FD72CAE8F89}" type="presParOf" srcId="{CF6D50B3-578A-4EA0-A5A0-492FA729F6ED}" destId="{61EB78D8-69FF-471D-8FEB-71388C442F55}" srcOrd="1" destOrd="0" presId="urn:microsoft.com/office/officeart/2008/layout/PictureGrid"/>
@@ -2612,13 +2600,6 @@
         </dgm:presLayoutVars>
       </dgm:prSet>
       <dgm:spPr/>
-      <dgm:t>
-        <a:bodyPr/>
-        <a:lstStyle/>
-        <a:p>
-          <a:endParaRPr lang="ru-RU"/>
-        </a:p>
-      </dgm:t>
     </dgm:pt>
     <dgm:pt modelId="{CF6D50B3-578A-4EA0-A5A0-492FA729F6ED}" type="pres">
       <dgm:prSet presAssocID="{B75F6A3A-9A51-4DF3-8A57-9AEB0739425C}" presName="composite" presStyleCnt="0"/>
@@ -2631,13 +2612,6 @@
         </dgm:presLayoutVars>
       </dgm:prSet>
       <dgm:spPr/>
-      <dgm:t>
-        <a:bodyPr/>
-        <a:lstStyle/>
-        <a:p>
-          <a:endParaRPr lang="ru-RU"/>
-        </a:p>
-      </dgm:t>
     </dgm:pt>
     <dgm:pt modelId="{61EB78D8-69FF-471D-8FEB-71388C442F55}" type="pres">
       <dgm:prSet presAssocID="{B75F6A3A-9A51-4DF3-8A57-9AEB0739425C}" presName="rect1" presStyleLbl="alignImgPlace1" presStyleIdx="0" presStyleCnt="1" custScaleX="596594" custScaleY="114980" custLinFactX="-64576" custLinFactNeighborX="-100000" custLinFactNeighborY="-13065"/>
@@ -2659,9 +2633,9 @@
     </dgm:pt>
   </dgm:ptLst>
   <dgm:cxnLst>
-    <dgm:cxn modelId="{017518C9-1619-4B19-AA03-86BA999BA287}" srcId="{EAB81984-5B84-4970-8447-2B456B8C58DF}" destId="{B75F6A3A-9A51-4DF3-8A57-9AEB0739425C}" srcOrd="0" destOrd="0" parTransId="{203596AF-4F49-40BA-B1E1-11BDD34B512E}" sibTransId="{A056157B-3867-49A4-9195-F3A4F3FBBA8E}"/>
     <dgm:cxn modelId="{1CEAA455-5BF4-4666-95B8-390900AB8124}" type="presOf" srcId="{EAB81984-5B84-4970-8447-2B456B8C58DF}" destId="{3A252E36-3D7E-49E5-B812-EE4CACF0D5CF}" srcOrd="0" destOrd="0" presId="urn:microsoft.com/office/officeart/2008/layout/PictureGrid"/>
     <dgm:cxn modelId="{147A14B3-96E8-4139-969B-9DB1BCB4D95E}" type="presOf" srcId="{B75F6A3A-9A51-4DF3-8A57-9AEB0739425C}" destId="{B29ABF60-EC0F-45AD-A90E-9C76D15C2F14}" srcOrd="0" destOrd="0" presId="urn:microsoft.com/office/officeart/2008/layout/PictureGrid"/>
+    <dgm:cxn modelId="{017518C9-1619-4B19-AA03-86BA999BA287}" srcId="{EAB81984-5B84-4970-8447-2B456B8C58DF}" destId="{B75F6A3A-9A51-4DF3-8A57-9AEB0739425C}" srcOrd="0" destOrd="0" parTransId="{203596AF-4F49-40BA-B1E1-11BDD34B512E}" sibTransId="{A056157B-3867-49A4-9195-F3A4F3FBBA8E}"/>
     <dgm:cxn modelId="{D3458AFA-605E-43EE-8C8A-0E0C1E3CD931}" type="presParOf" srcId="{3A252E36-3D7E-49E5-B812-EE4CACF0D5CF}" destId="{CF6D50B3-578A-4EA0-A5A0-492FA729F6ED}" srcOrd="0" destOrd="0" presId="urn:microsoft.com/office/officeart/2008/layout/PictureGrid"/>
     <dgm:cxn modelId="{9835F3F3-3E30-4AC4-AD89-BC095FA9A878}" type="presParOf" srcId="{CF6D50B3-578A-4EA0-A5A0-492FA729F6ED}" destId="{B29ABF60-EC0F-45AD-A90E-9C76D15C2F14}" srcOrd="0" destOrd="0" presId="urn:microsoft.com/office/officeart/2008/layout/PictureGrid"/>
     <dgm:cxn modelId="{70FA379F-7827-49B9-806E-1FD72CAE8F89}" type="presParOf" srcId="{CF6D50B3-578A-4EA0-A5A0-492FA729F6ED}" destId="{61EB78D8-69FF-471D-8FEB-71388C442F55}" srcOrd="1" destOrd="0" presId="urn:microsoft.com/office/officeart/2008/layout/PictureGrid"/>
@@ -2751,13 +2725,6 @@
         </dgm:presLayoutVars>
       </dgm:prSet>
       <dgm:spPr/>
-      <dgm:t>
-        <a:bodyPr/>
-        <a:lstStyle/>
-        <a:p>
-          <a:endParaRPr lang="ru-RU"/>
-        </a:p>
-      </dgm:t>
     </dgm:pt>
     <dgm:pt modelId="{65D73C51-61AB-436D-8191-975603FC9C68}" type="pres">
       <dgm:prSet presAssocID="{9C9C0585-42CE-4F34-A2BB-F1377DA03788}" presName="composite" presStyleCnt="0"/>
@@ -2770,13 +2737,6 @@
         </dgm:presLayoutVars>
       </dgm:prSet>
       <dgm:spPr/>
-      <dgm:t>
-        <a:bodyPr/>
-        <a:lstStyle/>
-        <a:p>
-          <a:endParaRPr lang="ru-RU"/>
-        </a:p>
-      </dgm:t>
     </dgm:pt>
     <dgm:pt modelId="{DFDA3CA3-5C68-4A2F-A4A8-285063A35D87}" type="pres">
       <dgm:prSet presAssocID="{9C9C0585-42CE-4F34-A2BB-F1377DA03788}" presName="rect1" presStyleLbl="alignImgPlace1" presStyleIdx="0" presStyleCnt="1" custScaleX="62421" custScaleY="62421" custLinFactNeighborX="1076" custLinFactNeighborY="-52209"/>
@@ -2801,8 +2761,8 @@
     </dgm:pt>
   </dgm:ptLst>
   <dgm:cxnLst>
+    <dgm:cxn modelId="{A9E27516-E8E4-42A7-A155-024D48E79559}" type="presOf" srcId="{8F66C165-B39F-46D3-B19F-623799541DD3}" destId="{B6F028CB-F170-4FEF-BC3A-25F0E90D434A}" srcOrd="0" destOrd="0" presId="urn:microsoft.com/office/officeart/2008/layout/PictureGrid"/>
     <dgm:cxn modelId="{A177C822-7566-4410-A889-706A6CE15148}" srcId="{8F66C165-B39F-46D3-B19F-623799541DD3}" destId="{9C9C0585-42CE-4F34-A2BB-F1377DA03788}" srcOrd="0" destOrd="0" parTransId="{4E5DCF2B-AAE7-41E2-837F-518128C03597}" sibTransId="{56F70C7F-1925-4DBA-9BD6-AF5E91799A59}"/>
-    <dgm:cxn modelId="{A9E27516-E8E4-42A7-A155-024D48E79559}" type="presOf" srcId="{8F66C165-B39F-46D3-B19F-623799541DD3}" destId="{B6F028CB-F170-4FEF-BC3A-25F0E90D434A}" srcOrd="0" destOrd="0" presId="urn:microsoft.com/office/officeart/2008/layout/PictureGrid"/>
     <dgm:cxn modelId="{ACD53F50-5BA1-48C9-B5DF-09BF6DA4DE65}" type="presOf" srcId="{9C9C0585-42CE-4F34-A2BB-F1377DA03788}" destId="{A30F2283-C0A4-4A69-BCBE-833D967155A2}" srcOrd="0" destOrd="0" presId="urn:microsoft.com/office/officeart/2008/layout/PictureGrid"/>
     <dgm:cxn modelId="{CC189C1C-06A1-4F03-B886-67BF46A53703}" type="presParOf" srcId="{B6F028CB-F170-4FEF-BC3A-25F0E90D434A}" destId="{65D73C51-61AB-436D-8191-975603FC9C68}" srcOrd="0" destOrd="0" presId="urn:microsoft.com/office/officeart/2008/layout/PictureGrid"/>
     <dgm:cxn modelId="{CD7DB92E-B84F-43A0-AC2D-FBBFB40722EE}" type="presParOf" srcId="{65D73C51-61AB-436D-8191-975603FC9C68}" destId="{A30F2283-C0A4-4A69-BCBE-833D967155A2}" srcOrd="0" destOrd="0" presId="urn:microsoft.com/office/officeart/2008/layout/PictureGrid"/>
@@ -2863,7 +2823,7 @@
         </a:bodyPr>
         <a:lstStyle/>
         <a:p>
-          <a:pPr lvl="0" algn="l" defTabSz="222250">
+          <a:pPr marL="0" lvl="0" indent="0" algn="l" defTabSz="222250">
             <a:lnSpc>
               <a:spcPct val="90000"/>
             </a:lnSpc>
@@ -2873,6 +2833,7 @@
             <a:spcAft>
               <a:spcPct val="35000"/>
             </a:spcAft>
+            <a:buNone/>
           </a:pPr>
           <a:r>
             <a:rPr lang="ru-RU" sz="500" kern="1200" dirty="0"/>
@@ -2949,6 +2910,118 @@
       <dsp:cNvGrpSpPr/>
     </dsp:nvGrpSpPr>
     <dsp:grpSpPr/>
+    <dsp:sp modelId="{B29ABF60-EC0F-45AD-A90E-9C76D15C2F14}">
+      <dsp:nvSpPr>
+        <dsp:cNvPr id="0" name=""/>
+        <dsp:cNvSpPr/>
+      </dsp:nvSpPr>
+      <dsp:spPr>
+        <a:xfrm>
+          <a:off x="1748174" y="210303"/>
+          <a:ext cx="175586" cy="38914"/>
+        </a:xfrm>
+        <a:prstGeom prst="rect">
+          <a:avLst/>
+        </a:prstGeom>
+        <a:noFill/>
+        <a:ln>
+          <a:noFill/>
+        </a:ln>
+        <a:effectLst/>
+      </dsp:spPr>
+      <dsp:style>
+        <a:lnRef idx="0">
+          <a:scrgbClr r="0" g="0" b="0"/>
+        </a:lnRef>
+        <a:fillRef idx="0">
+          <a:scrgbClr r="0" g="0" b="0"/>
+        </a:fillRef>
+        <a:effectRef idx="0">
+          <a:scrgbClr r="0" g="0" b="0"/>
+        </a:effectRef>
+        <a:fontRef idx="minor"/>
+      </dsp:style>
+      <dsp:txBody>
+        <a:bodyPr spcFirstLastPara="0" vert="horz" wrap="square" lIns="0" tIns="19050" rIns="19050" bIns="0" numCol="1" spcCol="1270" anchor="t" anchorCtr="0">
+          <a:noAutofit/>
+        </a:bodyPr>
+        <a:lstStyle/>
+        <a:p>
+          <a:pPr marL="0" lvl="0" indent="0" algn="l" defTabSz="222250">
+            <a:lnSpc>
+              <a:spcPct val="90000"/>
+            </a:lnSpc>
+            <a:spcBef>
+              <a:spcPct val="0"/>
+            </a:spcBef>
+            <a:spcAft>
+              <a:spcPct val="35000"/>
+            </a:spcAft>
+            <a:buNone/>
+          </a:pPr>
+          <a:r>
+            <a:rPr lang="ru-RU" sz="500" kern="1200" dirty="0"/>
+            <a:t> </a:t>
+          </a:r>
+        </a:p>
+      </dsp:txBody>
+      <dsp:txXfrm>
+        <a:off x="1748174" y="210303"/>
+        <a:ext cx="175586" cy="38914"/>
+      </dsp:txXfrm>
+    </dsp:sp>
+    <dsp:sp modelId="{61EB78D8-69FF-471D-8FEB-71388C442F55}">
+      <dsp:nvSpPr>
+        <dsp:cNvPr id="0" name=""/>
+        <dsp:cNvSpPr/>
+      </dsp:nvSpPr>
+      <dsp:spPr>
+        <a:xfrm>
+          <a:off x="0" y="0"/>
+          <a:ext cx="1980001" cy="381600"/>
+        </a:xfrm>
+        <a:prstGeom prst="rect">
+          <a:avLst/>
+        </a:prstGeom>
+        <a:blipFill>
+          <a:blip xmlns:r="http://schemas.openxmlformats.org/officeDocument/2006/relationships" r:embed="rId1">
+            <a:extLst>
+              <a:ext uri="{28A0092B-C50C-407E-A947-70E740481C1C}">
+                <a14:useLocalDpi xmlns:a14="http://schemas.microsoft.com/office/drawing/2010/main" val="0"/>
+              </a:ext>
+            </a:extLst>
+          </a:blip>
+          <a:srcRect/>
+          <a:stretch>
+            <a:fillRect l="-1000" r="-1000"/>
+          </a:stretch>
+        </a:blipFill>
+        <a:ln w="25400" cap="flat" cmpd="sng" algn="ctr">
+          <a:solidFill>
+            <a:schemeClr val="lt1">
+              <a:hueOff val="0"/>
+              <a:satOff val="0"/>
+              <a:lumOff val="0"/>
+              <a:alphaOff val="0"/>
+            </a:schemeClr>
+          </a:solidFill>
+          <a:prstDash val="solid"/>
+        </a:ln>
+        <a:effectLst/>
+      </dsp:spPr>
+      <dsp:style>
+        <a:lnRef idx="2">
+          <a:scrgbClr r="0" g="0" b="0"/>
+        </a:lnRef>
+        <a:fillRef idx="1">
+          <a:scrgbClr r="0" g="0" b="0"/>
+        </a:fillRef>
+        <a:effectRef idx="0">
+          <a:scrgbClr r="0" g="0" b="0"/>
+        </a:effectRef>
+        <a:fontRef idx="minor"/>
+      </dsp:style>
+    </dsp:sp>
   </dsp:spTree>
 </dsp:drawing>
 </file>
@@ -2961,6 +3034,128 @@
       <dsp:cNvGrpSpPr/>
     </dsp:nvGrpSpPr>
     <dsp:grpSpPr/>
+    <dsp:sp modelId="{A30F2283-C0A4-4A69-BCBE-833D967155A2}">
+      <dsp:nvSpPr>
+        <dsp:cNvPr id="0" name=""/>
+        <dsp:cNvSpPr/>
+      </dsp:nvSpPr>
+      <dsp:spPr>
+        <a:xfrm>
+          <a:off x="469735" y="1146225"/>
+          <a:ext cx="2927097" cy="509149"/>
+        </a:xfrm>
+        <a:prstGeom prst="rect">
+          <a:avLst/>
+        </a:prstGeom>
+        <a:noFill/>
+        <a:ln>
+          <a:noFill/>
+        </a:ln>
+        <a:effectLst/>
+      </dsp:spPr>
+      <dsp:style>
+        <a:lnRef idx="0">
+          <a:scrgbClr r="0" g="0" b="0"/>
+        </a:lnRef>
+        <a:fillRef idx="0">
+          <a:scrgbClr r="0" g="0" b="0"/>
+        </a:fillRef>
+        <a:effectRef idx="0">
+          <a:scrgbClr r="0" g="0" b="0"/>
+        </a:effectRef>
+        <a:fontRef idx="minor"/>
+      </dsp:style>
+      <dsp:txBody>
+        <a:bodyPr spcFirstLastPara="0" vert="horz" wrap="square" lIns="0" tIns="152400" rIns="152400" bIns="0" numCol="1" spcCol="1270" anchor="b" anchorCtr="0">
+          <a:noAutofit/>
+        </a:bodyPr>
+        <a:lstStyle/>
+        <a:p>
+          <a:pPr marL="0" lvl="0" indent="0" algn="ctr" defTabSz="1778000">
+            <a:lnSpc>
+              <a:spcPct val="90000"/>
+            </a:lnSpc>
+            <a:spcBef>
+              <a:spcPct val="0"/>
+            </a:spcBef>
+            <a:spcAft>
+              <a:spcPct val="35000"/>
+            </a:spcAft>
+            <a:buNone/>
+          </a:pPr>
+          <a:r>
+            <a:rPr lang="ru-RU" sz="4000" kern="1200" dirty="0">
+              <a:solidFill>
+                <a:schemeClr val="accent1"/>
+              </a:solidFill>
+            </a:rPr>
+            <a:t>ВОПРОСЫ</a:t>
+          </a:r>
+          <a:r>
+            <a:rPr lang="en-US" sz="4000" kern="1200" dirty="0">
+              <a:solidFill>
+                <a:schemeClr val="accent1"/>
+              </a:solidFill>
+            </a:rPr>
+            <a:t>?</a:t>
+          </a:r>
+          <a:endParaRPr lang="ru-RU" sz="4000" kern="1200" dirty="0">
+            <a:solidFill>
+              <a:schemeClr val="accent1"/>
+            </a:solidFill>
+          </a:endParaRPr>
+        </a:p>
+      </dsp:txBody>
+      <dsp:txXfrm>
+        <a:off x="469735" y="1146225"/>
+        <a:ext cx="2927097" cy="509149"/>
+      </dsp:txXfrm>
+    </dsp:sp>
+    <dsp:sp modelId="{DFDA3CA3-5C68-4A2F-A4A8-285063A35D87}">
+      <dsp:nvSpPr>
+        <dsp:cNvPr id="0" name=""/>
+        <dsp:cNvSpPr/>
+      </dsp:nvSpPr>
+      <dsp:spPr>
+        <a:xfrm>
+          <a:off x="1521700" y="91137"/>
+          <a:ext cx="849599" cy="849599"/>
+        </a:xfrm>
+        <a:prstGeom prst="rect">
+          <a:avLst/>
+        </a:prstGeom>
+        <a:blipFill>
+          <a:blip xmlns:r="http://schemas.openxmlformats.org/officeDocument/2006/relationships" r:embed="rId1">
+            <a:extLst>
+              <a:ext uri="{28A0092B-C50C-407E-A947-70E740481C1C}">
+                <a14:useLocalDpi xmlns:a14="http://schemas.microsoft.com/office/drawing/2010/main" val="0"/>
+              </a:ext>
+            </a:extLst>
+          </a:blip>
+          <a:srcRect/>
+          <a:stretch>
+            <a:fillRect/>
+          </a:stretch>
+        </a:blipFill>
+        <a:ln w="0" cap="flat" cmpd="sng" algn="ctr">
+          <a:noFill/>
+          <a:prstDash val="solid"/>
+        </a:ln>
+        <a:effectLst/>
+      </dsp:spPr>
+      <dsp:style>
+        <a:lnRef idx="2">
+          <a:scrgbClr r="0" g="0" b="0"/>
+        </a:lnRef>
+        <a:fillRef idx="1">
+          <a:scrgbClr r="0" g="0" b="0"/>
+        </a:fillRef>
+        <a:effectRef idx="0">
+          <a:scrgbClr r="0" g="0" b="0"/>
+        </a:effectRef>
+        <a:fontRef idx="minor"/>
+      </dsp:style>
+    </dsp:sp>
   </dsp:spTree>
 </dsp:drawing>
 </file>
@@ -6947,7 +7142,7 @@
           <a:p>
             <a:fld id="{1D12B38D-150E-44F0-AD67-CE4A0E7D73CD}" type="datetimeFigureOut">
               <a:rPr lang="ru-RU" smtClean="0"/>
-              <a:t>30.06.2018</a:t>
+              <a:t>16.04.2019</a:t>
             </a:fld>
             <a:endParaRPr lang="ru-RU"/>
           </a:p>
@@ -7438,65 +7633,101 @@
           <a:lstStyle/>
           <a:p>
             <a:r>
+              <a:rPr lang="en-US" dirty="0"/>
+              <a:t>TODO. </a:t>
+            </a:r>
+            <a:r>
               <a:rPr lang="ru-RU" dirty="0"/>
-              <a:t>Перед следующей</a:t>
+              <a:t>Непонятно,</a:t>
             </a:r>
             <a:r>
               <a:rPr lang="ru-RU" baseline="0" dirty="0"/>
-              <a:t> задачей рассмотрим еще пару возможностей </a:t>
+              <a:t> как к этим пунктам подводить в контексте задачи.</a:t>
+            </a:r>
+            <a:endParaRPr lang="ru-RU" dirty="0"/>
+          </a:p>
+          <a:p>
+            <a:endParaRPr lang="ru-RU" dirty="0"/>
+          </a:p>
+          <a:p>
+            <a:r>
+              <a:rPr lang="ru-RU" dirty="0"/>
+              <a:t>К п.1:</a:t>
+            </a:r>
+            <a:r>
+              <a:rPr lang="ru-RU" baseline="0" dirty="0"/>
+              <a:t> это классическая </a:t>
+            </a:r>
+            <a:r>
+              <a:rPr lang="en-US" baseline="0" dirty="0"/>
+              <a:t>TDD.</a:t>
+            </a:r>
+            <a:r>
+              <a:rPr lang="ru-RU" baseline="0" dirty="0"/>
+              <a:t> Почитать можно книгу Кента Бека.</a:t>
+            </a:r>
+          </a:p>
+          <a:p>
+            <a:r>
+              <a:rPr lang="ru-RU" dirty="0"/>
+              <a:t>К п.3:</a:t>
+            </a:r>
+            <a:r>
+              <a:rPr lang="ru-RU" baseline="0" dirty="0"/>
+              <a:t> </a:t>
+            </a:r>
+            <a:r>
+              <a:rPr lang="ru-RU" dirty="0"/>
+              <a:t>Количество вызовов существенно в работе кэша.</a:t>
+            </a:r>
+          </a:p>
+          <a:p>
+            <a:endParaRPr lang="ru-RU" dirty="0"/>
+          </a:p>
+          <a:p>
+            <a:r>
+              <a:rPr lang="ru-RU" dirty="0"/>
+              <a:t>Недостаток написания тестов в</a:t>
+            </a:r>
+            <a:r>
+              <a:rPr lang="ru-RU" baseline="0" dirty="0"/>
+              <a:t> том же файле: это значит, что </a:t>
+            </a:r>
+            <a:r>
+              <a:rPr lang="ru-RU" baseline="0" dirty="0" err="1"/>
+              <a:t>релизная</a:t>
+            </a:r>
+            <a:r>
+              <a:rPr lang="ru-RU" baseline="0" dirty="0"/>
+              <a:t> сборка будет зависеть от </a:t>
             </a:r>
             <a:r>
               <a:rPr lang="en-US" baseline="0" dirty="0" err="1"/>
-              <a:t>FakeItEasy</a:t>
+              <a:t>NUnit</a:t>
             </a:r>
             <a:r>
               <a:rPr lang="en-US" baseline="0" dirty="0"/>
-              <a:t>.</a:t>
-            </a:r>
-            <a:endParaRPr lang="ru-RU" baseline="0" dirty="0"/>
-          </a:p>
-          <a:p>
+              <a:t> </a:t>
+            </a:r>
+            <a:r>
+              <a:rPr lang="ru-RU" baseline="0" dirty="0"/>
+              <a:t>и других библиотек для тестов.</a:t>
+            </a:r>
+            <a:endParaRPr lang="en-US" baseline="0" dirty="0"/>
+          </a:p>
+          <a:p>
+            <a:endParaRPr lang="en-US" baseline="0" dirty="0"/>
+          </a:p>
+          <a:p>
+            <a:r>
+              <a:rPr lang="ru-RU" baseline="0" dirty="0"/>
+              <a:t>ВАЖНО: после задачи сделать перерыв! 10 минут достаточно</a:t>
+            </a:r>
+            <a:r>
+              <a:rPr lang="ru-RU" baseline="0"/>
+              <a:t>, если не обед.</a:t>
+            </a:r>
             <a:endParaRPr lang="en-US" dirty="0"/>
-          </a:p>
-          <a:p>
-            <a:r>
-              <a:rPr lang="ru-RU" dirty="0"/>
-              <a:t>Рассказать</a:t>
-            </a:r>
-            <a:r>
-              <a:rPr lang="ru-RU" baseline="0" dirty="0"/>
-              <a:t> про возможности </a:t>
-            </a:r>
-            <a:r>
-              <a:rPr lang="ru-RU" baseline="0" dirty="0" err="1"/>
-              <a:t>фреймворка</a:t>
-            </a:r>
-            <a:r>
-              <a:rPr lang="ru-RU" baseline="0" dirty="0"/>
-              <a:t> (они могут пригодиться в следующей задаче):</a:t>
-            </a:r>
-          </a:p>
-          <a:p>
-            <a:pPr marL="228600" indent="-228600">
-              <a:buAutoNum type="arabicPeriod"/>
-            </a:pPr>
-            <a:r>
-              <a:rPr lang="ru-RU" baseline="0" dirty="0"/>
-              <a:t>Замокать вызов метода с любыми параметрами</a:t>
-            </a:r>
-          </a:p>
-          <a:p>
-            <a:pPr marL="228600" indent="-228600">
-              <a:buAutoNum type="arabicPeriod"/>
-            </a:pPr>
-            <a:r>
-              <a:rPr lang="ru-RU" baseline="0" dirty="0"/>
-              <a:t>Настроить возвращаемые значения для первого или первых нескольких вызовов метода</a:t>
-            </a:r>
-            <a:endParaRPr lang="en-US" dirty="0"/>
-          </a:p>
-          <a:p>
-            <a:endParaRPr lang="ru-RU" dirty="0"/>
           </a:p>
         </p:txBody>
       </p:sp>
@@ -7526,7 +7757,7 @@
     </p:spTree>
     <p:extLst>
       <p:ext uri="{BB962C8B-B14F-4D97-AF65-F5344CB8AC3E}">
-        <p14:creationId xmlns:p14="http://schemas.microsoft.com/office/powerpoint/2010/main" val="93746307"/>
+        <p14:creationId xmlns:p14="http://schemas.microsoft.com/office/powerpoint/2010/main" val="3022555790"/>
       </p:ext>
     </p:extLst>
   </p:cSld>
@@ -7582,68 +7813,61 @@
           <a:p>
             <a:r>
               <a:rPr lang="ru-RU" dirty="0"/>
-              <a:t>Рассказ про стек:</a:t>
-            </a:r>
+              <a:t>Перед следующей</a:t>
+            </a:r>
+            <a:r>
+              <a:rPr lang="ru-RU" baseline="0" dirty="0"/>
+              <a:t> задачей рассмотрим еще пару возможностей </a:t>
+            </a:r>
+            <a:r>
+              <a:rPr lang="en-US" baseline="0" dirty="0" err="1"/>
+              <a:t>FakeItEasy</a:t>
+            </a:r>
+            <a:r>
+              <a:rPr lang="en-US" baseline="0" dirty="0"/>
+              <a:t>.</a:t>
+            </a:r>
+            <a:endParaRPr lang="ru-RU" baseline="0" dirty="0"/>
+          </a:p>
+          <a:p>
             <a:endParaRPr lang="en-US" dirty="0"/>
           </a:p>
           <a:p>
             <a:r>
               <a:rPr lang="ru-RU" dirty="0"/>
-              <a:t>Настройки</a:t>
+              <a:t>Рассказать</a:t>
             </a:r>
             <a:r>
               <a:rPr lang="ru-RU" baseline="0" dirty="0"/>
-              <a:t> результатов вызовов </a:t>
+              <a:t> про возможности </a:t>
             </a:r>
             <a:r>
               <a:rPr lang="ru-RU" baseline="0" dirty="0" err="1"/>
-              <a:t>замоканного</a:t>
+              <a:t>фреймворка</a:t>
             </a:r>
             <a:r>
               <a:rPr lang="ru-RU" baseline="0" dirty="0"/>
-              <a:t> метода складываются в стек.</a:t>
-            </a:r>
-          </a:p>
-          <a:p>
-            <a:endParaRPr lang="en-US" baseline="0" dirty="0"/>
-          </a:p>
-          <a:p>
+              <a:t> (они могут пригодиться в следующей задаче):</a:t>
+            </a:r>
+          </a:p>
+          <a:p>
+            <a:pPr marL="228600" indent="-228600">
+              <a:buAutoNum type="arabicPeriod"/>
+            </a:pPr>
             <a:r>
               <a:rPr lang="ru-RU" baseline="0" dirty="0"/>
-              <a:t>Спросить аудиторию, какие значения будет выдавать метод</a:t>
-            </a:r>
-            <a:endParaRPr lang="en-US" baseline="0" dirty="0"/>
-          </a:p>
-          <a:p>
-            <a:endParaRPr lang="ru-RU" baseline="0" dirty="0"/>
-          </a:p>
-          <a:p>
+              <a:t>Замокать вызов метода с любыми параметрами</a:t>
+            </a:r>
+          </a:p>
+          <a:p>
+            <a:pPr marL="228600" indent="-228600">
+              <a:buAutoNum type="arabicPeriod"/>
+            </a:pPr>
             <a:r>
               <a:rPr lang="ru-RU" baseline="0" dirty="0"/>
-              <a:t>Метод будет возвращать значения в порядке, противоположном тому, в котором вызывали </a:t>
-            </a:r>
-            <a:r>
-              <a:rPr lang="en-US" baseline="0" dirty="0"/>
-              <a:t>Returns()</a:t>
-            </a:r>
-            <a:r>
-              <a:rPr lang="ru-RU" baseline="0" dirty="0"/>
-              <a:t>.</a:t>
-            </a:r>
-          </a:p>
-          <a:p>
-            <a:r>
-              <a:rPr lang="ru-RU" baseline="0" dirty="0"/>
-              <a:t>Почему? Например, позволяет переопределять поведение, заданное в </a:t>
-            </a:r>
-            <a:r>
-              <a:rPr lang="ru-RU" baseline="0" dirty="0" err="1"/>
-              <a:t>сетапе</a:t>
-            </a:r>
-            <a:r>
-              <a:rPr lang="ru-RU" baseline="0" dirty="0"/>
-              <a:t>.</a:t>
-            </a:r>
+              <a:t>Настроить возвращаемые значения для первого или первых нескольких вызовов метода</a:t>
+            </a:r>
+            <a:endParaRPr lang="en-US" dirty="0"/>
           </a:p>
           <a:p>
             <a:endParaRPr lang="ru-RU" dirty="0"/>
@@ -7676,7 +7900,7 @@
     </p:spTree>
     <p:extLst>
       <p:ext uri="{BB962C8B-B14F-4D97-AF65-F5344CB8AC3E}">
-        <p14:creationId xmlns:p14="http://schemas.microsoft.com/office/powerpoint/2010/main" val="4149653668"/>
+        <p14:creationId xmlns:p14="http://schemas.microsoft.com/office/powerpoint/2010/main" val="93746307"/>
       </p:ext>
     </p:extLst>
   </p:cSld>
@@ -7731,27 +7955,71 @@
           <a:lstStyle/>
           <a:p>
             <a:r>
-              <a:rPr lang="ru-RU" dirty="0" smtClean="0"/>
-              <a:t>Иначе будет </a:t>
-            </a:r>
-            <a:r>
-              <a:rPr lang="en-US" dirty="0" err="1" smtClean="0"/>
-              <a:t>Overspecification</a:t>
-            </a:r>
-            <a:r>
-              <a:rPr lang="ru-RU" dirty="0" smtClean="0"/>
-              <a:t> в тестах:</a:t>
-            </a:r>
-          </a:p>
-          <a:p>
-            <a:r>
-              <a:rPr lang="ru-RU" dirty="0" smtClean="0"/>
-              <a:t>тест</a:t>
-            </a:r>
-            <a:r>
-              <a:rPr lang="ru-RU" baseline="0" dirty="0" smtClean="0"/>
-              <a:t> проверяющий работу кэша должен будет установить поведение логгера, что не суть теста.</a:t>
-            </a:r>
+              <a:rPr lang="ru-RU" dirty="0"/>
+              <a:t>Рассказ про стек:</a:t>
+            </a:r>
+            <a:endParaRPr lang="en-US" dirty="0"/>
+          </a:p>
+          <a:p>
+            <a:r>
+              <a:rPr lang="ru-RU" dirty="0"/>
+              <a:t>Настройки</a:t>
+            </a:r>
+            <a:r>
+              <a:rPr lang="ru-RU" baseline="0" dirty="0"/>
+              <a:t> результатов вызовов </a:t>
+            </a:r>
+            <a:r>
+              <a:rPr lang="ru-RU" baseline="0" dirty="0" err="1"/>
+              <a:t>замоканного</a:t>
+            </a:r>
+            <a:r>
+              <a:rPr lang="ru-RU" baseline="0" dirty="0"/>
+              <a:t> метода складываются в стек.</a:t>
+            </a:r>
+          </a:p>
+          <a:p>
+            <a:endParaRPr lang="en-US" baseline="0" dirty="0"/>
+          </a:p>
+          <a:p>
+            <a:r>
+              <a:rPr lang="ru-RU" baseline="0" dirty="0"/>
+              <a:t>Спросить аудиторию, какие значения будет выдавать метод</a:t>
+            </a:r>
+            <a:endParaRPr lang="en-US" baseline="0" dirty="0"/>
+          </a:p>
+          <a:p>
+            <a:endParaRPr lang="ru-RU" baseline="0" dirty="0"/>
+          </a:p>
+          <a:p>
+            <a:r>
+              <a:rPr lang="ru-RU" baseline="0" dirty="0"/>
+              <a:t>Метод будет возвращать значения в порядке, противоположном тому, в котором вызывали </a:t>
+            </a:r>
+            <a:r>
+              <a:rPr lang="en-US" baseline="0" dirty="0"/>
+              <a:t>Returns()</a:t>
+            </a:r>
+            <a:r>
+              <a:rPr lang="ru-RU" baseline="0" dirty="0"/>
+              <a:t>.</a:t>
+            </a:r>
+          </a:p>
+          <a:p>
+            <a:r>
+              <a:rPr lang="ru-RU" baseline="0" dirty="0"/>
+              <a:t>Почему? Например, позволяет переопределять поведение, заданное в </a:t>
+            </a:r>
+            <a:r>
+              <a:rPr lang="ru-RU" baseline="0" dirty="0" err="1"/>
+              <a:t>сетапе</a:t>
+            </a:r>
+            <a:r>
+              <a:rPr lang="ru-RU" baseline="0" dirty="0"/>
+              <a:t>.</a:t>
+            </a:r>
+          </a:p>
+          <a:p>
             <a:endParaRPr lang="ru-RU" dirty="0"/>
           </a:p>
         </p:txBody>
@@ -7782,7 +8050,7 @@
     </p:spTree>
     <p:extLst>
       <p:ext uri="{BB962C8B-B14F-4D97-AF65-F5344CB8AC3E}">
-        <p14:creationId xmlns:p14="http://schemas.microsoft.com/office/powerpoint/2010/main" val="2286912505"/>
+        <p14:creationId xmlns:p14="http://schemas.microsoft.com/office/powerpoint/2010/main" val="4149653668"/>
       </p:ext>
     </p:extLst>
   </p:cSld>
@@ -7838,80 +8106,25 @@
           <a:p>
             <a:r>
               <a:rPr lang="ru-RU" dirty="0"/>
-              <a:t>Дополнительные</a:t>
+              <a:t>Иначе будет </a:t>
+            </a:r>
+            <a:r>
+              <a:rPr lang="en-US" dirty="0" err="1"/>
+              <a:t>Overspecification</a:t>
+            </a:r>
+            <a:r>
+              <a:rPr lang="ru-RU" dirty="0"/>
+              <a:t> в тестах:</a:t>
+            </a:r>
+          </a:p>
+          <a:p>
+            <a:r>
+              <a:rPr lang="ru-RU" dirty="0"/>
+              <a:t>тест</a:t>
             </a:r>
             <a:r>
               <a:rPr lang="ru-RU" baseline="0" dirty="0"/>
-              <a:t> требования:</a:t>
-            </a:r>
-            <a:endParaRPr lang="ru-RU" dirty="0"/>
-          </a:p>
-          <a:p>
-            <a:pPr marL="228600" indent="-228600">
-              <a:buAutoNum type="arabicPeriod"/>
-            </a:pPr>
-            <a:r>
-              <a:rPr lang="ru-RU" dirty="0"/>
-              <a:t>Обойтись без дублирования:</a:t>
-            </a:r>
-            <a:r>
-              <a:rPr lang="ru-RU" baseline="0" dirty="0"/>
-              <a:t> вынести общий код в </a:t>
-            </a:r>
-            <a:r>
-              <a:rPr lang="en-US" baseline="0" dirty="0" err="1"/>
-              <a:t>SetUp</a:t>
-            </a:r>
-            <a:endParaRPr lang="ru-RU" baseline="0" dirty="0"/>
-          </a:p>
-          <a:p>
-            <a:pPr marL="228600" marR="0" lvl="0" indent="-228600" algn="l" defTabSz="914400" rtl="0" eaLnBrk="1" fontAlgn="auto" latinLnBrk="0" hangingPunct="1">
-              <a:lnSpc>
-                <a:spcPct val="100000"/>
-              </a:lnSpc>
-              <a:spcBef>
-                <a:spcPts val="0"/>
-              </a:spcBef>
-              <a:spcAft>
-                <a:spcPts val="0"/>
-              </a:spcAft>
-              <a:buClrTx/>
-              <a:buSzTx/>
-              <a:buFontTx/>
-              <a:buAutoNum type="arabicPeriod"/>
-              <a:tabLst/>
-              <a:defRPr/>
-            </a:pPr>
-            <a:r>
-              <a:rPr lang="ru-RU" baseline="0" dirty="0"/>
-              <a:t>Код теста должен быть очевидным для понимания (никакой магии</a:t>
-            </a:r>
-            <a:r>
-              <a:rPr lang="ru-RU" baseline="0" dirty="0" smtClean="0"/>
-              <a:t>!)</a:t>
-            </a:r>
-          </a:p>
-          <a:p>
-            <a:pPr marL="228600" marR="0" lvl="0" indent="-228600" algn="l" defTabSz="914400" rtl="0" eaLnBrk="1" fontAlgn="auto" latinLnBrk="0" hangingPunct="1">
-              <a:lnSpc>
-                <a:spcPct val="100000"/>
-              </a:lnSpc>
-              <a:spcBef>
-                <a:spcPts val="0"/>
-              </a:spcBef>
-              <a:spcAft>
-                <a:spcPts val="0"/>
-              </a:spcAft>
-              <a:buClrTx/>
-              <a:buSzTx/>
-              <a:buFontTx/>
-              <a:buAutoNum type="arabicPeriod"/>
-              <a:tabLst/>
-              <a:defRPr/>
-            </a:pPr>
-            <a:r>
-              <a:rPr lang="ru-RU" baseline="0" dirty="0" smtClean="0"/>
-              <a:t>В коде тестового метода должна остаться только существенная часть теста.</a:t>
+              <a:t> проверяющий работу кэша должен будет установить поведение логгера, что не суть теста.</a:t>
             </a:r>
             <a:endParaRPr lang="ru-RU" dirty="0"/>
           </a:p>
@@ -7943,7 +8156,7 @@
     </p:spTree>
     <p:extLst>
       <p:ext uri="{BB962C8B-B14F-4D97-AF65-F5344CB8AC3E}">
-        <p14:creationId xmlns:p14="http://schemas.microsoft.com/office/powerpoint/2010/main" val="3586348289"/>
+        <p14:creationId xmlns:p14="http://schemas.microsoft.com/office/powerpoint/2010/main" val="2286912505"/>
       </p:ext>
     </p:extLst>
   </p:cSld>
@@ -7998,99 +8211,79 @@
           <a:lstStyle/>
           <a:p>
             <a:r>
-              <a:rPr lang="ru-RU" baseline="0" dirty="0" smtClean="0"/>
-              <a:t>Показать оба решения, сначала прямолинейное, потом </a:t>
-            </a:r>
-            <a:r>
-              <a:rPr lang="ru-RU" baseline="0" dirty="0" err="1" smtClean="0"/>
-              <a:t>отрефакторенное</a:t>
-            </a:r>
-            <a:endParaRPr lang="ru-RU" baseline="0" smtClean="0"/>
-          </a:p>
-          <a:p>
-            <a:r>
-              <a:rPr lang="ru-RU" baseline="0" dirty="0" smtClean="0"/>
-              <a:t/>
-            </a:r>
-            <a:br>
-              <a:rPr lang="ru-RU" baseline="0" dirty="0" smtClean="0"/>
-            </a:br>
-            <a:r>
-              <a:rPr lang="ru-RU" baseline="0" dirty="0" smtClean="0"/>
-              <a:t>К </a:t>
+              <a:rPr lang="ru-RU" dirty="0"/>
+              <a:t>Дополнительные</a:t>
             </a:r>
             <a:r>
               <a:rPr lang="ru-RU" baseline="0" dirty="0"/>
-              <a:t>п.3</a:t>
-            </a:r>
-            <a:r>
-              <a:rPr lang="en-US" baseline="0" dirty="0"/>
-              <a:t>:</a:t>
+              <a:t> требования:</a:t>
+            </a:r>
+            <a:endParaRPr lang="ru-RU" dirty="0"/>
+          </a:p>
+          <a:p>
+            <a:pPr marL="228600" indent="-228600">
+              <a:buAutoNum type="arabicPeriod"/>
+            </a:pPr>
+            <a:r>
+              <a:rPr lang="ru-RU" dirty="0"/>
+              <a:t>Обойтись без дублирования:</a:t>
             </a:r>
             <a:r>
               <a:rPr lang="ru-RU" baseline="0" dirty="0"/>
-              <a:t> в этой задаче: когда </a:t>
-            </a:r>
-            <a:r>
-              <a:rPr lang="ru-RU" baseline="0" dirty="0" err="1"/>
-              <a:t>тестим</a:t>
-            </a:r>
+              <a:t> вынести общий код в </a:t>
+            </a:r>
+            <a:r>
+              <a:rPr lang="en-US" baseline="0" dirty="0" err="1"/>
+              <a:t>SetUp</a:t>
+            </a:r>
+            <a:endParaRPr lang="ru-RU" baseline="0" dirty="0"/>
+          </a:p>
+          <a:p>
+            <a:pPr marL="228600" marR="0" lvl="0" indent="-228600" algn="l" defTabSz="914400" rtl="0" eaLnBrk="1" fontAlgn="auto" latinLnBrk="0" hangingPunct="1">
+              <a:lnSpc>
+                <a:spcPct val="100000"/>
+              </a:lnSpc>
+              <a:spcBef>
+                <a:spcPts val="0"/>
+              </a:spcBef>
+              <a:spcAft>
+                <a:spcPts val="0"/>
+              </a:spcAft>
+              <a:buClrTx/>
+              <a:buSzTx/>
+              <a:buFontTx/>
+              <a:buAutoNum type="arabicPeriod"/>
+              <a:tabLst/>
+              <a:defRPr/>
+            </a:pPr>
             <a:r>
               <a:rPr lang="ru-RU" baseline="0" dirty="0"/>
-              <a:t> актуальность документа</a:t>
-            </a:r>
-          </a:p>
-          <a:p>
+              <a:t>Код теста должен быть очевидным для понимания (никакой магии!)</a:t>
+            </a:r>
+          </a:p>
+          <a:p>
+            <a:pPr marL="228600" marR="0" lvl="0" indent="-228600" algn="l" defTabSz="914400" rtl="0" eaLnBrk="1" fontAlgn="auto" latinLnBrk="0" hangingPunct="1">
+              <a:lnSpc>
+                <a:spcPct val="100000"/>
+              </a:lnSpc>
+              <a:spcBef>
+                <a:spcPts val="0"/>
+              </a:spcBef>
+              <a:spcAft>
+                <a:spcPts val="0"/>
+              </a:spcAft>
+              <a:buClrTx/>
+              <a:buSzTx/>
+              <a:buFontTx/>
+              <a:buAutoNum type="arabicPeriod"/>
+              <a:tabLst/>
+              <a:defRPr/>
+            </a:pPr>
             <a:r>
               <a:rPr lang="ru-RU" baseline="0" dirty="0"/>
-              <a:t>К п.4: Возможные решения: в реализации доставать время из </a:t>
-            </a:r>
-            <a:r>
-              <a:rPr lang="en-US" sz="1200" kern="1200" dirty="0" err="1">
-                <a:solidFill>
-                  <a:schemeClr val="tx1"/>
-                </a:solidFill>
-                <a:latin typeface="+mn-lt"/>
-                <a:ea typeface="+mn-ea"/>
-                <a:cs typeface="+mn-cs"/>
-              </a:rPr>
-              <a:t>IDateTimeService</a:t>
-            </a:r>
-            <a:r>
-              <a:rPr lang="en-US" sz="1200" kern="1200" dirty="0">
-                <a:solidFill>
-                  <a:schemeClr val="tx1"/>
-                </a:solidFill>
-                <a:latin typeface="+mn-lt"/>
-                <a:ea typeface="+mn-ea"/>
-                <a:cs typeface="+mn-cs"/>
-              </a:rPr>
-              <a:t>,</a:t>
-            </a:r>
-            <a:r>
-              <a:rPr lang="en-US" sz="1200" kern="1200" baseline="0" dirty="0">
-                <a:solidFill>
-                  <a:schemeClr val="tx1"/>
-                </a:solidFill>
-                <a:latin typeface="+mn-lt"/>
-                <a:ea typeface="+mn-ea"/>
-                <a:cs typeface="+mn-cs"/>
-              </a:rPr>
-              <a:t> </a:t>
-            </a:r>
-            <a:r>
-              <a:rPr lang="ru-RU" baseline="0" dirty="0"/>
-              <a:t>а в тесте его </a:t>
-            </a:r>
-            <a:r>
-              <a:rPr lang="ru-RU" baseline="0" dirty="0" err="1"/>
-              <a:t>мокать</a:t>
-            </a:r>
-            <a:r>
-              <a:rPr lang="ru-RU" baseline="0" dirty="0"/>
-              <a:t>. Еще можно текущее время передавать параметром в тестируемый метод.</a:t>
-            </a:r>
-            <a:endParaRPr lang="en-US" dirty="0"/>
+              <a:t>В коде тестового метода должна остаться только существенная часть теста.</a:t>
+            </a:r>
+            <a:endParaRPr lang="ru-RU" dirty="0"/>
           </a:p>
         </p:txBody>
       </p:sp>
@@ -8120,7 +8313,7 @@
     </p:spTree>
     <p:extLst>
       <p:ext uri="{BB962C8B-B14F-4D97-AF65-F5344CB8AC3E}">
-        <p14:creationId xmlns:p14="http://schemas.microsoft.com/office/powerpoint/2010/main" val="3543837237"/>
+        <p14:creationId xmlns:p14="http://schemas.microsoft.com/office/powerpoint/2010/main" val="3586348289"/>
       </p:ext>
     </p:extLst>
   </p:cSld>
@@ -8175,64 +8368,91 @@
           <a:lstStyle/>
           <a:p>
             <a:r>
-              <a:rPr lang="ru-RU" dirty="0"/>
-              <a:t>Показываем вариант </a:t>
-            </a:r>
-            <a:r>
-              <a:rPr lang="ru-RU" dirty="0" err="1"/>
-              <a:t>рефакторинга</a:t>
-            </a:r>
-            <a:r>
               <a:rPr lang="ru-RU" baseline="0" dirty="0"/>
+              <a:t>Показать оба решения, сначала прямолинейное, потом </a:t>
+            </a:r>
+            <a:r>
+              <a:rPr lang="ru-RU" baseline="0" dirty="0" err="1"/>
+              <a:t>отрефакторенное</a:t>
+            </a:r>
+            <a:endParaRPr lang="ru-RU" baseline="0"/>
+          </a:p>
+          <a:p>
+            <a:br>
+              <a:rPr lang="ru-RU" baseline="0" dirty="0"/>
+            </a:br>
+            <a:r>
+              <a:rPr lang="ru-RU" baseline="0" dirty="0"/>
+              <a:t>К п.3</a:t>
+            </a:r>
+            <a:r>
+              <a:rPr lang="en-US" baseline="0" dirty="0"/>
+              <a:t>:</a:t>
+            </a:r>
+            <a:r>
+              <a:rPr lang="ru-RU" baseline="0" dirty="0"/>
+              <a:t> в этой задаче: когда </a:t>
+            </a:r>
+            <a:r>
+              <a:rPr lang="ru-RU" baseline="0" dirty="0" err="1"/>
+              <a:t>тестим</a:t>
+            </a:r>
+            <a:r>
+              <a:rPr lang="ru-RU" baseline="0" dirty="0"/>
+              <a:t> актуальность документа</a:t>
+            </a:r>
+          </a:p>
+          <a:p>
+            <a:r>
+              <a:rPr lang="ru-RU" baseline="0" dirty="0"/>
+              <a:t>К п.4: Возможные решения: в реализации доставать время из </a:t>
+            </a:r>
+            <a:r>
+              <a:rPr lang="en-US" sz="1200" kern="1200" dirty="0" err="1">
+                <a:solidFill>
+                  <a:schemeClr val="tx1"/>
+                </a:solidFill>
+                <a:latin typeface="+mn-lt"/>
+                <a:ea typeface="+mn-ea"/>
+                <a:cs typeface="+mn-cs"/>
+              </a:rPr>
+              <a:t>IDateTimeService</a:t>
+            </a:r>
+            <a:r>
+              <a:rPr lang="en-US" sz="1200" kern="1200" dirty="0">
+                <a:solidFill>
+                  <a:schemeClr val="tx1"/>
+                </a:solidFill>
+                <a:latin typeface="+mn-lt"/>
+                <a:ea typeface="+mn-ea"/>
+                <a:cs typeface="+mn-cs"/>
+              </a:rPr>
+              <a:t>,</a:t>
+            </a:r>
+            <a:r>
+              <a:rPr lang="en-US" sz="1200" kern="1200" baseline="0" dirty="0">
+                <a:solidFill>
+                  <a:schemeClr val="tx1"/>
+                </a:solidFill>
+                <a:latin typeface="+mn-lt"/>
+                <a:ea typeface="+mn-ea"/>
+                <a:cs typeface="+mn-cs"/>
+              </a:rPr>
               <a:t> </a:t>
             </a:r>
             <a:r>
-              <a:rPr lang="en-US" baseline="0" dirty="0" err="1"/>
-              <a:t>FileSender</a:t>
-            </a:r>
-            <a:r>
-              <a:rPr lang="en-US" baseline="0" dirty="0"/>
-              <a:t> </a:t>
-            </a:r>
-            <a:r>
               <a:rPr lang="ru-RU" baseline="0" dirty="0"/>
-              <a:t>в </a:t>
-            </a:r>
-            <a:r>
-              <a:rPr lang="en-US" baseline="0" dirty="0" err="1"/>
-              <a:t>MultiFileSender</a:t>
-            </a:r>
-            <a:r>
-              <a:rPr lang="en-US" baseline="0" dirty="0"/>
-              <a:t>, </a:t>
-            </a:r>
-            <a:r>
-              <a:rPr lang="en-US" baseline="0" dirty="0" err="1"/>
-              <a:t>SingleFileSender</a:t>
-            </a:r>
-            <a:r>
-              <a:rPr lang="en-US" baseline="0" dirty="0"/>
-              <a:t> </a:t>
+              <a:t>а в тесте его </a:t>
+            </a:r>
+            <a:r>
+              <a:rPr lang="ru-RU" baseline="0" dirty="0" err="1"/>
+              <a:t>мокать</a:t>
             </a:r>
             <a:r>
               <a:rPr lang="ru-RU" baseline="0" dirty="0"/>
-              <a:t>и </a:t>
-            </a:r>
-            <a:r>
-              <a:rPr lang="en-US" baseline="0" dirty="0" err="1"/>
-              <a:t>DocumentChecker</a:t>
-            </a:r>
-            <a:r>
-              <a:rPr lang="en-US" baseline="0" dirty="0"/>
-              <a:t>.</a:t>
-            </a:r>
-          </a:p>
-          <a:p>
-            <a:r>
-              <a:rPr lang="ru-RU" baseline="0" dirty="0"/>
-              <a:t>Смотрим, какие получились тесты.</a:t>
-            </a:r>
-            <a:endParaRPr lang="ru-RU" dirty="0"/>
+              <a:t>. Еще можно текущее время передавать параметром в тестируемый метод.</a:t>
+            </a:r>
+            <a:endParaRPr lang="en-US" dirty="0"/>
           </a:p>
         </p:txBody>
       </p:sp>
@@ -8262,7 +8482,7 @@
     </p:spTree>
     <p:extLst>
       <p:ext uri="{BB962C8B-B14F-4D97-AF65-F5344CB8AC3E}">
-        <p14:creationId xmlns:p14="http://schemas.microsoft.com/office/powerpoint/2010/main" val="3958762426"/>
+        <p14:creationId xmlns:p14="http://schemas.microsoft.com/office/powerpoint/2010/main" val="3543837237"/>
       </p:ext>
     </p:extLst>
   </p:cSld>
@@ -8318,44 +8538,63 @@
           <a:p>
             <a:r>
               <a:rPr lang="ru-RU" dirty="0"/>
-              <a:t>Тестов</a:t>
+              <a:t>Показываем вариант </a:t>
+            </a:r>
+            <a:r>
+              <a:rPr lang="ru-RU" dirty="0" err="1"/>
+              <a:t>рефакторинга</a:t>
             </a:r>
             <a:r>
               <a:rPr lang="ru-RU" baseline="0" dirty="0"/>
-              <a:t> после </a:t>
-            </a:r>
-            <a:r>
-              <a:rPr lang="ru-RU" baseline="0" dirty="0" err="1"/>
-              <a:t>рефакторинга</a:t>
+              <a:t> </a:t>
+            </a:r>
+            <a:r>
+              <a:rPr lang="en-US" baseline="0" dirty="0" err="1"/>
+              <a:t>FileSender</a:t>
+            </a:r>
+            <a:r>
+              <a:rPr lang="en-US" baseline="0" dirty="0"/>
+              <a:t> </a:t>
             </a:r>
             <a:r>
               <a:rPr lang="ru-RU" baseline="0" dirty="0"/>
-              <a:t> больше.</a:t>
-            </a:r>
-          </a:p>
-          <a:p>
-            <a:endParaRPr lang="ru-RU" baseline="0" dirty="0"/>
-          </a:p>
-          <a:p>
+              <a:t>в </a:t>
+            </a:r>
+            <a:r>
+              <a:rPr lang="en-US" baseline="0" dirty="0" err="1"/>
+              <a:t>MultiFileSender</a:t>
+            </a:r>
+            <a:r>
+              <a:rPr lang="en-US" baseline="0" dirty="0"/>
+              <a:t>, </a:t>
+            </a:r>
+            <a:r>
+              <a:rPr lang="en-US" baseline="0" dirty="0" err="1"/>
+              <a:t>SingleFileSender</a:t>
+            </a:r>
+            <a:r>
+              <a:rPr lang="en-US" baseline="0" dirty="0"/>
+              <a:t> </a:t>
+            </a:r>
             <a:r>
               <a:rPr lang="ru-RU" baseline="0" dirty="0"/>
-              <a:t>Вопрос аудитории: это хорошо или плохо?</a:t>
+              <a:t>и </a:t>
+            </a:r>
+            <a:r>
+              <a:rPr lang="en-US" baseline="0" dirty="0" err="1"/>
+              <a:t>DocumentChecker</a:t>
+            </a:r>
+            <a:r>
+              <a:rPr lang="en-US" baseline="0" dirty="0"/>
+              <a:t>.</a:t>
             </a:r>
           </a:p>
           <a:p>
             <a:r>
               <a:rPr lang="ru-RU" baseline="0" dirty="0"/>
-              <a:t>Хорошо, потому что тесты проще.</a:t>
-            </a:r>
-          </a:p>
-          <a:p>
-            <a:endParaRPr lang="ru-RU" baseline="0" dirty="0"/>
-          </a:p>
-          <a:p>
-            <a:r>
-              <a:rPr lang="ru-RU" baseline="0" dirty="0"/>
-              <a:t>Их больше, т.к. положительный исход порождает по одному тесту на сущность (зеленые, жирные), а также отдельно нужен тест на ошибки предыдущего уровня (красные).</a:t>
-            </a:r>
+              <a:t>Смотрим, какие получились тесты.</a:t>
+            </a:r>
+            <a:endParaRPr lang="ru-RU" dirty="0"/>
           </a:p>
         </p:txBody>
       </p:sp>
@@ -8385,7 +8624,7 @@
     </p:spTree>
     <p:extLst>
       <p:ext uri="{BB962C8B-B14F-4D97-AF65-F5344CB8AC3E}">
-        <p14:creationId xmlns:p14="http://schemas.microsoft.com/office/powerpoint/2010/main" val="2463996460"/>
+        <p14:creationId xmlns:p14="http://schemas.microsoft.com/office/powerpoint/2010/main" val="3958762426"/>
       </p:ext>
     </p:extLst>
   </p:cSld>
@@ -8441,25 +8680,44 @@
           <a:p>
             <a:r>
               <a:rPr lang="ru-RU" dirty="0"/>
-              <a:t>Пример </a:t>
-            </a:r>
-            <a:r>
-              <a:rPr lang="en-US" dirty="0"/>
-              <a:t>Fake – </a:t>
-            </a:r>
-            <a:r>
-              <a:rPr lang="en-US" dirty="0" err="1"/>
-              <a:t>InMemory</a:t>
-            </a:r>
-            <a:r>
-              <a:rPr lang="en-US" dirty="0"/>
-              <a:t> Storage</a:t>
+              <a:t>Тестов</a:t>
             </a:r>
             <a:r>
               <a:rPr lang="ru-RU" baseline="0" dirty="0"/>
-              <a:t> без использования сетевых вызовов.</a:t>
-            </a:r>
-            <a:endParaRPr lang="en-US" dirty="0"/>
+              <a:t> после </a:t>
+            </a:r>
+            <a:r>
+              <a:rPr lang="ru-RU" baseline="0" dirty="0" err="1"/>
+              <a:t>рефакторинга</a:t>
+            </a:r>
+            <a:r>
+              <a:rPr lang="ru-RU" baseline="0" dirty="0"/>
+              <a:t> больше.</a:t>
+            </a:r>
+          </a:p>
+          <a:p>
+            <a:endParaRPr lang="ru-RU" baseline="0" dirty="0"/>
+          </a:p>
+          <a:p>
+            <a:r>
+              <a:rPr lang="ru-RU" baseline="0" dirty="0"/>
+              <a:t>Вопрос аудитории: это хорошо или плохо?</a:t>
+            </a:r>
+          </a:p>
+          <a:p>
+            <a:r>
+              <a:rPr lang="ru-RU" baseline="0" dirty="0"/>
+              <a:t>Хорошо, потому что тесты проще.</a:t>
+            </a:r>
+          </a:p>
+          <a:p>
+            <a:endParaRPr lang="ru-RU" baseline="0" dirty="0"/>
+          </a:p>
+          <a:p>
+            <a:r>
+              <a:rPr lang="ru-RU" baseline="0" dirty="0"/>
+              <a:t>Их больше, т.к. положительный исход порождает по одному тесту на сущность (зеленые, жирные), а также отдельно нужен тест на ошибки предыдущего уровня (красные).</a:t>
+            </a:r>
           </a:p>
         </p:txBody>
       </p:sp>
@@ -8480,7 +8738,111 @@
           <a:p>
             <a:fld id="{DC348DFF-10E5-4AE9-8016-9910A89BCDEE}" type="slidenum">
               <a:rPr lang="ru-RU" smtClean="0"/>
-              <a:t>18</a:t>
+              <a:t>17</a:t>
+            </a:fld>
+            <a:endParaRPr lang="ru-RU"/>
+          </a:p>
+        </p:txBody>
+      </p:sp>
+    </p:spTree>
+    <p:extLst>
+      <p:ext uri="{BB962C8B-B14F-4D97-AF65-F5344CB8AC3E}">
+        <p14:creationId xmlns:p14="http://schemas.microsoft.com/office/powerpoint/2010/main" val="2463996460"/>
+      </p:ext>
+    </p:extLst>
+  </p:cSld>
+  <p:clrMapOvr>
+    <a:masterClrMapping/>
+  </p:clrMapOvr>
+</p:notes>
+</file>
+
+<file path=ppt/notesSlides/notesSlide18.xml><?xml version="1.0" encoding="utf-8"?>
+<p:notes xmlns:a="http://schemas.openxmlformats.org/drawingml/2006/main" xmlns:r="http://schemas.openxmlformats.org/officeDocument/2006/relationships" xmlns:p="http://schemas.openxmlformats.org/presentationml/2006/main">
+  <p:cSld>
+    <p:spTree>
+      <p:nvGrpSpPr>
+        <p:cNvPr id="1" name=""/>
+        <p:cNvGrpSpPr/>
+        <p:nvPr/>
+      </p:nvGrpSpPr>
+      <p:grpSpPr>
+        <a:xfrm>
+          <a:off x="0" y="0"/>
+          <a:ext cx="0" cy="0"/>
+          <a:chOff x="0" y="0"/>
+          <a:chExt cx="0" cy="0"/>
+        </a:xfrm>
+      </p:grpSpPr>
+      <p:sp>
+        <p:nvSpPr>
+          <p:cNvPr id="2" name="Образ слайда 1"/>
+          <p:cNvSpPr>
+            <a:spLocks noGrp="1" noRot="1" noChangeAspect="1"/>
+          </p:cNvSpPr>
+          <p:nvPr>
+            <p:ph type="sldImg"/>
+          </p:nvPr>
+        </p:nvSpPr>
+        <p:spPr/>
+      </p:sp>
+      <p:sp>
+        <p:nvSpPr>
+          <p:cNvPr id="3" name="Заметки 2"/>
+          <p:cNvSpPr>
+            <a:spLocks noGrp="1"/>
+          </p:cNvSpPr>
+          <p:nvPr>
+            <p:ph type="body" idx="1"/>
+          </p:nvPr>
+        </p:nvSpPr>
+        <p:spPr/>
+        <p:txBody>
+          <a:bodyPr/>
+          <a:lstStyle/>
+          <a:p>
+            <a:r>
+              <a:rPr lang="ru-RU" dirty="0"/>
+              <a:t>Пример </a:t>
+            </a:r>
+            <a:r>
+              <a:rPr lang="en-US" dirty="0"/>
+              <a:t>Fake – </a:t>
+            </a:r>
+            <a:r>
+              <a:rPr lang="en-US" dirty="0" err="1"/>
+              <a:t>InMemory</a:t>
+            </a:r>
+            <a:r>
+              <a:rPr lang="en-US" dirty="0"/>
+              <a:t> Storage</a:t>
+            </a:r>
+            <a:r>
+              <a:rPr lang="ru-RU" baseline="0" dirty="0"/>
+              <a:t> без использования сетевых вызовов.</a:t>
+            </a:r>
+            <a:endParaRPr lang="en-US" dirty="0"/>
+          </a:p>
+        </p:txBody>
+      </p:sp>
+      <p:sp>
+        <p:nvSpPr>
+          <p:cNvPr id="4" name="Номер слайда 3"/>
+          <p:cNvSpPr>
+            <a:spLocks noGrp="1"/>
+          </p:cNvSpPr>
+          <p:nvPr>
+            <p:ph type="sldNum" sz="quarter" idx="10"/>
+          </p:nvPr>
+        </p:nvSpPr>
+        <p:spPr/>
+        <p:txBody>
+          <a:bodyPr/>
+          <a:lstStyle/>
+          <a:p>
+            <a:fld id="{DC348DFF-10E5-4AE9-8016-9910A89BCDEE}" type="slidenum">
+              <a:rPr lang="ru-RU" smtClean="0"/>
+              <a:t>19</a:t>
             </a:fld>
             <a:endParaRPr lang="ru-RU"/>
           </a:p>
@@ -9458,27 +9820,6 @@
               <a:t>Рассказать, как замокать вызов метода и как проверить, вызвался ли он.</a:t>
             </a:r>
           </a:p>
-          <a:p>
-            <a:endParaRPr lang="ru-RU" baseline="0" dirty="0"/>
-          </a:p>
-          <a:p>
-            <a:r>
-              <a:rPr lang="ru-RU" baseline="0" dirty="0"/>
-              <a:t>В </a:t>
-            </a:r>
-            <a:r>
-              <a:rPr lang="en-US" baseline="0" dirty="0" err="1"/>
-              <a:t>MustHaveHappened</a:t>
-            </a:r>
-            <a:r>
-              <a:rPr lang="en-US" baseline="0" dirty="0"/>
-              <a:t> </a:t>
-            </a:r>
-            <a:r>
-              <a:rPr lang="ru-RU" baseline="0" dirty="0"/>
-              <a:t>можно передать, сколько раз мы ожидали вызов.</a:t>
-            </a:r>
-          </a:p>
         </p:txBody>
       </p:sp>
       <p:sp>
@@ -9683,78 +10024,30 @@
           <a:bodyPr/>
           <a:lstStyle/>
           <a:p>
-            <a:r>
-              <a:rPr lang="en-US" dirty="0"/>
-              <a:t>TODO. </a:t>
-            </a:r>
-            <a:r>
-              <a:rPr lang="ru-RU" dirty="0"/>
-              <a:t>Непонятно,</a:t>
-            </a:r>
+            <a:pPr marL="0" marR="0" lvl="0" indent="0" algn="l" defTabSz="914400" rtl="0" eaLnBrk="1" fontAlgn="auto" latinLnBrk="0" hangingPunct="1">
+              <a:lnSpc>
+                <a:spcPct val="100000"/>
+              </a:lnSpc>
+              <a:spcBef>
+                <a:spcPts val="0"/>
+              </a:spcBef>
+              <a:spcAft>
+                <a:spcPts val="0"/>
+              </a:spcAft>
+              <a:buClrTx/>
+              <a:buSzTx/>
+              <a:buFontTx/>
+              <a:buNone/>
+              <a:tabLst/>
+              <a:defRPr/>
+            </a:pPr>
             <a:r>
               <a:rPr lang="ru-RU" baseline="0" dirty="0"/>
-              <a:t> как к этим пунктам подводить в контексте задачи.</a:t>
-            </a:r>
-            <a:endParaRPr lang="ru-RU" dirty="0"/>
-          </a:p>
-          <a:p>
-            <a:endParaRPr lang="ru-RU" dirty="0"/>
-          </a:p>
-          <a:p>
-            <a:r>
-              <a:rPr lang="ru-RU" dirty="0"/>
-              <a:t>К п.1:</a:t>
-            </a:r>
-            <a:r>
-              <a:rPr lang="ru-RU" baseline="0" dirty="0"/>
-              <a:t> это классическая </a:t>
-            </a:r>
-            <a:r>
-              <a:rPr lang="en-US" baseline="0" dirty="0"/>
-              <a:t>TDD.</a:t>
-            </a:r>
-            <a:r>
-              <a:rPr lang="ru-RU" baseline="0" dirty="0"/>
-              <a:t> Почитать можно книгу Кента Бека.</a:t>
-            </a:r>
-          </a:p>
-          <a:p>
-            <a:r>
-              <a:rPr lang="ru-RU" dirty="0"/>
-              <a:t>К п.3:</a:t>
-            </a:r>
-            <a:r>
-              <a:rPr lang="ru-RU" baseline="0" dirty="0"/>
-              <a:t> </a:t>
-            </a:r>
-            <a:r>
-              <a:rPr lang="ru-RU" dirty="0"/>
-              <a:t>Количество вызовов существенно в работе кэша.</a:t>
-            </a:r>
-          </a:p>
-          <a:p>
-            <a:endParaRPr lang="ru-RU" dirty="0"/>
-          </a:p>
-          <a:p>
-            <a:r>
-              <a:rPr lang="ru-RU" dirty="0"/>
-              <a:t>Недостаток написания тестов в</a:t>
-            </a:r>
-            <a:r>
-              <a:rPr lang="ru-RU" baseline="0" dirty="0"/>
-              <a:t> том же файле: это значит, что </a:t>
-            </a:r>
-            <a:r>
-              <a:rPr lang="ru-RU" baseline="0" dirty="0" err="1"/>
-              <a:t>релизная</a:t>
-            </a:r>
-            <a:r>
-              <a:rPr lang="ru-RU" baseline="0" dirty="0"/>
-              <a:t> сборка будет зависеть от </a:t>
+              <a:t>В </a:t>
             </a:r>
             <a:r>
               <a:rPr lang="en-US" baseline="0" dirty="0" err="1"/>
-              <a:t>NUnit</a:t>
+              <a:t>MustHaveHappened</a:t>
             </a:r>
             <a:r>
               <a:rPr lang="en-US" baseline="0" dirty="0"/>
@@ -9762,23 +10055,11 @@
             </a:r>
             <a:r>
               <a:rPr lang="ru-RU" baseline="0" dirty="0"/>
-              <a:t>и других библиотек для тестов.</a:t>
-            </a:r>
-            <a:endParaRPr lang="en-US" baseline="0" dirty="0"/>
-          </a:p>
-          <a:p>
-            <a:endParaRPr lang="en-US" baseline="0" dirty="0"/>
-          </a:p>
-          <a:p>
-            <a:r>
-              <a:rPr lang="ru-RU" baseline="0" dirty="0"/>
-              <a:t>ВАЖНО: после задачи сделать перерыв! 10 минут достаточно</a:t>
-            </a:r>
-            <a:r>
-              <a:rPr lang="ru-RU" baseline="0"/>
-              <a:t>, если не обед.</a:t>
-            </a:r>
-            <a:endParaRPr lang="en-US" dirty="0"/>
+              <a:t>можно передать, сколько раз мы ожидали вызов.</a:t>
+            </a:r>
+          </a:p>
+          <a:p>
+            <a:endParaRPr lang="ru-RU" baseline="0" dirty="0"/>
           </a:p>
         </p:txBody>
       </p:sp>
@@ -9808,7 +10089,7 @@
     </p:spTree>
     <p:extLst>
       <p:ext uri="{BB962C8B-B14F-4D97-AF65-F5344CB8AC3E}">
-        <p14:creationId xmlns:p14="http://schemas.microsoft.com/office/powerpoint/2010/main" val="3022555790"/>
+        <p14:creationId xmlns:p14="http://schemas.microsoft.com/office/powerpoint/2010/main" val="385625085"/>
       </p:ext>
     </p:extLst>
   </p:cSld>
@@ -14009,132 +14290,38 @@
           </a:bodyPr>
           <a:lstStyle/>
           <a:p>
-            <a:r>
-              <a:rPr lang="en-US" b="1" dirty="0"/>
-              <a:t>Arrange:</a:t>
-            </a:r>
-          </a:p>
-          <a:p>
-            <a:r>
-              <a:rPr lang="en-US" sz="2800" dirty="0" err="1">
-                <a:latin typeface="Consolas" panose="020B0609020204030204" pitchFamily="49" charset="0"/>
-              </a:rPr>
-              <a:t>A.CallTo</a:t>
-            </a:r>
-            <a:r>
-              <a:rPr lang="en-US" sz="2800" dirty="0">
-                <a:latin typeface="Consolas" panose="020B0609020204030204" pitchFamily="49" charset="0"/>
-              </a:rPr>
-              <a:t>(() =&gt; </a:t>
-            </a:r>
-            <a:r>
-              <a:rPr lang="en-US" sz="2800" dirty="0" err="1">
-                <a:latin typeface="Consolas" panose="020B0609020204030204" pitchFamily="49" charset="0"/>
-              </a:rPr>
-              <a:t>fake.SomeMethod</a:t>
-            </a:r>
-            <a:r>
-              <a:rPr lang="en-US" sz="2800" dirty="0">
-                <a:latin typeface="Consolas" panose="020B0609020204030204" pitchFamily="49" charset="0"/>
-              </a:rPr>
-              <a:t>(null))</a:t>
-            </a:r>
-          </a:p>
-          <a:p>
-            <a:r>
-              <a:rPr lang="en-US" sz="2800" dirty="0">
-                <a:latin typeface="Consolas" panose="020B0609020204030204" pitchFamily="49" charset="0"/>
-              </a:rPr>
-              <a:t>	.</a:t>
-            </a:r>
-            <a:r>
-              <a:rPr lang="en-US" sz="2800" b="1" dirty="0" err="1">
-                <a:latin typeface="Consolas" panose="020B0609020204030204" pitchFamily="49" charset="0"/>
-              </a:rPr>
-              <a:t>WithAnyArguments</a:t>
-            </a:r>
-            <a:r>
-              <a:rPr lang="en-US" sz="2800" b="1" dirty="0">
-                <a:latin typeface="Consolas" panose="020B0609020204030204" pitchFamily="49" charset="0"/>
-              </a:rPr>
-              <a:t>()</a:t>
-            </a:r>
-            <a:r>
-              <a:rPr lang="en-US" sz="2800" dirty="0">
-                <a:latin typeface="Consolas" panose="020B0609020204030204" pitchFamily="49" charset="0"/>
-              </a:rPr>
-              <a:t>.Returns(true)</a:t>
-            </a:r>
-            <a:r>
-              <a:rPr lang="en-US" sz="2800" b="1" dirty="0">
-                <a:latin typeface="Consolas" panose="020B0609020204030204" pitchFamily="49" charset="0"/>
-              </a:rPr>
-              <a:t>.Once()</a:t>
-            </a:r>
-            <a:r>
-              <a:rPr lang="en-US" sz="2800" dirty="0">
-                <a:latin typeface="Consolas" panose="020B0609020204030204" pitchFamily="49" charset="0"/>
-              </a:rPr>
-              <a:t>;</a:t>
-            </a:r>
-          </a:p>
-          <a:p>
-            <a:endParaRPr lang="en-US" dirty="0"/>
-          </a:p>
-          <a:p>
-            <a:r>
-              <a:rPr lang="en-US" sz="2800" dirty="0" err="1">
-                <a:latin typeface="Consolas" panose="020B0609020204030204" pitchFamily="49" charset="0"/>
-              </a:rPr>
-              <a:t>A.CallTo</a:t>
-            </a:r>
-            <a:r>
-              <a:rPr lang="en-US" sz="2800" dirty="0">
-                <a:latin typeface="Consolas" panose="020B0609020204030204" pitchFamily="49" charset="0"/>
-              </a:rPr>
-              <a:t>(() =&gt; </a:t>
-            </a:r>
-            <a:r>
-              <a:rPr lang="en-US" sz="2800" dirty="0" err="1">
-                <a:latin typeface="Consolas" panose="020B0609020204030204" pitchFamily="49" charset="0"/>
-              </a:rPr>
-              <a:t>fake.SomeMethod</a:t>
-            </a:r>
-            <a:r>
-              <a:rPr lang="en-US" sz="2800" dirty="0">
-                <a:latin typeface="Consolas" panose="020B0609020204030204" pitchFamily="49" charset="0"/>
-              </a:rPr>
-              <a:t>())</a:t>
-            </a:r>
-            <a:br>
-              <a:rPr lang="en-US" sz="2800" dirty="0">
-                <a:latin typeface="Consolas" panose="020B0609020204030204" pitchFamily="49" charset="0"/>
-              </a:rPr>
-            </a:br>
-            <a:r>
-              <a:rPr lang="en-US" sz="2800" dirty="0">
-                <a:latin typeface="Consolas" panose="020B0609020204030204" pitchFamily="49" charset="0"/>
-              </a:rPr>
-              <a:t>	.</a:t>
-            </a:r>
-            <a:r>
-              <a:rPr lang="en-US" sz="2800" b="1" dirty="0" err="1">
-                <a:latin typeface="Consolas" panose="020B0609020204030204" pitchFamily="49" charset="0"/>
-              </a:rPr>
-              <a:t>ReturnsNextFromSequence</a:t>
-            </a:r>
-            <a:r>
-              <a:rPr lang="en-US" sz="2800" dirty="0">
-                <a:latin typeface="Consolas" panose="020B0609020204030204" pitchFamily="49" charset="0"/>
-              </a:rPr>
-              <a:t>(false, true);</a:t>
-            </a:r>
-          </a:p>
-          <a:p>
-            <a:pPr marL="0" indent="0">
-              <a:buNone/>
+            <a:pPr marL="457200" indent="-457200">
+              <a:buFont typeface="Arial" panose="020B0604020202020204" pitchFamily="34" charset="0"/>
+              <a:buChar char="•"/>
             </a:pPr>
-            <a:endParaRPr lang="ru-RU" dirty="0"/>
+            <a:r>
+              <a:rPr lang="ru-RU" dirty="0"/>
+              <a:t>Не надо писать собственную заглушку</a:t>
+            </a:r>
+          </a:p>
+          <a:p>
+            <a:pPr marL="457200" indent="-457200">
+              <a:buFont typeface="Arial" panose="020B0604020202020204" pitchFamily="34" charset="0"/>
+              <a:buChar char="•"/>
+            </a:pPr>
+            <a:r>
+              <a:rPr lang="ru-RU" dirty="0"/>
+              <a:t>Можно тестировать, когда реализации зависимости еще нет</a:t>
+            </a:r>
+          </a:p>
+          <a:p>
+            <a:pPr marL="457200" indent="-457200">
+              <a:buFont typeface="Arial" panose="020B0604020202020204" pitchFamily="34" charset="0"/>
+              <a:buChar char="•"/>
+            </a:pPr>
+            <a:r>
+              <a:rPr lang="ru-RU" dirty="0" err="1"/>
+              <a:t>Моки</a:t>
+            </a:r>
+            <a:r>
+              <a:rPr lang="ru-RU" dirty="0"/>
+              <a:t> позволяют тестировать количество вызовов, что иногда существенно</a:t>
+            </a:r>
           </a:p>
         </p:txBody>
       </p:sp>
@@ -14161,6 +14348,399 @@
                   <a:schemeClr val="tx1"/>
                 </a:solidFill>
               </a:rPr>
+              <a:t>Разбор задачи</a:t>
+            </a:r>
+            <a:r>
+              <a:rPr lang="ru-RU" dirty="0"/>
+              <a:t> </a:t>
+            </a:r>
+            <a:r>
+              <a:rPr lang="en-US" dirty="0" err="1"/>
+              <a:t>tHINGcACHE</a:t>
+            </a:r>
+            <a:endParaRPr lang="ru-RU" dirty="0"/>
+          </a:p>
+        </p:txBody>
+      </p:sp>
+    </p:spTree>
+    <p:extLst>
+      <p:ext uri="{BB962C8B-B14F-4D97-AF65-F5344CB8AC3E}">
+        <p14:creationId xmlns:p14="http://schemas.microsoft.com/office/powerpoint/2010/main" val="2068482046"/>
+      </p:ext>
+    </p:extLst>
+  </p:cSld>
+  <p:clrMapOvr>
+    <a:masterClrMapping/>
+  </p:clrMapOvr>
+  <p:timing>
+    <p:tnLst>
+      <p:par>
+        <p:cTn id="1" dur="indefinite" restart="never" nodeType="tmRoot">
+          <p:childTnLst>
+            <p:seq concurrent="1" nextAc="seek">
+              <p:cTn id="2" dur="indefinite" nodeType="mainSeq">
+                <p:childTnLst>
+                  <p:par>
+                    <p:cTn id="3" fill="hold">
+                      <p:stCondLst>
+                        <p:cond delay="indefinite"/>
+                      </p:stCondLst>
+                      <p:childTnLst>
+                        <p:par>
+                          <p:cTn id="4" fill="hold">
+                            <p:stCondLst>
+                              <p:cond delay="0"/>
+                            </p:stCondLst>
+                            <p:childTnLst>
+                              <p:par>
+                                <p:cTn id="5" presetID="1" presetClass="entr" presetSubtype="0" fill="hold" grpId="0" nodeType="clickEffect">
+                                  <p:stCondLst>
+                                    <p:cond delay="0"/>
+                                  </p:stCondLst>
+                                  <p:childTnLst>
+                                    <p:set>
+                                      <p:cBhvr>
+                                        <p:cTn id="6" dur="1" fill="hold">
+                                          <p:stCondLst>
+                                            <p:cond delay="0"/>
+                                          </p:stCondLst>
+                                        </p:cTn>
+                                        <p:tgtEl>
+                                          <p:spTgt spid="3">
+                                            <p:txEl>
+                                              <p:pRg st="0" end="0"/>
+                                            </p:txEl>
+                                          </p:spTgt>
+                                        </p:tgtEl>
+                                        <p:attrNameLst>
+                                          <p:attrName>style.visibility</p:attrName>
+                                        </p:attrNameLst>
+                                      </p:cBhvr>
+                                      <p:to>
+                                        <p:strVal val="visible"/>
+                                      </p:to>
+                                    </p:set>
+                                  </p:childTnLst>
+                                </p:cTn>
+                              </p:par>
+                            </p:childTnLst>
+                          </p:cTn>
+                        </p:par>
+                      </p:childTnLst>
+                    </p:cTn>
+                  </p:par>
+                  <p:par>
+                    <p:cTn id="7" fill="hold">
+                      <p:stCondLst>
+                        <p:cond delay="indefinite"/>
+                      </p:stCondLst>
+                      <p:childTnLst>
+                        <p:par>
+                          <p:cTn id="8" fill="hold">
+                            <p:stCondLst>
+                              <p:cond delay="0"/>
+                            </p:stCondLst>
+                            <p:childTnLst>
+                              <p:par>
+                                <p:cTn id="9" presetID="1" presetClass="entr" presetSubtype="0" fill="hold" grpId="0" nodeType="clickEffect">
+                                  <p:stCondLst>
+                                    <p:cond delay="0"/>
+                                  </p:stCondLst>
+                                  <p:childTnLst>
+                                    <p:set>
+                                      <p:cBhvr>
+                                        <p:cTn id="10" dur="1" fill="hold">
+                                          <p:stCondLst>
+                                            <p:cond delay="0"/>
+                                          </p:stCondLst>
+                                        </p:cTn>
+                                        <p:tgtEl>
+                                          <p:spTgt spid="3">
+                                            <p:txEl>
+                                              <p:pRg st="1" end="1"/>
+                                            </p:txEl>
+                                          </p:spTgt>
+                                        </p:tgtEl>
+                                        <p:attrNameLst>
+                                          <p:attrName>style.visibility</p:attrName>
+                                        </p:attrNameLst>
+                                      </p:cBhvr>
+                                      <p:to>
+                                        <p:strVal val="visible"/>
+                                      </p:to>
+                                    </p:set>
+                                  </p:childTnLst>
+                                </p:cTn>
+                              </p:par>
+                            </p:childTnLst>
+                          </p:cTn>
+                        </p:par>
+                      </p:childTnLst>
+                    </p:cTn>
+                  </p:par>
+                  <p:par>
+                    <p:cTn id="11" fill="hold">
+                      <p:stCondLst>
+                        <p:cond delay="indefinite"/>
+                      </p:stCondLst>
+                      <p:childTnLst>
+                        <p:par>
+                          <p:cTn id="12" fill="hold">
+                            <p:stCondLst>
+                              <p:cond delay="0"/>
+                            </p:stCondLst>
+                            <p:childTnLst>
+                              <p:par>
+                                <p:cTn id="13" presetID="1" presetClass="entr" presetSubtype="0" fill="hold" grpId="0" nodeType="clickEffect">
+                                  <p:stCondLst>
+                                    <p:cond delay="0"/>
+                                  </p:stCondLst>
+                                  <p:childTnLst>
+                                    <p:set>
+                                      <p:cBhvr>
+                                        <p:cTn id="14" dur="1" fill="hold">
+                                          <p:stCondLst>
+                                            <p:cond delay="0"/>
+                                          </p:stCondLst>
+                                        </p:cTn>
+                                        <p:tgtEl>
+                                          <p:spTgt spid="3">
+                                            <p:txEl>
+                                              <p:pRg st="2" end="2"/>
+                                            </p:txEl>
+                                          </p:spTgt>
+                                        </p:tgtEl>
+                                        <p:attrNameLst>
+                                          <p:attrName>style.visibility</p:attrName>
+                                        </p:attrNameLst>
+                                      </p:cBhvr>
+                                      <p:to>
+                                        <p:strVal val="visible"/>
+                                      </p:to>
+                                    </p:set>
+                                  </p:childTnLst>
+                                </p:cTn>
+                              </p:par>
+                            </p:childTnLst>
+                          </p:cTn>
+                        </p:par>
+                      </p:childTnLst>
+                    </p:cTn>
+                  </p:par>
+                </p:childTnLst>
+              </p:cTn>
+              <p:prevCondLst>
+                <p:cond evt="onPrev" delay="0">
+                  <p:tgtEl>
+                    <p:sldTgt/>
+                  </p:tgtEl>
+                </p:cond>
+              </p:prevCondLst>
+              <p:nextCondLst>
+                <p:cond evt="onNext" delay="0">
+                  <p:tgtEl>
+                    <p:sldTgt/>
+                  </p:tgtEl>
+                </p:cond>
+              </p:nextCondLst>
+            </p:seq>
+          </p:childTnLst>
+        </p:cTn>
+      </p:par>
+    </p:tnLst>
+    <p:bldLst>
+      <p:bldP spid="3" grpId="0" build="p"/>
+    </p:bldLst>
+  </p:timing>
+</p:sld>
+</file>
+
+<file path=ppt/slides/slide11.xml><?xml version="1.0" encoding="utf-8"?>
+<p:sld xmlns:a="http://schemas.openxmlformats.org/drawingml/2006/main" xmlns:r="http://schemas.openxmlformats.org/officeDocument/2006/relationships" xmlns:p="http://schemas.openxmlformats.org/presentationml/2006/main">
+  <p:cSld>
+    <p:spTree>
+      <p:nvGrpSpPr>
+        <p:cNvPr id="1" name=""/>
+        <p:cNvGrpSpPr/>
+        <p:nvPr/>
+      </p:nvGrpSpPr>
+      <p:grpSpPr>
+        <a:xfrm>
+          <a:off x="0" y="0"/>
+          <a:ext cx="0" cy="0"/>
+          <a:chOff x="0" y="0"/>
+          <a:chExt cx="0" cy="0"/>
+        </a:xfrm>
+      </p:grpSpPr>
+      <p:sp>
+        <p:nvSpPr>
+          <p:cNvPr id="3" name="Объект 2"/>
+          <p:cNvSpPr>
+            <a:spLocks noGrp="1"/>
+          </p:cNvSpPr>
+          <p:nvPr>
+            <p:ph sz="quarter" idx="13"/>
+          </p:nvPr>
+        </p:nvSpPr>
+        <p:spPr/>
+        <p:txBody>
+          <a:bodyPr>
+            <a:normAutofit/>
+          </a:bodyPr>
+          <a:lstStyle/>
+          <a:p>
+            <a:r>
+              <a:rPr lang="en-US" b="1" dirty="0"/>
+              <a:t>Arrange:</a:t>
+            </a:r>
+          </a:p>
+          <a:p>
+            <a:r>
+              <a:rPr lang="en-US" sz="2800" dirty="0" err="1">
+                <a:latin typeface="Consolas" panose="020B0609020204030204" pitchFamily="49" charset="0"/>
+              </a:rPr>
+              <a:t>A.CallTo</a:t>
+            </a:r>
+            <a:r>
+              <a:rPr lang="en-US" sz="2800" dirty="0">
+                <a:latin typeface="Consolas" panose="020B0609020204030204" pitchFamily="49" charset="0"/>
+              </a:rPr>
+              <a:t>(() =&gt; </a:t>
+            </a:r>
+            <a:r>
+              <a:rPr lang="en-US" sz="2800" dirty="0" err="1">
+                <a:latin typeface="Consolas" panose="020B0609020204030204" pitchFamily="49" charset="0"/>
+              </a:rPr>
+              <a:t>fake.SomeMethod</a:t>
+            </a:r>
+            <a:r>
+              <a:rPr lang="en-US" sz="2800" dirty="0">
+                <a:latin typeface="Consolas" panose="020B0609020204030204" pitchFamily="49" charset="0"/>
+              </a:rPr>
+              <a:t>(null))</a:t>
+            </a:r>
+          </a:p>
+          <a:p>
+            <a:r>
+              <a:rPr lang="en-US" sz="2800" dirty="0">
+                <a:latin typeface="Consolas" panose="020B0609020204030204" pitchFamily="49" charset="0"/>
+              </a:rPr>
+              <a:t>	.</a:t>
+            </a:r>
+            <a:r>
+              <a:rPr lang="en-US" sz="2800" b="1" dirty="0" err="1">
+                <a:latin typeface="Consolas" panose="020B0609020204030204" pitchFamily="49" charset="0"/>
+              </a:rPr>
+              <a:t>WithAnyArguments</a:t>
+            </a:r>
+            <a:r>
+              <a:rPr lang="en-US" sz="2800" b="1" dirty="0">
+                <a:latin typeface="Consolas" panose="020B0609020204030204" pitchFamily="49" charset="0"/>
+              </a:rPr>
+              <a:t>()</a:t>
+            </a:r>
+            <a:r>
+              <a:rPr lang="en-US" sz="2800" dirty="0">
+                <a:latin typeface="Consolas" panose="020B0609020204030204" pitchFamily="49" charset="0"/>
+              </a:rPr>
+              <a:t>.Returns(true)</a:t>
+            </a:r>
+            <a:r>
+              <a:rPr lang="en-US" sz="2800" b="1" dirty="0">
+                <a:latin typeface="Consolas" panose="020B0609020204030204" pitchFamily="49" charset="0"/>
+              </a:rPr>
+              <a:t>.Once()</a:t>
+            </a:r>
+            <a:r>
+              <a:rPr lang="en-US" sz="2800" dirty="0">
+                <a:latin typeface="Consolas" panose="020B0609020204030204" pitchFamily="49" charset="0"/>
+              </a:rPr>
+              <a:t>;</a:t>
+            </a:r>
+          </a:p>
+          <a:p>
+            <a:endParaRPr lang="en-US" dirty="0"/>
+          </a:p>
+          <a:p>
+            <a:r>
+              <a:rPr lang="en-US" sz="2800" dirty="0" err="1">
+                <a:latin typeface="Consolas" panose="020B0609020204030204" pitchFamily="49" charset="0"/>
+              </a:rPr>
+              <a:t>A.CallTo</a:t>
+            </a:r>
+            <a:r>
+              <a:rPr lang="en-US" sz="2800" dirty="0">
+                <a:latin typeface="Consolas" panose="020B0609020204030204" pitchFamily="49" charset="0"/>
+              </a:rPr>
+              <a:t>(() =&gt; </a:t>
+            </a:r>
+            <a:r>
+              <a:rPr lang="en-US" sz="2800" dirty="0" err="1">
+                <a:latin typeface="Consolas" panose="020B0609020204030204" pitchFamily="49" charset="0"/>
+              </a:rPr>
+              <a:t>fake.SomeMethod</a:t>
+            </a:r>
+            <a:r>
+              <a:rPr lang="en-US" sz="2800" dirty="0">
+                <a:latin typeface="Consolas" panose="020B0609020204030204" pitchFamily="49" charset="0"/>
+              </a:rPr>
+              <a:t>())</a:t>
+            </a:r>
+            <a:br>
+              <a:rPr lang="en-US" sz="2800" dirty="0">
+                <a:latin typeface="Consolas" panose="020B0609020204030204" pitchFamily="49" charset="0"/>
+              </a:rPr>
+            </a:br>
+            <a:r>
+              <a:rPr lang="en-US" sz="2800" dirty="0">
+                <a:latin typeface="Consolas" panose="020B0609020204030204" pitchFamily="49" charset="0"/>
+              </a:rPr>
+              <a:t>	.</a:t>
+            </a:r>
+            <a:r>
+              <a:rPr lang="en-US" sz="2800" b="1" dirty="0" err="1">
+                <a:latin typeface="Consolas" panose="020B0609020204030204" pitchFamily="49" charset="0"/>
+              </a:rPr>
+              <a:t>ReturnsNextFromSequence</a:t>
+            </a:r>
+            <a:r>
+              <a:rPr lang="en-US" sz="2800" dirty="0">
+                <a:latin typeface="Consolas" panose="020B0609020204030204" pitchFamily="49" charset="0"/>
+              </a:rPr>
+              <a:t>(false, true);</a:t>
+            </a:r>
+          </a:p>
+          <a:p>
+            <a:pPr marL="0" indent="0">
+              <a:buNone/>
+            </a:pPr>
+            <a:endParaRPr lang="ru-RU" dirty="0"/>
+          </a:p>
+        </p:txBody>
+      </p:sp>
+      <p:sp>
+        <p:nvSpPr>
+          <p:cNvPr id="2" name="Заголовок 1"/>
+          <p:cNvSpPr>
+            <a:spLocks noGrp="1"/>
+          </p:cNvSpPr>
+          <p:nvPr>
+            <p:ph type="title"/>
+          </p:nvPr>
+        </p:nvSpPr>
+        <p:spPr/>
+        <p:txBody>
+          <a:bodyPr>
+            <a:noAutofit/>
+          </a:bodyPr>
+          <a:lstStyle/>
+          <a:p>
+            <a:r>
+              <a:rPr lang="ru-RU" dirty="0">
+                <a:solidFill>
+                  <a:schemeClr val="tx1"/>
+                </a:solidFill>
+              </a:rPr>
               <a:t>ДРУГИЕ ВОЗМОЖНОСТИ</a:t>
             </a:r>
             <a:endParaRPr lang="ru-RU" dirty="0"/>
@@ -14177,17 +14757,10 @@
   <p:clrMapOvr>
     <a:masterClrMapping/>
   </p:clrMapOvr>
-  <p:timing>
-    <p:tnLst>
-      <p:par>
-        <p:cTn id="1" dur="indefinite" restart="never" nodeType="tmRoot"/>
-      </p:par>
-    </p:tnLst>
-  </p:timing>
 </p:sld>
 </file>
 
-<file path=ppt/slides/slide11.xml><?xml version="1.0" encoding="utf-8"?>
+<file path=ppt/slides/slide12.xml><?xml version="1.0" encoding="utf-8"?>
 <p:sld xmlns:a="http://schemas.openxmlformats.org/drawingml/2006/main" xmlns:r="http://schemas.openxmlformats.org/officeDocument/2006/relationships" xmlns:p="http://schemas.openxmlformats.org/presentationml/2006/main">
   <p:cSld>
     <p:spTree>
@@ -16118,7 +16691,7 @@
 </p:sld>
 </file>
 
-<file path=ppt/slides/slide12.xml><?xml version="1.0" encoding="utf-8"?>
+<file path=ppt/slides/slide13.xml><?xml version="1.0" encoding="utf-8"?>
 <p:sld xmlns:a="http://schemas.openxmlformats.org/drawingml/2006/main" xmlns:r="http://schemas.openxmlformats.org/officeDocument/2006/relationships" xmlns:p="http://schemas.openxmlformats.org/presentationml/2006/main">
   <p:cSld>
     <p:spTree>
@@ -16140,7 +16713,7 @@
           <p:cNvPr id="3" name="Заголовок 2">
             <a:extLst>
               <a:ext uri="{FF2B5EF4-FFF2-40B4-BE49-F238E27FC236}">
-                <a16:creationId xmlns:a16="http://schemas.microsoft.com/office/drawing/2014/main" xmlns="" id="{BBDAAB41-1B82-4B23-9FDE-91CB0F19C549}"/>
+                <a16:creationId xmlns:a16="http://schemas.microsoft.com/office/drawing/2014/main" id="{BBDAAB41-1B82-4B23-9FDE-91CB0F19C549}"/>
               </a:ext>
             </a:extLst>
           </p:cNvPr>
@@ -16176,7 +16749,7 @@
           <p:cNvPr id="2" name="Объект 1">
             <a:extLst>
               <a:ext uri="{FF2B5EF4-FFF2-40B4-BE49-F238E27FC236}">
-                <a16:creationId xmlns:a16="http://schemas.microsoft.com/office/drawing/2014/main" xmlns="" id="{678D050B-70B8-411D-801E-83F35A20D625}"/>
+                <a16:creationId xmlns:a16="http://schemas.microsoft.com/office/drawing/2014/main" id="{678D050B-70B8-411D-801E-83F35A20D625}"/>
               </a:ext>
             </a:extLst>
           </p:cNvPr>
@@ -16194,13 +16767,8 @@
           <a:p>
             <a:r>
               <a:rPr lang="ru-RU" dirty="0"/>
-              <a:t>Уменьшает хрупкость</a:t>
-            </a:r>
-            <a:r>
-              <a:rPr lang="ru-RU" dirty="0" smtClean="0"/>
-              <a:t>!</a:t>
-            </a:r>
-            <a:endParaRPr lang="ru-RU" dirty="0"/>
+              <a:t>Уменьшает хрупкость!</a:t>
+            </a:r>
           </a:p>
           <a:p>
             <a:endParaRPr lang="ru-RU" dirty="0"/>
@@ -16215,15 +16783,7 @@
             </a:br>
             <a:r>
               <a:rPr lang="ru-RU" dirty="0"/>
-              <a:t>если </a:t>
-            </a:r>
-            <a:r>
-              <a:rPr lang="ru-RU" dirty="0" smtClean="0"/>
-              <a:t>добавить логгер </a:t>
-            </a:r>
-            <a:r>
-              <a:rPr lang="ru-RU" dirty="0"/>
-              <a:t>в </a:t>
+              <a:t>если добавить логгер в </a:t>
             </a:r>
             <a:r>
               <a:rPr lang="en-US" dirty="0" err="1"/>
@@ -16366,7 +16926,7 @@
 </p:sld>
 </file>
 
-<file path=ppt/slides/slide13.xml><?xml version="1.0" encoding="utf-8"?>
+<file path=ppt/slides/slide14.xml><?xml version="1.0" encoding="utf-8"?>
 <p:sld xmlns:a="http://schemas.openxmlformats.org/drawingml/2006/main" xmlns:r="http://schemas.openxmlformats.org/officeDocument/2006/relationships" xmlns:p="http://schemas.openxmlformats.org/presentationml/2006/main">
   <p:cSld>
     <p:spTree>
@@ -16536,17 +17096,10 @@
   <p:clrMapOvr>
     <a:masterClrMapping/>
   </p:clrMapOvr>
-  <p:timing>
-    <p:tnLst>
-      <p:par>
-        <p:cTn id="1" dur="indefinite" restart="never" nodeType="tmRoot"/>
-      </p:par>
-    </p:tnLst>
-  </p:timing>
 </p:sld>
 </file>
 
-<file path=ppt/slides/slide14.xml><?xml version="1.0" encoding="utf-8"?>
+<file path=ppt/slides/slide15.xml><?xml version="1.0" encoding="utf-8"?>
 <p:sld xmlns:a="http://schemas.openxmlformats.org/drawingml/2006/main" xmlns:r="http://schemas.openxmlformats.org/officeDocument/2006/relationships" xmlns:p="http://schemas.openxmlformats.org/presentationml/2006/main">
   <p:cSld>
     <p:spTree>
@@ -16909,7 +17462,7 @@
 </p:sld>
 </file>
 
-<file path=ppt/slides/slide15.xml><?xml version="1.0" encoding="utf-8"?>
+<file path=ppt/slides/slide16.xml><?xml version="1.0" encoding="utf-8"?>
 <p:sld xmlns:a="http://schemas.openxmlformats.org/drawingml/2006/main" xmlns:r="http://schemas.openxmlformats.org/officeDocument/2006/relationships" xmlns:p="http://schemas.openxmlformats.org/presentationml/2006/main">
   <p:cSld>
     <p:spTree>
@@ -17011,17 +17564,10 @@
   <p:clrMapOvr>
     <a:masterClrMapping/>
   </p:clrMapOvr>
-  <p:timing>
-    <p:tnLst>
-      <p:par>
-        <p:cTn id="1" dur="indefinite" restart="never" nodeType="tmRoot"/>
-      </p:par>
-    </p:tnLst>
-  </p:timing>
 </p:sld>
 </file>
 
-<file path=ppt/slides/slide16.xml><?xml version="1.0" encoding="utf-8"?>
+<file path=ppt/slides/slide17.xml><?xml version="1.0" encoding="utf-8"?>
 <p:sld xmlns:a="http://schemas.openxmlformats.org/drawingml/2006/main" xmlns:r="http://schemas.openxmlformats.org/officeDocument/2006/relationships" xmlns:p="http://schemas.openxmlformats.org/presentationml/2006/main">
   <p:cSld>
     <p:spTree>
@@ -17636,7 +18182,7 @@
 </p:sld>
 </file>
 
-<file path=ppt/slides/slide17.xml><?xml version="1.0" encoding="utf-8"?>
+<file path=ppt/slides/slide18.xml><?xml version="1.0" encoding="utf-8"?>
 <p:sld xmlns:a="http://schemas.openxmlformats.org/drawingml/2006/main" xmlns:r="http://schemas.openxmlformats.org/officeDocument/2006/relationships" xmlns:p="http://schemas.openxmlformats.org/presentationml/2006/main">
   <p:cSld>
     <p:spTree>
@@ -17689,7 +18235,7 @@
 </p:sld>
 </file>
 
-<file path=ppt/slides/slide18.xml><?xml version="1.0" encoding="utf-8"?>
+<file path=ppt/slides/slide19.xml><?xml version="1.0" encoding="utf-8"?>
 <p:sld xmlns:a="http://schemas.openxmlformats.org/drawingml/2006/main" xmlns:r="http://schemas.openxmlformats.org/officeDocument/2006/relationships" xmlns:p="http://schemas.openxmlformats.org/presentationml/2006/main">
   <p:cSld>
     <p:spTree>
@@ -17961,159 +18507,6 @@
   <p:clrMapOvr>
     <a:masterClrMapping/>
   </p:clrMapOvr>
-</p:sld>
-</file>
-
-<file path=ppt/slides/slide19.xml><?xml version="1.0" encoding="utf-8"?>
-<p:sld xmlns:a="http://schemas.openxmlformats.org/drawingml/2006/main" xmlns:r="http://schemas.openxmlformats.org/officeDocument/2006/relationships" xmlns:p="http://schemas.openxmlformats.org/presentationml/2006/main" show="0">
-  <p:cSld>
-    <p:spTree>
-      <p:nvGrpSpPr>
-        <p:cNvPr id="1" name=""/>
-        <p:cNvGrpSpPr/>
-        <p:nvPr/>
-      </p:nvGrpSpPr>
-      <p:grpSpPr>
-        <a:xfrm>
-          <a:off x="0" y="0"/>
-          <a:ext cx="0" cy="0"/>
-          <a:chOff x="0" y="0"/>
-          <a:chExt cx="0" cy="0"/>
-        </a:xfrm>
-      </p:grpSpPr>
-      <p:sp>
-        <p:nvSpPr>
-          <p:cNvPr id="5" name="Объект 4"/>
-          <p:cNvSpPr>
-            <a:spLocks noGrp="1"/>
-          </p:cNvSpPr>
-          <p:nvPr>
-            <p:ph sz="quarter" idx="13"/>
-          </p:nvPr>
-        </p:nvSpPr>
-        <p:spPr/>
-        <p:txBody>
-          <a:bodyPr>
-            <a:normAutofit/>
-          </a:bodyPr>
-          <a:lstStyle/>
-          <a:p>
-            <a:pPr marL="0" indent="0">
-              <a:buNone/>
-            </a:pPr>
-            <a:r>
-              <a:rPr lang="en-US" sz="3600" dirty="0">
-                <a:solidFill>
-                  <a:schemeClr val="accent1"/>
-                </a:solidFill>
-              </a:rPr>
-              <a:t>State tests</a:t>
-            </a:r>
-          </a:p>
-          <a:p>
-            <a:pPr marL="0" indent="0" algn="ctr">
-              <a:buNone/>
-            </a:pPr>
-            <a:r>
-              <a:rPr lang="en-US" sz="3600" dirty="0"/>
-              <a:t>VS</a:t>
-            </a:r>
-          </a:p>
-          <a:p>
-            <a:pPr marL="0" indent="0" algn="r">
-              <a:buNone/>
-            </a:pPr>
-            <a:r>
-              <a:rPr lang="en-US" sz="3600" dirty="0">
-                <a:solidFill>
-                  <a:schemeClr val="accent1"/>
-                </a:solidFill>
-              </a:rPr>
-              <a:t>Behavior tests</a:t>
-            </a:r>
-            <a:endParaRPr lang="ru-RU" sz="3600" dirty="0">
-              <a:solidFill>
-                <a:schemeClr val="accent1"/>
-              </a:solidFill>
-            </a:endParaRPr>
-          </a:p>
-          <a:p>
-            <a:pPr marL="0" indent="0">
-              <a:buNone/>
-            </a:pPr>
-            <a:endParaRPr lang="en-US" sz="2400" dirty="0">
-              <a:hlinkClick r:id="rId2"/>
-            </a:endParaRPr>
-          </a:p>
-          <a:p>
-            <a:pPr marL="0" indent="0">
-              <a:buNone/>
-            </a:pPr>
-            <a:endParaRPr lang="ru-RU" sz="2400" dirty="0">
-              <a:hlinkClick r:id="rId2"/>
-            </a:endParaRPr>
-          </a:p>
-          <a:p>
-            <a:pPr marL="0" indent="0">
-              <a:buNone/>
-            </a:pPr>
-            <a:r>
-              <a:rPr lang="en-US" sz="2600" dirty="0">
-                <a:hlinkClick r:id="rId2"/>
-              </a:rPr>
-              <a:t>http://martinfowler.com/articles/mocksArentStubs.html</a:t>
-            </a:r>
-            <a:endParaRPr lang="en-US" sz="2600" dirty="0"/>
-          </a:p>
-          <a:p>
-            <a:pPr marL="0" indent="0">
-              <a:buNone/>
-            </a:pPr>
-            <a:endParaRPr lang="ru-RU" sz="2400" dirty="0"/>
-          </a:p>
-        </p:txBody>
-      </p:sp>
-      <p:sp>
-        <p:nvSpPr>
-          <p:cNvPr id="4" name="Заголовок 3"/>
-          <p:cNvSpPr>
-            <a:spLocks noGrp="1"/>
-          </p:cNvSpPr>
-          <p:nvPr>
-            <p:ph type="title"/>
-          </p:nvPr>
-        </p:nvSpPr>
-        <p:spPr/>
-        <p:txBody>
-          <a:bodyPr/>
-          <a:lstStyle/>
-          <a:p>
-            <a:r>
-              <a:rPr lang="ru-RU"/>
-              <a:t>Подходы к тестированию</a:t>
-            </a:r>
-            <a:endParaRPr lang="ru-RU" dirty="0"/>
-          </a:p>
-        </p:txBody>
-      </p:sp>
-    </p:spTree>
-    <p:extLst>
-      <p:ext uri="{BB962C8B-B14F-4D97-AF65-F5344CB8AC3E}">
-        <p14:creationId xmlns:p14="http://schemas.microsoft.com/office/powerpoint/2010/main" val="3707230800"/>
-      </p:ext>
-    </p:extLst>
-  </p:cSld>
-  <p:clrMapOvr>
-    <a:masterClrMapping/>
-  </p:clrMapOvr>
-  <mc:AlternateContent xmlns:mc="http://schemas.openxmlformats.org/markup-compatibility/2006">
-    <mc:Choice xmlns:p14="http://schemas.microsoft.com/office/powerpoint/2010/main" Requires="p14">
-      <p:transition spd="slow" p14:dur="2000"/>
-    </mc:Choice>
-    <mc:Fallback>
-      <p:transition spd="slow"/>
-    </mc:Fallback>
-  </mc:AlternateContent>
 </p:sld>
 </file>
 
@@ -18228,10 +18621,6 @@
             <a:r>
               <a:rPr lang="en-US" dirty="0"/>
               <a:t>ct</a:t>
-            </a:r>
-            <a:r>
-              <a:rPr lang="ru-RU" dirty="0"/>
-              <a:t/>
             </a:r>
             <a:br>
               <a:rPr lang="ru-RU" dirty="0"/>
@@ -18512,7 +18901,99 @@
       </p:grpSpPr>
       <p:sp>
         <p:nvSpPr>
-          <p:cNvPr id="2" name="Заголовок 1"/>
+          <p:cNvPr id="5" name="Объект 4"/>
+          <p:cNvSpPr>
+            <a:spLocks noGrp="1"/>
+          </p:cNvSpPr>
+          <p:nvPr>
+            <p:ph sz="quarter" idx="13"/>
+          </p:nvPr>
+        </p:nvSpPr>
+        <p:spPr/>
+        <p:txBody>
+          <a:bodyPr>
+            <a:normAutofit/>
+          </a:bodyPr>
+          <a:lstStyle/>
+          <a:p>
+            <a:pPr marL="0" indent="0">
+              <a:buNone/>
+            </a:pPr>
+            <a:r>
+              <a:rPr lang="en-US" sz="3600" dirty="0">
+                <a:solidFill>
+                  <a:schemeClr val="accent1"/>
+                </a:solidFill>
+              </a:rPr>
+              <a:t>State tests</a:t>
+            </a:r>
+          </a:p>
+          <a:p>
+            <a:pPr marL="0" indent="0" algn="ctr">
+              <a:buNone/>
+            </a:pPr>
+            <a:r>
+              <a:rPr lang="en-US" sz="3600" dirty="0"/>
+              <a:t>VS</a:t>
+            </a:r>
+          </a:p>
+          <a:p>
+            <a:pPr marL="0" indent="0" algn="r">
+              <a:buNone/>
+            </a:pPr>
+            <a:r>
+              <a:rPr lang="en-US" sz="3600" dirty="0">
+                <a:solidFill>
+                  <a:schemeClr val="accent1"/>
+                </a:solidFill>
+              </a:rPr>
+              <a:t>Behavior tests</a:t>
+            </a:r>
+            <a:endParaRPr lang="ru-RU" sz="3600" dirty="0">
+              <a:solidFill>
+                <a:schemeClr val="accent1"/>
+              </a:solidFill>
+            </a:endParaRPr>
+          </a:p>
+          <a:p>
+            <a:pPr marL="0" indent="0">
+              <a:buNone/>
+            </a:pPr>
+            <a:endParaRPr lang="en-US" sz="2400" dirty="0">
+              <a:hlinkClick r:id="rId2"/>
+            </a:endParaRPr>
+          </a:p>
+          <a:p>
+            <a:pPr marL="0" indent="0">
+              <a:buNone/>
+            </a:pPr>
+            <a:endParaRPr lang="ru-RU" sz="2400" dirty="0">
+              <a:hlinkClick r:id="rId2"/>
+            </a:endParaRPr>
+          </a:p>
+          <a:p>
+            <a:pPr marL="0" indent="0">
+              <a:buNone/>
+            </a:pPr>
+            <a:r>
+              <a:rPr lang="en-US" sz="2600" dirty="0">
+                <a:hlinkClick r:id="rId2"/>
+              </a:rPr>
+              <a:t>http://martinfowler.com/articles/mocksArentStubs.html</a:t>
+            </a:r>
+            <a:endParaRPr lang="en-US" sz="2600" dirty="0"/>
+          </a:p>
+          <a:p>
+            <a:pPr marL="0" indent="0">
+              <a:buNone/>
+            </a:pPr>
+            <a:endParaRPr lang="ru-RU" sz="2400" dirty="0"/>
+          </a:p>
+        </p:txBody>
+      </p:sp>
+      <p:sp>
+        <p:nvSpPr>
+          <p:cNvPr id="4" name="Заголовок 3"/>
           <p:cNvSpPr>
             <a:spLocks noGrp="1"/>
           </p:cNvSpPr>
@@ -18526,222 +19007,23 @@
           <a:lstStyle/>
           <a:p>
             <a:r>
-              <a:rPr lang="en-US" dirty="0"/>
-              <a:t>Behavior tests </a:t>
-            </a:r>
-            <a:r>
-              <a:rPr lang="en-US" dirty="0">
-                <a:solidFill>
-                  <a:schemeClr val="tx1"/>
-                </a:solidFill>
-              </a:rPr>
-              <a:t>vs</a:t>
-            </a:r>
-            <a:r>
-              <a:rPr lang="en-US" dirty="0"/>
-              <a:t> State tests</a:t>
-            </a:r>
-          </a:p>
-        </p:txBody>
-      </p:sp>
-      <p:sp>
-        <p:nvSpPr>
-          <p:cNvPr id="3" name="Объект 2"/>
-          <p:cNvSpPr>
-            <a:spLocks noGrp="1"/>
-          </p:cNvSpPr>
-          <p:nvPr>
-            <p:ph sz="quarter" idx="11"/>
-          </p:nvPr>
-        </p:nvSpPr>
-        <p:spPr/>
-        <p:txBody>
-          <a:bodyPr>
-            <a:normAutofit/>
-          </a:bodyPr>
-          <a:lstStyle/>
-          <a:p>
-            <a:pPr marL="457200" indent="-457200" fontAlgn="ctr">
-              <a:buFont typeface="Arial" panose="020B0604020202020204" pitchFamily="34" charset="0"/>
-              <a:buChar char="•"/>
-            </a:pPr>
-            <a:r>
-              <a:rPr lang="x-none" sz="2000" dirty="0"/>
-              <a:t>Более независимые</a:t>
-            </a:r>
-            <a:r>
-              <a:rPr lang="ru-RU" sz="2000" dirty="0"/>
-              <a:t> друг от друга</a:t>
-            </a:r>
-            <a:r>
-              <a:rPr lang="x-none" sz="2000" dirty="0"/>
-              <a:t> тесты</a:t>
-            </a:r>
-            <a:endParaRPr lang="en-US" sz="2000" dirty="0"/>
-          </a:p>
-          <a:p>
-            <a:pPr marL="457200" indent="-457200" fontAlgn="ctr">
-              <a:buFont typeface="Arial" panose="020B0604020202020204" pitchFamily="34" charset="0"/>
-              <a:buChar char="•"/>
-            </a:pPr>
-            <a:r>
-              <a:rPr lang="ru-RU" sz="2000" dirty="0"/>
-              <a:t>Методика приводит</a:t>
-            </a:r>
-            <a:r>
-              <a:rPr lang="x-none" sz="2000" dirty="0"/>
-              <a:t> к более модульному дизайну</a:t>
-            </a:r>
-            <a:endParaRPr lang="en-US" sz="2000" dirty="0"/>
-          </a:p>
-          <a:p>
-            <a:pPr marL="457200" indent="-457200" fontAlgn="ctr">
-              <a:buFont typeface="Arial" panose="020B0604020202020204" pitchFamily="34" charset="0"/>
-              <a:buChar char="•"/>
-            </a:pPr>
-            <a:endParaRPr lang="ru-RU" sz="2000" dirty="0"/>
-          </a:p>
-          <a:p>
-            <a:pPr marL="457200" indent="-457200" fontAlgn="ctr">
-              <a:buFont typeface="Arial" panose="020B0604020202020204" pitchFamily="34" charset="0"/>
-              <a:buChar char="•"/>
-            </a:pPr>
-            <a:r>
-              <a:rPr lang="ru-RU" sz="2000" dirty="0"/>
-              <a:t>В большей степени связывают реализацию и тесты, поэтому сложно менять реализацию</a:t>
-            </a:r>
-          </a:p>
-          <a:p>
-            <a:pPr marL="457200" indent="-457200" fontAlgn="ctr">
-              <a:buFont typeface="Arial" panose="020B0604020202020204" pitchFamily="34" charset="0"/>
-              <a:buChar char="•"/>
-            </a:pPr>
-            <a:endParaRPr lang="x-none" sz="2000" dirty="0"/>
-          </a:p>
-          <a:p>
-            <a:pPr marL="457200" indent="-457200" fontAlgn="ctr">
-              <a:buFont typeface="Arial" panose="020B0604020202020204" pitchFamily="34" charset="0"/>
-              <a:buChar char="•"/>
-            </a:pPr>
-            <a:r>
-              <a:rPr lang="x-none" sz="2000" dirty="0"/>
-              <a:t>Более быстрый и легкий запуск тестов</a:t>
-            </a:r>
-          </a:p>
-          <a:p>
-            <a:endParaRPr lang="en-US" sz="2000" dirty="0"/>
-          </a:p>
-        </p:txBody>
-      </p:sp>
-      <p:sp>
-        <p:nvSpPr>
-          <p:cNvPr id="4" name="Объект 3"/>
-          <p:cNvSpPr>
-            <a:spLocks noGrp="1"/>
-          </p:cNvSpPr>
-          <p:nvPr>
-            <p:ph sz="quarter" idx="12"/>
-          </p:nvPr>
-        </p:nvSpPr>
-        <p:spPr/>
-        <p:txBody>
-          <a:bodyPr>
-            <a:noAutofit/>
-          </a:bodyPr>
-          <a:lstStyle/>
-          <a:p>
-            <a:pPr marL="457200" indent="-457200" fontAlgn="ctr">
-              <a:buFont typeface="Arial" panose="020B0604020202020204" pitchFamily="34" charset="0"/>
-              <a:buChar char="•"/>
-            </a:pPr>
-            <a:r>
-              <a:rPr lang="x-none" sz="2000" dirty="0"/>
-              <a:t>Каждый тест -</a:t>
-            </a:r>
-            <a:r>
-              <a:rPr lang="ru-RU" sz="2000" dirty="0"/>
-              <a:t> это</a:t>
-            </a:r>
-            <a:r>
-              <a:rPr lang="x-none" sz="2000" dirty="0"/>
-              <a:t> мини-интеграционный тест</a:t>
-            </a:r>
-            <a:endParaRPr lang="en-US" sz="2000" dirty="0"/>
-          </a:p>
-          <a:p>
-            <a:pPr marL="457200" indent="-457200" fontAlgn="ctr">
-              <a:buFont typeface="Arial" panose="020B0604020202020204" pitchFamily="34" charset="0"/>
-              <a:buChar char="•"/>
-            </a:pPr>
-            <a:r>
-              <a:rPr lang="ru-RU" sz="2000" dirty="0"/>
-              <a:t>Позволяет тестировать стыки между модулями</a:t>
-            </a:r>
-            <a:endParaRPr lang="en-US" sz="2000" dirty="0"/>
-          </a:p>
-          <a:p>
-            <a:pPr marL="457200" indent="-457200" fontAlgn="ctr">
-              <a:buFont typeface="Arial" panose="020B0604020202020204" pitchFamily="34" charset="0"/>
-              <a:buChar char="•"/>
-            </a:pPr>
-            <a:endParaRPr lang="x-none" sz="2000" dirty="0"/>
-          </a:p>
-          <a:p>
-            <a:pPr marL="457200" indent="-457200" fontAlgn="ctr">
-              <a:buFont typeface="Arial" panose="020B0604020202020204" pitchFamily="34" charset="0"/>
-              <a:buChar char="•"/>
-            </a:pPr>
-            <a:r>
-              <a:rPr lang="x-none" sz="2000" dirty="0"/>
-              <a:t>Создаются лишние методы для получения и тестирования внутреннего состояния</a:t>
-            </a:r>
-            <a:endParaRPr lang="en-US" sz="2000" dirty="0"/>
-          </a:p>
-          <a:p>
-            <a:pPr marL="457200" indent="-457200" fontAlgn="ctr">
-              <a:buFont typeface="Arial" panose="020B0604020202020204" pitchFamily="34" charset="0"/>
-              <a:buChar char="•"/>
-            </a:pPr>
-            <a:endParaRPr lang="x-none" sz="2000" dirty="0"/>
-          </a:p>
-          <a:p>
-            <a:pPr marL="457200" indent="-457200" fontAlgn="ctr">
-              <a:buFont typeface="Arial" panose="020B0604020202020204" pitchFamily="34" charset="0"/>
-              <a:buChar char="•"/>
-            </a:pPr>
-            <a:r>
-              <a:rPr lang="en-US" sz="2000" dirty="0"/>
-              <a:t>Test Fixture: </a:t>
-            </a:r>
-            <a:r>
-              <a:rPr lang="x-none" sz="2000" dirty="0"/>
-              <a:t>Необходимо создания тестового окружения, которое для скорости приходится переиспользовать, что создает побочные эффекты</a:t>
-            </a:r>
-            <a:endParaRPr lang="ru-RU" sz="2000" dirty="0"/>
-          </a:p>
-          <a:p>
-            <a:endParaRPr lang="en-US" sz="2000" dirty="0"/>
+              <a:rPr lang="ru-RU"/>
+              <a:t>Подходы к тестированию</a:t>
+            </a:r>
+            <a:endParaRPr lang="ru-RU" dirty="0"/>
           </a:p>
         </p:txBody>
       </p:sp>
     </p:spTree>
     <p:extLst>
       <p:ext uri="{BB962C8B-B14F-4D97-AF65-F5344CB8AC3E}">
-        <p14:creationId xmlns:p14="http://schemas.microsoft.com/office/powerpoint/2010/main" val="1575640365"/>
+        <p14:creationId xmlns:p14="http://schemas.microsoft.com/office/powerpoint/2010/main" val="3707230800"/>
       </p:ext>
     </p:extLst>
   </p:cSld>
   <p:clrMapOvr>
     <a:masterClrMapping/>
   </p:clrMapOvr>
-  <mc:AlternateContent xmlns:mc="http://schemas.openxmlformats.org/markup-compatibility/2006">
-    <mc:Choice xmlns:p14="http://schemas.microsoft.com/office/powerpoint/2010/main" Requires="p14">
-      <p:transition spd="slow" p14:dur="2000"/>
-    </mc:Choice>
-    <mc:Fallback>
-      <p:transition spd="slow"/>
-    </mc:Fallback>
-  </mc:AlternateContent>
 </p:sld>
 </file>
 
@@ -18764,10 +19046,254 @@
       </p:grpSpPr>
       <p:sp>
         <p:nvSpPr>
+          <p:cNvPr id="2" name="Заголовок 1"/>
+          <p:cNvSpPr>
+            <a:spLocks noGrp="1"/>
+          </p:cNvSpPr>
+          <p:nvPr>
+            <p:ph type="title"/>
+          </p:nvPr>
+        </p:nvSpPr>
+        <p:spPr/>
+        <p:txBody>
+          <a:bodyPr/>
+          <a:lstStyle/>
+          <a:p>
+            <a:r>
+              <a:rPr lang="en-US" dirty="0"/>
+              <a:t>Behavior tests </a:t>
+            </a:r>
+            <a:r>
+              <a:rPr lang="en-US" dirty="0">
+                <a:solidFill>
+                  <a:schemeClr val="tx1"/>
+                </a:solidFill>
+              </a:rPr>
+              <a:t>vs</a:t>
+            </a:r>
+            <a:r>
+              <a:rPr lang="en-US" dirty="0"/>
+              <a:t> State tests</a:t>
+            </a:r>
+          </a:p>
+        </p:txBody>
+      </p:sp>
+      <p:sp>
+        <p:nvSpPr>
+          <p:cNvPr id="3" name="Объект 2"/>
+          <p:cNvSpPr>
+            <a:spLocks noGrp="1"/>
+          </p:cNvSpPr>
+          <p:nvPr>
+            <p:ph sz="quarter" idx="11"/>
+          </p:nvPr>
+        </p:nvSpPr>
+        <p:spPr/>
+        <p:txBody>
+          <a:bodyPr>
+            <a:normAutofit/>
+          </a:bodyPr>
+          <a:lstStyle/>
+          <a:p>
+            <a:pPr marL="457200" indent="-457200" fontAlgn="ctr">
+              <a:buFont typeface="Arial" panose="020B0604020202020204" pitchFamily="34" charset="0"/>
+              <a:buChar char="•"/>
+            </a:pPr>
+            <a:r>
+              <a:rPr lang="x-none" sz="2000" dirty="0"/>
+              <a:t>Более независимые</a:t>
+            </a:r>
+            <a:r>
+              <a:rPr lang="ru-RU" sz="2000" dirty="0"/>
+              <a:t> друг от друга</a:t>
+            </a:r>
+            <a:r>
+              <a:rPr lang="x-none" sz="2000" dirty="0"/>
+              <a:t> тесты</a:t>
+            </a:r>
+            <a:endParaRPr lang="en-US" sz="2000" dirty="0"/>
+          </a:p>
+          <a:p>
+            <a:pPr marL="457200" indent="-457200" fontAlgn="ctr">
+              <a:buFont typeface="Arial" panose="020B0604020202020204" pitchFamily="34" charset="0"/>
+              <a:buChar char="•"/>
+            </a:pPr>
+            <a:r>
+              <a:rPr lang="ru-RU" sz="2000" dirty="0"/>
+              <a:t>Методика приводит</a:t>
+            </a:r>
+            <a:r>
+              <a:rPr lang="x-none" sz="2000" dirty="0"/>
+              <a:t> к более модульному дизайну</a:t>
+            </a:r>
+            <a:endParaRPr lang="en-US" sz="2000" dirty="0"/>
+          </a:p>
+          <a:p>
+            <a:pPr marL="457200" indent="-457200" fontAlgn="ctr">
+              <a:buFont typeface="Arial" panose="020B0604020202020204" pitchFamily="34" charset="0"/>
+              <a:buChar char="•"/>
+            </a:pPr>
+            <a:endParaRPr lang="ru-RU" sz="2000" dirty="0"/>
+          </a:p>
+          <a:p>
+            <a:pPr marL="457200" indent="-457200" fontAlgn="ctr">
+              <a:buFont typeface="Arial" panose="020B0604020202020204" pitchFamily="34" charset="0"/>
+              <a:buChar char="•"/>
+            </a:pPr>
+            <a:r>
+              <a:rPr lang="ru-RU" sz="2000" dirty="0"/>
+              <a:t>В большей степени связывают реализацию и тесты, поэтому сложно менять реализацию</a:t>
+            </a:r>
+          </a:p>
+          <a:p>
+            <a:pPr marL="457200" indent="-457200" fontAlgn="ctr">
+              <a:buFont typeface="Arial" panose="020B0604020202020204" pitchFamily="34" charset="0"/>
+              <a:buChar char="•"/>
+            </a:pPr>
+            <a:endParaRPr lang="x-none" sz="2000" dirty="0"/>
+          </a:p>
+          <a:p>
+            <a:pPr marL="457200" indent="-457200" fontAlgn="ctr">
+              <a:buFont typeface="Arial" panose="020B0604020202020204" pitchFamily="34" charset="0"/>
+              <a:buChar char="•"/>
+            </a:pPr>
+            <a:r>
+              <a:rPr lang="x-none" sz="2000" dirty="0"/>
+              <a:t>Более быстрый и легкий запуск тестов</a:t>
+            </a:r>
+          </a:p>
+          <a:p>
+            <a:endParaRPr lang="en-US" sz="2000" dirty="0"/>
+          </a:p>
+        </p:txBody>
+      </p:sp>
+      <p:sp>
+        <p:nvSpPr>
+          <p:cNvPr id="4" name="Объект 3"/>
+          <p:cNvSpPr>
+            <a:spLocks noGrp="1"/>
+          </p:cNvSpPr>
+          <p:nvPr>
+            <p:ph sz="quarter" idx="12"/>
+          </p:nvPr>
+        </p:nvSpPr>
+        <p:spPr/>
+        <p:txBody>
+          <a:bodyPr>
+            <a:noAutofit/>
+          </a:bodyPr>
+          <a:lstStyle/>
+          <a:p>
+            <a:pPr marL="457200" indent="-457200" fontAlgn="ctr">
+              <a:buFont typeface="Arial" panose="020B0604020202020204" pitchFamily="34" charset="0"/>
+              <a:buChar char="•"/>
+            </a:pPr>
+            <a:r>
+              <a:rPr lang="x-none" sz="2000" dirty="0"/>
+              <a:t>Каждый тест -</a:t>
+            </a:r>
+            <a:r>
+              <a:rPr lang="ru-RU" sz="2000" dirty="0"/>
+              <a:t> это</a:t>
+            </a:r>
+            <a:r>
+              <a:rPr lang="x-none" sz="2000" dirty="0"/>
+              <a:t> мини-интеграционный тест</a:t>
+            </a:r>
+            <a:endParaRPr lang="en-US" sz="2000" dirty="0"/>
+          </a:p>
+          <a:p>
+            <a:pPr marL="457200" indent="-457200" fontAlgn="ctr">
+              <a:buFont typeface="Arial" panose="020B0604020202020204" pitchFamily="34" charset="0"/>
+              <a:buChar char="•"/>
+            </a:pPr>
+            <a:r>
+              <a:rPr lang="ru-RU" sz="2000" dirty="0"/>
+              <a:t>Позволяет тестировать стыки между модулями</a:t>
+            </a:r>
+            <a:endParaRPr lang="en-US" sz="2000" dirty="0"/>
+          </a:p>
+          <a:p>
+            <a:pPr marL="457200" indent="-457200" fontAlgn="ctr">
+              <a:buFont typeface="Arial" panose="020B0604020202020204" pitchFamily="34" charset="0"/>
+              <a:buChar char="•"/>
+            </a:pPr>
+            <a:endParaRPr lang="x-none" sz="2000" dirty="0"/>
+          </a:p>
+          <a:p>
+            <a:pPr marL="457200" indent="-457200" fontAlgn="ctr">
+              <a:buFont typeface="Arial" panose="020B0604020202020204" pitchFamily="34" charset="0"/>
+              <a:buChar char="•"/>
+            </a:pPr>
+            <a:r>
+              <a:rPr lang="x-none" sz="2000" dirty="0"/>
+              <a:t>Создаются лишние методы для получения и тестирования внутреннего состояния</a:t>
+            </a:r>
+            <a:endParaRPr lang="en-US" sz="2000" dirty="0"/>
+          </a:p>
+          <a:p>
+            <a:pPr marL="457200" indent="-457200" fontAlgn="ctr">
+              <a:buFont typeface="Arial" panose="020B0604020202020204" pitchFamily="34" charset="0"/>
+              <a:buChar char="•"/>
+            </a:pPr>
+            <a:endParaRPr lang="x-none" sz="2000" dirty="0"/>
+          </a:p>
+          <a:p>
+            <a:pPr marL="457200" indent="-457200" fontAlgn="ctr">
+              <a:buFont typeface="Arial" panose="020B0604020202020204" pitchFamily="34" charset="0"/>
+              <a:buChar char="•"/>
+            </a:pPr>
+            <a:r>
+              <a:rPr lang="en-US" sz="2000" dirty="0"/>
+              <a:t>Test Fixture: </a:t>
+            </a:r>
+            <a:r>
+              <a:rPr lang="x-none" sz="2000" dirty="0"/>
+              <a:t>Необходимо создания тестового окружения, которое для скорости приходится переиспользовать, что создает побочные эффекты</a:t>
+            </a:r>
+            <a:endParaRPr lang="ru-RU" sz="2000" dirty="0"/>
+          </a:p>
+          <a:p>
+            <a:endParaRPr lang="en-US" sz="2000" dirty="0"/>
+          </a:p>
+        </p:txBody>
+      </p:sp>
+    </p:spTree>
+    <p:extLst>
+      <p:ext uri="{BB962C8B-B14F-4D97-AF65-F5344CB8AC3E}">
+        <p14:creationId xmlns:p14="http://schemas.microsoft.com/office/powerpoint/2010/main" val="1575640365"/>
+      </p:ext>
+    </p:extLst>
+  </p:cSld>
+  <p:clrMapOvr>
+    <a:masterClrMapping/>
+  </p:clrMapOvr>
+</p:sld>
+</file>
+
+<file path=ppt/slides/slide22.xml><?xml version="1.0" encoding="utf-8"?>
+<p:sld xmlns:a="http://schemas.openxmlformats.org/drawingml/2006/main" xmlns:r="http://schemas.openxmlformats.org/officeDocument/2006/relationships" xmlns:p="http://schemas.openxmlformats.org/presentationml/2006/main" show="0">
+  <p:cSld>
+    <p:spTree>
+      <p:nvGrpSpPr>
+        <p:cNvPr id="1" name=""/>
+        <p:cNvGrpSpPr/>
+        <p:nvPr/>
+      </p:nvGrpSpPr>
+      <p:grpSpPr>
+        <a:xfrm>
+          <a:off x="0" y="0"/>
+          <a:ext cx="0" cy="0"/>
+          <a:chOff x="0" y="0"/>
+          <a:chExt cx="0" cy="0"/>
+        </a:xfrm>
+      </p:grpSpPr>
+      <p:sp>
+        <p:nvSpPr>
           <p:cNvPr id="2" name="Объект 1">
             <a:extLst>
               <a:ext uri="{FF2B5EF4-FFF2-40B4-BE49-F238E27FC236}">
-                <a16:creationId xmlns:a16="http://schemas.microsoft.com/office/drawing/2014/main" xmlns="" id="{4E05C4A9-0667-45B8-AC59-85FD9C81BD21}"/>
+                <a16:creationId xmlns:a16="http://schemas.microsoft.com/office/drawing/2014/main" id="{4E05C4A9-0667-45B8-AC59-85FD9C81BD21}"/>
               </a:ext>
             </a:extLst>
           </p:cNvPr>
@@ -18865,7 +19391,7 @@
           <p:cNvPr id="3" name="Заголовок 2">
             <a:extLst>
               <a:ext uri="{FF2B5EF4-FFF2-40B4-BE49-F238E27FC236}">
-                <a16:creationId xmlns:a16="http://schemas.microsoft.com/office/drawing/2014/main" xmlns="" id="{1B72F5E6-5086-4A59-ADDF-28C342BF771A}"/>
+                <a16:creationId xmlns:a16="http://schemas.microsoft.com/office/drawing/2014/main" id="{1B72F5E6-5086-4A59-ADDF-28C342BF771A}"/>
               </a:ext>
             </a:extLst>
           </p:cNvPr>
@@ -18893,7 +19419,7 @@
           <p:cNvPr id="5" name="Рисунок 4" descr="Речь">
             <a:extLst>
               <a:ext uri="{FF2B5EF4-FFF2-40B4-BE49-F238E27FC236}">
-                <a16:creationId xmlns:a16="http://schemas.microsoft.com/office/drawing/2014/main" xmlns="" id="{4CD964C9-55F6-450A-94E0-4A3D7D08BCAA}"/>
+                <a16:creationId xmlns:a16="http://schemas.microsoft.com/office/drawing/2014/main" id="{4CD964C9-55F6-450A-94E0-4A3D7D08BCAA}"/>
               </a:ext>
             </a:extLst>
           </p:cNvPr>
@@ -18909,7 +19435,7 @@
                 <a14:useLocalDpi xmlns:a14="http://schemas.microsoft.com/office/drawing/2010/main" val="0"/>
               </a:ext>
               <a:ext uri="{96DAC541-7B7A-43D3-8B79-37D633B846F1}">
-                <asvg:svgBlip xmlns:asvg="http://schemas.microsoft.com/office/drawing/2016/SVG/main" xmlns="" r:embed="rId4"/>
+                <asvg:svgBlip xmlns:asvg="http://schemas.microsoft.com/office/drawing/2016/SVG/main" r:embed="rId4"/>
               </a:ext>
             </a:extLst>
           </a:blip>
@@ -18937,14 +19463,6 @@
   <p:clrMapOvr>
     <a:masterClrMapping/>
   </p:clrMapOvr>
-  <mc:AlternateContent xmlns:mc="http://schemas.openxmlformats.org/markup-compatibility/2006">
-    <mc:Choice xmlns:p14="http://schemas.microsoft.com/office/powerpoint/2010/main" Requires="p14">
-      <p:transition spd="slow" p14:dur="2000"/>
-    </mc:Choice>
-    <mc:Fallback>
-      <p:transition spd="slow"/>
-    </mc:Fallback>
-  </mc:AlternateContent>
 </p:sld>
 </file>
 
@@ -19297,16 +19815,6 @@
                 <a:cs typeface="Consolas" panose="020B0609020204030204" pitchFamily="49" charset="0"/>
               </a:rPr>
               <a:t>&gt;(); </a:t>
-            </a:r>
-            <a:r>
-              <a:rPr lang="en-US" altLang="ru-RU" sz="2000" dirty="0">
-                <a:solidFill>
-                  <a:srgbClr val="969896"/>
-                </a:solidFill>
-                <a:latin typeface="Consolas" panose="020B0609020204030204" pitchFamily="49" charset="0"/>
-                <a:cs typeface="Consolas" panose="020B0609020204030204" pitchFamily="49" charset="0"/>
-              </a:rPr>
-              <a:t/>
             </a:r>
             <a:br>
               <a:rPr lang="en-US" altLang="ru-RU" sz="2000" dirty="0">
@@ -20713,10 +21221,6 @@
             <a:r>
               <a:rPr lang="en-US" sz="2800" dirty="0" err="1"/>
               <a:t>Castle.DynamicProxy</a:t>
-            </a:r>
-            <a:r>
-              <a:rPr lang="en-US" sz="2000" dirty="0"/>
-              <a:t/>
             </a:r>
             <a:br>
               <a:rPr lang="en-US" sz="2000" dirty="0"/>
@@ -21828,10 +22332,6 @@
             <a:endParaRPr lang="ru-RU" sz="2800" dirty="0"/>
           </a:p>
           <a:p>
-            <a:r>
-              <a:rPr lang="en-US" sz="2000" dirty="0"/>
-              <a:t/>
-            </a:r>
             <a:br>
               <a:rPr lang="en-US" sz="2000" dirty="0"/>
             </a:br>
@@ -22556,13 +23056,6 @@
   <p:clrMapOvr>
     <a:masterClrMapping/>
   </p:clrMapOvr>
-  <p:timing>
-    <p:tnLst>
-      <p:par>
-        <p:cTn id="1" dur="indefinite" restart="never" nodeType="tmRoot"/>
-      </p:par>
-    </p:tnLst>
-  </p:timing>
 </p:sld>
 </file>
 
@@ -22602,17 +23095,13 @@
           <a:p>
             <a:r>
               <a:rPr lang="en-US" sz="2600" b="1" dirty="0"/>
-              <a:t>Arrange</a:t>
-            </a:r>
-            <a:r>
-              <a:rPr lang="en-US" sz="2600" b="1" dirty="0" smtClean="0"/>
-              <a:t>:</a:t>
-            </a:r>
-            <a:endParaRPr lang="ru-RU" sz="2600" b="1" dirty="0" smtClean="0"/>
-          </a:p>
-          <a:p>
-            <a:r>
-              <a:rPr lang="en-US" sz="2600" dirty="0" err="1" smtClean="0">
+              <a:t>Arrange:</a:t>
+            </a:r>
+            <a:endParaRPr lang="ru-RU" sz="2600" b="1" dirty="0"/>
+          </a:p>
+          <a:p>
+            <a:r>
+              <a:rPr lang="en-US" sz="2600" dirty="0" err="1">
                 <a:solidFill>
                   <a:srgbClr val="0000FF"/>
                 </a:solidFill>
@@ -22622,7 +23111,7 @@
               <a:t>var</a:t>
             </a:r>
             <a:r>
-              <a:rPr lang="en-US" sz="2600" dirty="0" smtClean="0">
+              <a:rPr lang="en-US" sz="2600" dirty="0">
                 <a:solidFill>
                   <a:srgbClr val="0000FF"/>
                 </a:solidFill>
@@ -22632,7 +23121,7 @@
               <a:t> </a:t>
             </a:r>
             <a:r>
-              <a:rPr lang="en-US" sz="2600" dirty="0" smtClean="0">
+              <a:rPr lang="en-US" sz="2600" dirty="0">
                 <a:latin typeface="Consolas" panose="020B0609020204030204" pitchFamily="49" charset="0"/>
               </a:rPr>
               <a:t>fake = </a:t>
@@ -22678,13 +23167,13 @@
               <a:t>&lt;</a:t>
             </a:r>
             <a:r>
-              <a:rPr lang="en-US" sz="2600" dirty="0" err="1" smtClean="0">
+              <a:rPr lang="en-US" sz="2600" dirty="0" err="1">
                 <a:latin typeface="Consolas" panose="020B0609020204030204" pitchFamily="49" charset="0"/>
               </a:rPr>
               <a:t>ISomeService</a:t>
             </a:r>
             <a:r>
-              <a:rPr lang="en-US" sz="2600" dirty="0" smtClean="0">
+              <a:rPr lang="en-US" sz="2600" dirty="0">
                 <a:latin typeface="Consolas" panose="020B0609020204030204" pitchFamily="49" charset="0"/>
               </a:rPr>
               <a:t>&gt;();</a:t>
@@ -22692,7 +23181,7 @@
           </a:p>
           <a:p>
             <a:r>
-              <a:rPr lang="ru-RU" altLang="ru-RU" sz="2600" dirty="0" smtClean="0">
+              <a:rPr lang="ru-RU" altLang="ru-RU" sz="2600" dirty="0">
                 <a:solidFill>
                   <a:srgbClr val="00007F"/>
                 </a:solidFill>
@@ -22702,7 +23191,7 @@
               <a:t>A</a:t>
             </a:r>
             <a:r>
-              <a:rPr lang="ru-RU" altLang="ru-RU" sz="2600" dirty="0" smtClean="0">
+              <a:rPr lang="ru-RU" altLang="ru-RU" sz="2600" dirty="0">
                 <a:solidFill>
                   <a:srgbClr val="333333"/>
                 </a:solidFill>
@@ -22712,7 +23201,7 @@
               <a:t>.</a:t>
             </a:r>
             <a:r>
-              <a:rPr lang="en-US" altLang="ru-RU" sz="2600" dirty="0" err="1" smtClean="0">
+              <a:rPr lang="en-US" altLang="ru-RU" sz="2600" dirty="0" err="1">
                 <a:solidFill>
                   <a:srgbClr val="2B91AF"/>
                 </a:solidFill>
@@ -22722,16 +23211,10 @@
               <a:t>CallTo</a:t>
             </a:r>
             <a:r>
-              <a:rPr lang="en-US" sz="2600" dirty="0" smtClean="0">
-                <a:latin typeface="Consolas" panose="020B0609020204030204" pitchFamily="49" charset="0"/>
-              </a:rPr>
-              <a:t>(() </a:t>
-            </a:r>
-            <a:r>
               <a:rPr lang="en-US" sz="2600" dirty="0">
                 <a:latin typeface="Consolas" panose="020B0609020204030204" pitchFamily="49" charset="0"/>
               </a:rPr>
-              <a:t>=&gt; </a:t>
+              <a:t>(() =&gt; </a:t>
             </a:r>
             <a:r>
               <a:rPr lang="en-US" sz="2600" dirty="0" err="1">
@@ -22827,17 +23310,8 @@
               <a:rPr lang="en-US" sz="2600" dirty="0">
                 <a:latin typeface="Consolas" panose="020B0609020204030204" pitchFamily="49" charset="0"/>
               </a:rPr>
-              <a:t>value = </a:t>
-            </a:r>
-            <a:r>
-              <a:rPr lang="en-US" sz="2600" dirty="0" smtClean="0">
-                <a:latin typeface="Consolas" panose="020B0609020204030204" pitchFamily="49" charset="0"/>
-              </a:rPr>
-              <a:t>"42";</a:t>
-            </a:r>
-            <a:endParaRPr lang="en-US" sz="2600" dirty="0">
-              <a:latin typeface="Consolas" panose="020B0609020204030204" pitchFamily="49" charset="0"/>
-            </a:endParaRPr>
+              <a:t>value = "42";</a:t>
+            </a:r>
           </a:p>
           <a:p>
             <a:r>
@@ -22871,16 +23345,10 @@
               <a:t>CallTo</a:t>
             </a:r>
             <a:r>
-              <a:rPr lang="en-US" sz="2600" dirty="0" smtClean="0">
-                <a:latin typeface="Consolas" panose="020B0609020204030204" pitchFamily="49" charset="0"/>
-              </a:rPr>
-              <a:t>(() </a:t>
-            </a:r>
-            <a:r>
               <a:rPr lang="en-US" sz="2600" dirty="0">
                 <a:latin typeface="Consolas" panose="020B0609020204030204" pitchFamily="49" charset="0"/>
               </a:rPr>
-              <a:t>=&gt; </a:t>
+              <a:t>(() =&gt; </a:t>
             </a:r>
             <a:r>
               <a:rPr lang="en-US" sz="2600" dirty="0" err="1">
@@ -23006,13 +23474,6 @@
   <p:clrMapOvr>
     <a:masterClrMapping/>
   </p:clrMapOvr>
-  <p:timing>
-    <p:tnLst>
-      <p:par>
-        <p:cTn id="1" dur="indefinite" restart="never" nodeType="tmRoot"/>
-      </p:par>
-    </p:tnLst>
-  </p:timing>
 </p:sld>
 </file>
 
@@ -23064,44 +23525,182 @@
               <a:rPr lang="en-US" sz="2400" dirty="0">
                 <a:latin typeface="Consolas" panose="020B0609020204030204" pitchFamily="49" charset="0"/>
               </a:rPr>
-              <a:t> value = </a:t>
-            </a:r>
-            <a:r>
-              <a:rPr lang="en-US" sz="2400" dirty="0" smtClean="0">
-                <a:latin typeface="Consolas" panose="020B0609020204030204" pitchFamily="49" charset="0"/>
-              </a:rPr>
-              <a:t>"42";</a:t>
-            </a:r>
+              <a:t> value = "42";</a:t>
+            </a:r>
+          </a:p>
+          <a:p>
+            <a:r>
+              <a:rPr lang="en-US" sz="2400" dirty="0">
+                <a:solidFill>
+                  <a:srgbClr val="0000FF"/>
+                </a:solidFill>
+                <a:latin typeface="Consolas" panose="020B0609020204030204" pitchFamily="49" charset="0"/>
+                <a:cs typeface="Consolas" panose="020B0609020204030204" pitchFamily="49" charset="0"/>
+              </a:rPr>
+              <a:t>string</a:t>
+            </a:r>
+            <a:r>
+              <a:rPr lang="en-US" sz="2400" dirty="0">
+                <a:latin typeface="Consolas" panose="020B0609020204030204" pitchFamily="49" charset="0"/>
+              </a:rPr>
+              <a:t> _;</a:t>
+            </a:r>
+          </a:p>
+          <a:p>
+            <a:r>
+              <a:rPr lang="en-US" sz="2400" dirty="0" err="1">
+                <a:latin typeface="Consolas" panose="020B0609020204030204" pitchFamily="49" charset="0"/>
+              </a:rPr>
+              <a:t>A.</a:t>
+            </a:r>
+            <a:r>
+              <a:rPr lang="en-US" sz="2400" dirty="0" err="1">
+                <a:solidFill>
+                  <a:srgbClr val="2B91AF"/>
+                </a:solidFill>
+                <a:latin typeface="Consolas" panose="020B0609020204030204" pitchFamily="49" charset="0"/>
+                <a:cs typeface="Consolas" panose="020B0609020204030204" pitchFamily="49" charset="0"/>
+              </a:rPr>
+              <a:t>CallTo</a:t>
+            </a:r>
+            <a:r>
+              <a:rPr lang="en-US" sz="2400" dirty="0">
+                <a:latin typeface="Consolas" panose="020B0609020204030204" pitchFamily="49" charset="0"/>
+              </a:rPr>
+              <a:t>(() =&gt; </a:t>
+            </a:r>
+            <a:r>
+              <a:rPr lang="en-US" sz="2400" dirty="0" err="1">
+                <a:latin typeface="Consolas" panose="020B0609020204030204" pitchFamily="49" charset="0"/>
+              </a:rPr>
+              <a:t>fake.</a:t>
+            </a:r>
+            <a:r>
+              <a:rPr lang="en-US" sz="2400" dirty="0" err="1">
+                <a:solidFill>
+                  <a:srgbClr val="2B91AF"/>
+                </a:solidFill>
+                <a:latin typeface="Consolas" panose="020B0609020204030204" pitchFamily="49" charset="0"/>
+                <a:cs typeface="Consolas" panose="020B0609020204030204" pitchFamily="49" charset="0"/>
+              </a:rPr>
+              <a:t>TryRead</a:t>
+            </a:r>
+            <a:r>
+              <a:rPr lang="en-US" sz="2400" dirty="0">
+                <a:latin typeface="Consolas" panose="020B0609020204030204" pitchFamily="49" charset="0"/>
+              </a:rPr>
+              <a:t>(id, </a:t>
+            </a:r>
+            <a:r>
+              <a:rPr lang="en-US" sz="2400" dirty="0">
+                <a:solidFill>
+                  <a:srgbClr val="0000FF"/>
+                </a:solidFill>
+                <a:latin typeface="Consolas" panose="020B0609020204030204" pitchFamily="49" charset="0"/>
+                <a:cs typeface="Consolas" panose="020B0609020204030204" pitchFamily="49" charset="0"/>
+              </a:rPr>
+              <a:t>out</a:t>
+            </a:r>
+            <a:r>
+              <a:rPr lang="en-US" sz="2400" dirty="0">
+                <a:latin typeface="Consolas" panose="020B0609020204030204" pitchFamily="49" charset="0"/>
+              </a:rPr>
+              <a:t> _))</a:t>
+            </a:r>
+          </a:p>
+          <a:p>
+            <a:r>
+              <a:rPr lang="en-US" sz="2400" dirty="0">
+                <a:latin typeface="Consolas" panose="020B0609020204030204" pitchFamily="49" charset="0"/>
+              </a:rPr>
+              <a:t>	.</a:t>
+            </a:r>
+            <a:r>
+              <a:rPr lang="en-US" sz="2400" dirty="0">
+                <a:solidFill>
+                  <a:srgbClr val="2B91AF"/>
+                </a:solidFill>
+                <a:latin typeface="Consolas" panose="020B0609020204030204" pitchFamily="49" charset="0"/>
+                <a:cs typeface="Consolas" panose="020B0609020204030204" pitchFamily="49" charset="0"/>
+              </a:rPr>
+              <a:t>Returns</a:t>
+            </a:r>
+            <a:r>
+              <a:rPr lang="en-US" sz="2400" dirty="0">
+                <a:latin typeface="Consolas" panose="020B0609020204030204" pitchFamily="49" charset="0"/>
+              </a:rPr>
+              <a:t>(</a:t>
+            </a:r>
+            <a:r>
+              <a:rPr lang="en-US" sz="2400" dirty="0">
+                <a:solidFill>
+                  <a:srgbClr val="0000FF"/>
+                </a:solidFill>
+                <a:latin typeface="Consolas" panose="020B0609020204030204" pitchFamily="49" charset="0"/>
+                <a:cs typeface="Consolas" panose="020B0609020204030204" pitchFamily="49" charset="0"/>
+              </a:rPr>
+              <a:t>true</a:t>
+            </a:r>
+            <a:r>
+              <a:rPr lang="en-US" sz="2400" dirty="0">
+                <a:latin typeface="Consolas" panose="020B0609020204030204" pitchFamily="49" charset="0"/>
+              </a:rPr>
+              <a:t>)</a:t>
+            </a:r>
+            <a:endParaRPr lang="ru-RU" sz="2400" dirty="0">
+              <a:latin typeface="Consolas" panose="020B0609020204030204" pitchFamily="49" charset="0"/>
+            </a:endParaRPr>
+          </a:p>
+          <a:p>
+            <a:r>
+              <a:rPr lang="ru-RU" sz="2400" dirty="0">
+                <a:latin typeface="Consolas" panose="020B0609020204030204" pitchFamily="49" charset="0"/>
+              </a:rPr>
+              <a:t>	</a:t>
+            </a:r>
+            <a:r>
+              <a:rPr lang="en-US" sz="2400" dirty="0">
+                <a:latin typeface="Consolas" panose="020B0609020204030204" pitchFamily="49" charset="0"/>
+              </a:rPr>
+              <a:t>.</a:t>
+            </a:r>
+            <a:r>
+              <a:rPr lang="en-US" sz="2400" dirty="0" err="1">
+                <a:solidFill>
+                  <a:srgbClr val="2B91AF"/>
+                </a:solidFill>
+                <a:latin typeface="Consolas" panose="020B0609020204030204" pitchFamily="49" charset="0"/>
+                <a:cs typeface="Consolas" panose="020B0609020204030204" pitchFamily="49" charset="0"/>
+              </a:rPr>
+              <a:t>AssignsOutAndRefParameters</a:t>
+            </a:r>
+            <a:r>
+              <a:rPr lang="en-US" sz="2400" dirty="0">
+                <a:latin typeface="Consolas" panose="020B0609020204030204" pitchFamily="49" charset="0"/>
+              </a:rPr>
+              <a:t>(value);</a:t>
+            </a:r>
+          </a:p>
+          <a:p>
+            <a:r>
+              <a:rPr lang="en-US" sz="2400" dirty="0">
+                <a:solidFill>
+                  <a:schemeClr val="bg2">
+                    <a:lumMod val="75000"/>
+                  </a:schemeClr>
+                </a:solidFill>
+                <a:latin typeface="Consolas" panose="020B0609020204030204" pitchFamily="49" charset="0"/>
+              </a:rPr>
+              <a:t>&lt;=&gt;</a:t>
+            </a:r>
+          </a:p>
+          <a:p>
             <a:endParaRPr lang="en-US" sz="2400" dirty="0">
               <a:latin typeface="Consolas" panose="020B0609020204030204" pitchFamily="49" charset="0"/>
             </a:endParaRPr>
           </a:p>
           <a:p>
             <a:r>
-              <a:rPr lang="en-US" sz="2400" dirty="0" smtClean="0">
-                <a:solidFill>
-                  <a:srgbClr val="0000FF"/>
-                </a:solidFill>
-                <a:latin typeface="Consolas" panose="020B0609020204030204" pitchFamily="49" charset="0"/>
-                <a:cs typeface="Consolas" panose="020B0609020204030204" pitchFamily="49" charset="0"/>
-              </a:rPr>
-              <a:t>string</a:t>
-            </a:r>
-            <a:r>
-              <a:rPr lang="en-US" sz="2400" dirty="0" smtClean="0">
-                <a:latin typeface="Consolas" panose="020B0609020204030204" pitchFamily="49" charset="0"/>
-              </a:rPr>
-              <a:t> </a:t>
-            </a:r>
-            <a:r>
-              <a:rPr lang="en-US" sz="2400" dirty="0">
-                <a:latin typeface="Consolas" panose="020B0609020204030204" pitchFamily="49" charset="0"/>
-              </a:rPr>
-              <a:t>_;</a:t>
-            </a:r>
-          </a:p>
-          <a:p>
-            <a:r>
               <a:rPr lang="en-US" sz="2400" dirty="0" err="1">
                 <a:latin typeface="Consolas" panose="020B0609020204030204" pitchFamily="49" charset="0"/>
               </a:rPr>
@@ -23109,167 +23708,6 @@
             </a:r>
             <a:r>
               <a:rPr lang="en-US" sz="2400" dirty="0" err="1">
-                <a:solidFill>
-                  <a:srgbClr val="2B91AF"/>
-                </a:solidFill>
-                <a:latin typeface="Consolas" panose="020B0609020204030204" pitchFamily="49" charset="0"/>
-                <a:cs typeface="Consolas" panose="020B0609020204030204" pitchFamily="49" charset="0"/>
-              </a:rPr>
-              <a:t>CallTo</a:t>
-            </a:r>
-            <a:r>
-              <a:rPr lang="en-US" sz="2400" dirty="0">
-                <a:latin typeface="Consolas" panose="020B0609020204030204" pitchFamily="49" charset="0"/>
-              </a:rPr>
-              <a:t>(() =&gt; </a:t>
-            </a:r>
-            <a:r>
-              <a:rPr lang="en-US" sz="2400" dirty="0" err="1">
-                <a:latin typeface="Consolas" panose="020B0609020204030204" pitchFamily="49" charset="0"/>
-              </a:rPr>
-              <a:t>fake.</a:t>
-            </a:r>
-            <a:r>
-              <a:rPr lang="en-US" sz="2400" dirty="0" err="1">
-                <a:solidFill>
-                  <a:srgbClr val="2B91AF"/>
-                </a:solidFill>
-                <a:latin typeface="Consolas" panose="020B0609020204030204" pitchFamily="49" charset="0"/>
-                <a:cs typeface="Consolas" panose="020B0609020204030204" pitchFamily="49" charset="0"/>
-              </a:rPr>
-              <a:t>TryRead</a:t>
-            </a:r>
-            <a:r>
-              <a:rPr lang="en-US" sz="2400" dirty="0">
-                <a:latin typeface="Consolas" panose="020B0609020204030204" pitchFamily="49" charset="0"/>
-              </a:rPr>
-              <a:t>(id, </a:t>
-            </a:r>
-            <a:r>
-              <a:rPr lang="en-US" sz="2400" dirty="0">
-                <a:solidFill>
-                  <a:srgbClr val="0000FF"/>
-                </a:solidFill>
-                <a:latin typeface="Consolas" panose="020B0609020204030204" pitchFamily="49" charset="0"/>
-                <a:cs typeface="Consolas" panose="020B0609020204030204" pitchFamily="49" charset="0"/>
-              </a:rPr>
-              <a:t>out</a:t>
-            </a:r>
-            <a:r>
-              <a:rPr lang="en-US" sz="2400" dirty="0">
-                <a:latin typeface="Consolas" panose="020B0609020204030204" pitchFamily="49" charset="0"/>
-              </a:rPr>
-              <a:t> _))</a:t>
-            </a:r>
-          </a:p>
-          <a:p>
-            <a:r>
-              <a:rPr lang="en-US" sz="2400" dirty="0">
-                <a:latin typeface="Consolas" panose="020B0609020204030204" pitchFamily="49" charset="0"/>
-              </a:rPr>
-              <a:t>	.</a:t>
-            </a:r>
-            <a:r>
-              <a:rPr lang="en-US" sz="2400" dirty="0">
-                <a:solidFill>
-                  <a:srgbClr val="2B91AF"/>
-                </a:solidFill>
-                <a:latin typeface="Consolas" panose="020B0609020204030204" pitchFamily="49" charset="0"/>
-                <a:cs typeface="Consolas" panose="020B0609020204030204" pitchFamily="49" charset="0"/>
-              </a:rPr>
-              <a:t>Returns</a:t>
-            </a:r>
-            <a:r>
-              <a:rPr lang="en-US" sz="2400" dirty="0">
-                <a:latin typeface="Consolas" panose="020B0609020204030204" pitchFamily="49" charset="0"/>
-              </a:rPr>
-              <a:t>(</a:t>
-            </a:r>
-            <a:r>
-              <a:rPr lang="en-US" sz="2400" dirty="0">
-                <a:solidFill>
-                  <a:srgbClr val="0000FF"/>
-                </a:solidFill>
-                <a:latin typeface="Consolas" panose="020B0609020204030204" pitchFamily="49" charset="0"/>
-                <a:cs typeface="Consolas" panose="020B0609020204030204" pitchFamily="49" charset="0"/>
-              </a:rPr>
-              <a:t>true</a:t>
-            </a:r>
-            <a:r>
-              <a:rPr lang="en-US" sz="2400" dirty="0">
-                <a:latin typeface="Consolas" panose="020B0609020204030204" pitchFamily="49" charset="0"/>
-              </a:rPr>
-              <a:t>)</a:t>
-            </a:r>
-            <a:endParaRPr lang="ru-RU" sz="2400" dirty="0">
-              <a:latin typeface="Consolas" panose="020B0609020204030204" pitchFamily="49" charset="0"/>
-            </a:endParaRPr>
-          </a:p>
-          <a:p>
-            <a:r>
-              <a:rPr lang="ru-RU" sz="2400" dirty="0">
-                <a:latin typeface="Consolas" panose="020B0609020204030204" pitchFamily="49" charset="0"/>
-              </a:rPr>
-              <a:t>	</a:t>
-            </a:r>
-            <a:r>
-              <a:rPr lang="en-US" sz="2400" dirty="0">
-                <a:latin typeface="Consolas" panose="020B0609020204030204" pitchFamily="49" charset="0"/>
-              </a:rPr>
-              <a:t>.</a:t>
-            </a:r>
-            <a:r>
-              <a:rPr lang="en-US" sz="2400" dirty="0" err="1">
-                <a:solidFill>
-                  <a:srgbClr val="2B91AF"/>
-                </a:solidFill>
-                <a:latin typeface="Consolas" panose="020B0609020204030204" pitchFamily="49" charset="0"/>
-                <a:cs typeface="Consolas" panose="020B0609020204030204" pitchFamily="49" charset="0"/>
-              </a:rPr>
-              <a:t>AssignsOutAndRefParameters</a:t>
-            </a:r>
-            <a:r>
-              <a:rPr lang="en-US" sz="2400" dirty="0">
-                <a:latin typeface="Consolas" panose="020B0609020204030204" pitchFamily="49" charset="0"/>
-              </a:rPr>
-              <a:t>(value);</a:t>
-            </a:r>
-          </a:p>
-          <a:p>
-            <a:r>
-              <a:rPr lang="en-US" sz="2400" dirty="0" smtClean="0">
-                <a:solidFill>
-                  <a:schemeClr val="bg2">
-                    <a:lumMod val="75000"/>
-                  </a:schemeClr>
-                </a:solidFill>
-                <a:latin typeface="Consolas" panose="020B0609020204030204" pitchFamily="49" charset="0"/>
-              </a:rPr>
-              <a:t>&lt;=&gt;</a:t>
-            </a:r>
-            <a:endParaRPr lang="en-US" sz="2400" dirty="0">
-              <a:solidFill>
-                <a:schemeClr val="bg2">
-                  <a:lumMod val="75000"/>
-                </a:schemeClr>
-              </a:solidFill>
-              <a:latin typeface="Consolas" panose="020B0609020204030204" pitchFamily="49" charset="0"/>
-            </a:endParaRPr>
-          </a:p>
-          <a:p>
-            <a:endParaRPr lang="en-US" sz="2400" dirty="0" smtClean="0">
-              <a:latin typeface="Consolas" panose="020B0609020204030204" pitchFamily="49" charset="0"/>
-            </a:endParaRPr>
-          </a:p>
-          <a:p>
-            <a:r>
-              <a:rPr lang="en-US" sz="2400" dirty="0" err="1" smtClean="0">
-                <a:latin typeface="Consolas" panose="020B0609020204030204" pitchFamily="49" charset="0"/>
-              </a:rPr>
-              <a:t>A.</a:t>
-            </a:r>
-            <a:r>
-              <a:rPr lang="en-US" sz="2400" dirty="0" err="1" smtClean="0">
                 <a:solidFill>
                   <a:srgbClr val="2B91AF"/>
                 </a:solidFill>
@@ -23584,7 +24022,7 @@
       </p:grpSpPr>
       <p:sp>
         <p:nvSpPr>
-          <p:cNvPr id="3" name="Объект 2"/>
+          <p:cNvPr id="4" name="Объект 3"/>
           <p:cNvSpPr>
             <a:spLocks noGrp="1"/>
           </p:cNvSpPr>
@@ -23599,38 +24037,137 @@
           </a:bodyPr>
           <a:lstStyle/>
           <a:p>
-            <a:pPr marL="457200" indent="-457200">
-              <a:buFont typeface="Arial" panose="020B0604020202020204" pitchFamily="34" charset="0"/>
-              <a:buChar char="•"/>
-            </a:pPr>
-            <a:r>
-              <a:rPr lang="ru-RU" dirty="0"/>
-              <a:t>Не надо писать собственную заглушку</a:t>
-            </a:r>
-          </a:p>
-          <a:p>
-            <a:pPr marL="457200" indent="-457200">
-              <a:buFont typeface="Arial" panose="020B0604020202020204" pitchFamily="34" charset="0"/>
-              <a:buChar char="•"/>
-            </a:pPr>
-            <a:r>
-              <a:rPr lang="ru-RU" dirty="0"/>
-              <a:t>Можно тестировать, когда реализации зависимости еще нет</a:t>
-            </a:r>
-          </a:p>
-          <a:p>
-            <a:pPr marL="457200" indent="-457200">
-              <a:buFont typeface="Arial" panose="020B0604020202020204" pitchFamily="34" charset="0"/>
-              <a:buChar char="•"/>
-            </a:pPr>
-            <a:r>
-              <a:rPr lang="ru-RU" dirty="0" err="1"/>
-              <a:t>Моки</a:t>
-            </a:r>
-            <a:r>
-              <a:rPr lang="ru-RU" dirty="0"/>
-              <a:t> позволяют тестировать количество вызовов, что иногда существенно</a:t>
-            </a:r>
+            <a:r>
+              <a:rPr lang="en-US" sz="2600" dirty="0">
+                <a:solidFill>
+                  <a:srgbClr val="0000FF"/>
+                </a:solidFill>
+                <a:latin typeface="Consolas" panose="020B0609020204030204" pitchFamily="49" charset="0"/>
+                <a:cs typeface="Consolas" panose="020B0609020204030204" pitchFamily="49" charset="0"/>
+              </a:rPr>
+              <a:t>var </a:t>
+            </a:r>
+            <a:r>
+              <a:rPr lang="en-US" sz="2600" dirty="0">
+                <a:latin typeface="Consolas" panose="020B0609020204030204" pitchFamily="49" charset="0"/>
+              </a:rPr>
+              <a:t>value = "42";</a:t>
+            </a:r>
+          </a:p>
+          <a:p>
+            <a:r>
+              <a:rPr lang="ru-RU" altLang="ru-RU" sz="2600" dirty="0">
+                <a:solidFill>
+                  <a:srgbClr val="00007F"/>
+                </a:solidFill>
+                <a:latin typeface="Consolas" panose="020B0609020204030204" pitchFamily="49" charset="0"/>
+                <a:cs typeface="Consolas" panose="020B0609020204030204" pitchFamily="49" charset="0"/>
+              </a:rPr>
+              <a:t>A</a:t>
+            </a:r>
+            <a:r>
+              <a:rPr lang="ru-RU" altLang="ru-RU" sz="2600" dirty="0">
+                <a:solidFill>
+                  <a:srgbClr val="333333"/>
+                </a:solidFill>
+                <a:latin typeface="Consolas" panose="020B0609020204030204" pitchFamily="49" charset="0"/>
+                <a:cs typeface="Consolas" panose="020B0609020204030204" pitchFamily="49" charset="0"/>
+              </a:rPr>
+              <a:t>.</a:t>
+            </a:r>
+            <a:r>
+              <a:rPr lang="en-US" altLang="ru-RU" sz="2600" dirty="0" err="1">
+                <a:solidFill>
+                  <a:srgbClr val="2B91AF"/>
+                </a:solidFill>
+                <a:latin typeface="Consolas" panose="020B0609020204030204" pitchFamily="49" charset="0"/>
+                <a:cs typeface="Consolas" panose="020B0609020204030204" pitchFamily="49" charset="0"/>
+              </a:rPr>
+              <a:t>CallTo</a:t>
+            </a:r>
+            <a:r>
+              <a:rPr lang="en-US" sz="2600" dirty="0">
+                <a:latin typeface="Consolas" panose="020B0609020204030204" pitchFamily="49" charset="0"/>
+              </a:rPr>
+              <a:t>(() =&gt; </a:t>
+            </a:r>
+            <a:r>
+              <a:rPr lang="en-US" sz="2600" dirty="0" err="1">
+                <a:latin typeface="Consolas" panose="020B0609020204030204" pitchFamily="49" charset="0"/>
+              </a:rPr>
+              <a:t>fake.</a:t>
+            </a:r>
+            <a:r>
+              <a:rPr lang="en-US" sz="2600" dirty="0" err="1">
+                <a:solidFill>
+                  <a:srgbClr val="2B91AF"/>
+                </a:solidFill>
+                <a:latin typeface="Consolas" panose="020B0609020204030204" pitchFamily="49" charset="0"/>
+                <a:cs typeface="Consolas" panose="020B0609020204030204" pitchFamily="49" charset="0"/>
+              </a:rPr>
+              <a:t>TryRead</a:t>
+            </a:r>
+            <a:r>
+              <a:rPr lang="en-US" sz="2600" dirty="0">
+                <a:latin typeface="Consolas" panose="020B0609020204030204" pitchFamily="49" charset="0"/>
+              </a:rPr>
+              <a:t>(id, </a:t>
+            </a:r>
+            <a:r>
+              <a:rPr lang="en-US" sz="2600" dirty="0">
+                <a:solidFill>
+                  <a:srgbClr val="0000FF"/>
+                </a:solidFill>
+                <a:latin typeface="Consolas" panose="020B0609020204030204" pitchFamily="49" charset="0"/>
+                <a:cs typeface="Consolas" panose="020B0609020204030204" pitchFamily="49" charset="0"/>
+              </a:rPr>
+              <a:t>out</a:t>
+            </a:r>
+            <a:r>
+              <a:rPr lang="en-US" sz="2600" dirty="0">
+                <a:latin typeface="Consolas" panose="020B0609020204030204" pitchFamily="49" charset="0"/>
+              </a:rPr>
+              <a:t> value))</a:t>
+            </a:r>
+          </a:p>
+          <a:p>
+            <a:r>
+              <a:rPr lang="en-US" sz="2600" dirty="0">
+                <a:latin typeface="Consolas" panose="020B0609020204030204" pitchFamily="49" charset="0"/>
+              </a:rPr>
+              <a:t>	.</a:t>
+            </a:r>
+            <a:r>
+              <a:rPr lang="en-US" sz="2600" dirty="0" err="1">
+                <a:solidFill>
+                  <a:srgbClr val="2B91AF"/>
+                </a:solidFill>
+                <a:latin typeface="Consolas" panose="020B0609020204030204" pitchFamily="49" charset="0"/>
+                <a:cs typeface="Consolas" panose="020B0609020204030204" pitchFamily="49" charset="0"/>
+              </a:rPr>
+              <a:t>MustHaveHappened</a:t>
+            </a:r>
+            <a:r>
+              <a:rPr lang="en-US" sz="2600" dirty="0">
+                <a:latin typeface="Consolas" panose="020B0609020204030204" pitchFamily="49" charset="0"/>
+              </a:rPr>
+              <a:t>(</a:t>
+            </a:r>
+            <a:r>
+              <a:rPr lang="en-US" sz="2600" b="1" dirty="0" err="1">
+                <a:latin typeface="Consolas" panose="020B0609020204030204" pitchFamily="49" charset="0"/>
+              </a:rPr>
+              <a:t>Repeated.Exactly.Twice</a:t>
+            </a:r>
+            <a:r>
+              <a:rPr lang="en-US" sz="2600" dirty="0">
+                <a:latin typeface="Consolas" panose="020B0609020204030204" pitchFamily="49" charset="0"/>
+              </a:rPr>
+              <a:t>)</a:t>
+            </a:r>
+          </a:p>
+          <a:p>
+            <a:endParaRPr lang="en-US" sz="2600" dirty="0"/>
           </a:p>
         </p:txBody>
       </p:sp>
@@ -23657,7 +24194,7 @@
                   <a:schemeClr val="tx1"/>
                 </a:solidFill>
               </a:rPr>
-              <a:t>Разбор задачи</a:t>
+              <a:t>Задача</a:t>
             </a:r>
             <a:r>
               <a:rPr lang="ru-RU" dirty="0"/>
@@ -23665,7 +24202,7 @@
             </a:r>
             <a:r>
               <a:rPr lang="en-US" dirty="0" err="1"/>
-              <a:t>tHINGcACHE</a:t>
+              <a:t>ThingCache</a:t>
             </a:r>
             <a:endParaRPr lang="ru-RU" dirty="0"/>
           </a:p>
@@ -23674,193 +24211,13 @@
     </p:spTree>
     <p:extLst>
       <p:ext uri="{BB962C8B-B14F-4D97-AF65-F5344CB8AC3E}">
-        <p14:creationId xmlns:p14="http://schemas.microsoft.com/office/powerpoint/2010/main" val="2068482046"/>
+        <p14:creationId xmlns:p14="http://schemas.microsoft.com/office/powerpoint/2010/main" val="4150092886"/>
       </p:ext>
     </p:extLst>
   </p:cSld>
   <p:clrMapOvr>
     <a:masterClrMapping/>
   </p:clrMapOvr>
-  <p:timing>
-    <p:tnLst>
-      <p:par>
-        <p:cTn id="1" dur="indefinite" restart="never" nodeType="tmRoot">
-          <p:childTnLst>
-            <p:seq concurrent="1" nextAc="seek">
-              <p:cTn id="2" dur="indefinite" nodeType="mainSeq">
-                <p:childTnLst>
-                  <p:par>
-                    <p:cTn id="3" fill="hold">
-                      <p:stCondLst>
-                        <p:cond delay="indefinite"/>
-                      </p:stCondLst>
-                      <p:childTnLst>
-                        <p:par>
-                          <p:cTn id="4" fill="hold">
-                            <p:stCondLst>
-                              <p:cond delay="0"/>
-                            </p:stCondLst>
-                            <p:childTnLst>
-                              <p:par>
-                                <p:cTn id="5" presetID="1" presetClass="entr" presetSubtype="0" fill="hold" grpId="0" nodeType="clickEffect">
-                                  <p:stCondLst>
-                                    <p:cond delay="0"/>
-                                  </p:stCondLst>
-                                  <p:childTnLst>
-                                    <p:set>
-                                      <p:cBhvr>
-                                        <p:cTn id="6" dur="1" fill="hold">
-                                          <p:stCondLst>
-                                            <p:cond delay="0"/>
-                                          </p:stCondLst>
-                                        </p:cTn>
-                                        <p:tgtEl>
-                                          <p:spTgt spid="3">
-                                            <p:txEl>
-                                              <p:pRg st="0" end="0"/>
-                                            </p:txEl>
-                                          </p:spTgt>
-                                        </p:tgtEl>
-                                        <p:attrNameLst>
-                                          <p:attrName>style.visibility</p:attrName>
-                                        </p:attrNameLst>
-                                      </p:cBhvr>
-                                      <p:to>
-                                        <p:strVal val="visible"/>
-                                      </p:to>
-                                    </p:set>
-                                  </p:childTnLst>
-                                </p:cTn>
-                              </p:par>
-                            </p:childTnLst>
-                          </p:cTn>
-                        </p:par>
-                      </p:childTnLst>
-                    </p:cTn>
-                  </p:par>
-                  <p:par>
-                    <p:cTn id="7" fill="hold">
-                      <p:stCondLst>
-                        <p:cond delay="indefinite"/>
-                      </p:stCondLst>
-                      <p:childTnLst>
-                        <p:par>
-                          <p:cTn id="8" fill="hold">
-                            <p:stCondLst>
-                              <p:cond delay="0"/>
-                            </p:stCondLst>
-                            <p:childTnLst>
-                              <p:par>
-                                <p:cTn id="9" presetID="1" presetClass="entr" presetSubtype="0" fill="hold" grpId="0" nodeType="clickEffect">
-                                  <p:stCondLst>
-                                    <p:cond delay="0"/>
-                                  </p:stCondLst>
-                                  <p:childTnLst>
-                                    <p:set>
-                                      <p:cBhvr>
-                                        <p:cTn id="10" dur="1" fill="hold">
-                                          <p:stCondLst>
-                                            <p:cond delay="0"/>
-                                          </p:stCondLst>
-                                        </p:cTn>
-                                        <p:tgtEl>
-                                          <p:spTgt spid="3">
-                                            <p:txEl>
-                                              <p:pRg st="1" end="1"/>
-                                            </p:txEl>
-                                          </p:spTgt>
-                                        </p:tgtEl>
-                                        <p:attrNameLst>
-                                          <p:attrName>style.visibility</p:attrName>
-                                        </p:attrNameLst>
-                                      </p:cBhvr>
-                                      <p:to>
-                                        <p:strVal val="visible"/>
-                                      </p:to>
-                                    </p:set>
-                                  </p:childTnLst>
-                                </p:cTn>
-                              </p:par>
-                            </p:childTnLst>
-                          </p:cTn>
-                        </p:par>
-                      </p:childTnLst>
-                    </p:cTn>
-                  </p:par>
-                  <p:par>
-                    <p:cTn id="11" fill="hold">
-                      <p:stCondLst>
-                        <p:cond delay="indefinite"/>
-                      </p:stCondLst>
-                      <p:childTnLst>
-                        <p:par>
-                          <p:cTn id="12" fill="hold">
-                            <p:stCondLst>
-                              <p:cond delay="0"/>
-                            </p:stCondLst>
-                            <p:childTnLst>
-                              <p:par>
-                                <p:cTn id="13" presetID="1" presetClass="entr" presetSubtype="0" fill="hold" grpId="0" nodeType="clickEffect">
-                                  <p:stCondLst>
-                                    <p:cond delay="0"/>
-                                  </p:stCondLst>
-                                  <p:childTnLst>
-                                    <p:set>
-                                      <p:cBhvr>
-                                        <p:cTn id="14" dur="1" fill="hold">
-                                          <p:stCondLst>
-                                            <p:cond delay="0"/>
-                                          </p:stCondLst>
-                                        </p:cTn>
-                                        <p:tgtEl>
-                                          <p:spTgt spid="3">
-                                            <p:txEl>
-                                              <p:pRg st="2" end="2"/>
-                                            </p:txEl>
-                                          </p:spTgt>
-                                        </p:tgtEl>
-                                        <p:attrNameLst>
-                                          <p:attrName>style.visibility</p:attrName>
-                                        </p:attrNameLst>
-                                      </p:cBhvr>
-                                      <p:to>
-                                        <p:strVal val="visible"/>
-                                      </p:to>
-                                    </p:set>
-                                  </p:childTnLst>
-                                </p:cTn>
-                              </p:par>
-                            </p:childTnLst>
-                          </p:cTn>
-                        </p:par>
-                      </p:childTnLst>
-                    </p:cTn>
-                  </p:par>
-                </p:childTnLst>
-              </p:cTn>
-              <p:prevCondLst>
-                <p:cond evt="onPrev" delay="0">
-                  <p:tgtEl>
-                    <p:sldTgt/>
-                  </p:tgtEl>
-                </p:cond>
-              </p:prevCondLst>
-              <p:nextCondLst>
-                <p:cond evt="onNext" delay="0">
-                  <p:tgtEl>
-                    <p:sldTgt/>
-                  </p:tgtEl>
-                </p:cond>
-              </p:nextCondLst>
-            </p:seq>
-          </p:childTnLst>
-        </p:cTn>
-      </p:par>
-    </p:tnLst>
-    <p:bldLst>
-      <p:bldP spid="3" grpId="0" build="p"/>
-    </p:bldLst>
-  </p:timing>
 </p:sld>
 </file>
 

</xml_diff>

<commit_message>
slide fix: improved thing cache task descriptions
</commit_message>
<xml_diff>
--- a/mocks.pptx
+++ b/mocks.pptx
@@ -15,11 +15,11 @@
     <p:sldId id="342" r:id="rId6"/>
     <p:sldId id="343" r:id="rId7"/>
     <p:sldId id="322" r:id="rId8"/>
-    <p:sldId id="336" r:id="rId9"/>
+    <p:sldId id="348" r:id="rId9"/>
     <p:sldId id="338" r:id="rId10"/>
     <p:sldId id="346" r:id="rId11"/>
     <p:sldId id="330" r:id="rId12"/>
-    <p:sldId id="327" r:id="rId13"/>
+    <p:sldId id="349" r:id="rId13"/>
     <p:sldId id="341" r:id="rId14"/>
     <p:sldId id="345" r:id="rId15"/>
     <p:sldId id="337" r:id="rId16"/>
@@ -148,7 +148,7 @@
         <p14:section name="ThingCache" id="{197DA212-C4D4-4E13-B6B6-F312C5EBBC2E}">
           <p14:sldIdLst>
             <p14:sldId id="322"/>
-            <p14:sldId id="336"/>
+            <p14:sldId id="348"/>
             <p14:sldId id="338"/>
             <p14:sldId id="346"/>
             <p14:sldId id="330"/>
@@ -156,7 +156,7 @@
         </p14:section>
         <p14:section name="FileSender" id="{4B16B376-E454-4A3C-8ADB-D9E32B61680A}">
           <p14:sldIdLst>
-            <p14:sldId id="327"/>
+            <p14:sldId id="349"/>
             <p14:sldId id="341"/>
             <p14:sldId id="345"/>
             <p14:sldId id="337"/>
@@ -7142,7 +7142,7 @@
           <a:p>
             <a:fld id="{1D12B38D-150E-44F0-AD67-CE4A0E7D73CD}" type="datetimeFigureOut">
               <a:rPr lang="ru-RU" smtClean="0"/>
-              <a:t>16.04.2019</a:t>
+              <a:t>11.06.2019</a:t>
             </a:fld>
             <a:endParaRPr lang="ru-RU"/>
           </a:p>
@@ -7839,15 +7839,7 @@
             </a:r>
             <a:r>
               <a:rPr lang="ru-RU" baseline="0" dirty="0"/>
-              <a:t> про возможности </a:t>
-            </a:r>
-            <a:r>
-              <a:rPr lang="ru-RU" baseline="0" dirty="0" err="1"/>
-              <a:t>фреймворка</a:t>
-            </a:r>
-            <a:r>
-              <a:rPr lang="ru-RU" baseline="0" dirty="0"/>
-              <a:t> (они могут пригодиться в следующей задаче):</a:t>
+              <a:t> про возможности фреймворка (они могут пригодиться в следующей задаче):</a:t>
             </a:r>
           </a:p>
           <a:p>
@@ -7868,6 +7860,9 @@
               <a:t>Настроить возвращаемые значения для первого или первых нескольких вызовов метода</a:t>
             </a:r>
             <a:endParaRPr lang="en-US" dirty="0"/>
+          </a:p>
+          <a:p>
+            <a:endParaRPr lang="ru-RU" dirty="0"/>
           </a:p>
           <a:p>
             <a:endParaRPr lang="ru-RU" dirty="0"/>
@@ -7881,7 +7876,7 @@
             <a:spLocks noGrp="1"/>
           </p:cNvSpPr>
           <p:nvPr>
-            <p:ph type="sldNum" sz="quarter" idx="10"/>
+            <p:ph type="sldNum" sz="quarter" idx="5"/>
           </p:nvPr>
         </p:nvSpPr>
         <p:spPr/>
@@ -7900,7 +7895,7 @@
     </p:spTree>
     <p:extLst>
       <p:ext uri="{BB962C8B-B14F-4D97-AF65-F5344CB8AC3E}">
-        <p14:creationId xmlns:p14="http://schemas.microsoft.com/office/powerpoint/2010/main" val="93746307"/>
+        <p14:creationId xmlns:p14="http://schemas.microsoft.com/office/powerpoint/2010/main" val="3393794639"/>
       </p:ext>
     </p:extLst>
   </p:cSld>
@@ -9848,7 +9843,7 @@
     </p:spTree>
     <p:extLst>
       <p:ext uri="{BB962C8B-B14F-4D97-AF65-F5344CB8AC3E}">
-        <p14:creationId xmlns:p14="http://schemas.microsoft.com/office/powerpoint/2010/main" val="1203865521"/>
+        <p14:creationId xmlns:p14="http://schemas.microsoft.com/office/powerpoint/2010/main" val="363033580"/>
       </p:ext>
     </p:extLst>
   </p:cSld>
@@ -10443,7 +10438,7 @@
   <p:clrMapOvr>
     <a:masterClrMapping/>
   </p:clrMapOvr>
-  <p:extLst mod="1">
+  <p:extLst>
     <p:ext uri="{DCECCB84-F9BA-43D5-87BE-67443E8EF086}">
       <p15:sldGuideLst xmlns:p15="http://schemas.microsoft.com/office/powerpoint/2012/main">
         <p15:guide id="2" orient="horz" pos="1207">
@@ -10818,7 +10813,7 @@
   <p:clrMapOvr>
     <a:masterClrMapping/>
   </p:clrMapOvr>
-  <p:extLst mod="1">
+  <p:extLst>
     <p:ext uri="{DCECCB84-F9BA-43D5-87BE-67443E8EF086}">
       <p15:sldGuideLst xmlns:p15="http://schemas.microsoft.com/office/powerpoint/2012/main">
         <p15:guide id="1" orient="horz" pos="935">
@@ -10979,7 +10974,7 @@
   <p:clrMapOvr>
     <a:masterClrMapping/>
   </p:clrMapOvr>
-  <p:extLst mod="1">
+  <p:extLst>
     <p:ext uri="{DCECCB84-F9BA-43D5-87BE-67443E8EF086}">
       <p15:sldGuideLst xmlns:p15="http://schemas.microsoft.com/office/powerpoint/2012/main">
         <p15:guide id="1" orient="horz" pos="4065">
@@ -11145,7 +11140,7 @@
   <p:clrMapOvr>
     <a:masterClrMapping/>
   </p:clrMapOvr>
-  <p:extLst mod="1">
+  <p:extLst>
     <p:ext uri="{DCECCB84-F9BA-43D5-87BE-67443E8EF086}">
       <p15:sldGuideLst xmlns:p15="http://schemas.microsoft.com/office/powerpoint/2012/main">
         <p15:guide id="1" orient="horz" pos="3385">
@@ -12183,7 +12178,7 @@
   <p:clrMapOvr>
     <a:masterClrMapping/>
   </p:clrMapOvr>
-  <p:extLst mod="1">
+  <p:extLst>
     <p:ext uri="{DCECCB84-F9BA-43D5-87BE-67443E8EF086}">
       <p15:sldGuideLst xmlns:p15="http://schemas.microsoft.com/office/powerpoint/2012/main">
         <p15:guide id="2" orient="horz" pos="1207">
@@ -12851,7 +12846,7 @@
   <p:clrMapOvr>
     <a:masterClrMapping/>
   </p:clrMapOvr>
-  <p:extLst mod="1">
+  <p:extLst>
     <p:ext uri="{DCECCB84-F9BA-43D5-87BE-67443E8EF086}">
       <p15:sldGuideLst xmlns:p15="http://schemas.microsoft.com/office/powerpoint/2012/main">
         <p15:guide id="1" orient="horz" pos="1525">
@@ -13116,7 +13111,7 @@
   <p:clrMapOvr>
     <a:masterClrMapping/>
   </p:clrMapOvr>
-  <p:extLst mod="1">
+  <p:extLst>
     <p:ext uri="{DCECCB84-F9BA-43D5-87BE-67443E8EF086}">
       <p15:sldGuideLst xmlns:p15="http://schemas.microsoft.com/office/powerpoint/2012/main"/>
     </p:ext>
@@ -13254,7 +13249,7 @@
   <p:clrMapOvr>
     <a:masterClrMapping/>
   </p:clrMapOvr>
-  <p:extLst mod="1">
+  <p:extLst>
     <p:ext uri="{DCECCB84-F9BA-43D5-87BE-67443E8EF086}">
       <p15:sldGuideLst xmlns:p15="http://schemas.microsoft.com/office/powerpoint/2012/main"/>
     </p:ext>
@@ -13646,7 +13641,7 @@
       </a:lvl9pPr>
     </p:otherStyle>
   </p:txStyles>
-  <p:extLst mod="1">
+  <p:extLst>
     <p:ext uri="{27BBF7A9-308A-43DC-89C8-2F10F3537804}">
       <p15:sldGuideLst xmlns:p15="http://schemas.microsoft.com/office/powerpoint/2012/main">
         <p15:guide id="1" orient="horz" pos="346">
@@ -14075,7 +14070,7 @@
       </a:lvl9pPr>
     </p:otherStyle>
   </p:txStyles>
-  <p:extLst mod="1">
+  <p:extLst>
     <p:ext uri="{27BBF7A9-308A-43DC-89C8-2F10F3537804}">
       <p15:sldGuideLst xmlns:p15="http://schemas.microsoft.com/office/powerpoint/2012/main">
         <p15:guide id="1" orient="horz" pos="346">
@@ -14574,7 +14569,13 @@
       </p:grpSpPr>
       <p:sp>
         <p:nvSpPr>
-          <p:cNvPr id="3" name="Объект 2"/>
+          <p:cNvPr id="2" name="Объект 1">
+            <a:extLst>
+              <a:ext uri="{FF2B5EF4-FFF2-40B4-BE49-F238E27FC236}">
+                <a16:creationId xmlns:a16="http://schemas.microsoft.com/office/drawing/2014/main" id="{6ABDF624-0BCD-476D-AE51-2929F7E7D36B}"/>
+              </a:ext>
+            </a:extLst>
+          </p:cNvPr>
           <p:cNvSpPr>
             <a:spLocks noGrp="1"/>
           </p:cNvSpPr>
@@ -14590,7 +14591,9 @@
           <a:lstStyle/>
           <a:p>
             <a:r>
-              <a:rPr lang="en-US" b="1" dirty="0"/>
+              <a:rPr lang="en-US" sz="2800" b="1" dirty="0">
+                <a:latin typeface="+mn-lt"/>
+              </a:rPr>
               <a:t>Arrange:</a:t>
             </a:r>
           </a:p>
@@ -14659,7 +14662,9 @@
             </a:r>
           </a:p>
           <a:p>
-            <a:endParaRPr lang="en-US" dirty="0"/>
+            <a:endParaRPr lang="en-US" sz="2800" dirty="0">
+              <a:latin typeface="Consolas" panose="020B0609020204030204" pitchFamily="49" charset="0"/>
+            </a:endParaRPr>
           </a:p>
           <a:p>
             <a:r>
@@ -14711,16 +14716,26 @@
             </a:r>
           </a:p>
           <a:p>
-            <a:pPr marL="0" indent="0">
-              <a:buNone/>
-            </a:pPr>
-            <a:endParaRPr lang="ru-RU" dirty="0"/>
+            <a:endParaRPr lang="ru-RU" sz="2800" dirty="0">
+              <a:latin typeface="Consolas" panose="020B0609020204030204" pitchFamily="49" charset="0"/>
+            </a:endParaRPr>
+          </a:p>
+          <a:p>
+            <a:endParaRPr lang="ru-RU" sz="2800" dirty="0">
+              <a:latin typeface="Consolas" panose="020B0609020204030204" pitchFamily="49" charset="0"/>
+            </a:endParaRPr>
           </a:p>
         </p:txBody>
       </p:sp>
       <p:sp>
         <p:nvSpPr>
-          <p:cNvPr id="2" name="Заголовок 1"/>
+          <p:cNvPr id="3" name="Заголовок 2">
+            <a:extLst>
+              <a:ext uri="{FF2B5EF4-FFF2-40B4-BE49-F238E27FC236}">
+                <a16:creationId xmlns:a16="http://schemas.microsoft.com/office/drawing/2014/main" id="{8FD8F935-3322-4BD0-9884-BA6347F49CBE}"/>
+              </a:ext>
+            </a:extLst>
+          </p:cNvPr>
           <p:cNvSpPr>
             <a:spLocks noGrp="1"/>
           </p:cNvSpPr>
@@ -14730,27 +14745,20 @@
         </p:nvSpPr>
         <p:spPr/>
         <p:txBody>
-          <a:bodyPr>
-            <a:noAutofit/>
-          </a:bodyPr>
+          <a:bodyPr/>
           <a:lstStyle/>
           <a:p>
             <a:r>
-              <a:rPr lang="ru-RU" dirty="0">
-                <a:solidFill>
-                  <a:schemeClr val="tx1"/>
-                </a:solidFill>
-              </a:rPr>
-              <a:t>ДРУГИЕ ВОЗМОЖНОСТИ</a:t>
-            </a:r>
-            <a:endParaRPr lang="ru-RU" dirty="0"/>
+              <a:rPr lang="ru-RU" dirty="0"/>
+              <a:t>Другие возможности</a:t>
+            </a:r>
           </a:p>
         </p:txBody>
       </p:sp>
     </p:spTree>
     <p:extLst>
       <p:ext uri="{BB962C8B-B14F-4D97-AF65-F5344CB8AC3E}">
-        <p14:creationId xmlns:p14="http://schemas.microsoft.com/office/powerpoint/2010/main" val="1149368405"/>
+        <p14:creationId xmlns:p14="http://schemas.microsoft.com/office/powerpoint/2010/main" val="2217823952"/>
       </p:ext>
     </p:extLst>
   </p:cSld>
@@ -23089,45 +23097,263 @@
         <p:spPr/>
         <p:txBody>
           <a:bodyPr>
-            <a:normAutofit/>
+            <a:noAutofit/>
           </a:bodyPr>
           <a:lstStyle/>
           <a:p>
             <a:r>
-              <a:rPr lang="en-US" sz="2600" b="1" dirty="0"/>
+              <a:rPr lang="ru-RU" sz="2800" i="1" dirty="0">
+                <a:solidFill>
+                  <a:schemeClr val="accent1"/>
+                </a:solidFill>
+              </a:rPr>
+              <a:t>Синтаксис </a:t>
+            </a:r>
+            <a:r>
+              <a:rPr lang="en-US" sz="2800" i="1" dirty="0">
+                <a:solidFill>
+                  <a:schemeClr val="accent1"/>
+                </a:solidFill>
+              </a:rPr>
+              <a:t>AAA</a:t>
+            </a:r>
+            <a:r>
+              <a:rPr lang="ru-RU" sz="2800" i="1" dirty="0">
+                <a:solidFill>
+                  <a:schemeClr val="accent1"/>
+                </a:solidFill>
+              </a:rPr>
+              <a:t> </a:t>
+            </a:r>
+            <a:r>
+              <a:rPr lang="en-US" sz="2800" i="1" dirty="0">
+                <a:solidFill>
+                  <a:schemeClr val="accent1"/>
+                </a:solidFill>
+              </a:rPr>
+              <a:t>(1</a:t>
+            </a:r>
+            <a:r>
+              <a:rPr lang="ru-RU" sz="2800" i="1" dirty="0">
+                <a:solidFill>
+                  <a:schemeClr val="accent1"/>
+                </a:solidFill>
+              </a:rPr>
+              <a:t>/</a:t>
+            </a:r>
+            <a:r>
+              <a:rPr lang="en-US" sz="2800" i="1" dirty="0">
+                <a:solidFill>
+                  <a:schemeClr val="accent1"/>
+                </a:solidFill>
+              </a:rPr>
+              <a:t>3)</a:t>
+            </a:r>
+          </a:p>
+          <a:p>
+            <a:r>
+              <a:rPr lang="en-US" sz="2400" b="1" dirty="0"/>
               <a:t>Arrange:</a:t>
             </a:r>
-            <a:endParaRPr lang="ru-RU" sz="2600" b="1" dirty="0"/>
-          </a:p>
-          <a:p>
-            <a:r>
-              <a:rPr lang="en-US" sz="2600" dirty="0" err="1">
+            <a:endParaRPr lang="ru-RU" sz="2400" b="1" dirty="0"/>
+          </a:p>
+          <a:p>
+            <a:r>
+              <a:rPr lang="en-US" sz="2400" dirty="0">
                 <a:solidFill>
                   <a:srgbClr val="0000FF"/>
                 </a:solidFill>
                 <a:latin typeface="Consolas" panose="020B0609020204030204" pitchFamily="49" charset="0"/>
                 <a:cs typeface="Consolas" panose="020B0609020204030204" pitchFamily="49" charset="0"/>
               </a:rPr>
-              <a:t>var</a:t>
-            </a:r>
-            <a:r>
-              <a:rPr lang="en-US" sz="2600" dirty="0">
+              <a:t>var </a:t>
+            </a:r>
+            <a:r>
+              <a:rPr lang="en-US" sz="2400" dirty="0">
+                <a:latin typeface="Consolas" panose="020B0609020204030204" pitchFamily="49" charset="0"/>
+              </a:rPr>
+              <a:t>fake = </a:t>
+            </a:r>
+            <a:r>
+              <a:rPr lang="ru-RU" altLang="ru-RU" sz="2400" dirty="0" err="1">
+                <a:solidFill>
+                  <a:srgbClr val="00007F"/>
+                </a:solidFill>
+                <a:latin typeface="Consolas" panose="020B0609020204030204" pitchFamily="49" charset="0"/>
+                <a:cs typeface="Consolas" panose="020B0609020204030204" pitchFamily="49" charset="0"/>
+              </a:rPr>
+              <a:t>A</a:t>
+            </a:r>
+            <a:r>
+              <a:rPr lang="ru-RU" altLang="ru-RU" sz="2400" dirty="0" err="1">
+                <a:solidFill>
+                  <a:srgbClr val="333333"/>
+                </a:solidFill>
+                <a:latin typeface="Consolas" panose="020B0609020204030204" pitchFamily="49" charset="0"/>
+                <a:cs typeface="Consolas" panose="020B0609020204030204" pitchFamily="49" charset="0"/>
+              </a:rPr>
+              <a:t>.</a:t>
+            </a:r>
+            <a:r>
+              <a:rPr lang="ru-RU" altLang="ru-RU" sz="2400" dirty="0" err="1">
+                <a:solidFill>
+                  <a:srgbClr val="2B91AF"/>
+                </a:solidFill>
+                <a:latin typeface="Consolas" panose="020B0609020204030204" pitchFamily="49" charset="0"/>
+                <a:cs typeface="Consolas" panose="020B0609020204030204" pitchFamily="49" charset="0"/>
+              </a:rPr>
+              <a:t>Fake</a:t>
+            </a:r>
+            <a:r>
+              <a:rPr lang="ru-RU" altLang="ru-RU" sz="2400" dirty="0">
+                <a:solidFill>
+                  <a:srgbClr val="333333"/>
+                </a:solidFill>
+                <a:latin typeface="Consolas" panose="020B0609020204030204" pitchFamily="49" charset="0"/>
+                <a:cs typeface="Consolas" panose="020B0609020204030204" pitchFamily="49" charset="0"/>
+              </a:rPr>
+              <a:t>&lt;</a:t>
+            </a:r>
+            <a:r>
+              <a:rPr lang="en-US" sz="2400" dirty="0" err="1">
+                <a:latin typeface="Consolas" panose="020B0609020204030204" pitchFamily="49" charset="0"/>
+              </a:rPr>
+              <a:t>ISomeService</a:t>
+            </a:r>
+            <a:r>
+              <a:rPr lang="en-US" sz="2400" dirty="0">
+                <a:latin typeface="Consolas" panose="020B0609020204030204" pitchFamily="49" charset="0"/>
+              </a:rPr>
+              <a:t>&gt;();</a:t>
+            </a:r>
+          </a:p>
+          <a:p>
+            <a:r>
+              <a:rPr lang="ru-RU" altLang="ru-RU" sz="2400" dirty="0">
+                <a:solidFill>
+                  <a:srgbClr val="00007F"/>
+                </a:solidFill>
+                <a:latin typeface="Consolas" panose="020B0609020204030204" pitchFamily="49" charset="0"/>
+                <a:cs typeface="Consolas" panose="020B0609020204030204" pitchFamily="49" charset="0"/>
+              </a:rPr>
+              <a:t>A</a:t>
+            </a:r>
+            <a:r>
+              <a:rPr lang="ru-RU" altLang="ru-RU" sz="2400" dirty="0">
+                <a:solidFill>
+                  <a:srgbClr val="333333"/>
+                </a:solidFill>
+                <a:latin typeface="Consolas" panose="020B0609020204030204" pitchFamily="49" charset="0"/>
+                <a:cs typeface="Consolas" panose="020B0609020204030204" pitchFamily="49" charset="0"/>
+              </a:rPr>
+              <a:t>.</a:t>
+            </a:r>
+            <a:r>
+              <a:rPr lang="en-US" altLang="ru-RU" sz="2400" dirty="0" err="1">
+                <a:solidFill>
+                  <a:srgbClr val="2B91AF"/>
+                </a:solidFill>
+                <a:latin typeface="Consolas" panose="020B0609020204030204" pitchFamily="49" charset="0"/>
+                <a:cs typeface="Consolas" panose="020B0609020204030204" pitchFamily="49" charset="0"/>
+              </a:rPr>
+              <a:t>CallTo</a:t>
+            </a:r>
+            <a:r>
+              <a:rPr lang="en-US" sz="2400" dirty="0">
+                <a:latin typeface="Consolas" panose="020B0609020204030204" pitchFamily="49" charset="0"/>
+              </a:rPr>
+              <a:t>(() =&gt; </a:t>
+            </a:r>
+            <a:r>
+              <a:rPr lang="en-US" sz="2400" dirty="0" err="1">
+                <a:latin typeface="Consolas" panose="020B0609020204030204" pitchFamily="49" charset="0"/>
+              </a:rPr>
+              <a:t>fake.</a:t>
+            </a:r>
+            <a:r>
+              <a:rPr lang="en-US" sz="2400" dirty="0" err="1">
+                <a:solidFill>
+                  <a:srgbClr val="2B91AF"/>
+                </a:solidFill>
+                <a:latin typeface="Consolas" panose="020B0609020204030204" pitchFamily="49" charset="0"/>
+                <a:cs typeface="Consolas" panose="020B0609020204030204" pitchFamily="49" charset="0"/>
+              </a:rPr>
+              <a:t>SomeMethod</a:t>
+            </a:r>
+            <a:r>
+              <a:rPr lang="en-US" sz="2400" dirty="0">
+                <a:latin typeface="Consolas" panose="020B0609020204030204" pitchFamily="49" charset="0"/>
+              </a:rPr>
+              <a:t>(...))</a:t>
+            </a:r>
+          </a:p>
+          <a:p>
+            <a:r>
+              <a:rPr lang="en-US" sz="2400" dirty="0">
+                <a:latin typeface="Consolas" panose="020B0609020204030204" pitchFamily="49" charset="0"/>
+              </a:rPr>
+              <a:t>	.</a:t>
+            </a:r>
+            <a:r>
+              <a:rPr lang="en-US" sz="2400" dirty="0">
+                <a:solidFill>
+                  <a:srgbClr val="2B91AF"/>
+                </a:solidFill>
+                <a:latin typeface="Consolas" panose="020B0609020204030204" pitchFamily="49" charset="0"/>
+                <a:cs typeface="Consolas" panose="020B0609020204030204" pitchFamily="49" charset="0"/>
+              </a:rPr>
+              <a:t>Returns</a:t>
+            </a:r>
+            <a:r>
+              <a:rPr lang="en-US" sz="2400" dirty="0">
+                <a:latin typeface="Consolas" panose="020B0609020204030204" pitchFamily="49" charset="0"/>
+              </a:rPr>
+              <a:t>(</a:t>
+            </a:r>
+            <a:r>
+              <a:rPr lang="en-US" sz="2400" dirty="0">
                 <a:solidFill>
                   <a:srgbClr val="0000FF"/>
                 </a:solidFill>
                 <a:latin typeface="Consolas" panose="020B0609020204030204" pitchFamily="49" charset="0"/>
                 <a:cs typeface="Consolas" panose="020B0609020204030204" pitchFamily="49" charset="0"/>
               </a:rPr>
-              <a:t> </a:t>
-            </a:r>
-            <a:r>
-              <a:rPr lang="en-US" sz="2600" dirty="0">
-                <a:latin typeface="Consolas" panose="020B0609020204030204" pitchFamily="49" charset="0"/>
-              </a:rPr>
-              <a:t>fake = </a:t>
-            </a:r>
-            <a:r>
-              <a:rPr lang="ru-RU" altLang="ru-RU" sz="2600" dirty="0" err="1">
+              <a:t>true</a:t>
+            </a:r>
+            <a:r>
+              <a:rPr lang="en-US" sz="2400" dirty="0">
+                <a:latin typeface="Consolas" panose="020B0609020204030204" pitchFamily="49" charset="0"/>
+              </a:rPr>
+              <a:t>);</a:t>
+            </a:r>
+          </a:p>
+          <a:p>
+            <a:r>
+              <a:rPr lang="en-US" sz="2400" b="1" dirty="0"/>
+              <a:t>Assert:</a:t>
+            </a:r>
+          </a:p>
+          <a:p>
+            <a:r>
+              <a:rPr lang="en-US" sz="2400" dirty="0">
+                <a:solidFill>
+                  <a:srgbClr val="0000FF"/>
+                </a:solidFill>
+                <a:latin typeface="Consolas" panose="020B0609020204030204" pitchFamily="49" charset="0"/>
+                <a:cs typeface="Consolas" panose="020B0609020204030204" pitchFamily="49" charset="0"/>
+              </a:rPr>
+              <a:t>var </a:t>
+            </a:r>
+            <a:r>
+              <a:rPr lang="en-US" sz="2400" dirty="0">
+                <a:latin typeface="Consolas" panose="020B0609020204030204" pitchFamily="49" charset="0"/>
+              </a:rPr>
+              <a:t>value = "42";</a:t>
+            </a:r>
+          </a:p>
+          <a:p>
+            <a:r>
+              <a:rPr lang="ru-RU" altLang="ru-RU" sz="2400" dirty="0">
                 <a:solidFill>
                   <a:srgbClr val="00007F"/>
                 </a:solidFill>
@@ -23137,7 +23363,7 @@
               <a:t>A</a:t>
             </a:r>
             <a:r>
-              <a:rPr lang="ru-RU" altLang="ru-RU" sz="2600" dirty="0" err="1">
+              <a:rPr lang="ru-RU" altLang="ru-RU" sz="2400" dirty="0">
                 <a:solidFill>
                   <a:srgbClr val="333333"/>
                 </a:solidFill>
@@ -23147,283 +23373,92 @@
               <a:t>.</a:t>
             </a:r>
             <a:r>
-              <a:rPr lang="ru-RU" altLang="ru-RU" sz="2600" dirty="0" err="1">
+              <a:rPr lang="en-US" altLang="ru-RU" sz="2400" dirty="0" err="1">
                 <a:solidFill>
                   <a:srgbClr val="2B91AF"/>
                 </a:solidFill>
                 <a:latin typeface="Consolas" panose="020B0609020204030204" pitchFamily="49" charset="0"/>
                 <a:cs typeface="Consolas" panose="020B0609020204030204" pitchFamily="49" charset="0"/>
               </a:rPr>
-              <a:t>Fake</a:t>
-            </a:r>
-            <a:r>
-              <a:rPr lang="ru-RU" altLang="ru-RU" sz="2600" dirty="0">
-                <a:solidFill>
-                  <a:srgbClr val="333333"/>
+              <a:t>CallTo</a:t>
+            </a:r>
+            <a:r>
+              <a:rPr lang="en-US" sz="2400" dirty="0">
+                <a:latin typeface="Consolas" panose="020B0609020204030204" pitchFamily="49" charset="0"/>
+              </a:rPr>
+              <a:t>(() =&gt; </a:t>
+            </a:r>
+            <a:r>
+              <a:rPr lang="en-US" sz="2400" dirty="0" err="1">
+                <a:latin typeface="Consolas" panose="020B0609020204030204" pitchFamily="49" charset="0"/>
+              </a:rPr>
+              <a:t>fake.</a:t>
+            </a:r>
+            <a:r>
+              <a:rPr lang="en-US" sz="2400" dirty="0" err="1">
+                <a:solidFill>
+                  <a:srgbClr val="2B91AF"/>
                 </a:solidFill>
                 <a:latin typeface="Consolas" panose="020B0609020204030204" pitchFamily="49" charset="0"/>
                 <a:cs typeface="Consolas" panose="020B0609020204030204" pitchFamily="49" charset="0"/>
               </a:rPr>
-              <a:t>&lt;</a:t>
-            </a:r>
-            <a:r>
-              <a:rPr lang="en-US" sz="2600" dirty="0" err="1">
-                <a:latin typeface="Consolas" panose="020B0609020204030204" pitchFamily="49" charset="0"/>
-              </a:rPr>
-              <a:t>ISomeService</a:t>
-            </a:r>
-            <a:r>
-              <a:rPr lang="en-US" sz="2600" dirty="0">
-                <a:latin typeface="Consolas" panose="020B0609020204030204" pitchFamily="49" charset="0"/>
-              </a:rPr>
-              <a:t>&gt;();</a:t>
-            </a:r>
-          </a:p>
-          <a:p>
-            <a:r>
-              <a:rPr lang="ru-RU" altLang="ru-RU" sz="2600" dirty="0">
-                <a:solidFill>
-                  <a:srgbClr val="00007F"/>
+              <a:t>TryRead</a:t>
+            </a:r>
+            <a:r>
+              <a:rPr lang="en-US" sz="2400" dirty="0">
+                <a:latin typeface="Consolas" panose="020B0609020204030204" pitchFamily="49" charset="0"/>
+              </a:rPr>
+              <a:t>(id, </a:t>
+            </a:r>
+            <a:r>
+              <a:rPr lang="en-US" sz="2400" dirty="0">
+                <a:solidFill>
+                  <a:srgbClr val="0000FF"/>
                 </a:solidFill>
                 <a:latin typeface="Consolas" panose="020B0609020204030204" pitchFamily="49" charset="0"/>
                 <a:cs typeface="Consolas" panose="020B0609020204030204" pitchFamily="49" charset="0"/>
               </a:rPr>
-              <a:t>A</a:t>
-            </a:r>
-            <a:r>
-              <a:rPr lang="ru-RU" altLang="ru-RU" sz="2600" dirty="0">
-                <a:solidFill>
-                  <a:srgbClr val="333333"/>
+              <a:t>out</a:t>
+            </a:r>
+            <a:r>
+              <a:rPr lang="en-US" sz="2400" dirty="0">
+                <a:latin typeface="Consolas" panose="020B0609020204030204" pitchFamily="49" charset="0"/>
+              </a:rPr>
+              <a:t> value))</a:t>
+            </a:r>
+          </a:p>
+          <a:p>
+            <a:r>
+              <a:rPr lang="en-US" sz="2400" dirty="0">
+                <a:latin typeface="Consolas" panose="020B0609020204030204" pitchFamily="49" charset="0"/>
+              </a:rPr>
+              <a:t>	.</a:t>
+            </a:r>
+            <a:r>
+              <a:rPr lang="en-US" sz="2400" dirty="0" err="1">
+                <a:solidFill>
+                  <a:srgbClr val="2B91AF"/>
                 </a:solidFill>
                 <a:latin typeface="Consolas" panose="020B0609020204030204" pitchFamily="49" charset="0"/>
                 <a:cs typeface="Consolas" panose="020B0609020204030204" pitchFamily="49" charset="0"/>
               </a:rPr>
-              <a:t>.</a:t>
-            </a:r>
-            <a:r>
-              <a:rPr lang="en-US" altLang="ru-RU" sz="2600" dirty="0" err="1">
-                <a:solidFill>
-                  <a:srgbClr val="2B91AF"/>
-                </a:solidFill>
-                <a:latin typeface="Consolas" panose="020B0609020204030204" pitchFamily="49" charset="0"/>
-                <a:cs typeface="Consolas" panose="020B0609020204030204" pitchFamily="49" charset="0"/>
-              </a:rPr>
-              <a:t>CallTo</a:t>
-            </a:r>
-            <a:r>
-              <a:rPr lang="en-US" sz="2600" dirty="0">
-                <a:latin typeface="Consolas" panose="020B0609020204030204" pitchFamily="49" charset="0"/>
-              </a:rPr>
-              <a:t>(() =&gt; </a:t>
-            </a:r>
-            <a:r>
-              <a:rPr lang="en-US" sz="2600" dirty="0" err="1">
-                <a:latin typeface="Consolas" panose="020B0609020204030204" pitchFamily="49" charset="0"/>
-              </a:rPr>
-              <a:t>fake.</a:t>
-            </a:r>
-            <a:r>
-              <a:rPr lang="en-US" sz="2600" dirty="0" err="1">
-                <a:solidFill>
-                  <a:srgbClr val="2B91AF"/>
-                </a:solidFill>
-                <a:latin typeface="Consolas" panose="020B0609020204030204" pitchFamily="49" charset="0"/>
-                <a:cs typeface="Consolas" panose="020B0609020204030204" pitchFamily="49" charset="0"/>
-              </a:rPr>
-              <a:t>SomeMethod</a:t>
-            </a:r>
-            <a:r>
-              <a:rPr lang="en-US" sz="2600" dirty="0">
-                <a:latin typeface="Consolas" panose="020B0609020204030204" pitchFamily="49" charset="0"/>
-              </a:rPr>
-              <a:t>(...))</a:t>
-            </a:r>
-          </a:p>
-          <a:p>
-            <a:r>
-              <a:rPr lang="en-US" sz="2600" dirty="0">
-                <a:latin typeface="Consolas" panose="020B0609020204030204" pitchFamily="49" charset="0"/>
-              </a:rPr>
-              <a:t>	.</a:t>
-            </a:r>
-            <a:r>
-              <a:rPr lang="en-US" sz="2600" dirty="0">
-                <a:solidFill>
-                  <a:srgbClr val="2B91AF"/>
-                </a:solidFill>
-                <a:latin typeface="Consolas" panose="020B0609020204030204" pitchFamily="49" charset="0"/>
-                <a:cs typeface="Consolas" panose="020B0609020204030204" pitchFamily="49" charset="0"/>
-              </a:rPr>
-              <a:t>Returns</a:t>
-            </a:r>
-            <a:r>
-              <a:rPr lang="en-US" sz="2600" dirty="0">
-                <a:latin typeface="Consolas" panose="020B0609020204030204" pitchFamily="49" charset="0"/>
-              </a:rPr>
-              <a:t>(</a:t>
-            </a:r>
-            <a:r>
-              <a:rPr lang="en-US" sz="2600" dirty="0">
-                <a:solidFill>
-                  <a:srgbClr val="0000FF"/>
-                </a:solidFill>
-                <a:latin typeface="Consolas" panose="020B0609020204030204" pitchFamily="49" charset="0"/>
-                <a:cs typeface="Consolas" panose="020B0609020204030204" pitchFamily="49" charset="0"/>
-              </a:rPr>
-              <a:t>true</a:t>
-            </a:r>
-            <a:r>
-              <a:rPr lang="en-US" sz="2600" dirty="0">
-                <a:latin typeface="Consolas" panose="020B0609020204030204" pitchFamily="49" charset="0"/>
-              </a:rPr>
-              <a:t>);</a:t>
-            </a:r>
-          </a:p>
-          <a:p>
-            <a:r>
-              <a:rPr lang="en-US" sz="2600" b="1" dirty="0"/>
-              <a:t>Assert:</a:t>
-            </a:r>
-          </a:p>
-          <a:p>
-            <a:r>
-              <a:rPr lang="en-US" sz="2600" dirty="0" err="1">
-                <a:solidFill>
-                  <a:srgbClr val="0000FF"/>
-                </a:solidFill>
-                <a:latin typeface="Consolas" panose="020B0609020204030204" pitchFamily="49" charset="0"/>
-                <a:cs typeface="Consolas" panose="020B0609020204030204" pitchFamily="49" charset="0"/>
-              </a:rPr>
-              <a:t>var</a:t>
-            </a:r>
-            <a:r>
-              <a:rPr lang="en-US" sz="2600" dirty="0">
-                <a:solidFill>
-                  <a:srgbClr val="0000FF"/>
-                </a:solidFill>
-                <a:latin typeface="Consolas" panose="020B0609020204030204" pitchFamily="49" charset="0"/>
-                <a:cs typeface="Consolas" panose="020B0609020204030204" pitchFamily="49" charset="0"/>
-              </a:rPr>
-              <a:t> </a:t>
-            </a:r>
-            <a:r>
-              <a:rPr lang="en-US" sz="2600" dirty="0">
-                <a:latin typeface="Consolas" panose="020B0609020204030204" pitchFamily="49" charset="0"/>
-              </a:rPr>
-              <a:t>value = "42";</a:t>
-            </a:r>
-          </a:p>
-          <a:p>
-            <a:r>
-              <a:rPr lang="ru-RU" altLang="ru-RU" sz="2600" dirty="0">
-                <a:solidFill>
-                  <a:srgbClr val="00007F"/>
-                </a:solidFill>
-                <a:latin typeface="Consolas" panose="020B0609020204030204" pitchFamily="49" charset="0"/>
-                <a:cs typeface="Consolas" panose="020B0609020204030204" pitchFamily="49" charset="0"/>
-              </a:rPr>
-              <a:t>A</a:t>
-            </a:r>
-            <a:r>
-              <a:rPr lang="ru-RU" altLang="ru-RU" sz="2600" dirty="0">
-                <a:solidFill>
-                  <a:srgbClr val="333333"/>
-                </a:solidFill>
-                <a:latin typeface="Consolas" panose="020B0609020204030204" pitchFamily="49" charset="0"/>
-                <a:cs typeface="Consolas" panose="020B0609020204030204" pitchFamily="49" charset="0"/>
-              </a:rPr>
-              <a:t>.</a:t>
-            </a:r>
-            <a:r>
-              <a:rPr lang="en-US" altLang="ru-RU" sz="2600" dirty="0" err="1">
-                <a:solidFill>
-                  <a:srgbClr val="2B91AF"/>
-                </a:solidFill>
-                <a:latin typeface="Consolas" panose="020B0609020204030204" pitchFamily="49" charset="0"/>
-                <a:cs typeface="Consolas" panose="020B0609020204030204" pitchFamily="49" charset="0"/>
-              </a:rPr>
-              <a:t>CallTo</a:t>
-            </a:r>
-            <a:r>
-              <a:rPr lang="en-US" sz="2600" dirty="0">
-                <a:latin typeface="Consolas" panose="020B0609020204030204" pitchFamily="49" charset="0"/>
-              </a:rPr>
-              <a:t>(() =&gt; </a:t>
-            </a:r>
-            <a:r>
-              <a:rPr lang="en-US" sz="2600" dirty="0" err="1">
-                <a:latin typeface="Consolas" panose="020B0609020204030204" pitchFamily="49" charset="0"/>
-              </a:rPr>
-              <a:t>fake.</a:t>
-            </a:r>
-            <a:r>
-              <a:rPr lang="en-US" sz="2600" dirty="0" err="1">
-                <a:solidFill>
-                  <a:srgbClr val="2B91AF"/>
-                </a:solidFill>
-                <a:latin typeface="Consolas" panose="020B0609020204030204" pitchFamily="49" charset="0"/>
-                <a:cs typeface="Consolas" panose="020B0609020204030204" pitchFamily="49" charset="0"/>
-              </a:rPr>
-              <a:t>TryRead</a:t>
-            </a:r>
-            <a:r>
-              <a:rPr lang="en-US" sz="2600" dirty="0">
-                <a:latin typeface="Consolas" panose="020B0609020204030204" pitchFamily="49" charset="0"/>
-              </a:rPr>
-              <a:t>(id, </a:t>
-            </a:r>
-            <a:r>
-              <a:rPr lang="en-US" sz="2600" dirty="0">
-                <a:solidFill>
-                  <a:srgbClr val="0000FF"/>
-                </a:solidFill>
-                <a:latin typeface="Consolas" panose="020B0609020204030204" pitchFamily="49" charset="0"/>
-                <a:cs typeface="Consolas" panose="020B0609020204030204" pitchFamily="49" charset="0"/>
-              </a:rPr>
-              <a:t>out</a:t>
-            </a:r>
-            <a:r>
-              <a:rPr lang="en-US" sz="2600" dirty="0">
-                <a:latin typeface="Consolas" panose="020B0609020204030204" pitchFamily="49" charset="0"/>
-              </a:rPr>
-              <a:t> value))</a:t>
-            </a:r>
-          </a:p>
-          <a:p>
-            <a:r>
-              <a:rPr lang="en-US" sz="2600" dirty="0">
-                <a:latin typeface="Consolas" panose="020B0609020204030204" pitchFamily="49" charset="0"/>
-              </a:rPr>
-              <a:t>	.</a:t>
-            </a:r>
-            <a:r>
-              <a:rPr lang="en-US" sz="2600" dirty="0" err="1">
-                <a:solidFill>
-                  <a:srgbClr val="2B91AF"/>
-                </a:solidFill>
-                <a:latin typeface="Consolas" panose="020B0609020204030204" pitchFamily="49" charset="0"/>
-                <a:cs typeface="Consolas" panose="020B0609020204030204" pitchFamily="49" charset="0"/>
-              </a:rPr>
               <a:t>MustHaveHappened</a:t>
             </a:r>
             <a:r>
-              <a:rPr lang="en-US" sz="2600" dirty="0">
+              <a:rPr lang="en-US" sz="2400" dirty="0">
                 <a:latin typeface="Consolas" panose="020B0609020204030204" pitchFamily="49" charset="0"/>
               </a:rPr>
               <a:t>(); //</a:t>
             </a:r>
             <a:r>
-              <a:rPr lang="ru-RU" sz="2600" dirty="0">
+              <a:rPr lang="ru-RU" sz="2400" dirty="0">
                 <a:latin typeface="Consolas" panose="020B0609020204030204" pitchFamily="49" charset="0"/>
               </a:rPr>
               <a:t>должен быть в конце теста</a:t>
             </a:r>
-            <a:endParaRPr lang="en-US" sz="2600" dirty="0">
+            <a:endParaRPr lang="en-US" sz="2400" dirty="0">
               <a:latin typeface="Consolas" panose="020B0609020204030204" pitchFamily="49" charset="0"/>
             </a:endParaRPr>
-          </a:p>
-          <a:p>
-            <a:endParaRPr lang="en-US" sz="2600" dirty="0"/>
           </a:p>
         </p:txBody>
       </p:sp>
@@ -23467,7 +23502,7 @@
     </p:spTree>
     <p:extLst>
       <p:ext uri="{BB962C8B-B14F-4D97-AF65-F5344CB8AC3E}">
-        <p14:creationId xmlns:p14="http://schemas.microsoft.com/office/powerpoint/2010/main" val="1139970070"/>
+        <p14:creationId xmlns:p14="http://schemas.microsoft.com/office/powerpoint/2010/main" val="1661196519"/>
       </p:ext>
     </p:extLst>
   </p:cSld>
@@ -23512,7 +23547,57 @@
           <a:lstStyle/>
           <a:p>
             <a:r>
-              <a:rPr lang="en-US" sz="2400" dirty="0" err="1">
+              <a:rPr lang="ru-RU" sz="2800" i="1" dirty="0">
+                <a:solidFill>
+                  <a:schemeClr val="accent1"/>
+                </a:solidFill>
+              </a:rPr>
+              <a:t>Синтаксис </a:t>
+            </a:r>
+            <a:r>
+              <a:rPr lang="en-US" sz="2800" i="1" dirty="0">
+                <a:solidFill>
+                  <a:schemeClr val="accent1"/>
+                </a:solidFill>
+              </a:rPr>
+              <a:t>out</a:t>
+            </a:r>
+            <a:r>
+              <a:rPr lang="ru-RU" sz="2800" i="1" dirty="0">
+                <a:solidFill>
+                  <a:schemeClr val="accent1"/>
+                </a:solidFill>
+              </a:rPr>
+              <a:t> </a:t>
+            </a:r>
+            <a:r>
+              <a:rPr lang="en-US" sz="2800" i="1" dirty="0">
+                <a:solidFill>
+                  <a:schemeClr val="accent1"/>
+                </a:solidFill>
+              </a:rPr>
+              <a:t>(2</a:t>
+            </a:r>
+            <a:r>
+              <a:rPr lang="ru-RU" sz="2800" i="1" dirty="0">
+                <a:solidFill>
+                  <a:schemeClr val="accent1"/>
+                </a:solidFill>
+              </a:rPr>
+              <a:t>/</a:t>
+            </a:r>
+            <a:r>
+              <a:rPr lang="en-US" sz="2800" i="1" dirty="0">
+                <a:solidFill>
+                  <a:schemeClr val="accent1"/>
+                </a:solidFill>
+              </a:rPr>
+              <a:t>3)</a:t>
+            </a:r>
+          </a:p>
+          <a:p>
+            <a:r>
+              <a:rPr lang="en-US" sz="2400" dirty="0">
                 <a:solidFill>
                   <a:srgbClr val="0000FF"/>
                 </a:solidFill>
@@ -23895,7 +23980,7 @@
                                         <p:tgtEl>
                                           <p:spTgt spid="4">
                                             <p:txEl>
-                                              <p:pRg st="5" end="5"/>
+                                              <p:pRg st="6" end="6"/>
                                             </p:txEl>
                                           </p:spTgt>
                                         </p:tgtEl>
@@ -23926,7 +24011,7 @@
                                         <p:tgtEl>
                                           <p:spTgt spid="4">
                                             <p:txEl>
-                                              <p:pRg st="7" end="7"/>
+                                              <p:pRg st="8" end="8"/>
                                             </p:txEl>
                                           </p:spTgt>
                                         </p:tgtEl>
@@ -23957,7 +24042,7 @@
                                         <p:tgtEl>
                                           <p:spTgt spid="4">
                                             <p:txEl>
-                                              <p:pRg st="8" end="8"/>
+                                              <p:pRg st="9" end="9"/>
                                             </p:txEl>
                                           </p:spTgt>
                                         </p:tgtEl>
@@ -24036,6 +24121,70 @@
             <a:normAutofit/>
           </a:bodyPr>
           <a:lstStyle/>
+          <a:p>
+            <a:r>
+              <a:rPr lang="ru-RU" sz="2800" i="1" dirty="0">
+                <a:solidFill>
+                  <a:schemeClr val="accent1"/>
+                </a:solidFill>
+              </a:rPr>
+              <a:t>Синтаксис</a:t>
+            </a:r>
+            <a:r>
+              <a:rPr lang="en-US" sz="2800" i="1" dirty="0">
+                <a:solidFill>
+                  <a:schemeClr val="accent1"/>
+                </a:solidFill>
+              </a:rPr>
+              <a:t> Repeat</a:t>
+            </a:r>
+            <a:r>
+              <a:rPr lang="ru-RU" sz="2800" i="1" dirty="0">
+                <a:solidFill>
+                  <a:schemeClr val="accent1"/>
+                </a:solidFill>
+              </a:rPr>
+              <a:t> </a:t>
+            </a:r>
+            <a:r>
+              <a:rPr lang="en-US" sz="2800" i="1" dirty="0">
+                <a:solidFill>
+                  <a:schemeClr val="accent1"/>
+                </a:solidFill>
+              </a:rPr>
+              <a:t>(</a:t>
+            </a:r>
+            <a:r>
+              <a:rPr lang="ru-RU" sz="2800" i="1" dirty="0">
+                <a:solidFill>
+                  <a:schemeClr val="accent1"/>
+                </a:solidFill>
+              </a:rPr>
+              <a:t>3/3</a:t>
+            </a:r>
+            <a:r>
+              <a:rPr lang="en-US" sz="2800" i="1" dirty="0">
+                <a:solidFill>
+                  <a:schemeClr val="accent1"/>
+                </a:solidFill>
+              </a:rPr>
+              <a:t>)</a:t>
+            </a:r>
+            <a:endParaRPr lang="ru-RU" sz="2800" i="1" dirty="0">
+              <a:solidFill>
+                <a:schemeClr val="accent1"/>
+              </a:solidFill>
+            </a:endParaRPr>
+          </a:p>
+          <a:p>
+            <a:endParaRPr lang="ru-RU" sz="2600" dirty="0">
+              <a:solidFill>
+                <a:srgbClr val="0000FF"/>
+              </a:solidFill>
+              <a:latin typeface="Consolas" panose="020B0609020204030204" pitchFamily="49" charset="0"/>
+              <a:cs typeface="Consolas" panose="020B0609020204030204" pitchFamily="49" charset="0"/>
+            </a:endParaRPr>
+          </a:p>
           <a:p>
             <a:r>
               <a:rPr lang="en-US" sz="2600" dirty="0">

</xml_diff>

<commit_message>
Added uri to presentation. The article about using mocks in unit testing of multi-threaded code.
</commit_message>
<xml_diff>
--- a/mocks.pptx
+++ b/mocks.pptx
@@ -160,7 +160,7 @@
               <a:rPr b="0" lang="ru-RU" sz="1400" spc="-1" strike="noStrike">
                 <a:latin typeface="Times New Roman"/>
               </a:rPr>
-              <a:t>&lt;верхний колонтитул&gt;</a:t>
+              <a:t> </a:t>
             </a:r>
             <a:endParaRPr b="0" lang="ru-RU" sz="1400" spc="-1" strike="noStrike">
               <a:latin typeface="Times New Roman"/>
@@ -197,7 +197,7 @@
               <a:rPr b="0" lang="ru-RU" sz="1400" spc="-1" strike="noStrike">
                 <a:latin typeface="Times New Roman"/>
               </a:rPr>
-              <a:t>&lt;дата/время&gt;</a:t>
+              <a:t> </a:t>
             </a:r>
             <a:endParaRPr b="0" lang="ru-RU" sz="1400" spc="-1" strike="noStrike">
               <a:latin typeface="Times New Roman"/>
@@ -233,7 +233,7 @@
               <a:rPr b="0" lang="ru-RU" sz="1400" spc="-1" strike="noStrike">
                 <a:latin typeface="Times New Roman"/>
               </a:rPr>
-              <a:t>&lt;нижний колонтитул&gt;</a:t>
+              <a:t> </a:t>
             </a:r>
             <a:endParaRPr b="0" lang="ru-RU" sz="1400" spc="-1" strike="noStrike">
               <a:latin typeface="Times New Roman"/>
@@ -266,11 +266,11 @@
           </a:bodyPr>
           <a:p>
             <a:pPr algn="r"/>
-            <a:fld id="{8DE3FACC-421F-4409-BB83-B4B464C96A04}" type="slidenum">
+            <a:fld id="{62EE055B-BC47-4B9C-A48B-064789E878BC}" type="slidenum">
               <a:rPr b="0" lang="ru-RU" sz="1400" spc="-1" strike="noStrike">
                 <a:latin typeface="Times New Roman"/>
               </a:rPr>
-              <a:t>&lt;номер&gt;</a:t>
+              <a:t>1</a:t>
             </a:fld>
             <a:endParaRPr b="0" lang="ru-RU" sz="1400" spc="-1" strike="noStrike">
               <a:latin typeface="Times New Roman"/>
@@ -314,7 +314,7 @@
         <p:spPr>
           <a:xfrm>
             <a:off x="685800" y="1143000"/>
-            <a:ext cx="5485680" cy="3085560"/>
+            <a:ext cx="5485320" cy="3085200"/>
           </a:xfrm>
           <a:prstGeom prst="rect">
             <a:avLst/>
@@ -334,7 +334,7 @@
         <p:spPr>
           <a:xfrm>
             <a:off x="685800" y="4400640"/>
-            <a:ext cx="5485680" cy="3599640"/>
+            <a:ext cx="5485320" cy="3599280"/>
           </a:xfrm>
           <a:prstGeom prst="rect">
             <a:avLst/>
@@ -345,7 +345,7 @@
             <a:noAutofit/>
           </a:bodyPr>
           <a:p>
-            <a:pPr marL="216000" indent="-215640">
+            <a:pPr marL="216000" indent="-215280">
               <a:lnSpc>
                 <a:spcPct val="100000"/>
               </a:lnSpc>
@@ -361,7 +361,7 @@
             </a:endParaRPr>
           </a:p>
           <a:p>
-            <a:pPr marL="216000" indent="-215640">
+            <a:pPr marL="216000" indent="-215280">
               <a:lnSpc>
                 <a:spcPct val="100000"/>
               </a:lnSpc>
@@ -371,7 +371,7 @@
             </a:endParaRPr>
           </a:p>
           <a:p>
-            <a:pPr marL="216000" indent="-215640">
+            <a:pPr marL="216000" indent="-215280">
               <a:lnSpc>
                 <a:spcPct val="100000"/>
               </a:lnSpc>
@@ -387,7 +387,7 @@
             </a:endParaRPr>
           </a:p>
           <a:p>
-            <a:pPr marL="228600" indent="-227880">
+            <a:pPr marL="228600" indent="-227520">
               <a:lnSpc>
                 <a:spcPct val="100000"/>
               </a:lnSpc>
@@ -408,7 +408,7 @@
             </a:endParaRPr>
           </a:p>
           <a:p>
-            <a:pPr marL="228600" indent="-227880">
+            <a:pPr marL="228600" indent="-227520">
               <a:lnSpc>
                 <a:spcPct val="100000"/>
               </a:lnSpc>
@@ -429,7 +429,7 @@
             </a:endParaRPr>
           </a:p>
           <a:p>
-            <a:pPr marL="228600" indent="-227880">
+            <a:pPr marL="228600" indent="-227520">
               <a:lnSpc>
                 <a:spcPct val="100000"/>
               </a:lnSpc>
@@ -460,7 +460,7 @@
         <p:spPr>
           <a:xfrm>
             <a:off x="3884760" y="8685360"/>
-            <a:ext cx="2971080" cy="457920"/>
+            <a:ext cx="2970720" cy="457560"/>
           </a:xfrm>
           <a:prstGeom prst="rect">
             <a:avLst/>
@@ -486,7 +486,7 @@
                 <a:spcPct val="100000"/>
               </a:lnSpc>
             </a:pPr>
-            <a:fld id="{3559A846-E175-432C-B3A2-DEFCDFB4907D}" type="slidenum">
+            <a:fld id="{A5C0E661-D1CD-4405-887C-ED1DB91A35B3}" type="slidenum">
               <a:rPr b="0" lang="ru-RU" sz="1200" spc="-1" strike="noStrike">
                 <a:solidFill>
                   <a:srgbClr val="000000"/>
@@ -494,7 +494,7 @@
                 <a:latin typeface="+mn-lt"/>
                 <a:ea typeface="+mn-ea"/>
               </a:rPr>
-              <a:t>&lt;номер&gt;</a:t>
+              <a:t>23</a:t>
             </a:fld>
             <a:endParaRPr b="0" lang="ru-RU" sz="1200" spc="-1" strike="noStrike">
               <a:latin typeface="Arial"/>
@@ -537,7 +537,7 @@
         <p:spPr>
           <a:xfrm>
             <a:off x="685800" y="1143000"/>
-            <a:ext cx="5485680" cy="3085560"/>
+            <a:ext cx="5485320" cy="3085200"/>
           </a:xfrm>
           <a:prstGeom prst="rect">
             <a:avLst/>
@@ -557,7 +557,7 @@
         <p:spPr>
           <a:xfrm>
             <a:off x="685800" y="4400640"/>
-            <a:ext cx="5485680" cy="3599640"/>
+            <a:ext cx="5485320" cy="3599280"/>
           </a:xfrm>
           <a:prstGeom prst="rect">
             <a:avLst/>
@@ -568,7 +568,7 @@
             <a:noAutofit/>
           </a:bodyPr>
           <a:p>
-            <a:pPr marL="216000" indent="-216000">
+            <a:pPr marL="216000" indent="-215640">
               <a:lnSpc>
                 <a:spcPct val="100000"/>
               </a:lnSpc>
@@ -584,7 +584,7 @@
             </a:endParaRPr>
           </a:p>
           <a:p>
-            <a:pPr marL="216000" indent="-216000">
+            <a:pPr marL="216000" indent="-215640">
               <a:lnSpc>
                 <a:spcPct val="100000"/>
               </a:lnSpc>
@@ -604,7 +604,7 @@
         <p:spPr>
           <a:xfrm>
             <a:off x="3884760" y="8685360"/>
-            <a:ext cx="2971080" cy="457920"/>
+            <a:ext cx="2970720" cy="457560"/>
           </a:xfrm>
           <a:prstGeom prst="rect">
             <a:avLst/>
@@ -630,7 +630,7 @@
                 <a:spcPct val="100000"/>
               </a:lnSpc>
             </a:pPr>
-            <a:fld id="{3564B789-B6D0-41A2-B4E0-835325119F36}" type="slidenum">
+            <a:fld id="{B832CF8C-20BA-410B-9827-DE3FE5DFB8FE}" type="slidenum">
               <a:rPr b="0" lang="ru-RU" sz="1200" spc="-1" strike="noStrike">
                 <a:solidFill>
                   <a:srgbClr val="000000"/>
@@ -638,7 +638,7 @@
                 <a:latin typeface="+mn-lt"/>
                 <a:ea typeface="+mn-ea"/>
               </a:rPr>
-              <a:t>&lt;номер&gt;</a:t>
+              <a:t>23</a:t>
             </a:fld>
             <a:endParaRPr b="0" lang="ru-RU" sz="1200" spc="-1" strike="noStrike">
               <a:latin typeface="Arial"/>
@@ -681,7 +681,7 @@
         <p:spPr>
           <a:xfrm>
             <a:off x="685800" y="1143000"/>
-            <a:ext cx="5485680" cy="3085560"/>
+            <a:ext cx="5485320" cy="3085200"/>
           </a:xfrm>
           <a:prstGeom prst="rect">
             <a:avLst/>
@@ -701,7 +701,7 @@
         <p:spPr>
           <a:xfrm>
             <a:off x="685800" y="4400640"/>
-            <a:ext cx="5485680" cy="3599640"/>
+            <a:ext cx="5485320" cy="3599280"/>
           </a:xfrm>
           <a:prstGeom prst="rect">
             <a:avLst/>
@@ -712,7 +712,7 @@
             <a:noAutofit/>
           </a:bodyPr>
           <a:p>
-            <a:pPr marL="216000" indent="-215640">
+            <a:pPr marL="216000" indent="-215280">
               <a:lnSpc>
                 <a:spcPct val="100000"/>
               </a:lnSpc>
@@ -728,7 +728,7 @@
             </a:endParaRPr>
           </a:p>
           <a:p>
-            <a:pPr marL="216000" indent="-215640">
+            <a:pPr marL="216000" indent="-215280">
               <a:lnSpc>
                 <a:spcPct val="100000"/>
               </a:lnSpc>
@@ -738,7 +738,7 @@
             </a:endParaRPr>
           </a:p>
           <a:p>
-            <a:pPr marL="216000" indent="-215640">
+            <a:pPr marL="216000" indent="-215280">
               <a:lnSpc>
                 <a:spcPct val="100000"/>
               </a:lnSpc>
@@ -754,7 +754,7 @@
             </a:endParaRPr>
           </a:p>
           <a:p>
-            <a:pPr marL="216000" indent="-215640">
+            <a:pPr marL="216000" indent="-215280">
               <a:lnSpc>
                 <a:spcPct val="100000"/>
               </a:lnSpc>
@@ -770,7 +770,7 @@
             </a:endParaRPr>
           </a:p>
           <a:p>
-            <a:pPr marL="216000" indent="-215640">
+            <a:pPr marL="216000" indent="-215280">
               <a:lnSpc>
                 <a:spcPct val="100000"/>
               </a:lnSpc>
@@ -780,7 +780,7 @@
             </a:endParaRPr>
           </a:p>
           <a:p>
-            <a:pPr marL="216000" indent="-215640">
+            <a:pPr marL="216000" indent="-215280">
               <a:lnSpc>
                 <a:spcPct val="100000"/>
               </a:lnSpc>
@@ -796,7 +796,7 @@
             </a:endParaRPr>
           </a:p>
           <a:p>
-            <a:pPr marL="216000" indent="-215640">
+            <a:pPr marL="216000" indent="-215280">
               <a:lnSpc>
                 <a:spcPct val="100000"/>
               </a:lnSpc>
@@ -806,7 +806,7 @@
             </a:endParaRPr>
           </a:p>
           <a:p>
-            <a:pPr marL="216000" indent="-215640">
+            <a:pPr marL="216000" indent="-215280">
               <a:lnSpc>
                 <a:spcPct val="100000"/>
               </a:lnSpc>
@@ -832,7 +832,7 @@
         <p:spPr>
           <a:xfrm>
             <a:off x="3884760" y="8685360"/>
-            <a:ext cx="2971080" cy="457920"/>
+            <a:ext cx="2970720" cy="457560"/>
           </a:xfrm>
           <a:prstGeom prst="rect">
             <a:avLst/>
@@ -858,7 +858,7 @@
                 <a:spcPct val="100000"/>
               </a:lnSpc>
             </a:pPr>
-            <a:fld id="{1B8617A3-4825-4F43-8E49-D7B9B3CD448A}" type="slidenum">
+            <a:fld id="{EEA32B7B-CD31-4171-AA4C-40021D4D8C67}" type="slidenum">
               <a:rPr b="0" lang="ru-RU" sz="1200" spc="-1" strike="noStrike">
                 <a:solidFill>
                   <a:srgbClr val="000000"/>
@@ -866,7 +866,7 @@
                 <a:latin typeface="+mn-lt"/>
                 <a:ea typeface="+mn-ea"/>
               </a:rPr>
-              <a:t>&lt;номер&gt;</a:t>
+              <a:t>23</a:t>
             </a:fld>
             <a:endParaRPr b="0" lang="ru-RU" sz="1200" spc="-1" strike="noStrike">
               <a:latin typeface="Arial"/>
@@ -909,7 +909,7 @@
         <p:spPr>
           <a:xfrm>
             <a:off x="685800" y="1143000"/>
-            <a:ext cx="5485680" cy="3085560"/>
+            <a:ext cx="5485320" cy="3085200"/>
           </a:xfrm>
           <a:prstGeom prst="rect">
             <a:avLst/>
@@ -929,7 +929,7 @@
         <p:spPr>
           <a:xfrm>
             <a:off x="685800" y="4400640"/>
-            <a:ext cx="5485680" cy="3599640"/>
+            <a:ext cx="5485320" cy="3599280"/>
           </a:xfrm>
           <a:prstGeom prst="rect">
             <a:avLst/>
@@ -940,7 +940,7 @@
             <a:noAutofit/>
           </a:bodyPr>
           <a:p>
-            <a:pPr marL="216000" indent="-215640">
+            <a:pPr marL="216000" indent="-215280">
               <a:lnSpc>
                 <a:spcPct val="100000"/>
               </a:lnSpc>
@@ -956,7 +956,7 @@
             </a:endParaRPr>
           </a:p>
           <a:p>
-            <a:pPr marL="216000" indent="-215640">
+            <a:pPr marL="216000" indent="-215280">
               <a:lnSpc>
                 <a:spcPct val="100000"/>
               </a:lnSpc>
@@ -966,7 +966,7 @@
             </a:endParaRPr>
           </a:p>
           <a:p>
-            <a:pPr marL="216000" indent="-215640">
+            <a:pPr marL="216000" indent="-215280">
               <a:lnSpc>
                 <a:spcPct val="100000"/>
               </a:lnSpc>
@@ -982,7 +982,7 @@
             </a:endParaRPr>
           </a:p>
           <a:p>
-            <a:pPr marL="228600" indent="-227880">
+            <a:pPr marL="228600" indent="-227520">
               <a:lnSpc>
                 <a:spcPct val="100000"/>
               </a:lnSpc>
@@ -1003,7 +1003,7 @@
             </a:endParaRPr>
           </a:p>
           <a:p>
-            <a:pPr marL="228600" indent="-227880">
+            <a:pPr marL="228600" indent="-227520">
               <a:lnSpc>
                 <a:spcPct val="100000"/>
               </a:lnSpc>
@@ -1054,7 +1054,7 @@
         <p:spPr>
           <a:xfrm>
             <a:off x="3884760" y="8685360"/>
-            <a:ext cx="2971080" cy="457920"/>
+            <a:ext cx="2970720" cy="457560"/>
           </a:xfrm>
           <a:prstGeom prst="rect">
             <a:avLst/>
@@ -1080,11 +1080,14 @@
                 <a:spcPct val="100000"/>
               </a:lnSpc>
             </a:pPr>
-            <a:fld id="{0A7A65A2-151C-43FD-9D1B-D2FDF396AF1F}" type="slidenum">
+            <a:fld id="{4C1586A3-8079-4325-A700-9B19D289CCCD}" type="slidenum">
               <a:rPr b="0" lang="ru-RU" sz="1200" spc="-1" strike="noStrike">
+                <a:solidFill>
+                  <a:srgbClr val="000000"/>
+                </a:solidFill>
                 <a:latin typeface="Times New Roman"/>
               </a:rPr>
-              <a:t>&lt;номер&gt;</a:t>
+              <a:t>23</a:t>
             </a:fld>
             <a:endParaRPr b="0" lang="ru-RU" sz="1200" spc="-1" strike="noStrike">
               <a:latin typeface="Arial"/>
@@ -1127,7 +1130,7 @@
         <p:spPr>
           <a:xfrm>
             <a:off x="685800" y="1143000"/>
-            <a:ext cx="5485680" cy="3085560"/>
+            <a:ext cx="5485320" cy="3085200"/>
           </a:xfrm>
           <a:prstGeom prst="rect">
             <a:avLst/>
@@ -1147,7 +1150,7 @@
         <p:spPr>
           <a:xfrm>
             <a:off x="685800" y="4400640"/>
-            <a:ext cx="5485680" cy="3599640"/>
+            <a:ext cx="5485320" cy="3599280"/>
           </a:xfrm>
           <a:prstGeom prst="rect">
             <a:avLst/>
@@ -1158,7 +1161,7 @@
             <a:noAutofit/>
           </a:bodyPr>
           <a:p>
-            <a:pPr marL="216000" indent="-215640">
+            <a:pPr marL="216000" indent="-215280">
               <a:lnSpc>
                 <a:spcPct val="100000"/>
               </a:lnSpc>
@@ -1174,7 +1177,7 @@
             </a:endParaRPr>
           </a:p>
           <a:p>
-            <a:pPr marL="216000" indent="-215640">
+            <a:pPr marL="216000" indent="-215280">
               <a:lnSpc>
                 <a:spcPct val="100000"/>
               </a:lnSpc>
@@ -1190,7 +1193,7 @@
             </a:endParaRPr>
           </a:p>
           <a:p>
-            <a:pPr marL="216000" indent="-215640">
+            <a:pPr marL="216000" indent="-215280">
               <a:lnSpc>
                 <a:spcPct val="100000"/>
               </a:lnSpc>
@@ -1200,7 +1203,7 @@
             </a:endParaRPr>
           </a:p>
           <a:p>
-            <a:pPr marL="216000" indent="-215640">
+            <a:pPr marL="216000" indent="-215280">
               <a:lnSpc>
                 <a:spcPct val="100000"/>
               </a:lnSpc>
@@ -1216,7 +1219,7 @@
             </a:endParaRPr>
           </a:p>
           <a:p>
-            <a:pPr marL="216000" indent="-215640">
+            <a:pPr marL="216000" indent="-215280">
               <a:lnSpc>
                 <a:spcPct val="100000"/>
               </a:lnSpc>
@@ -1226,7 +1229,7 @@
             </a:endParaRPr>
           </a:p>
           <a:p>
-            <a:pPr marL="216000" indent="-215640">
+            <a:pPr marL="216000" indent="-215280">
               <a:lnSpc>
                 <a:spcPct val="100000"/>
               </a:lnSpc>
@@ -1242,7 +1245,7 @@
             </a:endParaRPr>
           </a:p>
           <a:p>
-            <a:pPr marL="216000" indent="-215640">
+            <a:pPr marL="216000" indent="-215280">
               <a:lnSpc>
                 <a:spcPct val="100000"/>
               </a:lnSpc>
@@ -1258,7 +1261,7 @@
             </a:endParaRPr>
           </a:p>
           <a:p>
-            <a:pPr marL="216000" indent="-215640">
+            <a:pPr marL="216000" indent="-215280">
               <a:lnSpc>
                 <a:spcPct val="100000"/>
               </a:lnSpc>
@@ -1278,7 +1281,7 @@
         <p:spPr>
           <a:xfrm>
             <a:off x="3884760" y="8685360"/>
-            <a:ext cx="2971080" cy="457920"/>
+            <a:ext cx="2970720" cy="457560"/>
           </a:xfrm>
           <a:prstGeom prst="rect">
             <a:avLst/>
@@ -1304,7 +1307,7 @@
                 <a:spcPct val="100000"/>
               </a:lnSpc>
             </a:pPr>
-            <a:fld id="{AB7FBBB0-585F-47B8-979A-7218B55D9BF6}" type="slidenum">
+            <a:fld id="{E25903C6-7095-433A-A1E0-AAA2C1047D1F}" type="slidenum">
               <a:rPr b="0" lang="ru-RU" sz="1200" spc="-1" strike="noStrike">
                 <a:solidFill>
                   <a:srgbClr val="000000"/>
@@ -1312,7 +1315,7 @@
                 <a:latin typeface="+mn-lt"/>
                 <a:ea typeface="+mn-ea"/>
               </a:rPr>
-              <a:t>&lt;номер&gt;</a:t>
+              <a:t>23</a:t>
             </a:fld>
             <a:endParaRPr b="0" lang="ru-RU" sz="1200" spc="-1" strike="noStrike">
               <a:latin typeface="Arial"/>
@@ -1355,7 +1358,7 @@
         <p:spPr>
           <a:xfrm>
             <a:off x="685800" y="1143000"/>
-            <a:ext cx="5485680" cy="3085560"/>
+            <a:ext cx="5485320" cy="3085200"/>
           </a:xfrm>
           <a:prstGeom prst="rect">
             <a:avLst/>
@@ -1375,7 +1378,7 @@
         <p:spPr>
           <a:xfrm>
             <a:off x="685800" y="4400640"/>
-            <a:ext cx="5485680" cy="3599640"/>
+            <a:ext cx="5485320" cy="3599280"/>
           </a:xfrm>
           <a:prstGeom prst="rect">
             <a:avLst/>
@@ -1386,7 +1389,7 @@
             <a:noAutofit/>
           </a:bodyPr>
           <a:p>
-            <a:pPr marL="216000" indent="-215640">
+            <a:pPr marL="216000" indent="-215280">
               <a:lnSpc>
                 <a:spcPct val="100000"/>
               </a:lnSpc>
@@ -1402,7 +1405,7 @@
             </a:endParaRPr>
           </a:p>
           <a:p>
-            <a:pPr marL="216000" indent="-215640">
+            <a:pPr marL="216000" indent="-215280">
               <a:lnSpc>
                 <a:spcPct val="100000"/>
               </a:lnSpc>
@@ -1428,7 +1431,7 @@
         <p:spPr>
           <a:xfrm>
             <a:off x="3884760" y="8685360"/>
-            <a:ext cx="2971080" cy="457920"/>
+            <a:ext cx="2970720" cy="457560"/>
           </a:xfrm>
           <a:prstGeom prst="rect">
             <a:avLst/>
@@ -1454,7 +1457,7 @@
                 <a:spcPct val="100000"/>
               </a:lnSpc>
             </a:pPr>
-            <a:fld id="{5841356A-8485-4084-8BDC-76AC1BA87396}" type="slidenum">
+            <a:fld id="{B5AA02D2-7529-48B3-950B-1CDFF78D43EA}" type="slidenum">
               <a:rPr b="0" lang="ru-RU" sz="1200" spc="-1" strike="noStrike">
                 <a:solidFill>
                   <a:srgbClr val="000000"/>
@@ -1505,7 +1508,7 @@
         <p:spPr>
           <a:xfrm>
             <a:off x="685800" y="1143000"/>
-            <a:ext cx="5485680" cy="3085560"/>
+            <a:ext cx="5485320" cy="3085200"/>
           </a:xfrm>
           <a:prstGeom prst="rect">
             <a:avLst/>
@@ -1525,7 +1528,7 @@
         <p:spPr>
           <a:xfrm>
             <a:off x="685800" y="4400640"/>
-            <a:ext cx="5485680" cy="3599640"/>
+            <a:ext cx="5485320" cy="3599280"/>
           </a:xfrm>
           <a:prstGeom prst="rect">
             <a:avLst/>
@@ -1536,7 +1539,7 @@
             <a:noAutofit/>
           </a:bodyPr>
           <a:p>
-            <a:pPr marL="216000" indent="-215640">
+            <a:pPr marL="216000" indent="-215280">
               <a:lnSpc>
                 <a:spcPct val="100000"/>
               </a:lnSpc>
@@ -1552,7 +1555,7 @@
             </a:endParaRPr>
           </a:p>
           <a:p>
-            <a:pPr marL="228600" indent="-227880">
+            <a:pPr marL="228600" indent="-227520">
               <a:lnSpc>
                 <a:spcPct val="100000"/>
               </a:lnSpc>
@@ -1573,7 +1576,7 @@
             </a:endParaRPr>
           </a:p>
           <a:p>
-            <a:pPr marL="228600" indent="-227880">
+            <a:pPr marL="228600" indent="-227520">
               <a:lnSpc>
                 <a:spcPct val="100000"/>
               </a:lnSpc>
@@ -1594,7 +1597,7 @@
             </a:endParaRPr>
           </a:p>
           <a:p>
-            <a:pPr marL="228600" indent="-227880">
+            <a:pPr marL="228600" indent="-227520">
               <a:lnSpc>
                 <a:spcPct val="100000"/>
               </a:lnSpc>
@@ -1625,7 +1628,7 @@
         <p:spPr>
           <a:xfrm>
             <a:off x="3884760" y="8685360"/>
-            <a:ext cx="2971080" cy="457920"/>
+            <a:ext cx="2970720" cy="457560"/>
           </a:xfrm>
           <a:prstGeom prst="rect">
             <a:avLst/>
@@ -1651,7 +1654,7 @@
                 <a:spcPct val="100000"/>
               </a:lnSpc>
             </a:pPr>
-            <a:fld id="{DD35E168-8D53-4D07-AC2C-6BF1B610EE49}" type="slidenum">
+            <a:fld id="{584665F0-FEAB-425D-8CFF-418CB2F5E4F3}" type="slidenum">
               <a:rPr b="0" lang="ru-RU" sz="1200" spc="-1" strike="noStrike">
                 <a:solidFill>
                   <a:srgbClr val="000000"/>
@@ -1702,7 +1705,7 @@
         <p:spPr>
           <a:xfrm>
             <a:off x="685800" y="1143000"/>
-            <a:ext cx="5485680" cy="3085560"/>
+            <a:ext cx="5485320" cy="3085200"/>
           </a:xfrm>
           <a:prstGeom prst="rect">
             <a:avLst/>
@@ -1722,7 +1725,7 @@
         <p:spPr>
           <a:xfrm>
             <a:off x="685800" y="4400640"/>
-            <a:ext cx="5485680" cy="3599640"/>
+            <a:ext cx="5485320" cy="3599280"/>
           </a:xfrm>
           <a:prstGeom prst="rect">
             <a:avLst/>
@@ -1733,7 +1736,7 @@
             <a:noAutofit/>
           </a:bodyPr>
           <a:p>
-            <a:pPr marL="216000" indent="-215640">
+            <a:pPr marL="216000" indent="-215280">
               <a:lnSpc>
                 <a:spcPct val="100000"/>
               </a:lnSpc>
@@ -1749,7 +1752,7 @@
             </a:endParaRPr>
           </a:p>
           <a:p>
-            <a:pPr marL="216000" indent="-215640">
+            <a:pPr marL="216000" indent="-215280">
               <a:lnSpc>
                 <a:spcPct val="100000"/>
               </a:lnSpc>
@@ -1766,7 +1769,7 @@
             </a:endParaRPr>
           </a:p>
           <a:p>
-            <a:pPr marL="216000" indent="-215640">
+            <a:pPr marL="216000" indent="-215280">
               <a:lnSpc>
                 <a:spcPct val="100000"/>
               </a:lnSpc>
@@ -1812,7 +1815,7 @@
         <p:spPr>
           <a:xfrm>
             <a:off x="3884760" y="8685360"/>
-            <a:ext cx="2971080" cy="457920"/>
+            <a:ext cx="2970720" cy="457560"/>
           </a:xfrm>
           <a:prstGeom prst="rect">
             <a:avLst/>
@@ -1838,7 +1841,7 @@
                 <a:spcPct val="100000"/>
               </a:lnSpc>
             </a:pPr>
-            <a:fld id="{4020C81B-772E-475F-9070-F211C9F3CAB9}" type="slidenum">
+            <a:fld id="{D4D0089F-494A-4892-B157-50A32EDD4CA9}" type="slidenum">
               <a:rPr b="0" lang="ru-RU" sz="1200" spc="-1" strike="noStrike">
                 <a:solidFill>
                   <a:srgbClr val="000000"/>
@@ -1889,7 +1892,7 @@
         <p:spPr>
           <a:xfrm>
             <a:off x="685800" y="1143000"/>
-            <a:ext cx="5485680" cy="3085560"/>
+            <a:ext cx="5485320" cy="3085200"/>
           </a:xfrm>
           <a:prstGeom prst="rect">
             <a:avLst/>
@@ -1909,7 +1912,7 @@
         <p:spPr>
           <a:xfrm>
             <a:off x="685800" y="4400640"/>
-            <a:ext cx="5485680" cy="3599640"/>
+            <a:ext cx="5485320" cy="3599280"/>
           </a:xfrm>
           <a:prstGeom prst="rect">
             <a:avLst/>
@@ -1920,7 +1923,7 @@
             <a:noAutofit/>
           </a:bodyPr>
           <a:p>
-            <a:pPr marL="216000" indent="-215640">
+            <a:pPr marL="216000" indent="-215280">
               <a:lnSpc>
                 <a:spcPct val="100000"/>
               </a:lnSpc>
@@ -1936,7 +1939,7 @@
             </a:endParaRPr>
           </a:p>
           <a:p>
-            <a:pPr marL="216000" indent="-215640">
+            <a:pPr marL="216000" indent="-215280">
               <a:lnSpc>
                 <a:spcPct val="100000"/>
               </a:lnSpc>
@@ -1962,7 +1965,7 @@
         <p:spPr>
           <a:xfrm>
             <a:off x="3884760" y="8685360"/>
-            <a:ext cx="2971080" cy="457920"/>
+            <a:ext cx="2970720" cy="457560"/>
           </a:xfrm>
           <a:prstGeom prst="rect">
             <a:avLst/>
@@ -1988,7 +1991,7 @@
                 <a:spcPct val="100000"/>
               </a:lnSpc>
             </a:pPr>
-            <a:fld id="{D52831B0-DF9D-46D9-BDAC-D780AF6C4C6E}" type="slidenum">
+            <a:fld id="{45FD8517-0633-462F-A11B-AE5B6CBE3BDA}" type="slidenum">
               <a:rPr b="0" lang="ru-RU" sz="1200" spc="-1" strike="noStrike">
                 <a:solidFill>
                   <a:srgbClr val="000000"/>
@@ -2039,7 +2042,7 @@
         <p:spPr>
           <a:xfrm>
             <a:off x="685800" y="1143000"/>
-            <a:ext cx="5485680" cy="3085560"/>
+            <a:ext cx="5485320" cy="3085200"/>
           </a:xfrm>
           <a:prstGeom prst="rect">
             <a:avLst/>
@@ -2059,7 +2062,7 @@
         <p:spPr>
           <a:xfrm>
             <a:off x="685800" y="4400640"/>
-            <a:ext cx="5485680" cy="3599640"/>
+            <a:ext cx="5485320" cy="3599280"/>
           </a:xfrm>
           <a:prstGeom prst="rect">
             <a:avLst/>
@@ -2070,7 +2073,7 @@
             <a:noAutofit/>
           </a:bodyPr>
           <a:p>
-            <a:pPr marL="216000" indent="-215640">
+            <a:pPr marL="216000" indent="-215280">
               <a:lnSpc>
                 <a:spcPct val="100000"/>
               </a:lnSpc>
@@ -2086,7 +2089,7 @@
             </a:endParaRPr>
           </a:p>
           <a:p>
-            <a:pPr marL="216000" indent="-215640">
+            <a:pPr marL="216000" indent="-215280">
               <a:lnSpc>
                 <a:spcPct val="100000"/>
               </a:lnSpc>
@@ -2096,7 +2099,7 @@
             </a:endParaRPr>
           </a:p>
           <a:p>
-            <a:pPr marL="216000" indent="-215640">
+            <a:pPr marL="216000" indent="-215280">
               <a:lnSpc>
                 <a:spcPct val="100000"/>
               </a:lnSpc>
@@ -2112,7 +2115,7 @@
             </a:endParaRPr>
           </a:p>
           <a:p>
-            <a:pPr marL="216000" indent="-215640">
+            <a:pPr marL="216000" indent="-215280">
               <a:lnSpc>
                 <a:spcPct val="100000"/>
               </a:lnSpc>
@@ -2128,7 +2131,7 @@
             </a:endParaRPr>
           </a:p>
           <a:p>
-            <a:pPr marL="216000" indent="-215640">
+            <a:pPr marL="216000" indent="-215280">
               <a:lnSpc>
                 <a:spcPct val="100000"/>
               </a:lnSpc>
@@ -2138,7 +2141,7 @@
             </a:endParaRPr>
           </a:p>
           <a:p>
-            <a:pPr marL="216000" indent="-215640">
+            <a:pPr marL="216000" indent="-215280">
               <a:lnSpc>
                 <a:spcPct val="100000"/>
               </a:lnSpc>
@@ -2164,7 +2167,7 @@
         <p:spPr>
           <a:xfrm>
             <a:off x="3884760" y="8685360"/>
-            <a:ext cx="2971080" cy="457920"/>
+            <a:ext cx="2970720" cy="457560"/>
           </a:xfrm>
           <a:prstGeom prst="rect">
             <a:avLst/>
@@ -2190,7 +2193,7 @@
                 <a:spcPct val="100000"/>
               </a:lnSpc>
             </a:pPr>
-            <a:fld id="{60658ABA-ABB8-4394-AA17-BD1A6D8CF5F3}" type="slidenum">
+            <a:fld id="{355251EE-0786-4F25-8291-7FE22BBB5C41}" type="slidenum">
               <a:rPr b="0" lang="ru-RU" sz="1200" spc="-1" strike="noStrike">
                 <a:solidFill>
                   <a:srgbClr val="000000"/>
@@ -2241,7 +2244,7 @@
         <p:spPr>
           <a:xfrm>
             <a:off x="685800" y="1143000"/>
-            <a:ext cx="5485680" cy="3085560"/>
+            <a:ext cx="5485320" cy="3085200"/>
           </a:xfrm>
           <a:prstGeom prst="rect">
             <a:avLst/>
@@ -2261,7 +2264,7 @@
         <p:spPr>
           <a:xfrm>
             <a:off x="685800" y="4400640"/>
-            <a:ext cx="5485680" cy="3599640"/>
+            <a:ext cx="5485320" cy="3599280"/>
           </a:xfrm>
           <a:prstGeom prst="rect">
             <a:avLst/>
@@ -2272,7 +2275,7 @@
             <a:noAutofit/>
           </a:bodyPr>
           <a:p>
-            <a:pPr marL="216000" indent="-215640">
+            <a:pPr marL="216000" indent="-215280">
               <a:lnSpc>
                 <a:spcPct val="100000"/>
               </a:lnSpc>
@@ -2288,7 +2291,7 @@
             </a:endParaRPr>
           </a:p>
           <a:p>
-            <a:pPr marL="216000" indent="-215640">
+            <a:pPr marL="216000" indent="-215280">
               <a:lnSpc>
                 <a:spcPct val="100000"/>
               </a:lnSpc>
@@ -2304,7 +2307,7 @@
             </a:endParaRPr>
           </a:p>
           <a:p>
-            <a:pPr marL="216000" indent="-215640">
+            <a:pPr marL="216000" indent="-215280">
               <a:lnSpc>
                 <a:spcPct val="100000"/>
               </a:lnSpc>
@@ -2314,7 +2317,7 @@
             </a:endParaRPr>
           </a:p>
           <a:p>
-            <a:pPr marL="216000" indent="-215640">
+            <a:pPr marL="216000" indent="-215280">
               <a:lnSpc>
                 <a:spcPct val="100000"/>
               </a:lnSpc>
@@ -2330,7 +2333,7 @@
             </a:endParaRPr>
           </a:p>
           <a:p>
-            <a:pPr marL="216000" indent="-215640">
+            <a:pPr marL="216000" indent="-215280">
               <a:lnSpc>
                 <a:spcPct val="100000"/>
               </a:lnSpc>
@@ -2340,7 +2343,7 @@
             </a:endParaRPr>
           </a:p>
           <a:p>
-            <a:pPr marL="216000" indent="-215640">
+            <a:pPr marL="216000" indent="-215280">
               <a:lnSpc>
                 <a:spcPct val="100000"/>
               </a:lnSpc>
@@ -2356,7 +2359,7 @@
             </a:endParaRPr>
           </a:p>
           <a:p>
-            <a:pPr marL="216000" indent="-215640">
+            <a:pPr marL="216000" indent="-215280">
               <a:lnSpc>
                 <a:spcPct val="100000"/>
               </a:lnSpc>
@@ -2372,7 +2375,7 @@
             </a:endParaRPr>
           </a:p>
           <a:p>
-            <a:pPr marL="216000" indent="-215640">
+            <a:pPr marL="216000" indent="-215280">
               <a:lnSpc>
                 <a:spcPct val="100000"/>
               </a:lnSpc>
@@ -2388,7 +2391,7 @@
             </a:endParaRPr>
           </a:p>
           <a:p>
-            <a:pPr marL="216000" indent="-215640">
+            <a:pPr marL="216000" indent="-215280">
               <a:lnSpc>
                 <a:spcPct val="100000"/>
               </a:lnSpc>
@@ -2398,7 +2401,7 @@
             </a:endParaRPr>
           </a:p>
           <a:p>
-            <a:pPr marL="216000" indent="-215640">
+            <a:pPr marL="216000" indent="-215280">
               <a:lnSpc>
                 <a:spcPct val="100000"/>
               </a:lnSpc>
@@ -2414,7 +2417,7 @@
             </a:endParaRPr>
           </a:p>
           <a:p>
-            <a:pPr marL="216000" indent="-215640">
+            <a:pPr marL="216000" indent="-215280">
               <a:lnSpc>
                 <a:spcPct val="100000"/>
               </a:lnSpc>
@@ -2440,7 +2443,7 @@
         <p:spPr>
           <a:xfrm>
             <a:off x="3884760" y="8685360"/>
-            <a:ext cx="2971080" cy="457920"/>
+            <a:ext cx="2970720" cy="457560"/>
           </a:xfrm>
           <a:prstGeom prst="rect">
             <a:avLst/>
@@ -2466,7 +2469,7 @@
                 <a:spcPct val="100000"/>
               </a:lnSpc>
             </a:pPr>
-            <a:fld id="{24D4AD19-F3A0-4564-93E8-1E126F367917}" type="slidenum">
+            <a:fld id="{9ED01BD8-1529-4E8C-8C3C-C402741ED30F}" type="slidenum">
               <a:rPr b="0" lang="ru-RU" sz="1200" spc="-1" strike="noStrike">
                 <a:solidFill>
                   <a:srgbClr val="000000"/>
@@ -2474,7 +2477,7 @@
                 <a:latin typeface="+mn-lt"/>
                 <a:ea typeface="+mn-ea"/>
               </a:rPr>
-              <a:t>&lt;номер&gt;</a:t>
+              <a:t>23</a:t>
             </a:fld>
             <a:endParaRPr b="0" lang="ru-RU" sz="1200" spc="-1" strike="noStrike">
               <a:latin typeface="Arial"/>
@@ -2517,7 +2520,7 @@
         <p:spPr>
           <a:xfrm>
             <a:off x="685800" y="1143000"/>
-            <a:ext cx="5485680" cy="3085560"/>
+            <a:ext cx="5485320" cy="3085200"/>
           </a:xfrm>
           <a:prstGeom prst="rect">
             <a:avLst/>
@@ -2537,7 +2540,7 @@
         <p:spPr>
           <a:xfrm>
             <a:off x="685800" y="4400640"/>
-            <a:ext cx="5485680" cy="3599640"/>
+            <a:ext cx="5485320" cy="3599280"/>
           </a:xfrm>
           <a:prstGeom prst="rect">
             <a:avLst/>
@@ -2548,7 +2551,7 @@
             <a:noAutofit/>
           </a:bodyPr>
           <a:p>
-            <a:pPr marL="216000" indent="-215640">
+            <a:pPr marL="216000" indent="-215280">
               <a:lnSpc>
                 <a:spcPct val="100000"/>
               </a:lnSpc>
@@ -2574,7 +2577,7 @@
         <p:spPr>
           <a:xfrm>
             <a:off x="3884760" y="8685360"/>
-            <a:ext cx="2971080" cy="457920"/>
+            <a:ext cx="2970720" cy="457560"/>
           </a:xfrm>
           <a:prstGeom prst="rect">
             <a:avLst/>
@@ -2600,7 +2603,7 @@
                 <a:spcPct val="100000"/>
               </a:lnSpc>
             </a:pPr>
-            <a:fld id="{C5B29D1C-9CBB-403E-9F98-47EA0E85EB27}" type="slidenum">
+            <a:fld id="{0254265D-256D-409F-9CB1-72A0B7AD9273}" type="slidenum">
               <a:rPr b="0" lang="ru-RU" sz="1200" spc="-1" strike="noStrike">
                 <a:solidFill>
                   <a:srgbClr val="000000"/>
@@ -2651,7 +2654,7 @@
         <p:spPr>
           <a:xfrm>
             <a:off x="685800" y="1143000"/>
-            <a:ext cx="5485680" cy="3085560"/>
+            <a:ext cx="5485320" cy="3085200"/>
           </a:xfrm>
           <a:prstGeom prst="rect">
             <a:avLst/>
@@ -2671,7 +2674,7 @@
         <p:spPr>
           <a:xfrm>
             <a:off x="685800" y="4400640"/>
-            <a:ext cx="5485680" cy="3599640"/>
+            <a:ext cx="5485320" cy="3599280"/>
           </a:xfrm>
           <a:prstGeom prst="rect">
             <a:avLst/>
@@ -2682,7 +2685,7 @@
             <a:noAutofit/>
           </a:bodyPr>
           <a:p>
-            <a:pPr marL="216000" indent="-215640">
+            <a:pPr marL="216000" indent="-215280">
               <a:lnSpc>
                 <a:spcPct val="100000"/>
               </a:lnSpc>
@@ -2698,7 +2701,7 @@
             </a:endParaRPr>
           </a:p>
           <a:p>
-            <a:pPr marL="228600" indent="-227880">
+            <a:pPr marL="228600" indent="-227520">
               <a:lnSpc>
                 <a:spcPct val="100000"/>
               </a:lnSpc>
@@ -2719,7 +2722,7 @@
             </a:endParaRPr>
           </a:p>
           <a:p>
-            <a:pPr marL="228600" indent="-227880">
+            <a:pPr marL="228600" indent="-227520">
               <a:lnSpc>
                 <a:spcPct val="100000"/>
               </a:lnSpc>
@@ -2740,7 +2743,7 @@
             </a:endParaRPr>
           </a:p>
           <a:p>
-            <a:pPr marL="228600" indent="-227880">
+            <a:pPr marL="228600" indent="-227520">
               <a:lnSpc>
                 <a:spcPct val="100000"/>
               </a:lnSpc>
@@ -2797,7 +2800,7 @@
             </a:endParaRPr>
           </a:p>
           <a:p>
-            <a:pPr marL="228600" indent="-227880">
+            <a:pPr marL="228600" indent="-227520">
               <a:lnSpc>
                 <a:spcPct val="100000"/>
               </a:lnSpc>
@@ -2818,7 +2821,7 @@
             </a:endParaRPr>
           </a:p>
           <a:p>
-            <a:pPr marL="228600" indent="-227880">
+            <a:pPr marL="228600" indent="-227520">
               <a:lnSpc>
                 <a:spcPct val="100000"/>
               </a:lnSpc>
@@ -2839,7 +2842,7 @@
             </a:endParaRPr>
           </a:p>
           <a:p>
-            <a:pPr marL="228600" indent="-227880">
+            <a:pPr marL="228600" indent="-227520">
               <a:lnSpc>
                 <a:spcPct val="100000"/>
               </a:lnSpc>
@@ -2880,7 +2883,7 @@
         <p:spPr>
           <a:xfrm>
             <a:off x="3884760" y="8685360"/>
-            <a:ext cx="2971080" cy="457920"/>
+            <a:ext cx="2970720" cy="457560"/>
           </a:xfrm>
           <a:prstGeom prst="rect">
             <a:avLst/>
@@ -2906,7 +2909,7 @@
                 <a:spcPct val="100000"/>
               </a:lnSpc>
             </a:pPr>
-            <a:fld id="{074EEA66-7992-4E91-808E-73FE4031598B}" type="slidenum">
+            <a:fld id="{4AB92F16-A6C8-49B4-9068-B9DE47E88EA9}" type="slidenum">
               <a:rPr b="0" lang="ru-RU" sz="1200" spc="-1" strike="noStrike">
                 <a:solidFill>
                   <a:srgbClr val="000000"/>
@@ -2914,7 +2917,7 @@
                 <a:latin typeface="+mn-lt"/>
                 <a:ea typeface="+mn-ea"/>
               </a:rPr>
-              <a:t>&lt;номер&gt;</a:t>
+              <a:t>23</a:t>
             </a:fld>
             <a:endParaRPr b="0" lang="ru-RU" sz="1200" spc="-1" strike="noStrike">
               <a:latin typeface="Arial"/>
@@ -2957,7 +2960,7 @@
         <p:spPr>
           <a:xfrm>
             <a:off x="685800" y="1143000"/>
-            <a:ext cx="5485680" cy="3085560"/>
+            <a:ext cx="5485320" cy="3085200"/>
           </a:xfrm>
           <a:prstGeom prst="rect">
             <a:avLst/>
@@ -2977,7 +2980,7 @@
         <p:spPr>
           <a:xfrm>
             <a:off x="685800" y="4400640"/>
-            <a:ext cx="5485680" cy="3599640"/>
+            <a:ext cx="5485320" cy="3599280"/>
           </a:xfrm>
           <a:prstGeom prst="rect">
             <a:avLst/>
@@ -2988,7 +2991,7 @@
             <a:noAutofit/>
           </a:bodyPr>
           <a:p>
-            <a:pPr marL="228600" indent="-227880">
+            <a:pPr marL="228600" indent="-227520">
               <a:lnSpc>
                 <a:spcPct val="100000"/>
               </a:lnSpc>
@@ -3009,7 +3012,7 @@
             </a:endParaRPr>
           </a:p>
           <a:p>
-            <a:pPr marL="228600" indent="-227880">
+            <a:pPr marL="228600" indent="-227520">
               <a:lnSpc>
                 <a:spcPct val="100000"/>
               </a:lnSpc>
@@ -3066,7 +3069,7 @@
         <p:spPr>
           <a:xfrm>
             <a:off x="3884760" y="8685360"/>
-            <a:ext cx="2971080" cy="457920"/>
+            <a:ext cx="2970720" cy="457560"/>
           </a:xfrm>
           <a:prstGeom prst="rect">
             <a:avLst/>
@@ -3092,7 +3095,7 @@
                 <a:spcPct val="100000"/>
               </a:lnSpc>
             </a:pPr>
-            <a:fld id="{B5250252-02A6-459E-B9A3-BE89A6F95316}" type="slidenum">
+            <a:fld id="{639FBC5B-47D7-49FD-8671-1045B6C95CC2}" type="slidenum">
               <a:rPr b="0" lang="ru-RU" sz="1200" spc="-1" strike="noStrike">
                 <a:solidFill>
                   <a:srgbClr val="000000"/>
@@ -3100,7 +3103,7 @@
                 <a:latin typeface="+mn-lt"/>
                 <a:ea typeface="+mn-ea"/>
               </a:rPr>
-              <a:t>&lt;номер&gt;</a:t>
+              <a:t>23</a:t>
             </a:fld>
             <a:endParaRPr b="0" lang="ru-RU" sz="1200" spc="-1" strike="noStrike">
               <a:latin typeface="Arial"/>
@@ -3143,7 +3146,7 @@
         <p:spPr>
           <a:xfrm>
             <a:off x="685800" y="1143000"/>
-            <a:ext cx="5485680" cy="3085560"/>
+            <a:ext cx="5485320" cy="3085200"/>
           </a:xfrm>
           <a:prstGeom prst="rect">
             <a:avLst/>
@@ -3163,7 +3166,7 @@
         <p:spPr>
           <a:xfrm>
             <a:off x="685800" y="4400640"/>
-            <a:ext cx="5485680" cy="3599640"/>
+            <a:ext cx="5485320" cy="3599280"/>
           </a:xfrm>
           <a:prstGeom prst="rect">
             <a:avLst/>
@@ -3174,7 +3177,7 @@
             <a:noAutofit/>
           </a:bodyPr>
           <a:p>
-            <a:pPr marL="216000" indent="-215640">
+            <a:pPr marL="216000" indent="-215280">
               <a:lnSpc>
                 <a:spcPct val="100000"/>
               </a:lnSpc>
@@ -3190,7 +3193,7 @@
             </a:endParaRPr>
           </a:p>
           <a:p>
-            <a:pPr marL="216000" indent="-215640">
+            <a:pPr marL="216000" indent="-215280">
               <a:lnSpc>
                 <a:spcPct val="100000"/>
               </a:lnSpc>
@@ -3200,7 +3203,7 @@
             </a:endParaRPr>
           </a:p>
           <a:p>
-            <a:pPr marL="216000" indent="-215640">
+            <a:pPr marL="216000" indent="-215280">
               <a:lnSpc>
                 <a:spcPct val="100000"/>
               </a:lnSpc>
@@ -3216,7 +3219,7 @@
             </a:endParaRPr>
           </a:p>
           <a:p>
-            <a:pPr marL="216000" indent="-215640">
+            <a:pPr marL="216000" indent="-215280">
               <a:lnSpc>
                 <a:spcPct val="100000"/>
               </a:lnSpc>
@@ -3226,7 +3229,7 @@
             </a:endParaRPr>
           </a:p>
           <a:p>
-            <a:pPr marL="216000" indent="-215640">
+            <a:pPr marL="216000" indent="-215280">
               <a:lnSpc>
                 <a:spcPct val="100000"/>
               </a:lnSpc>
@@ -3252,7 +3255,7 @@
         <p:spPr>
           <a:xfrm>
             <a:off x="3884760" y="8685360"/>
-            <a:ext cx="2971080" cy="457920"/>
+            <a:ext cx="2970720" cy="457560"/>
           </a:xfrm>
           <a:prstGeom prst="rect">
             <a:avLst/>
@@ -3278,7 +3281,7 @@
                 <a:spcPct val="100000"/>
               </a:lnSpc>
             </a:pPr>
-            <a:fld id="{DF635096-9E06-4B59-9904-7B1DC4940854}" type="slidenum">
+            <a:fld id="{0A7712FC-2D15-487D-A389-C24E8D30DCE1}" type="slidenum">
               <a:rPr b="0" lang="ru-RU" sz="1200" spc="-1" strike="noStrike">
                 <a:solidFill>
                   <a:srgbClr val="000000"/>
@@ -3286,7 +3289,7 @@
                 <a:latin typeface="+mn-lt"/>
                 <a:ea typeface="+mn-ea"/>
               </a:rPr>
-              <a:t>&lt;номер&gt;</a:t>
+              <a:t>23</a:t>
             </a:fld>
             <a:endParaRPr b="0" lang="ru-RU" sz="1200" spc="-1" strike="noStrike">
               <a:latin typeface="Arial"/>
@@ -3329,7 +3332,7 @@
         <p:spPr>
           <a:xfrm>
             <a:off x="380880" y="694800"/>
-            <a:ext cx="6095160" cy="3428280"/>
+            <a:ext cx="6094800" cy="3427920"/>
           </a:xfrm>
           <a:prstGeom prst="rect">
             <a:avLst/>
@@ -3349,7 +3352,7 @@
         <p:spPr>
           <a:xfrm>
             <a:off x="685800" y="4343400"/>
-            <a:ext cx="5485680" cy="4114800"/>
+            <a:ext cx="5485320" cy="4114800"/>
           </a:xfrm>
           <a:prstGeom prst="rect">
             <a:avLst/>
@@ -3360,7 +3363,7 @@
             <a:spAutoFit/>
           </a:bodyPr>
           <a:p>
-            <a:pPr marL="216000" indent="-216000">
+            <a:pPr marL="216000" indent="-215640">
               <a:lnSpc>
                 <a:spcPct val="100000"/>
               </a:lnSpc>
@@ -3376,7 +3379,7 @@
             </a:endParaRPr>
           </a:p>
           <a:p>
-            <a:pPr marL="216000" indent="-216000">
+            <a:pPr marL="216000" indent="-215640">
               <a:lnSpc>
                 <a:spcPct val="100000"/>
               </a:lnSpc>
@@ -3385,7 +3388,49 @@
               <a:rPr b="0" lang="ru-RU" sz="2000" spc="-1" strike="noStrike">
                 <a:latin typeface="Arial"/>
               </a:rPr>
-              <a:t>FakeItEasy позволяет добавить свою реализацию InterceptionListener. Вызовы методов OnBeforeCallIntercepted и OnAfterCallIntercepted происходят каждый раз при обращении к методу mock-объекта. </a:t>
+              <a:t>FakeItEasy позволяет добавить свою реализацию InterceptionListener. Вызовы методов OnBeforeCallIntercepted и OnAfterCallIntercepted происходят каждый раз при обращении к методу mock-объекта.</a:t>
+            </a:r>
+            <a:endParaRPr b="0" lang="ru-RU" sz="2000" spc="-1" strike="noStrike">
+              <a:latin typeface="Arial"/>
+            </a:endParaRPr>
+          </a:p>
+          <a:p>
+            <a:pPr marL="216000" indent="-215640">
+              <a:lnSpc>
+                <a:spcPct val="100000"/>
+              </a:lnSpc>
+            </a:pPr>
+            <a:endParaRPr b="0" lang="ru-RU" sz="2000" spc="-1" strike="noStrike">
+              <a:latin typeface="Arial"/>
+            </a:endParaRPr>
+          </a:p>
+          <a:p>
+            <a:pPr marL="216000" indent="-215640">
+              <a:lnSpc>
+                <a:spcPct val="100000"/>
+              </a:lnSpc>
+            </a:pPr>
+            <a:r>
+              <a:rPr b="0" lang="ru-RU" sz="2000" spc="-1" strike="noStrike">
+                <a:latin typeface="Arial"/>
+              </a:rPr>
+              <a:t>По ссылке небольшая статья о тестировании многопоточного кода с использованием моков на пример Typemock.</a:t>
+            </a:r>
+            <a:endParaRPr b="0" lang="ru-RU" sz="2000" spc="-1" strike="noStrike">
+              <a:latin typeface="Arial"/>
+            </a:endParaRPr>
+          </a:p>
+          <a:p>
+            <a:pPr marL="216000" indent="-215640">
+              <a:lnSpc>
+                <a:spcPct val="100000"/>
+              </a:lnSpc>
+            </a:pPr>
+            <a:r>
+              <a:rPr b="0" lang="ru-RU" sz="2000" spc="-1" strike="noStrike">
+                <a:latin typeface="Arial"/>
+              </a:rPr>
+              <a:t> </a:t>
             </a:r>
             <a:endParaRPr b="0" lang="ru-RU" sz="2000" spc="-1" strike="noStrike">
               <a:latin typeface="Arial"/>
@@ -3428,7 +3473,7 @@
         <p:spPr>
           <a:xfrm>
             <a:off x="685800" y="1143000"/>
-            <a:ext cx="5485680" cy="3085560"/>
+            <a:ext cx="5485320" cy="3085200"/>
           </a:xfrm>
           <a:prstGeom prst="rect">
             <a:avLst/>
@@ -3448,7 +3493,7 @@
         <p:spPr>
           <a:xfrm>
             <a:off x="685800" y="4400640"/>
-            <a:ext cx="5485680" cy="3599640"/>
+            <a:ext cx="5485320" cy="3599280"/>
           </a:xfrm>
           <a:prstGeom prst="rect">
             <a:avLst/>
@@ -3459,7 +3504,7 @@
             <a:noAutofit/>
           </a:bodyPr>
           <a:p>
-            <a:pPr marL="216000" indent="-215640">
+            <a:pPr marL="216000" indent="-215280">
               <a:lnSpc>
                 <a:spcPct val="100000"/>
               </a:lnSpc>
@@ -3475,7 +3520,7 @@
             </a:endParaRPr>
           </a:p>
           <a:p>
-            <a:pPr marL="216000" indent="-215640">
+            <a:pPr marL="216000" indent="-215280">
               <a:lnSpc>
                 <a:spcPct val="100000"/>
               </a:lnSpc>
@@ -3485,7 +3530,7 @@
             </a:endParaRPr>
           </a:p>
           <a:p>
-            <a:pPr marL="216000" indent="-215640">
+            <a:pPr marL="216000" indent="-215280">
               <a:lnSpc>
                 <a:spcPct val="100000"/>
               </a:lnSpc>
@@ -3511,7 +3556,7 @@
         <p:spPr>
           <a:xfrm>
             <a:off x="3884760" y="8685360"/>
-            <a:ext cx="2971080" cy="457920"/>
+            <a:ext cx="2970720" cy="457560"/>
           </a:xfrm>
           <a:prstGeom prst="rect">
             <a:avLst/>
@@ -3537,7 +3582,7 @@
                 <a:spcPct val="100000"/>
               </a:lnSpc>
             </a:pPr>
-            <a:fld id="{B4248B96-1335-40BC-ACF3-37E25645A622}" type="slidenum">
+            <a:fld id="{2EC11EC3-E02A-4D66-9802-9B80AEBBE932}" type="slidenum">
               <a:rPr b="0" lang="ru-RU" sz="1200" spc="-1" strike="noStrike">
                 <a:solidFill>
                   <a:srgbClr val="000000"/>
@@ -3545,7 +3590,7 @@
                 <a:latin typeface="+mn-lt"/>
                 <a:ea typeface="+mn-ea"/>
               </a:rPr>
-              <a:t>&lt;номер&gt;</a:t>
+              <a:t>23</a:t>
             </a:fld>
             <a:endParaRPr b="0" lang="ru-RU" sz="1200" spc="-1" strike="noStrike">
               <a:latin typeface="Arial"/>
@@ -3588,7 +3633,7 @@
         <p:spPr>
           <a:xfrm>
             <a:off x="685800" y="1143000"/>
-            <a:ext cx="5485680" cy="3085560"/>
+            <a:ext cx="5485320" cy="3085200"/>
           </a:xfrm>
           <a:prstGeom prst="rect">
             <a:avLst/>
@@ -3608,7 +3653,7 @@
         <p:spPr>
           <a:xfrm>
             <a:off x="685800" y="4400640"/>
-            <a:ext cx="5485680" cy="3599640"/>
+            <a:ext cx="5485320" cy="3599280"/>
           </a:xfrm>
           <a:prstGeom prst="rect">
             <a:avLst/>
@@ -3619,7 +3664,7 @@
             <a:noAutofit/>
           </a:bodyPr>
           <a:p>
-            <a:pPr marL="216000" indent="-215640">
+            <a:pPr marL="216000" indent="-215280">
               <a:lnSpc>
                 <a:spcPct val="100000"/>
               </a:lnSpc>
@@ -3645,7 +3690,7 @@
         <p:spPr>
           <a:xfrm>
             <a:off x="3884760" y="8685360"/>
-            <a:ext cx="2971080" cy="457920"/>
+            <a:ext cx="2970720" cy="457560"/>
           </a:xfrm>
           <a:prstGeom prst="rect">
             <a:avLst/>
@@ -3671,7 +3716,7 @@
                 <a:spcPct val="100000"/>
               </a:lnSpc>
             </a:pPr>
-            <a:fld id="{4EFFDCF7-4447-47D2-9602-FB8846E84C7D}" type="slidenum">
+            <a:fld id="{480752F9-FF1C-4E49-A9A9-C0A7EA35D623}" type="slidenum">
               <a:rPr b="0" lang="ru-RU" sz="1200" spc="-1" strike="noStrike">
                 <a:solidFill>
                   <a:srgbClr val="000000"/>
@@ -3679,7 +3724,7 @@
                 <a:latin typeface="+mn-lt"/>
                 <a:ea typeface="+mn-ea"/>
               </a:rPr>
-              <a:t>&lt;номер&gt;</a:t>
+              <a:t>23</a:t>
             </a:fld>
             <a:endParaRPr b="0" lang="ru-RU" sz="1200" spc="-1" strike="noStrike">
               <a:latin typeface="Arial"/>
@@ -3722,7 +3767,7 @@
         <p:spPr>
           <a:xfrm>
             <a:off x="685800" y="1143000"/>
-            <a:ext cx="5485680" cy="3085560"/>
+            <a:ext cx="5485320" cy="3085200"/>
           </a:xfrm>
           <a:prstGeom prst="rect">
             <a:avLst/>
@@ -3742,7 +3787,7 @@
         <p:spPr>
           <a:xfrm>
             <a:off x="685800" y="4400640"/>
-            <a:ext cx="5485680" cy="3599640"/>
+            <a:ext cx="5485320" cy="3599280"/>
           </a:xfrm>
           <a:prstGeom prst="rect">
             <a:avLst/>
@@ -3753,7 +3798,7 @@
             <a:noAutofit/>
           </a:bodyPr>
           <a:p>
-            <a:pPr marL="216000" indent="-215640">
+            <a:pPr marL="216000" indent="-215280">
               <a:lnSpc>
                 <a:spcPct val="100000"/>
               </a:lnSpc>
@@ -3769,7 +3814,7 @@
             </a:endParaRPr>
           </a:p>
           <a:p>
-            <a:pPr marL="216000" indent="-215640">
+            <a:pPr marL="216000" indent="-215280">
               <a:lnSpc>
                 <a:spcPct val="100000"/>
               </a:lnSpc>
@@ -3779,7 +3824,7 @@
             </a:endParaRPr>
           </a:p>
           <a:p>
-            <a:pPr marL="216000" indent="-215640">
+            <a:pPr marL="216000" indent="-215280">
               <a:lnSpc>
                 <a:spcPct val="100000"/>
               </a:lnSpc>
@@ -3795,7 +3840,7 @@
             </a:endParaRPr>
           </a:p>
           <a:p>
-            <a:pPr marL="216000" indent="-215640">
+            <a:pPr marL="216000" indent="-215280">
               <a:lnSpc>
                 <a:spcPct val="100000"/>
               </a:lnSpc>
@@ -3821,7 +3866,7 @@
         <p:spPr>
           <a:xfrm>
             <a:off x="3884760" y="8685360"/>
-            <a:ext cx="2971080" cy="457920"/>
+            <a:ext cx="2970720" cy="457560"/>
           </a:xfrm>
           <a:prstGeom prst="rect">
             <a:avLst/>
@@ -3847,7 +3892,7 @@
                 <a:spcPct val="100000"/>
               </a:lnSpc>
             </a:pPr>
-            <a:fld id="{1C1A7F04-4576-4C32-8A1D-8F8B9698C42A}" type="slidenum">
+            <a:fld id="{ED201C77-9C0A-42FB-985D-FD1F43F77B50}" type="slidenum">
               <a:rPr b="0" lang="ru-RU" sz="1200" spc="-1" strike="noStrike">
                 <a:solidFill>
                   <a:srgbClr val="000000"/>
@@ -3855,7 +3900,7 @@
                 <a:latin typeface="+mn-lt"/>
                 <a:ea typeface="+mn-ea"/>
               </a:rPr>
-              <a:t>&lt;номер&gt;</a:t>
+              <a:t>23</a:t>
             </a:fld>
             <a:endParaRPr b="0" lang="ru-RU" sz="1200" spc="-1" strike="noStrike">
               <a:latin typeface="Arial"/>
@@ -12037,9 +12082,9 @@
         <p:grpSpPr>
           <a:xfrm>
             <a:off x="1295280" y="5221800"/>
-            <a:ext cx="1979280" cy="380880"/>
+            <a:ext cx="1978920" cy="380520"/>
             <a:chOff x="1295280" y="5221800"/>
-            <a:chExt cx="1979280" cy="380880"/>
+            <a:chExt cx="1978920" cy="380520"/>
           </a:xfrm>
         </p:grpSpPr>
         <p:sp>
@@ -12051,7 +12096,7 @@
           <p:spPr>
             <a:xfrm>
               <a:off x="3043440" y="5432040"/>
-              <a:ext cx="174960" cy="38160"/>
+              <a:ext cx="174600" cy="37800"/>
             </a:xfrm>
             <a:prstGeom prst="rect">
               <a:avLst/>
@@ -12105,7 +12150,7 @@
           <p:spPr>
             <a:xfrm>
               <a:off x="1295280" y="5221800"/>
-              <a:ext cx="1979280" cy="380880"/>
+              <a:ext cx="1978920" cy="380520"/>
             </a:xfrm>
             <a:prstGeom prst="rect">
               <a:avLst/>
@@ -12113,7 +12158,7 @@
             <a:blipFill rotWithShape="0">
               <a:blip r:embed="rId2"/>
               <a:stretch>
-                <a:fillRect l="-985" t="0" r="-985" b="0"/>
+                <a:fillRect l="-971" t="0" r="-971" b="0"/>
               </a:stretch>
             </a:blipFill>
             <a:ln>
@@ -13815,7 +13860,7 @@
         <p:spPr>
           <a:xfrm>
             <a:off x="1295640" y="549360"/>
-            <a:ext cx="9600480" cy="791280"/>
+            <a:ext cx="9600120" cy="790920"/>
           </a:xfrm>
           <a:prstGeom prst="rect">
             <a:avLst/>
@@ -13866,7 +13911,7 @@
         <p:spPr>
           <a:xfrm>
             <a:off x="1295280" y="3429000"/>
-            <a:ext cx="9600480" cy="1799640"/>
+            <a:ext cx="9600120" cy="1799280"/>
           </a:xfrm>
           <a:prstGeom prst="rect">
             <a:avLst/>
@@ -13975,7 +14020,7 @@
         <p:spPr>
           <a:xfrm>
             <a:off x="1127520" y="5013000"/>
-            <a:ext cx="627840" cy="649800"/>
+            <a:ext cx="627480" cy="649440"/>
           </a:xfrm>
           <a:prstGeom prst="rect">
             <a:avLst/>
@@ -14051,7 +14096,7 @@
         <p:spPr>
           <a:xfrm>
             <a:off x="1295280" y="1628640"/>
-            <a:ext cx="9600480" cy="4679280"/>
+            <a:ext cx="9600120" cy="4678920"/>
           </a:xfrm>
           <a:prstGeom prst="rect">
             <a:avLst/>
@@ -14330,7 +14375,7 @@
         <p:spPr>
           <a:xfrm>
             <a:off x="1295640" y="549360"/>
-            <a:ext cx="9600480" cy="791280"/>
+            <a:ext cx="9600120" cy="790920"/>
           </a:xfrm>
           <a:prstGeom prst="rect">
             <a:avLst/>
@@ -14395,10 +14440,10 @@
   <p:timing>
     <p:tnLst>
       <p:par>
-        <p:cTn id="101" dur="indefinite" restart="never" nodeType="tmRoot">
+        <p:cTn id="105" dur="indefinite" restart="never" nodeType="tmRoot">
           <p:childTnLst>
             <p:seq>
-              <p:cTn id="102" dur="indefinite" nodeType="mainSeq"/>
+              <p:cTn id="106" dur="indefinite" nodeType="mainSeq"/>
               <p:prevCondLst>
                 <p:cond delay="0" evt="onPrev">
                   <p:tgtEl>
@@ -14448,7 +14493,7 @@
         <p:spPr>
           <a:xfrm>
             <a:off x="1295280" y="1628640"/>
-            <a:ext cx="9600480" cy="4679280"/>
+            <a:ext cx="9600120" cy="4678920"/>
           </a:xfrm>
           <a:prstGeom prst="rect">
             <a:avLst/>
@@ -14469,7 +14514,7 @@
             <a:normAutofit/>
           </a:bodyPr>
           <a:p>
-            <a:pPr marL="457200" indent="-456480">
+            <a:pPr marL="457200" indent="-456120">
               <a:lnSpc>
                 <a:spcPct val="100000"/>
               </a:lnSpc>
@@ -14497,7 +14542,7 @@
             </a:endParaRPr>
           </a:p>
           <a:p>
-            <a:pPr marL="457200" indent="-456480">
+            <a:pPr marL="457200" indent="-456120">
               <a:lnSpc>
                 <a:spcPct val="100000"/>
               </a:lnSpc>
@@ -14525,7 +14570,7 @@
             </a:endParaRPr>
           </a:p>
           <a:p>
-            <a:pPr marL="457200" indent="-456480">
+            <a:pPr marL="457200" indent="-456120">
               <a:lnSpc>
                 <a:spcPct val="100000"/>
               </a:lnSpc>
@@ -14563,7 +14608,7 @@
         <p:spPr>
           <a:xfrm>
             <a:off x="1295640" y="549360"/>
-            <a:ext cx="9600480" cy="791280"/>
+            <a:ext cx="9600120" cy="790920"/>
           </a:xfrm>
           <a:prstGeom prst="rect">
             <a:avLst/>
@@ -14628,60 +14673,11 @@
   <p:timing>
     <p:tnLst>
       <p:par>
-        <p:cTn id="103" dur="indefinite" restart="never" nodeType="tmRoot">
+        <p:cTn id="107" dur="indefinite" restart="never" nodeType="tmRoot">
           <p:childTnLst>
             <p:seq>
-              <p:cTn id="104" dur="indefinite" nodeType="mainSeq">
+              <p:cTn id="108" dur="indefinite" nodeType="mainSeq">
                 <p:childTnLst>
-                  <p:par>
-                    <p:cTn id="105" fill="hold">
-                      <p:stCondLst>
-                        <p:cond delay="indefinite"/>
-                      </p:stCondLst>
-                      <p:childTnLst>
-                        <p:par>
-                          <p:cTn id="106" fill="hold">
-                            <p:stCondLst>
-                              <p:cond delay="0"/>
-                            </p:stCondLst>
-                            <p:childTnLst>
-                              <p:par>
-                                <p:cTn id="107" nodeType="clickEffect" fill="hold" presetClass="entr" presetID="1">
-                                  <p:stCondLst>
-                                    <p:cond delay="0"/>
-                                  </p:stCondLst>
-                                  <p:childTnLst>
-                                    <p:set>
-                                      <p:cBhvr>
-                                        <p:cTn id="108" dur="1" fill="hold">
-                                          <p:stCondLst>
-                                            <p:cond delay="0"/>
-                                          </p:stCondLst>
-                                        </p:cTn>
-                                        <p:tgtEl>
-                                          <p:spTgt spid="267">
-                                            <p:txEl>
-                                              <p:pRg st="0" end="0"/>
-                                            </p:txEl>
-                                          </p:spTgt>
-                                        </p:tgtEl>
-                                        <p:attrNameLst>
-                                          <p:attrName>style.visibility</p:attrName>
-                                        </p:attrNameLst>
-                                      </p:cBhvr>
-                                      <p:to>
-                                        <p:strVal val="visible"/>
-                                      </p:to>
-                                    </p:set>
-                                  </p:childTnLst>
-                                </p:cTn>
-                              </p:par>
-                            </p:childTnLst>
-                          </p:cTn>
-                        </p:par>
-                      </p:childTnLst>
-                    </p:cTn>
-                  </p:par>
                   <p:par>
                     <p:cTn id="109" fill="hold">
                       <p:stCondLst>
@@ -14710,7 +14706,7 @@
                                         <p:tgtEl>
                                           <p:spTgt spid="267">
                                             <p:txEl>
-                                              <p:pRg st="1" end="1"/>
+                                              <p:pRg st="0" end="0"/>
                                             </p:txEl>
                                           </p:spTgt>
                                         </p:tgtEl>
@@ -14752,6 +14748,55 @@
                                     <p:set>
                                       <p:cBhvr>
                                         <p:cTn id="116" dur="1" fill="hold">
+                                          <p:stCondLst>
+                                            <p:cond delay="0"/>
+                                          </p:stCondLst>
+                                        </p:cTn>
+                                        <p:tgtEl>
+                                          <p:spTgt spid="267">
+                                            <p:txEl>
+                                              <p:pRg st="1" end="1"/>
+                                            </p:txEl>
+                                          </p:spTgt>
+                                        </p:tgtEl>
+                                        <p:attrNameLst>
+                                          <p:attrName>style.visibility</p:attrName>
+                                        </p:attrNameLst>
+                                      </p:cBhvr>
+                                      <p:to>
+                                        <p:strVal val="visible"/>
+                                      </p:to>
+                                    </p:set>
+                                  </p:childTnLst>
+                                </p:cTn>
+                              </p:par>
+                            </p:childTnLst>
+                          </p:cTn>
+                        </p:par>
+                      </p:childTnLst>
+                    </p:cTn>
+                  </p:par>
+                  <p:par>
+                    <p:cTn id="117" fill="hold">
+                      <p:stCondLst>
+                        <p:cond delay="indefinite"/>
+                      </p:stCondLst>
+                      <p:childTnLst>
+                        <p:par>
+                          <p:cTn id="118" fill="hold">
+                            <p:stCondLst>
+                              <p:cond delay="0"/>
+                            </p:stCondLst>
+                            <p:childTnLst>
+                              <p:par>
+                                <p:cTn id="119" nodeType="clickEffect" fill="hold" presetClass="entr" presetID="1">
+                                  <p:stCondLst>
+                                    <p:cond delay="0"/>
+                                  </p:stCondLst>
+                                  <p:childTnLst>
+                                    <p:set>
+                                      <p:cBhvr>
+                                        <p:cTn id="120" dur="1" fill="hold">
                                           <p:stCondLst>
                                             <p:cond delay="0"/>
                                           </p:stCondLst>
@@ -14831,7 +14876,7 @@
         <p:spPr>
           <a:xfrm>
             <a:off x="1295280" y="1628640"/>
-            <a:ext cx="9600480" cy="4679280"/>
+            <a:ext cx="9600120" cy="4678920"/>
           </a:xfrm>
           <a:prstGeom prst="rect">
             <a:avLst/>
@@ -15084,7 +15129,7 @@
         <p:spPr>
           <a:xfrm>
             <a:off x="1295640" y="549360"/>
-            <a:ext cx="9600480" cy="791280"/>
+            <a:ext cx="9600120" cy="790920"/>
           </a:xfrm>
           <a:prstGeom prst="rect">
             <a:avLst/>
@@ -15165,7 +15210,7 @@
         <p:spPr>
           <a:xfrm>
             <a:off x="1295640" y="549360"/>
-            <a:ext cx="9600480" cy="791280"/>
+            <a:ext cx="9600120" cy="790920"/>
           </a:xfrm>
           <a:prstGeom prst="rect">
             <a:avLst/>
@@ -15216,7 +15261,7 @@
         <p:spPr>
           <a:xfrm>
             <a:off x="6622200" y="2094120"/>
-            <a:ext cx="3416040" cy="2138760"/>
+            <a:ext cx="3415680" cy="2138400"/>
           </a:xfrm>
           <a:prstGeom prst="rect">
             <a:avLst/>
@@ -15419,7 +15464,7 @@
         <p:spPr>
           <a:xfrm>
             <a:off x="6376320" y="1781280"/>
-            <a:ext cx="4261680" cy="2845440"/>
+            <a:ext cx="4261320" cy="2845080"/>
           </a:xfrm>
           <a:prstGeom prst="rect">
             <a:avLst/>
@@ -15456,7 +15501,7 @@
         <p:spPr>
           <a:xfrm>
             <a:off x="1447920" y="1781280"/>
-            <a:ext cx="4327920" cy="4679280"/>
+            <a:ext cx="4327560" cy="4678920"/>
           </a:xfrm>
           <a:prstGeom prst="rect">
             <a:avLst/>
@@ -15780,7 +15825,7 @@
         <p:spPr>
           <a:xfrm>
             <a:off x="6622200" y="4695480"/>
-            <a:ext cx="3416040" cy="641880"/>
+            <a:ext cx="3415680" cy="641520"/>
           </a:xfrm>
           <a:prstGeom prst="rect">
             <a:avLst/>
@@ -15806,7 +15851,7 @@
         <p:spPr>
           <a:xfrm>
             <a:off x="6622200" y="3984840"/>
-            <a:ext cx="3416040" cy="641880"/>
+            <a:ext cx="3415680" cy="641520"/>
           </a:xfrm>
           <a:prstGeom prst="rect">
             <a:avLst/>
@@ -15832,7 +15877,7 @@
         <p:spPr>
           <a:xfrm>
             <a:off x="6238440" y="4876560"/>
-            <a:ext cx="4261680" cy="455760"/>
+            <a:ext cx="4261320" cy="455400"/>
           </a:xfrm>
           <a:prstGeom prst="rect">
             <a:avLst/>
@@ -15893,7 +15938,7 @@
         <p:spPr>
           <a:xfrm>
             <a:off x="6622200" y="1622160"/>
-            <a:ext cx="3730680" cy="471240"/>
+            <a:ext cx="3730320" cy="470880"/>
           </a:xfrm>
           <a:prstGeom prst="rect">
             <a:avLst/>
@@ -15929,7 +15974,7 @@
         <p:spPr>
           <a:xfrm>
             <a:off x="6238440" y="5754960"/>
-            <a:ext cx="5043240" cy="455760"/>
+            <a:ext cx="5042880" cy="455400"/>
           </a:xfrm>
           <a:prstGeom prst="rect">
             <a:avLst/>
@@ -16030,7 +16075,7 @@
         <p:spPr>
           <a:xfrm>
             <a:off x="6095880" y="5754960"/>
-            <a:ext cx="279360" cy="455760"/>
+            <a:ext cx="279000" cy="455400"/>
           </a:xfrm>
           <a:prstGeom prst="rect">
             <a:avLst/>
@@ -16085,56 +16130,11 @@
   <p:timing>
     <p:tnLst>
       <p:par>
-        <p:cTn id="117" dur="indefinite" restart="never" nodeType="tmRoot">
+        <p:cTn id="121" dur="indefinite" restart="never" nodeType="tmRoot">
           <p:childTnLst>
             <p:seq>
-              <p:cTn id="118" dur="indefinite" nodeType="mainSeq">
+              <p:cTn id="122" dur="indefinite" nodeType="mainSeq">
                 <p:childTnLst>
-                  <p:par>
-                    <p:cTn id="119" fill="hold">
-                      <p:stCondLst>
-                        <p:cond delay="indefinite"/>
-                      </p:stCondLst>
-                      <p:childTnLst>
-                        <p:par>
-                          <p:cTn id="120" fill="hold">
-                            <p:stCondLst>
-                              <p:cond delay="0"/>
-                            </p:stCondLst>
-                            <p:childTnLst>
-                              <p:par>
-                                <p:cTn id="121" nodeType="clickEffect" fill="hold" presetClass="entr" presetID="1">
-                                  <p:stCondLst>
-                                    <p:cond delay="0"/>
-                                  </p:stCondLst>
-                                  <p:childTnLst>
-                                    <p:set>
-                                      <p:cBhvr>
-                                        <p:cTn id="122" dur="1" fill="hold">
-                                          <p:stCondLst>
-                                            <p:cond delay="0"/>
-                                          </p:stCondLst>
-                                        </p:cTn>
-                                        <p:tgtEl>
-                                          <p:spTgt spid="277"/>
-                                        </p:tgtEl>
-                                        <p:attrNameLst>
-                                          <p:attrName>style.visibility</p:attrName>
-                                        </p:attrNameLst>
-                                      </p:cBhvr>
-                                      <p:to>
-                                        <p:strVal val="visible"/>
-                                      </p:to>
-                                    </p:set>
-                                  </p:childTnLst>
-                                </p:cTn>
-                              </p:par>
-                            </p:childTnLst>
-                          </p:cTn>
-                        </p:par>
-                      </p:childTnLst>
-                    </p:cTn>
-                  </p:par>
                   <p:par>
                     <p:cTn id="123" fill="hold">
                       <p:stCondLst>
@@ -16161,6 +16161,51 @@
                                           </p:stCondLst>
                                         </p:cTn>
                                         <p:tgtEl>
+                                          <p:spTgt spid="277"/>
+                                        </p:tgtEl>
+                                        <p:attrNameLst>
+                                          <p:attrName>style.visibility</p:attrName>
+                                        </p:attrNameLst>
+                                      </p:cBhvr>
+                                      <p:to>
+                                        <p:strVal val="visible"/>
+                                      </p:to>
+                                    </p:set>
+                                  </p:childTnLst>
+                                </p:cTn>
+                              </p:par>
+                            </p:childTnLst>
+                          </p:cTn>
+                        </p:par>
+                      </p:childTnLst>
+                    </p:cTn>
+                  </p:par>
+                  <p:par>
+                    <p:cTn id="127" fill="hold">
+                      <p:stCondLst>
+                        <p:cond delay="indefinite"/>
+                      </p:stCondLst>
+                      <p:childTnLst>
+                        <p:par>
+                          <p:cTn id="128" fill="hold">
+                            <p:stCondLst>
+                              <p:cond delay="0"/>
+                            </p:stCondLst>
+                            <p:childTnLst>
+                              <p:par>
+                                <p:cTn id="129" nodeType="clickEffect" fill="hold" presetClass="entr" presetID="1">
+                                  <p:stCondLst>
+                                    <p:cond delay="0"/>
+                                  </p:stCondLst>
+                                  <p:childTnLst>
+                                    <p:set>
+                                      <p:cBhvr>
+                                        <p:cTn id="130" dur="1" fill="hold">
+                                          <p:stCondLst>
+                                            <p:cond delay="0"/>
+                                          </p:stCondLst>
+                                        </p:cTn>
+                                        <p:tgtEl>
                                           <p:spTgt spid="272">
                                             <p:txEl>
                                               <p:pRg st="3" end="3"/>
@@ -16179,14 +16224,14 @@
                                 </p:cTn>
                               </p:par>
                               <p:par>
-                                <p:cTn id="127" nodeType="withEffect" fill="hold" presetClass="entr" presetID="1">
+                                <p:cTn id="131" nodeType="withEffect" fill="hold" presetClass="entr" presetID="1">
                                   <p:stCondLst>
                                     <p:cond delay="0"/>
                                   </p:stCondLst>
                                   <p:childTnLst>
                                     <p:set>
                                       <p:cBhvr>
-                                        <p:cTn id="128" dur="1" fill="hold">
+                                        <p:cTn id="132" dur="1" fill="hold">
                                           <p:stCondLst>
                                             <p:cond delay="0"/>
                                           </p:stCondLst>
@@ -16212,26 +16257,26 @@
                     </p:cTn>
                   </p:par>
                   <p:par>
-                    <p:cTn id="129" fill="hold">
+                    <p:cTn id="133" fill="hold">
                       <p:stCondLst>
                         <p:cond delay="indefinite"/>
                       </p:stCondLst>
                       <p:childTnLst>
                         <p:par>
-                          <p:cTn id="130" fill="hold">
+                          <p:cTn id="134" fill="hold">
                             <p:stCondLst>
                               <p:cond delay="0"/>
                             </p:stCondLst>
                             <p:childTnLst>
                               <p:par>
-                                <p:cTn id="131" nodeType="clickEffect" fill="hold" presetClass="entr" presetID="1">
+                                <p:cTn id="135" nodeType="clickEffect" fill="hold" presetClass="entr" presetID="1">
                                   <p:stCondLst>
                                     <p:cond delay="0"/>
                                   </p:stCondLst>
                                   <p:childTnLst>
                                     <p:set>
                                       <p:cBhvr>
-                                        <p:cTn id="132" dur="1" fill="hold">
+                                        <p:cTn id="136" dur="1" fill="hold">
                                           <p:stCondLst>
                                             <p:cond delay="0"/>
                                           </p:stCondLst>
@@ -16255,14 +16300,14 @@
                                 </p:cTn>
                               </p:par>
                               <p:par>
-                                <p:cTn id="133" nodeType="withEffect" fill="hold" presetClass="entr" presetID="1">
+                                <p:cTn id="137" nodeType="withEffect" fill="hold" presetClass="entr" presetID="1">
                                   <p:stCondLst>
                                     <p:cond delay="0"/>
                                   </p:stCondLst>
                                   <p:childTnLst>
                                     <p:set>
                                       <p:cBhvr>
-                                        <p:cTn id="134" dur="1" fill="hold">
+                                        <p:cTn id="138" dur="1" fill="hold">
                                           <p:stCondLst>
                                             <p:cond delay="0"/>
                                           </p:stCondLst>
@@ -16286,14 +16331,14 @@
                                 </p:cTn>
                               </p:par>
                               <p:par>
-                                <p:cTn id="135" nodeType="withEffect" fill="hold" presetClass="entr" presetID="1">
+                                <p:cTn id="139" nodeType="withEffect" fill="hold" presetClass="entr" presetID="1">
                                   <p:stCondLst>
                                     <p:cond delay="0"/>
                                   </p:stCondLst>
                                   <p:childTnLst>
                                     <p:set>
                                       <p:cBhvr>
-                                        <p:cTn id="136" dur="1" fill="hold">
+                                        <p:cTn id="140" dur="1" fill="hold">
                                           <p:stCondLst>
                                             <p:cond delay="0"/>
                                           </p:stCondLst>
@@ -16323,26 +16368,26 @@
                     </p:cTn>
                   </p:par>
                   <p:par>
-                    <p:cTn id="137" fill="hold">
+                    <p:cTn id="141" fill="hold">
                       <p:stCondLst>
                         <p:cond delay="indefinite"/>
                       </p:stCondLst>
                       <p:childTnLst>
                         <p:par>
-                          <p:cTn id="138" fill="hold">
+                          <p:cTn id="142" fill="hold">
                             <p:stCondLst>
                               <p:cond delay="0"/>
                             </p:stCondLst>
                             <p:childTnLst>
                               <p:par>
-                                <p:cTn id="139" nodeType="clickEffect" fill="hold" presetClass="entr" presetID="1">
+                                <p:cTn id="143" nodeType="clickEffect" fill="hold" presetClass="entr" presetID="1">
                                   <p:stCondLst>
                                     <p:cond delay="0"/>
                                   </p:stCondLst>
                                   <p:childTnLst>
                                     <p:set>
                                       <p:cBhvr>
-                                        <p:cTn id="140" dur="1" fill="hold">
+                                        <p:cTn id="144" dur="1" fill="hold">
                                           <p:stCondLst>
                                             <p:cond delay="0"/>
                                           </p:stCondLst>
@@ -16366,14 +16411,14 @@
                                 </p:cTn>
                               </p:par>
                               <p:par>
-                                <p:cTn id="141" nodeType="withEffect" fill="hold" presetClass="entr" presetID="1">
+                                <p:cTn id="145" nodeType="withEffect" fill="hold" presetClass="entr" presetID="1">
                                   <p:stCondLst>
                                     <p:cond delay="0"/>
                                   </p:stCondLst>
                                   <p:childTnLst>
                                     <p:set>
                                       <p:cBhvr>
-                                        <p:cTn id="142" dur="1" fill="hold">
+                                        <p:cTn id="146" dur="1" fill="hold">
                                           <p:stCondLst>
                                             <p:cond delay="0"/>
                                           </p:stCondLst>
@@ -16397,14 +16442,14 @@
                                 </p:cTn>
                               </p:par>
                               <p:par>
-                                <p:cTn id="143" nodeType="withEffect" fill="hold" presetClass="entr" presetID="1">
+                                <p:cTn id="147" nodeType="withEffect" fill="hold" presetClass="entr" presetID="1">
                                   <p:stCondLst>
                                     <p:cond delay="0"/>
                                   </p:stCondLst>
                                   <p:childTnLst>
                                     <p:set>
                                       <p:cBhvr>
-                                        <p:cTn id="144" dur="1" fill="hold">
+                                        <p:cTn id="148" dur="1" fill="hold">
                                           <p:stCondLst>
                                             <p:cond delay="0"/>
                                           </p:stCondLst>
@@ -16428,14 +16473,14 @@
                                 </p:cTn>
                               </p:par>
                               <p:par>
-                                <p:cTn id="145" nodeType="withEffect" fill="hold" presetClass="entr" presetID="1">
+                                <p:cTn id="149" nodeType="withEffect" fill="hold" presetClass="entr" presetID="1">
                                   <p:stCondLst>
                                     <p:cond delay="0"/>
                                   </p:stCondLst>
                                   <p:childTnLst>
                                     <p:set>
                                       <p:cBhvr>
-                                        <p:cTn id="146" dur="1" fill="hold">
+                                        <p:cTn id="150" dur="1" fill="hold">
                                           <p:stCondLst>
                                             <p:cond delay="0"/>
                                           </p:stCondLst>
@@ -16465,81 +16510,19 @@
                     </p:cTn>
                   </p:par>
                   <p:par>
-                    <p:cTn id="147" fill="hold">
+                    <p:cTn id="151" fill="hold">
                       <p:stCondLst>
                         <p:cond delay="indefinite"/>
                       </p:stCondLst>
                       <p:childTnLst>
                         <p:par>
-                          <p:cTn id="148" fill="hold">
+                          <p:cTn id="152" fill="hold">
                             <p:stCondLst>
                               <p:cond delay="0"/>
                             </p:stCondLst>
                             <p:childTnLst>
                               <p:par>
-                                <p:cTn id="149" nodeType="clickEffect" fill="hold" presetClass="entr" presetID="1">
-                                  <p:stCondLst>
-                                    <p:cond delay="0"/>
-                                  </p:stCondLst>
-                                  <p:childTnLst>
-                                    <p:set>
-                                      <p:cBhvr>
-                                        <p:cTn id="150" dur="1" fill="hold">
-                                          <p:stCondLst>
-                                            <p:cond delay="0"/>
-                                          </p:stCondLst>
-                                        </p:cTn>
-                                        <p:tgtEl>
-                                          <p:spTgt spid="274">
-                                            <p:txEl>
-                                              <p:pRg st="7" end="7"/>
-                                            </p:txEl>
-                                          </p:spTgt>
-                                        </p:tgtEl>
-                                        <p:attrNameLst>
-                                          <p:attrName>style.visibility</p:attrName>
-                                        </p:attrNameLst>
-                                      </p:cBhvr>
-                                      <p:to>
-                                        <p:strVal val="visible"/>
-                                      </p:to>
-                                    </p:set>
-                                  </p:childTnLst>
-                                </p:cTn>
-                              </p:par>
-                              <p:par>
-                                <p:cTn id="151" nodeType="withEffect" fill="hold" presetClass="entr" presetID="1">
-                                  <p:stCondLst>
-                                    <p:cond delay="0"/>
-                                  </p:stCondLst>
-                                  <p:childTnLst>
-                                    <p:set>
-                                      <p:cBhvr>
-                                        <p:cTn id="152" dur="1" fill="hold">
-                                          <p:stCondLst>
-                                            <p:cond delay="0"/>
-                                          </p:stCondLst>
-                                        </p:cTn>
-                                        <p:tgtEl>
-                                          <p:spTgt spid="274">
-                                            <p:txEl>
-                                              <p:pRg st="8" end="8"/>
-                                            </p:txEl>
-                                          </p:spTgt>
-                                        </p:tgtEl>
-                                        <p:attrNameLst>
-                                          <p:attrName>style.visibility</p:attrName>
-                                        </p:attrNameLst>
-                                      </p:cBhvr>
-                                      <p:to>
-                                        <p:strVal val="visible"/>
-                                      </p:to>
-                                    </p:set>
-                                  </p:childTnLst>
-                                </p:cTn>
-                              </p:par>
-                              <p:par>
-                                <p:cTn id="153" nodeType="withEffect" fill="hold" presetClass="entr" presetID="1">
+                                <p:cTn id="153" nodeType="clickEffect" fill="hold" presetClass="entr" presetID="1">
                                   <p:stCondLst>
                                     <p:cond delay="0"/>
                                   </p:stCondLst>
@@ -16554,7 +16537,7 @@
                                         <p:tgtEl>
                                           <p:spTgt spid="274">
                                             <p:txEl>
-                                              <p:pRg st="9" end="9"/>
+                                              <p:pRg st="7" end="7"/>
                                             </p:txEl>
                                           </p:spTgt>
                                         </p:tgtEl>
@@ -16583,9 +16566,9 @@
                                           </p:stCondLst>
                                         </p:cTn>
                                         <p:tgtEl>
-                                          <p:spTgt spid="272">
+                                          <p:spTgt spid="274">
                                             <p:txEl>
-                                              <p:pRg st="0" end="0"/>
+                                              <p:pRg st="8" end="8"/>
                                             </p:txEl>
                                           </p:spTgt>
                                         </p:tgtEl>
@@ -16600,26 +16583,39 @@
                                   </p:childTnLst>
                                 </p:cTn>
                               </p:par>
-                            </p:childTnLst>
-                          </p:cTn>
-                        </p:par>
-                      </p:childTnLst>
-                    </p:cTn>
-                  </p:par>
-                  <p:par>
-                    <p:cTn id="157" fill="hold">
-                      <p:stCondLst>
-                        <p:cond delay="indefinite"/>
-                      </p:stCondLst>
-                      <p:childTnLst>
-                        <p:par>
-                          <p:cTn id="158" fill="hold">
-                            <p:stCondLst>
-                              <p:cond delay="0"/>
-                            </p:stCondLst>
-                            <p:childTnLst>
                               <p:par>
-                                <p:cTn id="159" nodeType="clickEffect" fill="hold" presetClass="entr" presetID="1">
+                                <p:cTn id="157" nodeType="withEffect" fill="hold" presetClass="entr" presetID="1">
+                                  <p:stCondLst>
+                                    <p:cond delay="0"/>
+                                  </p:stCondLst>
+                                  <p:childTnLst>
+                                    <p:set>
+                                      <p:cBhvr>
+                                        <p:cTn id="158" dur="1" fill="hold">
+                                          <p:stCondLst>
+                                            <p:cond delay="0"/>
+                                          </p:stCondLst>
+                                        </p:cTn>
+                                        <p:tgtEl>
+                                          <p:spTgt spid="274">
+                                            <p:txEl>
+                                              <p:pRg st="9" end="9"/>
+                                            </p:txEl>
+                                          </p:spTgt>
+                                        </p:tgtEl>
+                                        <p:attrNameLst>
+                                          <p:attrName>style.visibility</p:attrName>
+                                        </p:attrNameLst>
+                                      </p:cBhvr>
+                                      <p:to>
+                                        <p:strVal val="visible"/>
+                                      </p:to>
+                                    </p:set>
+                                  </p:childTnLst>
+                                </p:cTn>
+                              </p:par>
+                              <p:par>
+                                <p:cTn id="159" nodeType="withEffect" fill="hold" presetClass="entr" presetID="1">
                                   <p:stCondLst>
                                     <p:cond delay="0"/>
                                   </p:stCondLst>
@@ -16632,7 +16628,11 @@
                                           </p:stCondLst>
                                         </p:cTn>
                                         <p:tgtEl>
-                                          <p:spTgt spid="280"/>
+                                          <p:spTgt spid="272">
+                                            <p:txEl>
+                                              <p:pRg st="0" end="0"/>
+                                            </p:txEl>
+                                          </p:spTgt>
                                         </p:tgtEl>
                                         <p:attrNameLst>
                                           <p:attrName>style.visibility</p:attrName>
@@ -16677,6 +16677,51 @@
                                           </p:stCondLst>
                                         </p:cTn>
                                         <p:tgtEl>
+                                          <p:spTgt spid="280"/>
+                                        </p:tgtEl>
+                                        <p:attrNameLst>
+                                          <p:attrName>style.visibility</p:attrName>
+                                        </p:attrNameLst>
+                                      </p:cBhvr>
+                                      <p:to>
+                                        <p:strVal val="visible"/>
+                                      </p:to>
+                                    </p:set>
+                                  </p:childTnLst>
+                                </p:cTn>
+                              </p:par>
+                            </p:childTnLst>
+                          </p:cTn>
+                        </p:par>
+                      </p:childTnLst>
+                    </p:cTn>
+                  </p:par>
+                  <p:par>
+                    <p:cTn id="165" fill="hold">
+                      <p:stCondLst>
+                        <p:cond delay="indefinite"/>
+                      </p:stCondLst>
+                      <p:childTnLst>
+                        <p:par>
+                          <p:cTn id="166" fill="hold">
+                            <p:stCondLst>
+                              <p:cond delay="0"/>
+                            </p:stCondLst>
+                            <p:childTnLst>
+                              <p:par>
+                                <p:cTn id="167" nodeType="clickEffect" fill="hold" presetClass="entr" presetID="1">
+                                  <p:stCondLst>
+                                    <p:cond delay="0"/>
+                                  </p:stCondLst>
+                                  <p:childTnLst>
+                                    <p:set>
+                                      <p:cBhvr>
+                                        <p:cTn id="168" dur="1" fill="hold">
+                                          <p:stCondLst>
+                                            <p:cond delay="0"/>
+                                          </p:stCondLst>
+                                        </p:cTn>
+                                        <p:tgtEl>
                                           <p:spTgt spid="279"/>
                                         </p:tgtEl>
                                         <p:attrNameLst>
@@ -16691,14 +16736,14 @@
                                 </p:cTn>
                               </p:par>
                               <p:par>
-                                <p:cTn id="165" nodeType="withEffect" fill="hold" presetClass="exit" presetID="1">
+                                <p:cTn id="169" nodeType="withEffect" fill="hold" presetClass="exit" presetID="1">
                                   <p:stCondLst>
                                     <p:cond delay="0"/>
                                   </p:stCondLst>
                                   <p:childTnLst>
                                     <p:set>
                                       <p:cBhvr>
-                                        <p:cTn id="166" dur="1" fill="hold">
+                                        <p:cTn id="170" dur="1" fill="hold">
                                           <p:stCondLst>
                                             <p:cond delay="0"/>
                                           </p:stCondLst>
@@ -16774,7 +16819,7 @@
         <p:spPr>
           <a:xfrm>
             <a:off x="1295640" y="549360"/>
-            <a:ext cx="9600480" cy="791280"/>
+            <a:ext cx="9600120" cy="790920"/>
           </a:xfrm>
           <a:prstGeom prst="rect">
             <a:avLst/>
@@ -16825,7 +16870,7 @@
         <p:spPr>
           <a:xfrm>
             <a:off x="1295280" y="1628640"/>
-            <a:ext cx="9600480" cy="4679280"/>
+            <a:ext cx="9600120" cy="4678920"/>
           </a:xfrm>
           <a:prstGeom prst="rect">
             <a:avLst/>
@@ -16943,32 +16988,32 @@
   <p:timing>
     <p:tnLst>
       <p:par>
-        <p:cTn id="167" dur="indefinite" restart="never" nodeType="tmRoot">
+        <p:cTn id="171" dur="indefinite" restart="never" nodeType="tmRoot">
           <p:childTnLst>
             <p:seq>
-              <p:cTn id="168" dur="indefinite" nodeType="mainSeq">
+              <p:cTn id="172" dur="indefinite" nodeType="mainSeq">
                 <p:childTnLst>
                   <p:par>
-                    <p:cTn id="169" fill="hold">
+                    <p:cTn id="173" fill="hold">
                       <p:stCondLst>
                         <p:cond delay="indefinite"/>
                       </p:stCondLst>
                       <p:childTnLst>
                         <p:par>
-                          <p:cTn id="170" fill="hold">
+                          <p:cTn id="174" fill="hold">
                             <p:stCondLst>
                               <p:cond delay="0"/>
                             </p:stCondLst>
                             <p:childTnLst>
                               <p:par>
-                                <p:cTn id="171" nodeType="clickEffect" fill="hold" presetClass="entr" presetID="1">
+                                <p:cTn id="175" nodeType="clickEffect" fill="hold" presetClass="entr" presetID="1">
                                   <p:stCondLst>
                                     <p:cond delay="0"/>
                                   </p:stCondLst>
                                   <p:childTnLst>
                                     <p:set>
                                       <p:cBhvr>
-                                        <p:cTn id="172" dur="1" fill="hold">
+                                        <p:cTn id="176" dur="1" fill="hold">
                                           <p:stCondLst>
                                             <p:cond delay="0"/>
                                           </p:stCondLst>
@@ -16992,14 +17037,14 @@
                                 </p:cTn>
                               </p:par>
                               <p:par>
-                                <p:cTn id="173" nodeType="withEffect" fill="hold" presetClass="entr" presetID="1">
+                                <p:cTn id="177" nodeType="withEffect" fill="hold" presetClass="entr" presetID="1">
                                   <p:stCondLst>
                                     <p:cond delay="0"/>
                                   </p:stCondLst>
                                   <p:childTnLst>
                                     <p:set>
                                       <p:cBhvr>
-                                        <p:cTn id="174" dur="1" fill="hold">
+                                        <p:cTn id="178" dur="1" fill="hold">
                                           <p:stCondLst>
                                             <p:cond delay="0"/>
                                           </p:stCondLst>
@@ -17079,7 +17124,7 @@
         <p:spPr>
           <a:xfrm>
             <a:off x="1295280" y="1628640"/>
-            <a:ext cx="9600480" cy="4679280"/>
+            <a:ext cx="9600120" cy="4678920"/>
           </a:xfrm>
           <a:prstGeom prst="rect">
             <a:avLst/>
@@ -17235,7 +17280,7 @@
         <p:spPr>
           <a:xfrm>
             <a:off x="1295640" y="549360"/>
-            <a:ext cx="9600480" cy="791280"/>
+            <a:ext cx="9600120" cy="790920"/>
           </a:xfrm>
           <a:prstGeom prst="rect">
             <a:avLst/>
@@ -17326,7 +17371,7 @@
         <p:spPr>
           <a:xfrm>
             <a:off x="1295280" y="1628640"/>
-            <a:ext cx="9600480" cy="4679280"/>
+            <a:ext cx="9600120" cy="4678920"/>
           </a:xfrm>
           <a:prstGeom prst="rect">
             <a:avLst/>
@@ -17347,7 +17392,7 @@
             <a:normAutofit/>
           </a:bodyPr>
           <a:p>
-            <a:pPr marL="457200" indent="-456480">
+            <a:pPr marL="457200" indent="-456120">
               <a:lnSpc>
                 <a:spcPct val="100000"/>
               </a:lnSpc>
@@ -17375,7 +17420,7 @@
             </a:endParaRPr>
           </a:p>
           <a:p>
-            <a:pPr marL="457200" indent="-456480">
+            <a:pPr marL="457200" indent="-456120">
               <a:lnSpc>
                 <a:spcPct val="100000"/>
               </a:lnSpc>
@@ -17403,7 +17448,7 @@
             </a:endParaRPr>
           </a:p>
           <a:p>
-            <a:pPr marL="457200" indent="-456480">
+            <a:pPr marL="457200" indent="-456120">
               <a:lnSpc>
                 <a:spcPct val="100000"/>
               </a:lnSpc>
@@ -17431,7 +17476,7 @@
             </a:endParaRPr>
           </a:p>
           <a:p>
-            <a:pPr marL="457200" indent="-456480">
+            <a:pPr marL="457200" indent="-456120">
               <a:lnSpc>
                 <a:spcPct val="100000"/>
               </a:lnSpc>
@@ -17469,7 +17514,7 @@
         <p:spPr>
           <a:xfrm>
             <a:off x="1295640" y="549360"/>
-            <a:ext cx="9600480" cy="791280"/>
+            <a:ext cx="9600120" cy="790920"/>
           </a:xfrm>
           <a:prstGeom prst="rect">
             <a:avLst/>
@@ -17534,60 +17579,11 @@
   <p:timing>
     <p:tnLst>
       <p:par>
-        <p:cTn id="175" dur="indefinite" restart="never" nodeType="tmRoot">
+        <p:cTn id="179" dur="indefinite" restart="never" nodeType="tmRoot">
           <p:childTnLst>
             <p:seq>
-              <p:cTn id="176" dur="indefinite" nodeType="mainSeq">
+              <p:cTn id="180" dur="indefinite" nodeType="mainSeq">
                 <p:childTnLst>
-                  <p:par>
-                    <p:cTn id="177" fill="hold">
-                      <p:stCondLst>
-                        <p:cond delay="indefinite"/>
-                      </p:stCondLst>
-                      <p:childTnLst>
-                        <p:par>
-                          <p:cTn id="178" fill="hold">
-                            <p:stCondLst>
-                              <p:cond delay="0"/>
-                            </p:stCondLst>
-                            <p:childTnLst>
-                              <p:par>
-                                <p:cTn id="179" nodeType="clickEffect" fill="hold" presetClass="entr" presetID="1">
-                                  <p:stCondLst>
-                                    <p:cond delay="0"/>
-                                  </p:stCondLst>
-                                  <p:childTnLst>
-                                    <p:set>
-                                      <p:cBhvr>
-                                        <p:cTn id="180" dur="1" fill="hold">
-                                          <p:stCondLst>
-                                            <p:cond delay="0"/>
-                                          </p:stCondLst>
-                                        </p:cTn>
-                                        <p:tgtEl>
-                                          <p:spTgt spid="285">
-                                            <p:txEl>
-                                              <p:pRg st="0" end="0"/>
-                                            </p:txEl>
-                                          </p:spTgt>
-                                        </p:tgtEl>
-                                        <p:attrNameLst>
-                                          <p:attrName>style.visibility</p:attrName>
-                                        </p:attrNameLst>
-                                      </p:cBhvr>
-                                      <p:to>
-                                        <p:strVal val="visible"/>
-                                      </p:to>
-                                    </p:set>
-                                  </p:childTnLst>
-                                </p:cTn>
-                              </p:par>
-                            </p:childTnLst>
-                          </p:cTn>
-                        </p:par>
-                      </p:childTnLst>
-                    </p:cTn>
-                  </p:par>
                   <p:par>
                     <p:cTn id="181" fill="hold">
                       <p:stCondLst>
@@ -17616,7 +17612,7 @@
                                         <p:tgtEl>
                                           <p:spTgt spid="285">
                                             <p:txEl>
-                                              <p:pRg st="1" end="1"/>
+                                              <p:pRg st="0" end="0"/>
                                             </p:txEl>
                                           </p:spTgt>
                                         </p:tgtEl>
@@ -17665,7 +17661,7 @@
                                         <p:tgtEl>
                                           <p:spTgt spid="285">
                                             <p:txEl>
-                                              <p:pRg st="2" end="2"/>
+                                              <p:pRg st="1" end="1"/>
                                             </p:txEl>
                                           </p:spTgt>
                                         </p:tgtEl>
@@ -17707,6 +17703,55 @@
                                     <p:set>
                                       <p:cBhvr>
                                         <p:cTn id="192" dur="1" fill="hold">
+                                          <p:stCondLst>
+                                            <p:cond delay="0"/>
+                                          </p:stCondLst>
+                                        </p:cTn>
+                                        <p:tgtEl>
+                                          <p:spTgt spid="285">
+                                            <p:txEl>
+                                              <p:pRg st="2" end="2"/>
+                                            </p:txEl>
+                                          </p:spTgt>
+                                        </p:tgtEl>
+                                        <p:attrNameLst>
+                                          <p:attrName>style.visibility</p:attrName>
+                                        </p:attrNameLst>
+                                      </p:cBhvr>
+                                      <p:to>
+                                        <p:strVal val="visible"/>
+                                      </p:to>
+                                    </p:set>
+                                  </p:childTnLst>
+                                </p:cTn>
+                              </p:par>
+                            </p:childTnLst>
+                          </p:cTn>
+                        </p:par>
+                      </p:childTnLst>
+                    </p:cTn>
+                  </p:par>
+                  <p:par>
+                    <p:cTn id="193" fill="hold">
+                      <p:stCondLst>
+                        <p:cond delay="indefinite"/>
+                      </p:stCondLst>
+                      <p:childTnLst>
+                        <p:par>
+                          <p:cTn id="194" fill="hold">
+                            <p:stCondLst>
+                              <p:cond delay="0"/>
+                            </p:stCondLst>
+                            <p:childTnLst>
+                              <p:par>
+                                <p:cTn id="195" nodeType="clickEffect" fill="hold" presetClass="entr" presetID="1">
+                                  <p:stCondLst>
+                                    <p:cond delay="0"/>
+                                  </p:stCondLst>
+                                  <p:childTnLst>
+                                    <p:set>
+                                      <p:cBhvr>
+                                        <p:cTn id="196" dur="1" fill="hold">
                                           <p:stCondLst>
                                             <p:cond delay="0"/>
                                           </p:stCondLst>
@@ -17786,7 +17831,7 @@
         <p:spPr>
           <a:xfrm>
             <a:off x="1295640" y="1628640"/>
-            <a:ext cx="9600480" cy="3599640"/>
+            <a:ext cx="9600120" cy="3599280"/>
           </a:xfrm>
           <a:prstGeom prst="rect">
             <a:avLst/>
@@ -17841,7 +17886,7 @@
         <p:spPr>
           <a:xfrm>
             <a:off x="5448240" y="549360"/>
-            <a:ext cx="1295280" cy="1582920"/>
+            <a:ext cx="1294920" cy="1582560"/>
           </a:xfrm>
           <a:prstGeom prst="rect">
             <a:avLst/>
@@ -17890,7 +17935,7 @@
         <p:spPr>
           <a:xfrm>
             <a:off x="1295640" y="549360"/>
-            <a:ext cx="9600480" cy="791280"/>
+            <a:ext cx="9600120" cy="790920"/>
           </a:xfrm>
           <a:prstGeom prst="rect">
             <a:avLst/>
@@ -17951,7 +17996,7 @@
         <p:spPr>
           <a:xfrm>
             <a:off x="1295280" y="1628640"/>
-            <a:ext cx="4799880" cy="4679280"/>
+            <a:ext cx="4799520" cy="4678920"/>
           </a:xfrm>
           <a:prstGeom prst="rect">
             <a:avLst/>
@@ -18327,7 +18372,7 @@
         <p:spPr>
           <a:xfrm>
             <a:off x="6095880" y="1628640"/>
-            <a:ext cx="4799880" cy="4679280"/>
+            <a:ext cx="4799520" cy="4678920"/>
           </a:xfrm>
           <a:prstGeom prst="rect">
             <a:avLst/>
@@ -18820,7 +18865,7 @@
         <p:spPr>
           <a:xfrm>
             <a:off x="1300680" y="3429000"/>
-            <a:ext cx="9600480" cy="1799640"/>
+            <a:ext cx="9600120" cy="1799280"/>
           </a:xfrm>
           <a:prstGeom prst="rect">
             <a:avLst/>
@@ -18901,7 +18946,7 @@
         <p:spPr>
           <a:xfrm>
             <a:off x="1295280" y="1628640"/>
-            <a:ext cx="9600480" cy="4679280"/>
+            <a:ext cx="9600120" cy="4678920"/>
           </a:xfrm>
           <a:prstGeom prst="rect">
             <a:avLst/>
@@ -19089,7 +19134,7 @@
         <p:spPr>
           <a:xfrm>
             <a:off x="1295640" y="549360"/>
-            <a:ext cx="9600480" cy="791280"/>
+            <a:ext cx="9600120" cy="790920"/>
           </a:xfrm>
           <a:prstGeom prst="rect">
             <a:avLst/>
@@ -19347,7 +19392,7 @@
         <p:spPr>
           <a:xfrm>
             <a:off x="1295280" y="1628640"/>
-            <a:ext cx="9600480" cy="4679280"/>
+            <a:ext cx="9600120" cy="4678920"/>
           </a:xfrm>
           <a:prstGeom prst="rect">
             <a:avLst/>
@@ -19391,7 +19436,7 @@
             </a:endParaRPr>
           </a:p>
           <a:p>
-            <a:pPr marL="457200" indent="-456480">
+            <a:pPr marL="457200" indent="-456120">
               <a:lnSpc>
                 <a:spcPct val="100000"/>
               </a:lnSpc>
@@ -19429,7 +19474,7 @@
             </a:endParaRPr>
           </a:p>
           <a:p>
-            <a:pPr marL="457200" indent="-456480">
+            <a:pPr marL="457200" indent="-456120">
               <a:lnSpc>
                 <a:spcPct val="100000"/>
               </a:lnSpc>
@@ -19467,7 +19512,7 @@
             </a:endParaRPr>
           </a:p>
           <a:p>
-            <a:pPr marL="457200" indent="-456480">
+            <a:pPr marL="457200" indent="-456120">
               <a:lnSpc>
                 <a:spcPct val="100000"/>
               </a:lnSpc>
@@ -19505,7 +19550,7 @@
             </a:endParaRPr>
           </a:p>
           <a:p>
-            <a:pPr marL="457200" indent="-456480">
+            <a:pPr marL="457200" indent="-456120">
               <a:lnSpc>
                 <a:spcPct val="100000"/>
               </a:lnSpc>
@@ -19566,7 +19611,7 @@
         <p:spPr>
           <a:xfrm>
             <a:off x="1295640" y="549360"/>
-            <a:ext cx="9600480" cy="791280"/>
+            <a:ext cx="9600120" cy="790920"/>
           </a:xfrm>
           <a:prstGeom prst="rect">
             <a:avLst/>
@@ -19616,8 +19661,8 @@
         </p:nvSpPr>
         <p:spPr>
           <a:xfrm rot="20880000">
-            <a:off x="7423920" y="4906080"/>
-            <a:ext cx="3218040" cy="942840"/>
+            <a:off x="7423560" y="4906080"/>
+            <a:ext cx="3217680" cy="942840"/>
           </a:xfrm>
           <a:prstGeom prst="rect">
             <a:avLst/>
@@ -19709,7 +19754,7 @@
         <p:spPr>
           <a:xfrm>
             <a:off x="1295280" y="1628640"/>
-            <a:ext cx="9600480" cy="4679280"/>
+            <a:ext cx="9600120" cy="4678920"/>
           </a:xfrm>
           <a:prstGeom prst="rect">
             <a:avLst/>
@@ -19873,7 +19918,7 @@
         <p:spPr>
           <a:xfrm>
             <a:off x="1295640" y="549360"/>
-            <a:ext cx="9600480" cy="791280"/>
+            <a:ext cx="9600120" cy="790920"/>
           </a:xfrm>
           <a:prstGeom prst="rect">
             <a:avLst/>
@@ -19954,7 +19999,7 @@
         <p:spPr>
           <a:xfrm>
             <a:off x="1295640" y="549360"/>
-            <a:ext cx="9600480" cy="791280"/>
+            <a:ext cx="9600120" cy="790920"/>
           </a:xfrm>
           <a:prstGeom prst="rect">
             <a:avLst/>
@@ -20025,7 +20070,7 @@
         <p:spPr>
           <a:xfrm>
             <a:off x="1295280" y="1628640"/>
-            <a:ext cx="4799880" cy="4679280"/>
+            <a:ext cx="4799520" cy="4678920"/>
           </a:xfrm>
           <a:prstGeom prst="rect">
             <a:avLst/>
@@ -20046,7 +20091,7 @@
             <a:normAutofit/>
           </a:bodyPr>
           <a:p>
-            <a:pPr marL="457200" indent="-456480">
+            <a:pPr marL="457200" indent="-456120">
               <a:lnSpc>
                 <a:spcPct val="100000"/>
               </a:lnSpc>
@@ -20074,7 +20119,7 @@
             </a:endParaRPr>
           </a:p>
           <a:p>
-            <a:pPr marL="457200" indent="-456480">
+            <a:pPr marL="457200" indent="-456120">
               <a:lnSpc>
                 <a:spcPct val="100000"/>
               </a:lnSpc>
@@ -20115,7 +20160,7 @@
             </a:endParaRPr>
           </a:p>
           <a:p>
-            <a:pPr marL="457200" indent="-456480">
+            <a:pPr marL="457200" indent="-456120">
               <a:lnSpc>
                 <a:spcPct val="100000"/>
               </a:lnSpc>
@@ -20156,7 +20201,7 @@
             </a:endParaRPr>
           </a:p>
           <a:p>
-            <a:pPr marL="457200" indent="-456480">
+            <a:pPr marL="457200" indent="-456120">
               <a:lnSpc>
                 <a:spcPct val="100000"/>
               </a:lnSpc>
@@ -20207,7 +20252,7 @@
         <p:spPr>
           <a:xfrm>
             <a:off x="6095880" y="1628640"/>
-            <a:ext cx="4799880" cy="4679280"/>
+            <a:ext cx="4799520" cy="4678920"/>
           </a:xfrm>
           <a:prstGeom prst="rect">
             <a:avLst/>
@@ -20228,7 +20273,7 @@
             <a:noAutofit/>
           </a:bodyPr>
           <a:p>
-            <a:pPr marL="457200" indent="-456480">
+            <a:pPr marL="457200" indent="-456120">
               <a:lnSpc>
                 <a:spcPct val="100000"/>
               </a:lnSpc>
@@ -20256,7 +20301,7 @@
             </a:endParaRPr>
           </a:p>
           <a:p>
-            <a:pPr marL="457200" indent="-456480">
+            <a:pPr marL="457200" indent="-456120">
               <a:lnSpc>
                 <a:spcPct val="100000"/>
               </a:lnSpc>
@@ -20297,7 +20342,7 @@
             </a:endParaRPr>
           </a:p>
           <a:p>
-            <a:pPr marL="457200" indent="-456480">
+            <a:pPr marL="457200" indent="-456120">
               <a:lnSpc>
                 <a:spcPct val="100000"/>
               </a:lnSpc>
@@ -20338,7 +20383,7 @@
             </a:endParaRPr>
           </a:p>
           <a:p>
-            <a:pPr marL="457200" indent="-456480">
+            <a:pPr marL="457200" indent="-456120">
               <a:lnSpc>
                 <a:spcPct val="100000"/>
               </a:lnSpc>
@@ -20419,7 +20464,7 @@
         <p:spPr>
           <a:xfrm>
             <a:off x="1295280" y="1628640"/>
-            <a:ext cx="9600480" cy="4679280"/>
+            <a:ext cx="9600120" cy="4678920"/>
           </a:xfrm>
           <a:prstGeom prst="rect">
             <a:avLst/>
@@ -20603,7 +20648,7 @@
         <p:spPr>
           <a:xfrm>
             <a:off x="1295640" y="549360"/>
-            <a:ext cx="9600480" cy="791280"/>
+            <a:ext cx="9600120" cy="790920"/>
           </a:xfrm>
           <a:prstGeom prst="rect">
             <a:avLst/>
@@ -20658,7 +20703,7 @@
         <p:spPr>
           <a:xfrm>
             <a:off x="5183280" y="1622160"/>
-            <a:ext cx="1824480" cy="1824480"/>
+            <a:ext cx="1824120" cy="1824120"/>
           </a:xfrm>
           <a:prstGeom prst="rect">
             <a:avLst/>
@@ -20707,7 +20752,7 @@
         <p:spPr>
           <a:xfrm>
             <a:off x="1295640" y="549360"/>
-            <a:ext cx="9600480" cy="791280"/>
+            <a:ext cx="9600120" cy="790920"/>
           </a:xfrm>
           <a:prstGeom prst="rect">
             <a:avLst/>
@@ -20794,7 +20839,7 @@
         <p:spPr>
           <a:xfrm>
             <a:off x="1295640" y="1628640"/>
-            <a:ext cx="9600480" cy="4033800"/>
+            <a:ext cx="9600120" cy="4033440"/>
           </a:xfrm>
           <a:prstGeom prst="rect">
             <a:avLst/>
@@ -21310,7 +21355,7 @@
         <p:spPr>
           <a:xfrm>
             <a:off x="9698400" y="798840"/>
-            <a:ext cx="1698840" cy="1084680"/>
+            <a:ext cx="1698480" cy="1084320"/>
           </a:xfrm>
           <a:prstGeom prst="rect">
             <a:avLst/>
@@ -21329,7 +21374,7 @@
         <p:spPr>
           <a:xfrm>
             <a:off x="1295280" y="5522400"/>
-            <a:ext cx="9600480" cy="1099080"/>
+            <a:ext cx="9600120" cy="1098720"/>
           </a:xfrm>
           <a:prstGeom prst="rect">
             <a:avLst/>
@@ -21596,7 +21641,7 @@
         <p:spPr>
           <a:xfrm>
             <a:off x="1295640" y="549360"/>
-            <a:ext cx="9600480" cy="791280"/>
+            <a:ext cx="9600120" cy="790920"/>
           </a:xfrm>
           <a:prstGeom prst="rect">
             <a:avLst/>
@@ -21647,7 +21692,7 @@
         <p:spPr>
           <a:xfrm>
             <a:off x="2685960" y="2772360"/>
-            <a:ext cx="7886160" cy="3535920"/>
+            <a:ext cx="7885800" cy="3535560"/>
           </a:xfrm>
           <a:prstGeom prst="rect">
             <a:avLst/>
@@ -21673,7 +21718,7 @@
         <p:spPr>
           <a:xfrm>
             <a:off x="1295640" y="1628640"/>
-            <a:ext cx="9600480" cy="5022000"/>
+            <a:ext cx="9600120" cy="5021640"/>
           </a:xfrm>
           <a:prstGeom prst="rect">
             <a:avLst/>
@@ -22177,7 +22222,7 @@
         <p:spPr>
           <a:xfrm flipH="1">
             <a:off x="6739200" y="5501160"/>
-            <a:ext cx="677880" cy="471240"/>
+            <a:ext cx="677520" cy="470880"/>
           </a:xfrm>
           <a:custGeom>
             <a:avLst/>
@@ -22543,7 +22588,7 @@
         <p:spPr>
           <a:xfrm>
             <a:off x="1295640" y="549360"/>
-            <a:ext cx="9600480" cy="791280"/>
+            <a:ext cx="9600120" cy="790920"/>
           </a:xfrm>
           <a:prstGeom prst="rect">
             <a:avLst/>
@@ -22594,7 +22639,7 @@
         <p:spPr>
           <a:xfrm>
             <a:off x="2685960" y="2772360"/>
-            <a:ext cx="7886160" cy="3535920"/>
+            <a:ext cx="7885800" cy="3535560"/>
           </a:xfrm>
           <a:prstGeom prst="rect">
             <a:avLst/>
@@ -22620,7 +22665,7 @@
         <p:spPr>
           <a:xfrm>
             <a:off x="1295640" y="1628640"/>
-            <a:ext cx="9600480" cy="5022000"/>
+            <a:ext cx="9600120" cy="5021640"/>
           </a:xfrm>
           <a:prstGeom prst="rect">
             <a:avLst/>
@@ -23307,7 +23352,7 @@
         <p:spPr>
           <a:xfrm>
             <a:off x="1296000" y="549720"/>
-            <a:ext cx="9600480" cy="791280"/>
+            <a:ext cx="9600120" cy="790920"/>
           </a:xfrm>
           <a:prstGeom prst="rect">
             <a:avLst/>
@@ -23358,7 +23403,7 @@
         <p:spPr>
           <a:xfrm>
             <a:off x="1296000" y="1440000"/>
-            <a:ext cx="9504000" cy="4835880"/>
+            <a:ext cx="9503640" cy="5200200"/>
           </a:xfrm>
           <a:prstGeom prst="rect">
             <a:avLst/>
@@ -23727,6 +23772,313 @@
                 <a:spcPct val="100000"/>
               </a:lnSpc>
             </a:pPr>
+            <a:r>
+              <a:rPr b="0" lang="ru-RU" sz="1200" spc="-1" strike="noStrike">
+                <a:solidFill>
+                  <a:srgbClr val="0000ff"/>
+                </a:solidFill>
+                <a:latin typeface="Consolas"/>
+                <a:ea typeface="Consolas"/>
+              </a:rPr>
+              <a:t>public static class </a:t>
+            </a:r>
+            <a:r>
+              <a:rPr b="0" lang="ru-RU" sz="1200" spc="-1" strike="noStrike">
+                <a:solidFill>
+                  <a:srgbClr val="2b91af"/>
+                </a:solidFill>
+                <a:latin typeface="Consolas"/>
+                <a:ea typeface="Consolas"/>
+              </a:rPr>
+              <a:t>FakeOptionsExtensions</a:t>
+            </a:r>
+            <a:br/>
+            <a:r>
+              <a:rPr b="0" lang="ru-RU" sz="1200" spc="-1" strike="noStrike">
+                <a:solidFill>
+                  <a:srgbClr val="000000"/>
+                </a:solidFill>
+                <a:latin typeface="Consolas"/>
+                <a:ea typeface="Consolas"/>
+              </a:rPr>
+              <a:t>{</a:t>
+            </a:r>
+            <a:br/>
+            <a:r>
+              <a:rPr b="0" lang="ru-RU" sz="1200" spc="-1" strike="noStrike">
+                <a:solidFill>
+                  <a:srgbClr val="000000"/>
+                </a:solidFill>
+                <a:latin typeface="Consolas"/>
+                <a:ea typeface="Consolas"/>
+              </a:rPr>
+              <a:t>    </a:t>
+            </a:r>
+            <a:r>
+              <a:rPr b="0" lang="ru-RU" sz="1200" spc="-1" strike="noStrike">
+                <a:solidFill>
+                  <a:srgbClr val="0000ff"/>
+                </a:solidFill>
+                <a:latin typeface="Consolas"/>
+                <a:ea typeface="Consolas"/>
+              </a:rPr>
+              <a:t>public static </a:t>
+            </a:r>
+            <a:r>
+              <a:rPr b="0" lang="ru-RU" sz="1200" spc="-1" strike="noStrike">
+                <a:solidFill>
+                  <a:srgbClr val="2b91af"/>
+                </a:solidFill>
+                <a:latin typeface="Consolas"/>
+                <a:ea typeface="Consolas"/>
+              </a:rPr>
+              <a:t>IFakeOptions</a:t>
+            </a:r>
+            <a:r>
+              <a:rPr b="0" lang="ru-RU" sz="1200" spc="-1" strike="noStrike">
+                <a:solidFill>
+                  <a:srgbClr val="000000"/>
+                </a:solidFill>
+                <a:latin typeface="Consolas"/>
+                <a:ea typeface="Consolas"/>
+              </a:rPr>
+              <a:t>&lt;</a:t>
+            </a:r>
+            <a:r>
+              <a:rPr b="0" lang="ru-RU" sz="1200" spc="-1" strike="noStrike">
+                <a:solidFill>
+                  <a:srgbClr val="2b91af"/>
+                </a:solidFill>
+                <a:latin typeface="Consolas"/>
+                <a:ea typeface="Consolas"/>
+              </a:rPr>
+              <a:t>T</a:t>
+            </a:r>
+            <a:r>
+              <a:rPr b="0" lang="ru-RU" sz="1200" spc="-1" strike="noStrike">
+                <a:solidFill>
+                  <a:srgbClr val="000000"/>
+                </a:solidFill>
+                <a:latin typeface="Consolas"/>
+                <a:ea typeface="Consolas"/>
+              </a:rPr>
+              <a:t>&gt;</a:t>
+            </a:r>
+            <a:r>
+              <a:rPr b="0" lang="ru-RU" sz="1200" spc="-1" strike="noStrike">
+                <a:solidFill>
+                  <a:srgbClr val="a9a9a9"/>
+                </a:solidFill>
+                <a:latin typeface="Consolas"/>
+                <a:ea typeface="Consolas"/>
+              </a:rPr>
+              <a:t> </a:t>
+            </a:r>
+            <a:r>
+              <a:rPr b="0" lang="ru-RU" sz="1200" spc="-1" strike="noStrike">
+                <a:solidFill>
+                  <a:srgbClr val="000000"/>
+                </a:solidFill>
+                <a:latin typeface="Consolas"/>
+                <a:ea typeface="Consolas"/>
+              </a:rPr>
+              <a:t>Synchronized&lt;</a:t>
+            </a:r>
+            <a:r>
+              <a:rPr b="0" lang="ru-RU" sz="1200" spc="-1" strike="noStrike">
+                <a:solidFill>
+                  <a:srgbClr val="2b91af"/>
+                </a:solidFill>
+                <a:latin typeface="Consolas"/>
+                <a:ea typeface="Consolas"/>
+              </a:rPr>
+              <a:t>T</a:t>
+            </a:r>
+            <a:r>
+              <a:rPr b="0" lang="ru-RU" sz="1200" spc="-1" strike="noStrike">
+                <a:solidFill>
+                  <a:srgbClr val="000000"/>
+                </a:solidFill>
+                <a:latin typeface="Consolas"/>
+                <a:ea typeface="Consolas"/>
+              </a:rPr>
+              <a:t>&gt;(</a:t>
+            </a:r>
+            <a:r>
+              <a:rPr b="0" lang="ru-RU" sz="1200" spc="-1" strike="noStrike">
+                <a:solidFill>
+                  <a:srgbClr val="0000ff"/>
+                </a:solidFill>
+                <a:latin typeface="Consolas"/>
+                <a:ea typeface="Consolas"/>
+              </a:rPr>
+              <a:t>this </a:t>
+            </a:r>
+            <a:r>
+              <a:rPr b="0" lang="ru-RU" sz="1200" spc="-1" strike="noStrike">
+                <a:solidFill>
+                  <a:srgbClr val="2b91af"/>
+                </a:solidFill>
+                <a:latin typeface="Consolas"/>
+                <a:ea typeface="Consolas"/>
+              </a:rPr>
+              <a:t>IFakeOptions</a:t>
+            </a:r>
+            <a:r>
+              <a:rPr b="0" lang="ru-RU" sz="1200" spc="-1" strike="noStrike">
+                <a:solidFill>
+                  <a:srgbClr val="000000"/>
+                </a:solidFill>
+                <a:latin typeface="Consolas"/>
+                <a:ea typeface="Consolas"/>
+              </a:rPr>
+              <a:t>&lt;</a:t>
+            </a:r>
+            <a:r>
+              <a:rPr b="0" lang="ru-RU" sz="1200" spc="-1" strike="noStrike">
+                <a:solidFill>
+                  <a:srgbClr val="2b91af"/>
+                </a:solidFill>
+                <a:latin typeface="Consolas"/>
+                <a:ea typeface="Consolas"/>
+              </a:rPr>
+              <a:t>T</a:t>
+            </a:r>
+            <a:r>
+              <a:rPr b="0" lang="ru-RU" sz="1200" spc="-1" strike="noStrike">
+                <a:solidFill>
+                  <a:srgbClr val="000000"/>
+                </a:solidFill>
+                <a:latin typeface="Consolas"/>
+                <a:ea typeface="Consolas"/>
+              </a:rPr>
+              <a:t>&gt; builder)</a:t>
+            </a:r>
+            <a:br/>
+            <a:r>
+              <a:rPr b="0" lang="ru-RU" sz="1200" spc="-1" strike="noStrike">
+                <a:solidFill>
+                  <a:srgbClr val="000000"/>
+                </a:solidFill>
+                <a:latin typeface="Consolas"/>
+                <a:ea typeface="Consolas"/>
+              </a:rPr>
+              <a:t>    {</a:t>
+            </a:r>
+            <a:br/>
+            <a:r>
+              <a:rPr b="0" lang="ru-RU" sz="1200" spc="-1" strike="noStrike">
+                <a:solidFill>
+                  <a:srgbClr val="000000"/>
+                </a:solidFill>
+                <a:latin typeface="Consolas"/>
+                <a:ea typeface="Consolas"/>
+              </a:rPr>
+              <a:t>        </a:t>
+            </a:r>
+            <a:r>
+              <a:rPr b="0" lang="ru-RU" sz="1200" spc="-1" strike="noStrike">
+                <a:solidFill>
+                  <a:srgbClr val="0000ff"/>
+                </a:solidFill>
+                <a:latin typeface="Consolas"/>
+                <a:ea typeface="Consolas"/>
+              </a:rPr>
+              <a:t>return </a:t>
+            </a:r>
+            <a:r>
+              <a:rPr b="0" lang="ru-RU" sz="1200" spc="-1" strike="noStrike">
+                <a:solidFill>
+                  <a:srgbClr val="000000"/>
+                </a:solidFill>
+                <a:latin typeface="Consolas"/>
+                <a:ea typeface="Consolas"/>
+              </a:rPr>
+              <a:t>builder.ConfigureFake(fake =&gt;</a:t>
+            </a:r>
+            <a:br/>
+            <a:r>
+              <a:rPr b="0" lang="ru-RU" sz="1200" spc="-1" strike="noStrike">
+                <a:solidFill>
+                  <a:srgbClr val="000000"/>
+                </a:solidFill>
+                <a:latin typeface="Consolas"/>
+                <a:ea typeface="Consolas"/>
+              </a:rPr>
+              <a:t>            </a:t>
+            </a:r>
+            <a:r>
+              <a:rPr b="0" lang="ru-RU" sz="1200" spc="-1" strike="noStrike">
+                <a:solidFill>
+                  <a:srgbClr val="2b91af"/>
+                </a:solidFill>
+                <a:latin typeface="Consolas"/>
+                <a:ea typeface="Consolas"/>
+              </a:rPr>
+              <a:t>Fake</a:t>
+            </a:r>
+            <a:r>
+              <a:rPr b="0" lang="ru-RU" sz="1200" spc="-1" strike="noStrike">
+                <a:solidFill>
+                  <a:srgbClr val="000000"/>
+                </a:solidFill>
+                <a:latin typeface="Consolas"/>
+                <a:ea typeface="Consolas"/>
+              </a:rPr>
+              <a:t>.GetFakeManager(fake).AddInterceptionListener(</a:t>
+            </a:r>
+            <a:r>
+              <a:rPr b="0" lang="ru-RU" sz="1200" spc="-1" strike="noStrike">
+                <a:solidFill>
+                  <a:srgbClr val="0000ff"/>
+                </a:solidFill>
+                <a:latin typeface="Consolas"/>
+                <a:ea typeface="Consolas"/>
+              </a:rPr>
+              <a:t>new </a:t>
+            </a:r>
+            <a:r>
+              <a:rPr b="0" lang="ru-RU" sz="1200" spc="-1" strike="noStrike">
+                <a:solidFill>
+                  <a:srgbClr val="2b91af"/>
+                </a:solidFill>
+                <a:latin typeface="Consolas"/>
+                <a:ea typeface="Consolas"/>
+              </a:rPr>
+              <a:t>CallSynchronizer</a:t>
+            </a:r>
+            <a:r>
+              <a:rPr b="0" lang="ru-RU" sz="1200" spc="-1" strike="noStrike">
+                <a:solidFill>
+                  <a:srgbClr val="000000"/>
+                </a:solidFill>
+                <a:latin typeface="Consolas"/>
+                <a:ea typeface="Consolas"/>
+              </a:rPr>
+              <a:t>()));</a:t>
+            </a:r>
+            <a:br/>
+            <a:r>
+              <a:rPr b="0" lang="ru-RU" sz="1200" spc="-1" strike="noStrike">
+                <a:solidFill>
+                  <a:srgbClr val="000000"/>
+                </a:solidFill>
+                <a:latin typeface="Consolas"/>
+                <a:ea typeface="Consolas"/>
+              </a:rPr>
+              <a:t>    }</a:t>
+            </a:r>
+            <a:br/>
+            <a:r>
+              <a:rPr b="0" lang="ru-RU" sz="1200" spc="-1" strike="noStrike">
+                <a:solidFill>
+                  <a:srgbClr val="000000"/>
+                </a:solidFill>
+                <a:latin typeface="Consolas"/>
+                <a:ea typeface="Consolas"/>
+              </a:rPr>
+              <a:t>}</a:t>
+            </a:r>
             <a:endParaRPr b="0" lang="ru-RU" sz="1200" spc="-1" strike="noStrike">
               <a:latin typeface="Arial"/>
             </a:endParaRPr>
@@ -23737,6 +24089,16 @@
                 <a:spcPct val="100000"/>
               </a:lnSpc>
             </a:pPr>
+            <a:endParaRPr b="0" lang="ru-RU" sz="1200" spc="-1" strike="noStrike">
+              <a:latin typeface="Arial"/>
+            </a:endParaRPr>
+          </a:p>
+          <a:p>
+            <a:pPr>
+              <a:lnSpc>
+                <a:spcPct val="100000"/>
+              </a:lnSpc>
+            </a:pPr>
             <a:r>
               <a:rPr b="0" lang="ru-RU" sz="1200" spc="-1" strike="noStrike">
                 <a:solidFill>
@@ -23745,19 +24107,28 @@
                 <a:latin typeface="Consolas"/>
                 <a:ea typeface="Consolas"/>
               </a:rPr>
-              <a:t>public static class </a:t>
+              <a:t>var shop</a:t>
             </a:r>
             <a:r>
               <a:rPr b="0" lang="ru-RU" sz="1200" spc="-1" strike="noStrike">
                 <a:solidFill>
+                  <a:srgbClr val="000000"/>
+                </a:solidFill>
+                <a:latin typeface="Consolas"/>
+                <a:ea typeface="Consolas"/>
+              </a:rPr>
+              <a:t> = </a:t>
+            </a:r>
+            <a:r>
+              <a:rPr b="0" lang="ru-RU" sz="1200" spc="-1" strike="noStrike">
+                <a:solidFill>
                   <a:srgbClr val="2b91af"/>
                 </a:solidFill>
                 <a:latin typeface="Consolas"/>
                 <a:ea typeface="Consolas"/>
               </a:rPr>
-              <a:t>FakeOptionsExtensions</a:t>
-            </a:r>
-            <a:br/>
+              <a:t>A</a:t>
+            </a:r>
             <a:r>
               <a:rPr b="0" lang="ru-RU" sz="1200" spc="-1" strike="noStrike">
                 <a:solidFill>
@@ -23766,363 +24137,68 @@
                 <a:latin typeface="Consolas"/>
                 <a:ea typeface="Consolas"/>
               </a:rPr>
-              <a:t>{</a:t>
-            </a:r>
-            <a:br/>
+              <a:t>.Fake&lt;</a:t>
+            </a:r>
             <a:r>
               <a:rPr b="0" lang="ru-RU" sz="1200" spc="-1" strike="noStrike">
                 <a:solidFill>
+                  <a:srgbClr val="2b91af"/>
+                </a:solidFill>
+                <a:latin typeface="Consolas"/>
+                <a:ea typeface="Consolas"/>
+              </a:rPr>
+              <a:t>ICandyShop</a:t>
+            </a:r>
+            <a:r>
+              <a:rPr b="0" lang="ru-RU" sz="1200" spc="-1" strike="noStrike">
+                <a:solidFill>
                   <a:srgbClr val="000000"/>
                 </a:solidFill>
                 <a:latin typeface="Consolas"/>
                 <a:ea typeface="Consolas"/>
               </a:rPr>
-              <a:t>    </a:t>
-            </a:r>
+              <a:t>&gt;(x=&gt;x.Strict().Synchronized());</a:t>
+            </a:r>
+            <a:endParaRPr b="0" lang="ru-RU" sz="1200" spc="-1" strike="noStrike">
+              <a:latin typeface="Arial"/>
+            </a:endParaRPr>
+          </a:p>
+          <a:p>
+            <a:pPr>
+              <a:lnSpc>
+                <a:spcPct val="100000"/>
+              </a:lnSpc>
+            </a:pPr>
+            <a:endParaRPr b="0" lang="ru-RU" sz="1200" spc="-1" strike="noStrike">
+              <a:latin typeface="Arial"/>
+            </a:endParaRPr>
+          </a:p>
+          <a:p>
+            <a:pPr>
+              <a:lnSpc>
+                <a:spcPct val="100000"/>
+              </a:lnSpc>
+            </a:pPr>
+            <a:endParaRPr b="0" lang="ru-RU" sz="1200" spc="-1" strike="noStrike">
+              <a:latin typeface="Arial"/>
+            </a:endParaRPr>
+          </a:p>
+          <a:p>
+            <a:pPr>
+              <a:lnSpc>
+                <a:spcPct val="100000"/>
+              </a:lnSpc>
+            </a:pPr>
             <a:r>
               <a:rPr b="0" lang="ru-RU" sz="1200" spc="-1" strike="noStrike">
                 <a:solidFill>
-                  <a:srgbClr val="0000ff"/>
+                  <a:srgbClr val="000000"/>
                 </a:solidFill>
                 <a:latin typeface="Consolas"/>
                 <a:ea typeface="Consolas"/>
-              </a:rPr>
-              <a:t>public static </a:t>
-            </a:r>
-            <a:r>
-              <a:rPr b="0" lang="ru-RU" sz="1200" spc="-1" strike="noStrike">
-                <a:solidFill>
-                  <a:srgbClr val="2b91af"/>
-                </a:solidFill>
-                <a:latin typeface="Consolas"/>
-                <a:ea typeface="Consolas"/>
-              </a:rPr>
-              <a:t>IFakeOptions</a:t>
-            </a:r>
-            <a:r>
-              <a:rPr b="0" lang="ru-RU" sz="1200" spc="-1" strike="noStrike">
-                <a:solidFill>
-                  <a:srgbClr val="000000"/>
-                </a:solidFill>
-                <a:latin typeface="Consolas"/>
-                <a:ea typeface="Consolas"/>
-              </a:rPr>
-              <a:t>&lt;</a:t>
-            </a:r>
-            <a:r>
-              <a:rPr b="0" lang="ru-RU" sz="1200" spc="-1" strike="noStrike">
-                <a:solidFill>
-                  <a:srgbClr val="2b91af"/>
-                </a:solidFill>
-                <a:latin typeface="Consolas"/>
-                <a:ea typeface="Consolas"/>
-              </a:rPr>
-              <a:t>T</a:t>
-            </a:r>
-            <a:r>
-              <a:rPr b="0" lang="ru-RU" sz="1200" spc="-1" strike="noStrike">
-                <a:solidFill>
-                  <a:srgbClr val="000000"/>
-                </a:solidFill>
-                <a:latin typeface="Consolas"/>
-                <a:ea typeface="Consolas"/>
-              </a:rPr>
-              <a:t>&gt;</a:t>
-            </a:r>
-            <a:r>
-              <a:rPr b="0" lang="ru-RU" sz="1200" spc="-1" strike="noStrike">
-                <a:solidFill>
-                  <a:srgbClr val="a9a9a9"/>
-                </a:solidFill>
-                <a:latin typeface="Consolas"/>
-                <a:ea typeface="Consolas"/>
-              </a:rPr>
-              <a:t> </a:t>
-            </a:r>
-            <a:r>
-              <a:rPr b="0" lang="ru-RU" sz="1200" spc="-1" strike="noStrike">
-                <a:solidFill>
-                  <a:srgbClr val="000000"/>
-                </a:solidFill>
-                <a:latin typeface="Consolas"/>
-                <a:ea typeface="Consolas"/>
-              </a:rPr>
-              <a:t>Synchronized&lt;</a:t>
-            </a:r>
-            <a:r>
-              <a:rPr b="0" lang="ru-RU" sz="1200" spc="-1" strike="noStrike">
-                <a:solidFill>
-                  <a:srgbClr val="2b91af"/>
-                </a:solidFill>
-                <a:latin typeface="Consolas"/>
-                <a:ea typeface="Consolas"/>
-              </a:rPr>
-              <a:t>T</a:t>
-            </a:r>
-            <a:r>
-              <a:rPr b="0" lang="ru-RU" sz="1200" spc="-1" strike="noStrike">
-                <a:solidFill>
-                  <a:srgbClr val="000000"/>
-                </a:solidFill>
-                <a:latin typeface="Consolas"/>
-                <a:ea typeface="Consolas"/>
-              </a:rPr>
-              <a:t>&gt;(</a:t>
-            </a:r>
-            <a:r>
-              <a:rPr b="0" lang="ru-RU" sz="1200" spc="-1" strike="noStrike">
-                <a:solidFill>
-                  <a:srgbClr val="0000ff"/>
-                </a:solidFill>
-                <a:latin typeface="Consolas"/>
-                <a:ea typeface="Consolas"/>
-              </a:rPr>
-              <a:t>this </a:t>
-            </a:r>
-            <a:r>
-              <a:rPr b="0" lang="ru-RU" sz="1200" spc="-1" strike="noStrike">
-                <a:solidFill>
-                  <a:srgbClr val="2b91af"/>
-                </a:solidFill>
-                <a:latin typeface="Consolas"/>
-                <a:ea typeface="Consolas"/>
-              </a:rPr>
-              <a:t>IFakeOptions</a:t>
-            </a:r>
-            <a:r>
-              <a:rPr b="0" lang="ru-RU" sz="1200" spc="-1" strike="noStrike">
-                <a:solidFill>
-                  <a:srgbClr val="000000"/>
-                </a:solidFill>
-                <a:latin typeface="Consolas"/>
-                <a:ea typeface="Consolas"/>
-              </a:rPr>
-              <a:t>&lt;</a:t>
-            </a:r>
-            <a:r>
-              <a:rPr b="0" lang="ru-RU" sz="1200" spc="-1" strike="noStrike">
-                <a:solidFill>
-                  <a:srgbClr val="2b91af"/>
-                </a:solidFill>
-                <a:latin typeface="Consolas"/>
-                <a:ea typeface="Consolas"/>
-              </a:rPr>
-              <a:t>T</a:t>
-            </a:r>
-            <a:r>
-              <a:rPr b="0" lang="ru-RU" sz="1200" spc="-1" strike="noStrike">
-                <a:solidFill>
-                  <a:srgbClr val="000000"/>
-                </a:solidFill>
-                <a:latin typeface="Consolas"/>
-                <a:ea typeface="Consolas"/>
-              </a:rPr>
-              <a:t>&gt; builder)</a:t>
-            </a:r>
-            <a:br/>
-            <a:r>
-              <a:rPr b="0" lang="ru-RU" sz="1200" spc="-1" strike="noStrike">
-                <a:solidFill>
-                  <a:srgbClr val="000000"/>
-                </a:solidFill>
-                <a:latin typeface="Consolas"/>
-                <a:ea typeface="Consolas"/>
-              </a:rPr>
-              <a:t>    {</a:t>
-            </a:r>
-            <a:br/>
-            <a:r>
-              <a:rPr b="0" lang="ru-RU" sz="1200" spc="-1" strike="noStrike">
-                <a:solidFill>
-                  <a:srgbClr val="000000"/>
-                </a:solidFill>
-                <a:latin typeface="Consolas"/>
-                <a:ea typeface="Consolas"/>
-              </a:rPr>
-              <a:t>        </a:t>
-            </a:r>
-            <a:r>
-              <a:rPr b="0" lang="ru-RU" sz="1200" spc="-1" strike="noStrike">
-                <a:solidFill>
-                  <a:srgbClr val="0000ff"/>
-                </a:solidFill>
-                <a:latin typeface="Consolas"/>
-                <a:ea typeface="Consolas"/>
-              </a:rPr>
-              <a:t>return </a:t>
-            </a:r>
-            <a:r>
-              <a:rPr b="0" lang="ru-RU" sz="1200" spc="-1" strike="noStrike">
-                <a:solidFill>
-                  <a:srgbClr val="000000"/>
-                </a:solidFill>
-                <a:latin typeface="Consolas"/>
-                <a:ea typeface="Consolas"/>
-              </a:rPr>
-              <a:t>builder.ConfigureFake(fake =&gt;</a:t>
-            </a:r>
-            <a:br/>
-            <a:r>
-              <a:rPr b="0" lang="ru-RU" sz="1200" spc="-1" strike="noStrike">
-                <a:solidFill>
-                  <a:srgbClr val="000000"/>
-                </a:solidFill>
-                <a:latin typeface="Consolas"/>
-                <a:ea typeface="Consolas"/>
-              </a:rPr>
-              <a:t>            </a:t>
-            </a:r>
-            <a:r>
-              <a:rPr b="0" lang="ru-RU" sz="1200" spc="-1" strike="noStrike">
-                <a:solidFill>
-                  <a:srgbClr val="2b91af"/>
-                </a:solidFill>
-                <a:latin typeface="Consolas"/>
-                <a:ea typeface="Consolas"/>
-              </a:rPr>
-              <a:t>Fake</a:t>
-            </a:r>
-            <a:r>
-              <a:rPr b="0" lang="ru-RU" sz="1200" spc="-1" strike="noStrike">
-                <a:solidFill>
-                  <a:srgbClr val="000000"/>
-                </a:solidFill>
-                <a:latin typeface="Consolas"/>
-                <a:ea typeface="Consolas"/>
-              </a:rPr>
-              <a:t>.GetFakeManager(fake).AddInterceptionListener(</a:t>
-            </a:r>
-            <a:r>
-              <a:rPr b="0" lang="ru-RU" sz="1200" spc="-1" strike="noStrike">
-                <a:solidFill>
-                  <a:srgbClr val="0000ff"/>
-                </a:solidFill>
-                <a:latin typeface="Consolas"/>
-                <a:ea typeface="Consolas"/>
-              </a:rPr>
-              <a:t>new </a:t>
-            </a:r>
-            <a:r>
-              <a:rPr b="0" lang="ru-RU" sz="1200" spc="-1" strike="noStrike">
-                <a:solidFill>
-                  <a:srgbClr val="2b91af"/>
-                </a:solidFill>
-                <a:latin typeface="Consolas"/>
-                <a:ea typeface="Consolas"/>
-              </a:rPr>
-              <a:t>CallSynchronizer</a:t>
-            </a:r>
-            <a:r>
-              <a:rPr b="0" lang="ru-RU" sz="1200" spc="-1" strike="noStrike">
-                <a:solidFill>
-                  <a:srgbClr val="000000"/>
-                </a:solidFill>
-                <a:latin typeface="Consolas"/>
-                <a:ea typeface="Consolas"/>
-              </a:rPr>
-              <a:t>()));</a:t>
-            </a:r>
-            <a:br/>
-            <a:r>
-              <a:rPr b="0" lang="ru-RU" sz="1200" spc="-1" strike="noStrike">
-                <a:solidFill>
-                  <a:srgbClr val="000000"/>
-                </a:solidFill>
-                <a:latin typeface="Consolas"/>
-                <a:ea typeface="Consolas"/>
-              </a:rPr>
-              <a:t>    }</a:t>
-            </a:r>
-            <a:br/>
-            <a:r>
-              <a:rPr b="0" lang="ru-RU" sz="1200" spc="-1" strike="noStrike">
-                <a:solidFill>
-                  <a:srgbClr val="000000"/>
-                </a:solidFill>
-                <a:latin typeface="Consolas"/>
-                <a:ea typeface="Consolas"/>
-              </a:rPr>
-              <a:t>}</a:t>
-            </a:r>
-            <a:endParaRPr b="0" lang="ru-RU" sz="1200" spc="-1" strike="noStrike">
-              <a:latin typeface="Arial"/>
-            </a:endParaRPr>
-          </a:p>
-          <a:p>
-            <a:pPr>
-              <a:lnSpc>
-                <a:spcPct val="100000"/>
-              </a:lnSpc>
-            </a:pPr>
-            <a:endParaRPr b="0" lang="ru-RU" sz="1200" spc="-1" strike="noStrike">
-              <a:latin typeface="Arial"/>
-            </a:endParaRPr>
-          </a:p>
-          <a:p>
-            <a:pPr>
-              <a:lnSpc>
-                <a:spcPct val="100000"/>
-              </a:lnSpc>
-            </a:pPr>
-            <a:r>
-              <a:rPr b="0" lang="ru-RU" sz="1200" spc="-1" strike="noStrike">
-                <a:solidFill>
-                  <a:srgbClr val="0000ff"/>
-                </a:solidFill>
-                <a:latin typeface="Consolas"/>
-                <a:ea typeface="Consolas"/>
-              </a:rPr>
-              <a:t>var shop</a:t>
-            </a:r>
-            <a:r>
-              <a:rPr b="0" lang="ru-RU" sz="1200" spc="-1" strike="noStrike">
-                <a:solidFill>
-                  <a:srgbClr val="000000"/>
-                </a:solidFill>
-                <a:latin typeface="Consolas"/>
-                <a:ea typeface="Consolas"/>
-              </a:rPr>
-              <a:t> = </a:t>
-            </a:r>
-            <a:r>
-              <a:rPr b="0" lang="ru-RU" sz="1200" spc="-1" strike="noStrike">
-                <a:solidFill>
-                  <a:srgbClr val="2b91af"/>
-                </a:solidFill>
-                <a:latin typeface="Consolas"/>
-                <a:ea typeface="Consolas"/>
-              </a:rPr>
-              <a:t>A</a:t>
-            </a:r>
-            <a:r>
-              <a:rPr b="0" lang="ru-RU" sz="1200" spc="-1" strike="noStrike">
-                <a:solidFill>
-                  <a:srgbClr val="000000"/>
-                </a:solidFill>
-                <a:latin typeface="Consolas"/>
-                <a:ea typeface="Consolas"/>
-              </a:rPr>
-              <a:t>.Fake&lt;</a:t>
-            </a:r>
-            <a:r>
-              <a:rPr b="0" lang="ru-RU" sz="1200" spc="-1" strike="noStrike">
-                <a:solidFill>
-                  <a:srgbClr val="2b91af"/>
-                </a:solidFill>
-                <a:latin typeface="Consolas"/>
-                <a:ea typeface="Consolas"/>
-              </a:rPr>
-              <a:t>ICandyShop</a:t>
-            </a:r>
-            <a:r>
-              <a:rPr b="0" lang="ru-RU" sz="1200" spc="-1" strike="noStrike">
-                <a:solidFill>
-                  <a:srgbClr val="000000"/>
-                </a:solidFill>
-                <a:latin typeface="Consolas"/>
-                <a:ea typeface="Consolas"/>
-              </a:rPr>
-              <a:t>&gt;(x=&gt;x.Strict().Synchronized());</a:t>
+                <a:hlinkClick r:id="rId1"/>
+              </a:rPr>
+              <a:t>https://blog.ndcconferences.com/unit-testing-multi-threaded-code-using-mocks/</a:t>
             </a:r>
             <a:endParaRPr b="0" lang="ru-RU" sz="1200" spc="-1" strike="noStrike">
               <a:latin typeface="Arial"/>
@@ -24225,7 +24301,7 @@
                                         <p:tgtEl>
                                           <p:spTgt spid="258">
                                             <p:txEl>
-                                              <p:pRg st="3" end="3"/>
+                                              <p:pRg st="2" end="2"/>
                                             </p:txEl>
                                           </p:spTgt>
                                         </p:tgtEl>
@@ -24274,9 +24350,54 @@
                                         <p:tgtEl>
                                           <p:spTgt spid="258">
                                             <p:txEl>
-                                              <p:pRg st="5" end="5"/>
+                                              <p:pRg st="4" end="4"/>
                                             </p:txEl>
                                           </p:spTgt>
+                                        </p:tgtEl>
+                                        <p:attrNameLst>
+                                          <p:attrName>style.visibility</p:attrName>
+                                        </p:attrNameLst>
+                                      </p:cBhvr>
+                                      <p:to>
+                                        <p:strVal val="visible"/>
+                                      </p:to>
+                                    </p:set>
+                                  </p:childTnLst>
+                                </p:cTn>
+                              </p:par>
+                            </p:childTnLst>
+                          </p:cTn>
+                        </p:par>
+                      </p:childTnLst>
+                    </p:cTn>
+                  </p:par>
+                  <p:par>
+                    <p:cTn id="87" fill="hold">
+                      <p:stCondLst>
+                        <p:cond delay="indefinite"/>
+                      </p:stCondLst>
+                      <p:childTnLst>
+                        <p:par>
+                          <p:cTn id="88" fill="hold">
+                            <p:stCondLst>
+                              <p:cond delay="0"/>
+                            </p:stCondLst>
+                            <p:childTnLst>
+                              <p:par>
+                                <p:cTn id="89" nodeType="clickEffect" fill="hold" presetClass="entr" presetID="1">
+                                  <p:stCondLst>
+                                    <p:cond delay="0"/>
+                                  </p:stCondLst>
+                                  <p:childTnLst>
+                                    <p:set>
+                                      <p:cBhvr>
+                                        <p:cTn id="90" dur="1" fill="hold">
+                                          <p:stCondLst>
+                                            <p:cond delay="0"/>
+                                          </p:stCondLst>
+                                        </p:cTn>
+                                        <p:tgtEl>
+                                          <p:spTgt spid="258"/>
                                         </p:tgtEl>
                                         <p:attrNameLst>
                                           <p:attrName>style.visibility</p:attrName>
@@ -24346,7 +24467,7 @@
         <p:spPr>
           <a:xfrm>
             <a:off x="1295280" y="1628640"/>
-            <a:ext cx="9600480" cy="4679280"/>
+            <a:ext cx="9600120" cy="4678920"/>
           </a:xfrm>
           <a:prstGeom prst="rect">
             <a:avLst/>
@@ -24550,7 +24671,7 @@
         <p:spPr>
           <a:xfrm>
             <a:off x="1295640" y="549360"/>
-            <a:ext cx="9600480" cy="791280"/>
+            <a:ext cx="9600120" cy="790920"/>
           </a:xfrm>
           <a:prstGeom prst="rect">
             <a:avLst/>
@@ -24615,10 +24736,10 @@
   <p:timing>
     <p:tnLst>
       <p:par>
-        <p:cTn id="87" dur="indefinite" restart="never" nodeType="tmRoot">
+        <p:cTn id="91" dur="indefinite" restart="never" nodeType="tmRoot">
           <p:childTnLst>
             <p:seq>
-              <p:cTn id="88" dur="indefinite" nodeType="mainSeq"/>
+              <p:cTn id="92" dur="indefinite" nodeType="mainSeq"/>
               <p:prevCondLst>
                 <p:cond delay="0" evt="onPrev">
                   <p:tgtEl>
@@ -24668,7 +24789,7 @@
         <p:spPr>
           <a:xfrm>
             <a:off x="1295280" y="1628640"/>
-            <a:ext cx="9600480" cy="4679280"/>
+            <a:ext cx="9600120" cy="4678920"/>
           </a:xfrm>
           <a:prstGeom prst="rect">
             <a:avLst/>
@@ -25176,7 +25297,7 @@
         <p:spPr>
           <a:xfrm>
             <a:off x="1295640" y="549360"/>
-            <a:ext cx="9600480" cy="791280"/>
+            <a:ext cx="9600120" cy="790920"/>
           </a:xfrm>
           <a:prstGeom prst="rect">
             <a:avLst/>
@@ -25241,10 +25362,10 @@
   <p:timing>
     <p:tnLst>
       <p:par>
-        <p:cTn id="89" dur="indefinite" restart="never" nodeType="tmRoot">
+        <p:cTn id="93" dur="indefinite" restart="never" nodeType="tmRoot">
           <p:childTnLst>
             <p:seq>
-              <p:cTn id="90" dur="indefinite" nodeType="mainSeq"/>
+              <p:cTn id="94" dur="indefinite" nodeType="mainSeq"/>
               <p:prevCondLst>
                 <p:cond delay="0" evt="onPrev">
                   <p:tgtEl>
@@ -25294,7 +25415,7 @@
         <p:spPr>
           <a:xfrm>
             <a:off x="1295280" y="1628640"/>
-            <a:ext cx="9600480" cy="4679280"/>
+            <a:ext cx="9600120" cy="4678920"/>
           </a:xfrm>
           <a:prstGeom prst="rect">
             <a:avLst/>
@@ -25838,7 +25959,7 @@
         <p:spPr>
           <a:xfrm>
             <a:off x="1295640" y="549360"/>
-            <a:ext cx="9600480" cy="791280"/>
+            <a:ext cx="9600120" cy="790920"/>
           </a:xfrm>
           <a:prstGeom prst="rect">
             <a:avLst/>
@@ -25903,32 +26024,32 @@
   <p:timing>
     <p:tnLst>
       <p:par>
-        <p:cTn id="91" dur="indefinite" restart="never" nodeType="tmRoot">
+        <p:cTn id="95" dur="indefinite" restart="never" nodeType="tmRoot">
           <p:childTnLst>
             <p:seq>
-              <p:cTn id="92" dur="indefinite" nodeType="mainSeq">
+              <p:cTn id="96" dur="indefinite" nodeType="mainSeq">
                 <p:childTnLst>
                   <p:par>
-                    <p:cTn id="93" fill="hold">
+                    <p:cTn id="97" fill="hold">
                       <p:stCondLst>
                         <p:cond delay="indefinite"/>
                       </p:stCondLst>
                       <p:childTnLst>
                         <p:par>
-                          <p:cTn id="94" fill="hold">
+                          <p:cTn id="98" fill="hold">
                             <p:stCondLst>
                               <p:cond delay="0"/>
                             </p:stCondLst>
                             <p:childTnLst>
                               <p:par>
-                                <p:cTn id="95" nodeType="clickEffect" fill="hold" presetClass="entr" presetID="1">
+                                <p:cTn id="99" nodeType="clickEffect" fill="hold" presetClass="entr" presetID="1">
                                   <p:stCondLst>
                                     <p:cond delay="0"/>
                                   </p:stCondLst>
                                   <p:childTnLst>
                                     <p:set>
                                       <p:cBhvr>
-                                        <p:cTn id="96" dur="1" fill="hold">
+                                        <p:cTn id="100" dur="1" fill="hold">
                                           <p:stCondLst>
                                             <p:cond delay="0"/>
                                           </p:stCondLst>
@@ -25952,14 +26073,14 @@
                                 </p:cTn>
                               </p:par>
                               <p:par>
-                                <p:cTn id="97" nodeType="withEffect" fill="hold" presetClass="entr" presetID="1">
+                                <p:cTn id="101" nodeType="withEffect" fill="hold" presetClass="entr" presetID="1">
                                   <p:stCondLst>
                                     <p:cond delay="0"/>
                                   </p:stCondLst>
                                   <p:childTnLst>
                                     <p:set>
                                       <p:cBhvr>
-                                        <p:cTn id="98" dur="1" fill="hold">
+                                        <p:cTn id="102" dur="1" fill="hold">
                                           <p:stCondLst>
                                             <p:cond delay="0"/>
                                           </p:stCondLst>
@@ -25983,14 +26104,14 @@
                                 </p:cTn>
                               </p:par>
                               <p:par>
-                                <p:cTn id="99" nodeType="withEffect" fill="hold" presetClass="entr" presetID="1">
+                                <p:cTn id="103" nodeType="withEffect" fill="hold" presetClass="entr" presetID="1">
                                   <p:stCondLst>
                                     <p:cond delay="0"/>
                                   </p:stCondLst>
                                   <p:childTnLst>
                                     <p:set>
                                       <p:cBhvr>
-                                        <p:cTn id="100" dur="1" fill="hold">
+                                        <p:cTn id="104" dur="1" fill="hold">
                                           <p:stCondLst>
                                             <p:cond delay="0"/>
                                           </p:stCondLst>

</xml_diff>

<commit_message>
Update for event for testers
</commit_message>
<xml_diff>
--- a/mocks.pptx
+++ b/mocks.pptx
@@ -2516,13 +2516,6 @@
         </dgm:presLayoutVars>
       </dgm:prSet>
       <dgm:spPr/>
-      <dgm:t>
-        <a:bodyPr/>
-        <a:lstStyle/>
-        <a:p>
-          <a:endParaRPr lang="ru-RU"/>
-        </a:p>
-      </dgm:t>
     </dgm:pt>
     <dgm:pt modelId="{CF6D50B3-578A-4EA0-A5A0-492FA729F6ED}" type="pres">
       <dgm:prSet presAssocID="{B75F6A3A-9A51-4DF3-8A57-9AEB0739425C}" presName="composite" presStyleCnt="0"/>
@@ -2535,13 +2528,6 @@
         </dgm:presLayoutVars>
       </dgm:prSet>
       <dgm:spPr/>
-      <dgm:t>
-        <a:bodyPr/>
-        <a:lstStyle/>
-        <a:p>
-          <a:endParaRPr lang="ru-RU"/>
-        </a:p>
-      </dgm:t>
     </dgm:pt>
     <dgm:pt modelId="{61EB78D8-69FF-471D-8FEB-71388C442F55}" type="pres">
       <dgm:prSet presAssocID="{B75F6A3A-9A51-4DF3-8A57-9AEB0739425C}" presName="rect1" presStyleLbl="alignImgPlace1" presStyleIdx="0" presStyleCnt="1" custScaleX="596594" custScaleY="114980" custLinFactX="-64576" custLinFactNeighborX="-100000" custLinFactNeighborY="-13065"/>
@@ -2563,9 +2549,9 @@
     </dgm:pt>
   </dgm:ptLst>
   <dgm:cxnLst>
-    <dgm:cxn modelId="{017518C9-1619-4B19-AA03-86BA999BA287}" srcId="{EAB81984-5B84-4970-8447-2B456B8C58DF}" destId="{B75F6A3A-9A51-4DF3-8A57-9AEB0739425C}" srcOrd="0" destOrd="0" parTransId="{203596AF-4F49-40BA-B1E1-11BDD34B512E}" sibTransId="{A056157B-3867-49A4-9195-F3A4F3FBBA8E}"/>
     <dgm:cxn modelId="{1CEAA455-5BF4-4666-95B8-390900AB8124}" type="presOf" srcId="{EAB81984-5B84-4970-8447-2B456B8C58DF}" destId="{3A252E36-3D7E-49E5-B812-EE4CACF0D5CF}" srcOrd="0" destOrd="0" presId="urn:microsoft.com/office/officeart/2008/layout/PictureGrid"/>
     <dgm:cxn modelId="{147A14B3-96E8-4139-969B-9DB1BCB4D95E}" type="presOf" srcId="{B75F6A3A-9A51-4DF3-8A57-9AEB0739425C}" destId="{B29ABF60-EC0F-45AD-A90E-9C76D15C2F14}" srcOrd="0" destOrd="0" presId="urn:microsoft.com/office/officeart/2008/layout/PictureGrid"/>
+    <dgm:cxn modelId="{017518C9-1619-4B19-AA03-86BA999BA287}" srcId="{EAB81984-5B84-4970-8447-2B456B8C58DF}" destId="{B75F6A3A-9A51-4DF3-8A57-9AEB0739425C}" srcOrd="0" destOrd="0" parTransId="{203596AF-4F49-40BA-B1E1-11BDD34B512E}" sibTransId="{A056157B-3867-49A4-9195-F3A4F3FBBA8E}"/>
     <dgm:cxn modelId="{D3458AFA-605E-43EE-8C8A-0E0C1E3CD931}" type="presParOf" srcId="{3A252E36-3D7E-49E5-B812-EE4CACF0D5CF}" destId="{CF6D50B3-578A-4EA0-A5A0-492FA729F6ED}" srcOrd="0" destOrd="0" presId="urn:microsoft.com/office/officeart/2008/layout/PictureGrid"/>
     <dgm:cxn modelId="{9835F3F3-3E30-4AC4-AD89-BC095FA9A878}" type="presParOf" srcId="{CF6D50B3-578A-4EA0-A5A0-492FA729F6ED}" destId="{B29ABF60-EC0F-45AD-A90E-9C76D15C2F14}" srcOrd="0" destOrd="0" presId="urn:microsoft.com/office/officeart/2008/layout/PictureGrid"/>
     <dgm:cxn modelId="{70FA379F-7827-49B9-806E-1FD72CAE8F89}" type="presParOf" srcId="{CF6D50B3-578A-4EA0-A5A0-492FA729F6ED}" destId="{61EB78D8-69FF-471D-8FEB-71388C442F55}" srcOrd="1" destOrd="0" presId="urn:microsoft.com/office/officeart/2008/layout/PictureGrid"/>
@@ -2637,13 +2623,6 @@
         </dgm:presLayoutVars>
       </dgm:prSet>
       <dgm:spPr/>
-      <dgm:t>
-        <a:bodyPr/>
-        <a:lstStyle/>
-        <a:p>
-          <a:endParaRPr lang="ru-RU"/>
-        </a:p>
-      </dgm:t>
     </dgm:pt>
     <dgm:pt modelId="{CF6D50B3-578A-4EA0-A5A0-492FA729F6ED}" type="pres">
       <dgm:prSet presAssocID="{B75F6A3A-9A51-4DF3-8A57-9AEB0739425C}" presName="composite" presStyleCnt="0"/>
@@ -2656,13 +2635,6 @@
         </dgm:presLayoutVars>
       </dgm:prSet>
       <dgm:spPr/>
-      <dgm:t>
-        <a:bodyPr/>
-        <a:lstStyle/>
-        <a:p>
-          <a:endParaRPr lang="ru-RU"/>
-        </a:p>
-      </dgm:t>
     </dgm:pt>
     <dgm:pt modelId="{61EB78D8-69FF-471D-8FEB-71388C442F55}" type="pres">
       <dgm:prSet presAssocID="{B75F6A3A-9A51-4DF3-8A57-9AEB0739425C}" presName="rect1" presStyleLbl="alignImgPlace1" presStyleIdx="0" presStyleCnt="1" custScaleX="596594" custScaleY="114980" custLinFactX="-64576" custLinFactNeighborX="-100000" custLinFactNeighborY="-13065"/>
@@ -2684,9 +2656,9 @@
     </dgm:pt>
   </dgm:ptLst>
   <dgm:cxnLst>
-    <dgm:cxn modelId="{017518C9-1619-4B19-AA03-86BA999BA287}" srcId="{EAB81984-5B84-4970-8447-2B456B8C58DF}" destId="{B75F6A3A-9A51-4DF3-8A57-9AEB0739425C}" srcOrd="0" destOrd="0" parTransId="{203596AF-4F49-40BA-B1E1-11BDD34B512E}" sibTransId="{A056157B-3867-49A4-9195-F3A4F3FBBA8E}"/>
     <dgm:cxn modelId="{1CEAA455-5BF4-4666-95B8-390900AB8124}" type="presOf" srcId="{EAB81984-5B84-4970-8447-2B456B8C58DF}" destId="{3A252E36-3D7E-49E5-B812-EE4CACF0D5CF}" srcOrd="0" destOrd="0" presId="urn:microsoft.com/office/officeart/2008/layout/PictureGrid"/>
     <dgm:cxn modelId="{147A14B3-96E8-4139-969B-9DB1BCB4D95E}" type="presOf" srcId="{B75F6A3A-9A51-4DF3-8A57-9AEB0739425C}" destId="{B29ABF60-EC0F-45AD-A90E-9C76D15C2F14}" srcOrd="0" destOrd="0" presId="urn:microsoft.com/office/officeart/2008/layout/PictureGrid"/>
+    <dgm:cxn modelId="{017518C9-1619-4B19-AA03-86BA999BA287}" srcId="{EAB81984-5B84-4970-8447-2B456B8C58DF}" destId="{B75F6A3A-9A51-4DF3-8A57-9AEB0739425C}" srcOrd="0" destOrd="0" parTransId="{203596AF-4F49-40BA-B1E1-11BDD34B512E}" sibTransId="{A056157B-3867-49A4-9195-F3A4F3FBBA8E}"/>
     <dgm:cxn modelId="{D3458AFA-605E-43EE-8C8A-0E0C1E3CD931}" type="presParOf" srcId="{3A252E36-3D7E-49E5-B812-EE4CACF0D5CF}" destId="{CF6D50B3-578A-4EA0-A5A0-492FA729F6ED}" srcOrd="0" destOrd="0" presId="urn:microsoft.com/office/officeart/2008/layout/PictureGrid"/>
     <dgm:cxn modelId="{9835F3F3-3E30-4AC4-AD89-BC095FA9A878}" type="presParOf" srcId="{CF6D50B3-578A-4EA0-A5A0-492FA729F6ED}" destId="{B29ABF60-EC0F-45AD-A90E-9C76D15C2F14}" srcOrd="0" destOrd="0" presId="urn:microsoft.com/office/officeart/2008/layout/PictureGrid"/>
     <dgm:cxn modelId="{70FA379F-7827-49B9-806E-1FD72CAE8F89}" type="presParOf" srcId="{CF6D50B3-578A-4EA0-A5A0-492FA729F6ED}" destId="{61EB78D8-69FF-471D-8FEB-71388C442F55}" srcOrd="1" destOrd="0" presId="urn:microsoft.com/office/officeart/2008/layout/PictureGrid"/>
@@ -2776,13 +2748,6 @@
         </dgm:presLayoutVars>
       </dgm:prSet>
       <dgm:spPr/>
-      <dgm:t>
-        <a:bodyPr/>
-        <a:lstStyle/>
-        <a:p>
-          <a:endParaRPr lang="ru-RU"/>
-        </a:p>
-      </dgm:t>
     </dgm:pt>
     <dgm:pt modelId="{65D73C51-61AB-436D-8191-975603FC9C68}" type="pres">
       <dgm:prSet presAssocID="{9C9C0585-42CE-4F34-A2BB-F1377DA03788}" presName="composite" presStyleCnt="0"/>
@@ -2795,13 +2760,6 @@
         </dgm:presLayoutVars>
       </dgm:prSet>
       <dgm:spPr/>
-      <dgm:t>
-        <a:bodyPr/>
-        <a:lstStyle/>
-        <a:p>
-          <a:endParaRPr lang="ru-RU"/>
-        </a:p>
-      </dgm:t>
     </dgm:pt>
     <dgm:pt modelId="{DFDA3CA3-5C68-4A2F-A4A8-285063A35D87}" type="pres">
       <dgm:prSet presAssocID="{9C9C0585-42CE-4F34-A2BB-F1377DA03788}" presName="rect1" presStyleLbl="alignImgPlace1" presStyleIdx="0" presStyleCnt="1" custScaleX="62421" custScaleY="62421" custLinFactNeighborX="1076" custLinFactNeighborY="-52209"/>
@@ -2826,8 +2784,8 @@
     </dgm:pt>
   </dgm:ptLst>
   <dgm:cxnLst>
+    <dgm:cxn modelId="{A9E27516-E8E4-42A7-A155-024D48E79559}" type="presOf" srcId="{8F66C165-B39F-46D3-B19F-623799541DD3}" destId="{B6F028CB-F170-4FEF-BC3A-25F0E90D434A}" srcOrd="0" destOrd="0" presId="urn:microsoft.com/office/officeart/2008/layout/PictureGrid"/>
     <dgm:cxn modelId="{A177C822-7566-4410-A889-706A6CE15148}" srcId="{8F66C165-B39F-46D3-B19F-623799541DD3}" destId="{9C9C0585-42CE-4F34-A2BB-F1377DA03788}" srcOrd="0" destOrd="0" parTransId="{4E5DCF2B-AAE7-41E2-837F-518128C03597}" sibTransId="{56F70C7F-1925-4DBA-9BD6-AF5E91799A59}"/>
-    <dgm:cxn modelId="{A9E27516-E8E4-42A7-A155-024D48E79559}" type="presOf" srcId="{8F66C165-B39F-46D3-B19F-623799541DD3}" destId="{B6F028CB-F170-4FEF-BC3A-25F0E90D434A}" srcOrd="0" destOrd="0" presId="urn:microsoft.com/office/officeart/2008/layout/PictureGrid"/>
     <dgm:cxn modelId="{ACD53F50-5BA1-48C9-B5DF-09BF6DA4DE65}" type="presOf" srcId="{9C9C0585-42CE-4F34-A2BB-F1377DA03788}" destId="{A30F2283-C0A4-4A69-BCBE-833D967155A2}" srcOrd="0" destOrd="0" presId="urn:microsoft.com/office/officeart/2008/layout/PictureGrid"/>
     <dgm:cxn modelId="{CC189C1C-06A1-4F03-B886-67BF46A53703}" type="presParOf" srcId="{B6F028CB-F170-4FEF-BC3A-25F0E90D434A}" destId="{65D73C51-61AB-436D-8191-975603FC9C68}" srcOrd="0" destOrd="0" presId="urn:microsoft.com/office/officeart/2008/layout/PictureGrid"/>
     <dgm:cxn modelId="{CD7DB92E-B84F-43A0-AC2D-FBBFB40722EE}" type="presParOf" srcId="{65D73C51-61AB-436D-8191-975603FC9C68}" destId="{A30F2283-C0A4-4A69-BCBE-833D967155A2}" srcOrd="0" destOrd="0" presId="urn:microsoft.com/office/officeart/2008/layout/PictureGrid"/>
@@ -2888,7 +2846,7 @@
         </a:bodyPr>
         <a:lstStyle/>
         <a:p>
-          <a:pPr lvl="0" algn="l" defTabSz="222250">
+          <a:pPr marL="0" lvl="0" indent="0" algn="l" defTabSz="222250">
             <a:lnSpc>
               <a:spcPct val="90000"/>
             </a:lnSpc>
@@ -2898,6 +2856,7 @@
             <a:spcAft>
               <a:spcPct val="35000"/>
             </a:spcAft>
+            <a:buNone/>
           </a:pPr>
           <a:r>
             <a:rPr lang="ru-RU" sz="500" kern="1200" dirty="0"/>
@@ -3011,7 +2970,7 @@
         </a:bodyPr>
         <a:lstStyle/>
         <a:p>
-          <a:pPr lvl="0" algn="l" defTabSz="222250">
+          <a:pPr marL="0" lvl="0" indent="0" algn="l" defTabSz="222250">
             <a:lnSpc>
               <a:spcPct val="90000"/>
             </a:lnSpc>
@@ -3021,6 +2980,7 @@
             <a:spcAft>
               <a:spcPct val="35000"/>
             </a:spcAft>
+            <a:buNone/>
           </a:pPr>
           <a:r>
             <a:rPr lang="ru-RU" sz="500" kern="1200" dirty="0"/>
@@ -3134,7 +3094,7 @@
         </a:bodyPr>
         <a:lstStyle/>
         <a:p>
-          <a:pPr lvl="0" algn="ctr" defTabSz="1778000">
+          <a:pPr marL="0" lvl="0" indent="0" algn="ctr" defTabSz="1778000">
             <a:lnSpc>
               <a:spcPct val="90000"/>
             </a:lnSpc>
@@ -3144,6 +3104,7 @@
             <a:spcAft>
               <a:spcPct val="35000"/>
             </a:spcAft>
+            <a:buNone/>
           </a:pPr>
           <a:r>
             <a:rPr lang="ru-RU" sz="4000" kern="1200" dirty="0">
@@ -7204,7 +7165,7 @@
           <a:p>
             <a:fld id="{1D12B38D-150E-44F0-AD67-CE4A0E7D73CD}" type="datetimeFigureOut">
               <a:rPr lang="ru-RU" smtClean="0"/>
-              <a:t>26.08.2019</a:t>
+              <a:t>15.06.2020</a:t>
             </a:fld>
             <a:endParaRPr lang="ru-RU"/>
           </a:p>
@@ -8554,10 +8515,6 @@
             <a:endParaRPr lang="ru-RU" baseline="0"/>
           </a:p>
           <a:p>
-            <a:r>
-              <a:rPr lang="ru-RU" baseline="0" dirty="0"/>
-              <a:t/>
-            </a:r>
             <a:br>
               <a:rPr lang="ru-RU" baseline="0" dirty="0"/>
             </a:br>
@@ -9879,92 +9836,91 @@
           <a:lstStyle/>
           <a:p>
             <a:r>
-              <a:rPr lang="ru-RU" dirty="0" smtClean="0"/>
+              <a:rPr lang="ru-RU" dirty="0"/>
               <a:t>Как будет вести себя </a:t>
             </a:r>
             <a:r>
-              <a:rPr lang="ru-RU" dirty="0" err="1" smtClean="0"/>
+              <a:rPr lang="ru-RU" dirty="0" err="1"/>
               <a:t>mock</a:t>
             </a:r>
             <a:r>
-              <a:rPr lang="ru-RU" dirty="0" smtClean="0"/>
+              <a:rPr lang="ru-RU" dirty="0"/>
               <a:t>-объект, если вызов будет происходить при тестировании многопоточного кода? Например, мы тестируем метод класса </a:t>
             </a:r>
             <a:r>
-              <a:rPr lang="ru-RU" dirty="0" err="1" smtClean="0"/>
+              <a:rPr lang="ru-RU" dirty="0" err="1"/>
               <a:t>Server</a:t>
             </a:r>
             <a:r>
-              <a:rPr lang="ru-RU" dirty="0" smtClean="0"/>
+              <a:rPr lang="ru-RU" dirty="0"/>
               <a:t>, который зависит от </a:t>
             </a:r>
             <a:r>
-              <a:rPr lang="ru-RU" dirty="0" err="1" smtClean="0"/>
+              <a:rPr lang="ru-RU" dirty="0" err="1"/>
               <a:t>Ilogger</a:t>
             </a:r>
             <a:r>
-              <a:rPr lang="ru-RU" dirty="0" smtClean="0"/>
+              <a:rPr lang="ru-RU" dirty="0"/>
               <a:t>, и хотим замокать </a:t>
             </a:r>
             <a:r>
-              <a:rPr lang="ru-RU" dirty="0" err="1" smtClean="0"/>
+              <a:rPr lang="ru-RU" dirty="0" err="1"/>
               <a:t>логирование</a:t>
             </a:r>
             <a:r>
-              <a:rPr lang="ru-RU" dirty="0" smtClean="0"/>
+              <a:rPr lang="ru-RU" dirty="0"/>
               <a:t>. Не упадет ли наш тест из-за того, что обращение к «</a:t>
             </a:r>
             <a:r>
-              <a:rPr lang="ru-RU" dirty="0" err="1" smtClean="0"/>
+              <a:rPr lang="ru-RU" dirty="0" err="1"/>
               <a:t>фейковому</a:t>
             </a:r>
             <a:r>
-              <a:rPr lang="ru-RU" dirty="0" smtClean="0"/>
+              <a:rPr lang="ru-RU" dirty="0"/>
               <a:t>» логгеру будет происходить из разных потоков?</a:t>
             </a:r>
           </a:p>
           <a:p>
             <a:r>
-              <a:rPr lang="ru-RU" dirty="0" smtClean="0"/>
+              <a:rPr lang="ru-RU" dirty="0"/>
               <a:t>Ответ: нет.</a:t>
             </a:r>
           </a:p>
           <a:p>
             <a:r>
-              <a:rPr lang="ru-RU" dirty="0" smtClean="0"/>
+              <a:rPr lang="ru-RU" dirty="0"/>
               <a:t>Библиотека </a:t>
             </a:r>
             <a:r>
-              <a:rPr lang="ru-RU" dirty="0" err="1" smtClean="0"/>
+              <a:rPr lang="ru-RU" dirty="0" err="1"/>
               <a:t>FakeItEasy</a:t>
             </a:r>
             <a:r>
-              <a:rPr lang="ru-RU" dirty="0" smtClean="0"/>
+              <a:rPr lang="ru-RU" dirty="0"/>
               <a:t> корректно работает в многопоточном коде.</a:t>
             </a:r>
           </a:p>
           <a:p>
             <a:r>
-              <a:rPr lang="ru-RU" dirty="0" smtClean="0"/>
+              <a:rPr lang="ru-RU" dirty="0"/>
               <a:t>По ссылке небольшая статья о тестировании многопоточного кода с использованием </a:t>
             </a:r>
             <a:r>
-              <a:rPr lang="ru-RU" dirty="0" err="1" smtClean="0"/>
+              <a:rPr lang="ru-RU" dirty="0" err="1"/>
               <a:t>моков</a:t>
             </a:r>
             <a:r>
-              <a:rPr lang="ru-RU" dirty="0" smtClean="0"/>
+              <a:rPr lang="ru-RU" dirty="0"/>
               <a:t> на пример </a:t>
             </a:r>
             <a:r>
-              <a:rPr lang="ru-RU" dirty="0" err="1" smtClean="0"/>
+              <a:rPr lang="ru-RU" dirty="0" err="1"/>
               <a:t>Typemock</a:t>
             </a:r>
             <a:r>
-              <a:rPr lang="ru-RU" smtClean="0"/>
+              <a:rPr lang="ru-RU"/>
               <a:t>.</a:t>
             </a:r>
-            <a:endParaRPr lang="ru-RU"/>
           </a:p>
         </p:txBody>
       </p:sp>
@@ -10079,7 +10035,15 @@
           <a:p>
             <a:r>
               <a:rPr lang="ru-RU" baseline="0" dirty="0"/>
-              <a:t>Дальше еще два слайда, а потом начинаем задачу.</a:t>
+              <a:t>Дальше </a:t>
+            </a:r>
+            <a:r>
+              <a:rPr lang="ru-RU" baseline="0"/>
+              <a:t>еще несколько слайдов, </a:t>
+            </a:r>
+            <a:r>
+              <a:rPr lang="ru-RU" baseline="0" dirty="0"/>
+              <a:t>а потом начинаем задачу.</a:t>
             </a:r>
             <a:endParaRPr lang="en-US" baseline="0" dirty="0"/>
           </a:p>
@@ -17257,11 +17221,11 @@
           <a:p>
             <a:r>
               <a:rPr lang="ru-RU" sz="3600" dirty="0"/>
-              <a:t>Зачем нужны значения </a:t>
-            </a:r>
-            <a:r>
-              <a:rPr lang="ru-RU" sz="3600" dirty="0" err="1"/>
-              <a:t>по-умолчанию</a:t>
+              <a:t>Зачем нужны </a:t>
+            </a:r>
+            <a:r>
+              <a:rPr lang="ru-RU" sz="3600"/>
+              <a:t>значения по умолчанию</a:t>
             </a:r>
             <a:r>
               <a:rPr lang="ru-RU" sz="3600" dirty="0"/>
@@ -18873,10 +18837,6 @@
               <a:rPr lang="en-US" dirty="0"/>
               <a:t>ct</a:t>
             </a:r>
-            <a:r>
-              <a:rPr lang="ru-RU" dirty="0"/>
-              <a:t/>
-            </a:r>
             <a:br>
               <a:rPr lang="ru-RU" dirty="0"/>
             </a:br>
@@ -19554,14 +19514,6 @@
   <p:clrMapOvr>
     <a:masterClrMapping/>
   </p:clrMapOvr>
-  <mc:AlternateContent xmlns:mc="http://schemas.openxmlformats.org/markup-compatibility/2006" xmlns:p14="http://schemas.microsoft.com/office/powerpoint/2010/main">
-    <mc:Choice Requires="p14">
-      <p:transition spd="slow" p14:dur="2000"/>
-    </mc:Choice>
-    <mc:Fallback xmlns="">
-      <p:transition spd="slow"/>
-    </mc:Fallback>
-  </mc:AlternateContent>
 </p:sld>
 </file>
 
@@ -19806,14 +19758,6 @@
   <p:clrMapOvr>
     <a:masterClrMapping/>
   </p:clrMapOvr>
-  <mc:AlternateContent xmlns:mc="http://schemas.openxmlformats.org/markup-compatibility/2006" xmlns:p14="http://schemas.microsoft.com/office/powerpoint/2010/main">
-    <mc:Choice Requires="p14">
-      <p:transition spd="slow" p14:dur="2000"/>
-    </mc:Choice>
-    <mc:Fallback xmlns="">
-      <p:transition spd="slow"/>
-    </mc:Fallback>
-  </mc:AlternateContent>
 </p:sld>
 </file>
 
@@ -19981,7 +19925,7 @@
                 <a14:useLocalDpi xmlns:a14="http://schemas.microsoft.com/office/drawing/2010/main" val="0"/>
               </a:ext>
               <a:ext uri="{96DAC541-7B7A-43D3-8B79-37D633B846F1}">
-                <asvg:svgBlip xmlns="" xmlns:asvg="http://schemas.microsoft.com/office/drawing/2016/SVG/main" r:embed="rId4"/>
+                <asvg:svgBlip xmlns:asvg="http://schemas.microsoft.com/office/drawing/2016/SVG/main" r:embed="rId4"/>
               </a:ext>
             </a:extLst>
           </a:blip>
@@ -20361,16 +20305,6 @@
                 <a:cs typeface="Consolas" panose="020B0609020204030204" pitchFamily="49" charset="0"/>
               </a:rPr>
               <a:t>&gt;(); </a:t>
-            </a:r>
-            <a:r>
-              <a:rPr lang="en-US" altLang="ru-RU" sz="2000" dirty="0">
-                <a:solidFill>
-                  <a:srgbClr val="969896"/>
-                </a:solidFill>
-                <a:latin typeface="Consolas" panose="020B0609020204030204" pitchFamily="49" charset="0"/>
-                <a:cs typeface="Consolas" panose="020B0609020204030204" pitchFamily="49" charset="0"/>
-              </a:rPr>
-              <a:t/>
             </a:r>
             <a:br>
               <a:rPr lang="en-US" altLang="ru-RU" sz="2000" dirty="0">
@@ -21777,10 +21711,6 @@
             <a:r>
               <a:rPr lang="en-US" sz="2800" dirty="0" err="1"/>
               <a:t>Castle.DynamicProxy</a:t>
-            </a:r>
-            <a:r>
-              <a:rPr lang="en-US" sz="2000" dirty="0"/>
-              <a:t/>
             </a:r>
             <a:br>
               <a:rPr lang="en-US" sz="2000" dirty="0"/>
@@ -22892,10 +22822,6 @@
             <a:endParaRPr lang="ru-RU" sz="2800" dirty="0"/>
           </a:p>
           <a:p>
-            <a:r>
-              <a:rPr lang="en-US" sz="2000" dirty="0"/>
-              <a:t/>
-            </a:r>
             <a:br>
               <a:rPr lang="en-US" sz="2000" dirty="0"/>
             </a:br>
@@ -23681,30 +23607,30 @@
               <a:t>GetBestCandy</a:t>
             </a:r>
             <a:r>
-              <a:rPr lang="ru-RU" dirty="0" smtClean="0">
+              <a:rPr lang="ru-RU" dirty="0">
                 <a:latin typeface="Consolas" panose="020B0609020204030204" pitchFamily="49" charset="0"/>
               </a:rPr>
               <a:t>())</a:t>
             </a:r>
-            <a:endParaRPr lang="en-US" dirty="0" smtClean="0">
+            <a:endParaRPr lang="en-US" dirty="0">
               <a:latin typeface="Consolas" panose="020B0609020204030204" pitchFamily="49" charset="0"/>
             </a:endParaRPr>
           </a:p>
           <a:p>
             <a:r>
-              <a:rPr lang="en-US" dirty="0" smtClean="0">
+              <a:rPr lang="en-US" dirty="0">
                 <a:latin typeface="Consolas" panose="020B0609020204030204" pitchFamily="49" charset="0"/>
               </a:rPr>
               <a:t>    </a:t>
             </a:r>
             <a:r>
-              <a:rPr lang="ru-RU" dirty="0" smtClean="0">
+              <a:rPr lang="ru-RU" dirty="0">
                 <a:latin typeface="Consolas" panose="020B0609020204030204" pitchFamily="49" charset="0"/>
               </a:rPr>
               <a:t>.</a:t>
             </a:r>
             <a:r>
-              <a:rPr lang="ru-RU" dirty="0" err="1" smtClean="0">
+              <a:rPr lang="ru-RU" dirty="0" err="1">
                 <a:solidFill>
                   <a:srgbClr val="2B91AF"/>
                 </a:solidFill>
@@ -23713,25 +23639,25 @@
               <a:t>MustHaveHappened</a:t>
             </a:r>
             <a:r>
-              <a:rPr lang="ru-RU" dirty="0" smtClean="0">
+              <a:rPr lang="ru-RU" dirty="0">
                 <a:latin typeface="Consolas" panose="020B0609020204030204" pitchFamily="49" charset="0"/>
               </a:rPr>
               <a:t>(</a:t>
             </a:r>
             <a:r>
-              <a:rPr lang="ru-RU" dirty="0" err="1" smtClean="0">
+              <a:rPr lang="ru-RU" dirty="0" err="1">
                 <a:latin typeface="Consolas" panose="020B0609020204030204" pitchFamily="49" charset="0"/>
               </a:rPr>
               <a:t>callCount</a:t>
             </a:r>
             <a:r>
-              <a:rPr lang="ru-RU" dirty="0" smtClean="0">
+              <a:rPr lang="ru-RU" dirty="0">
                 <a:latin typeface="Consolas" panose="020B0609020204030204" pitchFamily="49" charset="0"/>
               </a:rPr>
               <a:t>, </a:t>
             </a:r>
             <a:r>
-              <a:rPr lang="ru-RU" dirty="0" err="1" smtClean="0">
+              <a:rPr lang="ru-RU" dirty="0" err="1">
                 <a:solidFill>
                   <a:srgbClr val="00007F"/>
                 </a:solidFill>
@@ -23740,7 +23666,7 @@
               <a:t>Times</a:t>
             </a:r>
             <a:r>
-              <a:rPr lang="ru-RU" dirty="0" err="1" smtClean="0">
+              <a:rPr lang="ru-RU" dirty="0" err="1">
                 <a:latin typeface="Consolas" panose="020B0609020204030204" pitchFamily="49" charset="0"/>
               </a:rPr>
               <a:t>.Exactly</a:t>

</xml_diff>